<commit_message>
two figures for type and name gen models
</commit_message>
<xml_diff>
--- a/figures/figures.pptx
+++ b/figures/figures.pptx
@@ -10,6 +10,7 @@
     <p:sldId id="258" r:id="rId4"/>
     <p:sldId id="259" r:id="rId5"/>
     <p:sldId id="260" r:id="rId6"/>
+    <p:sldId id="261" r:id="rId7"/>
   </p:sldIdLst>
   <p:sldSz cx="12192000" cy="6858000"/>
   <p:notesSz cx="6858000" cy="9144000"/>
@@ -13332,6 +13333,12 @@
           <a:prstGeom prst="rect">
             <a:avLst/>
           </a:prstGeom>
+          <a:solidFill>
+            <a:schemeClr val="accent5">
+              <a:lumMod val="40000"/>
+              <a:lumOff val="60000"/>
+            </a:schemeClr>
+          </a:solidFill>
           <a:ln/>
           <a:effectLst>
             <a:outerShdw blurRad="50800" dist="38100" dir="2700000" algn="tl" rotWithShape="0">
@@ -13947,10 +13954,4143 @@
           </a:fontRef>
         </p:style>
       </p:cxnSp>
+      <p:sp>
+        <p:nvSpPr>
+          <p:cNvPr id="3" name="TextBox 2">
+            <a:extLst>
+              <a:ext uri="{FF2B5EF4-FFF2-40B4-BE49-F238E27FC236}">
+                <a16:creationId xmlns:a16="http://schemas.microsoft.com/office/drawing/2014/main" id="{2EEB875D-7093-427D-A225-855AD93467A1}"/>
+              </a:ext>
+            </a:extLst>
+          </p:cNvPr>
+          <p:cNvSpPr txBox="1"/>
+          <p:nvPr/>
+        </p:nvSpPr>
+        <p:spPr>
+          <a:xfrm>
+            <a:off x="-72165" y="2483505"/>
+            <a:ext cx="1628459" cy="369332"/>
+          </a:xfrm>
+          <a:prstGeom prst="rect">
+            <a:avLst/>
+          </a:prstGeom>
+          <a:noFill/>
+        </p:spPr>
+        <p:txBody>
+          <a:bodyPr wrap="none" rtlCol="0">
+            <a:spAutoFit/>
+          </a:bodyPr>
+          <a:lstStyle/>
+          <a:p>
+            <a:r>
+              <a:rPr lang="en-US" dirty="0"/>
+              <a:t>Complete Code</a:t>
+            </a:r>
+          </a:p>
+        </p:txBody>
+      </p:sp>
     </p:spTree>
     <p:extLst>
       <p:ext uri="{BB962C8B-B14F-4D97-AF65-F5344CB8AC3E}">
         <p14:creationId xmlns:p14="http://schemas.microsoft.com/office/powerpoint/2010/main" val="2965220434"/>
+      </p:ext>
+    </p:extLst>
+  </p:cSld>
+  <p:clrMapOvr>
+    <a:masterClrMapping/>
+  </p:clrMapOvr>
+</p:sld>
+</file>
+
+<file path=ppt/slides/slide6.xml><?xml version="1.0" encoding="utf-8"?>
+<p:sld xmlns:a="http://schemas.openxmlformats.org/drawingml/2006/main" xmlns:r="http://schemas.openxmlformats.org/officeDocument/2006/relationships" xmlns:p="http://schemas.openxmlformats.org/presentationml/2006/main">
+  <p:cSld>
+    <p:spTree>
+      <p:nvGrpSpPr>
+        <p:cNvPr id="1" name=""/>
+        <p:cNvGrpSpPr/>
+        <p:nvPr/>
+      </p:nvGrpSpPr>
+      <p:grpSpPr>
+        <a:xfrm>
+          <a:off x="0" y="0"/>
+          <a:ext cx="0" cy="0"/>
+          <a:chOff x="0" y="0"/>
+          <a:chExt cx="0" cy="0"/>
+        </a:xfrm>
+      </p:grpSpPr>
+      <p:grpSp>
+        <p:nvGrpSpPr>
+          <p:cNvPr id="4" name="Group 3">
+            <a:extLst>
+              <a:ext uri="{FF2B5EF4-FFF2-40B4-BE49-F238E27FC236}">
+                <a16:creationId xmlns:a16="http://schemas.microsoft.com/office/drawing/2014/main" id="{05BD183D-0B86-42EB-88F6-042196F2497E}"/>
+              </a:ext>
+            </a:extLst>
+          </p:cNvPr>
+          <p:cNvGrpSpPr/>
+          <p:nvPr/>
+        </p:nvGrpSpPr>
+        <p:grpSpPr>
+          <a:xfrm>
+            <a:off x="39859" y="2885857"/>
+            <a:ext cx="1261872" cy="1309146"/>
+            <a:chOff x="3666744" y="2717780"/>
+            <a:chExt cx="1261872" cy="1309146"/>
+          </a:xfrm>
+        </p:grpSpPr>
+        <p:sp>
+          <p:nvSpPr>
+            <p:cNvPr id="5" name="Oval 4">
+              <a:extLst>
+                <a:ext uri="{FF2B5EF4-FFF2-40B4-BE49-F238E27FC236}">
+                  <a16:creationId xmlns:a16="http://schemas.microsoft.com/office/drawing/2014/main" id="{E5788072-969C-4C1D-B81B-3E02357D4D70}"/>
+                </a:ext>
+              </a:extLst>
+            </p:cNvPr>
+            <p:cNvSpPr/>
+            <p:nvPr/>
+          </p:nvSpPr>
+          <p:spPr>
+            <a:xfrm>
+              <a:off x="4197096" y="2717780"/>
+              <a:ext cx="182880" cy="182880"/>
+            </a:xfrm>
+            <a:prstGeom prst="ellipse">
+              <a:avLst/>
+            </a:prstGeom>
+            <a:solidFill>
+              <a:schemeClr val="accent6">
+                <a:lumMod val="20000"/>
+                <a:lumOff val="80000"/>
+              </a:schemeClr>
+            </a:solidFill>
+            <a:ln>
+              <a:solidFill>
+                <a:schemeClr val="accent6">
+                  <a:lumMod val="75000"/>
+                </a:schemeClr>
+              </a:solidFill>
+            </a:ln>
+          </p:spPr>
+          <p:style>
+            <a:lnRef idx="2">
+              <a:schemeClr val="accent1">
+                <a:shade val="50000"/>
+              </a:schemeClr>
+            </a:lnRef>
+            <a:fillRef idx="1">
+              <a:schemeClr val="accent1"/>
+            </a:fillRef>
+            <a:effectRef idx="0">
+              <a:schemeClr val="accent1"/>
+            </a:effectRef>
+            <a:fontRef idx="minor">
+              <a:schemeClr val="lt1"/>
+            </a:fontRef>
+          </p:style>
+          <p:txBody>
+            <a:bodyPr rtlCol="0" anchor="ctr"/>
+            <a:lstStyle/>
+            <a:p>
+              <a:pPr algn="ctr"/>
+              <a:endParaRPr lang="en-US"/>
+            </a:p>
+          </p:txBody>
+        </p:sp>
+        <p:sp>
+          <p:nvSpPr>
+            <p:cNvPr id="6" name="Oval 5">
+              <a:extLst>
+                <a:ext uri="{FF2B5EF4-FFF2-40B4-BE49-F238E27FC236}">
+                  <a16:creationId xmlns:a16="http://schemas.microsoft.com/office/drawing/2014/main" id="{3B97AC91-CC66-418C-9804-A8FD2A250815}"/>
+                </a:ext>
+              </a:extLst>
+            </p:cNvPr>
+            <p:cNvSpPr/>
+            <p:nvPr/>
+          </p:nvSpPr>
+          <p:spPr>
+            <a:xfrm>
+              <a:off x="3849624" y="3172968"/>
+              <a:ext cx="182880" cy="182880"/>
+            </a:xfrm>
+            <a:prstGeom prst="ellipse">
+              <a:avLst/>
+            </a:prstGeom>
+            <a:solidFill>
+              <a:schemeClr val="accent6">
+                <a:lumMod val="20000"/>
+                <a:lumOff val="80000"/>
+              </a:schemeClr>
+            </a:solidFill>
+            <a:ln>
+              <a:solidFill>
+                <a:schemeClr val="accent6">
+                  <a:lumMod val="75000"/>
+                </a:schemeClr>
+              </a:solidFill>
+            </a:ln>
+          </p:spPr>
+          <p:style>
+            <a:lnRef idx="2">
+              <a:schemeClr val="accent1">
+                <a:shade val="50000"/>
+              </a:schemeClr>
+            </a:lnRef>
+            <a:fillRef idx="1">
+              <a:schemeClr val="accent1"/>
+            </a:fillRef>
+            <a:effectRef idx="0">
+              <a:schemeClr val="accent1"/>
+            </a:effectRef>
+            <a:fontRef idx="minor">
+              <a:schemeClr val="lt1"/>
+            </a:fontRef>
+          </p:style>
+          <p:txBody>
+            <a:bodyPr rtlCol="0" anchor="ctr"/>
+            <a:lstStyle/>
+            <a:p>
+              <a:pPr algn="ctr"/>
+              <a:endParaRPr lang="en-US"/>
+            </a:p>
+          </p:txBody>
+        </p:sp>
+        <p:sp>
+          <p:nvSpPr>
+            <p:cNvPr id="7" name="Oval 6">
+              <a:extLst>
+                <a:ext uri="{FF2B5EF4-FFF2-40B4-BE49-F238E27FC236}">
+                  <a16:creationId xmlns:a16="http://schemas.microsoft.com/office/drawing/2014/main" id="{A6E73F57-C031-497D-9C5F-87AD0FD44C34}"/>
+                </a:ext>
+              </a:extLst>
+            </p:cNvPr>
+            <p:cNvSpPr/>
+            <p:nvPr/>
+          </p:nvSpPr>
+          <p:spPr>
+            <a:xfrm>
+              <a:off x="4288536" y="3661166"/>
+              <a:ext cx="182880" cy="182880"/>
+            </a:xfrm>
+            <a:prstGeom prst="ellipse">
+              <a:avLst/>
+            </a:prstGeom>
+            <a:solidFill>
+              <a:schemeClr val="accent6">
+                <a:lumMod val="20000"/>
+                <a:lumOff val="80000"/>
+              </a:schemeClr>
+            </a:solidFill>
+            <a:ln>
+              <a:solidFill>
+                <a:schemeClr val="accent6">
+                  <a:lumMod val="75000"/>
+                </a:schemeClr>
+              </a:solidFill>
+            </a:ln>
+          </p:spPr>
+          <p:style>
+            <a:lnRef idx="2">
+              <a:schemeClr val="accent1">
+                <a:shade val="50000"/>
+              </a:schemeClr>
+            </a:lnRef>
+            <a:fillRef idx="1">
+              <a:schemeClr val="accent1"/>
+            </a:fillRef>
+            <a:effectRef idx="0">
+              <a:schemeClr val="accent1"/>
+            </a:effectRef>
+            <a:fontRef idx="minor">
+              <a:schemeClr val="lt1"/>
+            </a:fontRef>
+          </p:style>
+          <p:txBody>
+            <a:bodyPr rtlCol="0" anchor="ctr"/>
+            <a:lstStyle/>
+            <a:p>
+              <a:pPr algn="ctr"/>
+              <a:endParaRPr lang="en-US"/>
+            </a:p>
+          </p:txBody>
+        </p:sp>
+        <p:sp>
+          <p:nvSpPr>
+            <p:cNvPr id="8" name="Oval 7">
+              <a:extLst>
+                <a:ext uri="{FF2B5EF4-FFF2-40B4-BE49-F238E27FC236}">
+                  <a16:creationId xmlns:a16="http://schemas.microsoft.com/office/drawing/2014/main" id="{41ADC034-E8C9-493E-907B-53D7BDF021A5}"/>
+                </a:ext>
+              </a:extLst>
+            </p:cNvPr>
+            <p:cNvSpPr/>
+            <p:nvPr/>
+          </p:nvSpPr>
+          <p:spPr>
+            <a:xfrm>
+              <a:off x="4745736" y="3246120"/>
+              <a:ext cx="182880" cy="182880"/>
+            </a:xfrm>
+            <a:prstGeom prst="ellipse">
+              <a:avLst/>
+            </a:prstGeom>
+            <a:solidFill>
+              <a:schemeClr val="accent6">
+                <a:lumMod val="20000"/>
+                <a:lumOff val="80000"/>
+              </a:schemeClr>
+            </a:solidFill>
+            <a:ln>
+              <a:solidFill>
+                <a:schemeClr val="accent6">
+                  <a:lumMod val="75000"/>
+                </a:schemeClr>
+              </a:solidFill>
+            </a:ln>
+          </p:spPr>
+          <p:style>
+            <a:lnRef idx="2">
+              <a:schemeClr val="accent1">
+                <a:shade val="50000"/>
+              </a:schemeClr>
+            </a:lnRef>
+            <a:fillRef idx="1">
+              <a:schemeClr val="accent1"/>
+            </a:fillRef>
+            <a:effectRef idx="0">
+              <a:schemeClr val="accent1"/>
+            </a:effectRef>
+            <a:fontRef idx="minor">
+              <a:schemeClr val="lt1"/>
+            </a:fontRef>
+          </p:style>
+          <p:txBody>
+            <a:bodyPr rtlCol="0" anchor="ctr"/>
+            <a:lstStyle/>
+            <a:p>
+              <a:pPr algn="ctr"/>
+              <a:endParaRPr lang="en-US" dirty="0"/>
+            </a:p>
+          </p:txBody>
+        </p:sp>
+        <p:sp>
+          <p:nvSpPr>
+            <p:cNvPr id="9" name="Oval 8">
+              <a:extLst>
+                <a:ext uri="{FF2B5EF4-FFF2-40B4-BE49-F238E27FC236}">
+                  <a16:creationId xmlns:a16="http://schemas.microsoft.com/office/drawing/2014/main" id="{44AFACC5-88D5-420B-8C0D-019D8D431DCD}"/>
+                </a:ext>
+              </a:extLst>
+            </p:cNvPr>
+            <p:cNvSpPr/>
+            <p:nvPr/>
+          </p:nvSpPr>
+          <p:spPr>
+            <a:xfrm>
+              <a:off x="3666744" y="3844046"/>
+              <a:ext cx="182880" cy="182880"/>
+            </a:xfrm>
+            <a:prstGeom prst="ellipse">
+              <a:avLst/>
+            </a:prstGeom>
+            <a:solidFill>
+              <a:schemeClr val="accent6">
+                <a:lumMod val="20000"/>
+                <a:lumOff val="80000"/>
+              </a:schemeClr>
+            </a:solidFill>
+            <a:ln>
+              <a:solidFill>
+                <a:schemeClr val="accent6">
+                  <a:lumMod val="75000"/>
+                </a:schemeClr>
+              </a:solidFill>
+            </a:ln>
+          </p:spPr>
+          <p:style>
+            <a:lnRef idx="2">
+              <a:schemeClr val="accent1">
+                <a:shade val="50000"/>
+              </a:schemeClr>
+            </a:lnRef>
+            <a:fillRef idx="1">
+              <a:schemeClr val="accent1"/>
+            </a:fillRef>
+            <a:effectRef idx="0">
+              <a:schemeClr val="accent1"/>
+            </a:effectRef>
+            <a:fontRef idx="minor">
+              <a:schemeClr val="lt1"/>
+            </a:fontRef>
+          </p:style>
+          <p:txBody>
+            <a:bodyPr rtlCol="0" anchor="ctr"/>
+            <a:lstStyle/>
+            <a:p>
+              <a:pPr algn="ctr"/>
+              <a:endParaRPr lang="en-US"/>
+            </a:p>
+          </p:txBody>
+        </p:sp>
+        <p:cxnSp>
+          <p:nvCxnSpPr>
+            <p:cNvPr id="10" name="Straight Arrow Connector 9">
+              <a:extLst>
+                <a:ext uri="{FF2B5EF4-FFF2-40B4-BE49-F238E27FC236}">
+                  <a16:creationId xmlns:a16="http://schemas.microsoft.com/office/drawing/2014/main" id="{45C6A2D0-B5FF-45E2-8CE4-C7B8D13F4913}"/>
+                </a:ext>
+              </a:extLst>
+            </p:cNvPr>
+            <p:cNvCxnSpPr>
+              <a:stCxn id="5" idx="3"/>
+              <a:endCxn id="6" idx="7"/>
+            </p:cNvCxnSpPr>
+            <p:nvPr/>
+          </p:nvCxnSpPr>
+          <p:spPr>
+            <a:xfrm flipH="1">
+              <a:off x="4005722" y="2873878"/>
+              <a:ext cx="218156" cy="325872"/>
+            </a:xfrm>
+            <a:prstGeom prst="straightConnector1">
+              <a:avLst/>
+            </a:prstGeom>
+            <a:ln>
+              <a:solidFill>
+                <a:srgbClr val="0070C0"/>
+              </a:solidFill>
+              <a:tailEnd type="triangle"/>
+            </a:ln>
+          </p:spPr>
+          <p:style>
+            <a:lnRef idx="1">
+              <a:schemeClr val="accent1"/>
+            </a:lnRef>
+            <a:fillRef idx="0">
+              <a:schemeClr val="accent1"/>
+            </a:fillRef>
+            <a:effectRef idx="0">
+              <a:schemeClr val="accent1"/>
+            </a:effectRef>
+            <a:fontRef idx="minor">
+              <a:schemeClr val="tx1"/>
+            </a:fontRef>
+          </p:style>
+        </p:cxnSp>
+        <p:cxnSp>
+          <p:nvCxnSpPr>
+            <p:cNvPr id="11" name="Straight Arrow Connector 10">
+              <a:extLst>
+                <a:ext uri="{FF2B5EF4-FFF2-40B4-BE49-F238E27FC236}">
+                  <a16:creationId xmlns:a16="http://schemas.microsoft.com/office/drawing/2014/main" id="{916F75C0-A6E5-42E8-AF7F-65F22B32AB94}"/>
+                </a:ext>
+              </a:extLst>
+            </p:cNvPr>
+            <p:cNvCxnSpPr>
+              <a:cxnSpLocks/>
+              <a:stCxn id="5" idx="4"/>
+              <a:endCxn id="7" idx="0"/>
+            </p:cNvCxnSpPr>
+            <p:nvPr/>
+          </p:nvCxnSpPr>
+          <p:spPr>
+            <a:xfrm>
+              <a:off x="4288536" y="2900660"/>
+              <a:ext cx="91440" cy="760506"/>
+            </a:xfrm>
+            <a:prstGeom prst="straightConnector1">
+              <a:avLst/>
+            </a:prstGeom>
+            <a:ln>
+              <a:solidFill>
+                <a:srgbClr val="0070C0"/>
+              </a:solidFill>
+              <a:tailEnd type="triangle"/>
+            </a:ln>
+          </p:spPr>
+          <p:style>
+            <a:lnRef idx="1">
+              <a:schemeClr val="accent1"/>
+            </a:lnRef>
+            <a:fillRef idx="0">
+              <a:schemeClr val="accent1"/>
+            </a:fillRef>
+            <a:effectRef idx="0">
+              <a:schemeClr val="accent1"/>
+            </a:effectRef>
+            <a:fontRef idx="minor">
+              <a:schemeClr val="tx1"/>
+            </a:fontRef>
+          </p:style>
+        </p:cxnSp>
+        <p:cxnSp>
+          <p:nvCxnSpPr>
+            <p:cNvPr id="12" name="Straight Arrow Connector 11">
+              <a:extLst>
+                <a:ext uri="{FF2B5EF4-FFF2-40B4-BE49-F238E27FC236}">
+                  <a16:creationId xmlns:a16="http://schemas.microsoft.com/office/drawing/2014/main" id="{C0937B8F-C243-4DBB-AEB0-59A785F1B80D}"/>
+                </a:ext>
+              </a:extLst>
+            </p:cNvPr>
+            <p:cNvCxnSpPr>
+              <a:cxnSpLocks/>
+              <a:stCxn id="5" idx="5"/>
+              <a:endCxn id="8" idx="1"/>
+            </p:cNvCxnSpPr>
+            <p:nvPr/>
+          </p:nvCxnSpPr>
+          <p:spPr>
+            <a:xfrm>
+              <a:off x="4353194" y="2873878"/>
+              <a:ext cx="419324" cy="399024"/>
+            </a:xfrm>
+            <a:prstGeom prst="straightConnector1">
+              <a:avLst/>
+            </a:prstGeom>
+            <a:ln>
+              <a:solidFill>
+                <a:srgbClr val="0070C0"/>
+              </a:solidFill>
+              <a:tailEnd type="triangle"/>
+            </a:ln>
+          </p:spPr>
+          <p:style>
+            <a:lnRef idx="1">
+              <a:schemeClr val="accent1"/>
+            </a:lnRef>
+            <a:fillRef idx="0">
+              <a:schemeClr val="accent1"/>
+            </a:fillRef>
+            <a:effectRef idx="0">
+              <a:schemeClr val="accent1"/>
+            </a:effectRef>
+            <a:fontRef idx="minor">
+              <a:schemeClr val="tx1"/>
+            </a:fontRef>
+          </p:style>
+        </p:cxnSp>
+        <p:cxnSp>
+          <p:nvCxnSpPr>
+            <p:cNvPr id="13" name="Straight Arrow Connector 12">
+              <a:extLst>
+                <a:ext uri="{FF2B5EF4-FFF2-40B4-BE49-F238E27FC236}">
+                  <a16:creationId xmlns:a16="http://schemas.microsoft.com/office/drawing/2014/main" id="{29B04A20-B743-4B82-B885-6F329C49A813}"/>
+                </a:ext>
+              </a:extLst>
+            </p:cNvPr>
+            <p:cNvCxnSpPr>
+              <a:cxnSpLocks/>
+              <a:stCxn id="8" idx="3"/>
+              <a:endCxn id="7" idx="7"/>
+            </p:cNvCxnSpPr>
+            <p:nvPr/>
+          </p:nvCxnSpPr>
+          <p:spPr>
+            <a:xfrm flipH="1">
+              <a:off x="4444634" y="3402218"/>
+              <a:ext cx="327884" cy="285730"/>
+            </a:xfrm>
+            <a:prstGeom prst="straightConnector1">
+              <a:avLst/>
+            </a:prstGeom>
+            <a:ln>
+              <a:solidFill>
+                <a:srgbClr val="0070C0"/>
+              </a:solidFill>
+              <a:tailEnd type="triangle"/>
+            </a:ln>
+          </p:spPr>
+          <p:style>
+            <a:lnRef idx="1">
+              <a:schemeClr val="accent1"/>
+            </a:lnRef>
+            <a:fillRef idx="0">
+              <a:schemeClr val="accent1"/>
+            </a:fillRef>
+            <a:effectRef idx="0">
+              <a:schemeClr val="accent1"/>
+            </a:effectRef>
+            <a:fontRef idx="minor">
+              <a:schemeClr val="tx1"/>
+            </a:fontRef>
+          </p:style>
+        </p:cxnSp>
+        <p:cxnSp>
+          <p:nvCxnSpPr>
+            <p:cNvPr id="14" name="Straight Arrow Connector 13">
+              <a:extLst>
+                <a:ext uri="{FF2B5EF4-FFF2-40B4-BE49-F238E27FC236}">
+                  <a16:creationId xmlns:a16="http://schemas.microsoft.com/office/drawing/2014/main" id="{90D13FC1-B4C7-460F-B970-1132AD8B942E}"/>
+                </a:ext>
+              </a:extLst>
+            </p:cNvPr>
+            <p:cNvCxnSpPr>
+              <a:cxnSpLocks/>
+              <a:stCxn id="9" idx="6"/>
+              <a:endCxn id="7" idx="2"/>
+            </p:cNvCxnSpPr>
+            <p:nvPr/>
+          </p:nvCxnSpPr>
+          <p:spPr>
+            <a:xfrm flipV="1">
+              <a:off x="3849624" y="3752606"/>
+              <a:ext cx="438912" cy="182880"/>
+            </a:xfrm>
+            <a:prstGeom prst="straightConnector1">
+              <a:avLst/>
+            </a:prstGeom>
+            <a:ln>
+              <a:solidFill>
+                <a:srgbClr val="0070C0"/>
+              </a:solidFill>
+              <a:tailEnd type="triangle"/>
+            </a:ln>
+          </p:spPr>
+          <p:style>
+            <a:lnRef idx="1">
+              <a:schemeClr val="accent1"/>
+            </a:lnRef>
+            <a:fillRef idx="0">
+              <a:schemeClr val="accent1"/>
+            </a:fillRef>
+            <a:effectRef idx="0">
+              <a:schemeClr val="accent1"/>
+            </a:effectRef>
+            <a:fontRef idx="minor">
+              <a:schemeClr val="tx1"/>
+            </a:fontRef>
+          </p:style>
+        </p:cxnSp>
+        <p:cxnSp>
+          <p:nvCxnSpPr>
+            <p:cNvPr id="15" name="Straight Arrow Connector 14">
+              <a:extLst>
+                <a:ext uri="{FF2B5EF4-FFF2-40B4-BE49-F238E27FC236}">
+                  <a16:creationId xmlns:a16="http://schemas.microsoft.com/office/drawing/2014/main" id="{421A8B38-18BD-4BA4-B448-C3D8EBBE5D14}"/>
+                </a:ext>
+              </a:extLst>
+            </p:cNvPr>
+            <p:cNvCxnSpPr>
+              <a:cxnSpLocks/>
+              <a:stCxn id="9" idx="0"/>
+              <a:endCxn id="6" idx="4"/>
+            </p:cNvCxnSpPr>
+            <p:nvPr/>
+          </p:nvCxnSpPr>
+          <p:spPr>
+            <a:xfrm flipV="1">
+              <a:off x="3758184" y="3355848"/>
+              <a:ext cx="182880" cy="488198"/>
+            </a:xfrm>
+            <a:prstGeom prst="straightConnector1">
+              <a:avLst/>
+            </a:prstGeom>
+            <a:ln>
+              <a:solidFill>
+                <a:srgbClr val="0070C0"/>
+              </a:solidFill>
+              <a:tailEnd type="triangle"/>
+            </a:ln>
+          </p:spPr>
+          <p:style>
+            <a:lnRef idx="1">
+              <a:schemeClr val="accent1"/>
+            </a:lnRef>
+            <a:fillRef idx="0">
+              <a:schemeClr val="accent1"/>
+            </a:fillRef>
+            <a:effectRef idx="0">
+              <a:schemeClr val="accent1"/>
+            </a:effectRef>
+            <a:fontRef idx="minor">
+              <a:schemeClr val="tx1"/>
+            </a:fontRef>
+          </p:style>
+        </p:cxnSp>
+      </p:grpSp>
+      <p:sp>
+        <p:nvSpPr>
+          <p:cNvPr id="16" name="Rectangle: Rounded Corners 15">
+            <a:extLst>
+              <a:ext uri="{FF2B5EF4-FFF2-40B4-BE49-F238E27FC236}">
+                <a16:creationId xmlns:a16="http://schemas.microsoft.com/office/drawing/2014/main" id="{EEFE1ACB-AB9F-4E48-87EB-ED655D5C73ED}"/>
+              </a:ext>
+            </a:extLst>
+          </p:cNvPr>
+          <p:cNvSpPr/>
+          <p:nvPr/>
+        </p:nvSpPr>
+        <p:spPr>
+          <a:xfrm>
+            <a:off x="1890992" y="2753203"/>
+            <a:ext cx="1597275" cy="1541444"/>
+          </a:xfrm>
+          <a:prstGeom prst="roundRect">
+            <a:avLst>
+              <a:gd name="adj" fmla="val 10106"/>
+            </a:avLst>
+          </a:prstGeom>
+          <a:solidFill>
+            <a:schemeClr val="accent4">
+              <a:lumMod val="20000"/>
+              <a:lumOff val="80000"/>
+            </a:schemeClr>
+          </a:solidFill>
+          <a:ln>
+            <a:solidFill>
+              <a:srgbClr val="FFC000"/>
+            </a:solidFill>
+          </a:ln>
+          <a:effectLst>
+            <a:outerShdw blurRad="50800" dist="38100" dir="2700000" algn="tl" rotWithShape="0">
+              <a:prstClr val="black">
+                <a:alpha val="40000"/>
+              </a:prstClr>
+            </a:outerShdw>
+          </a:effectLst>
+        </p:spPr>
+        <p:style>
+          <a:lnRef idx="2">
+            <a:schemeClr val="accent1">
+              <a:shade val="50000"/>
+            </a:schemeClr>
+          </a:lnRef>
+          <a:fillRef idx="1">
+            <a:schemeClr val="accent1"/>
+          </a:fillRef>
+          <a:effectRef idx="0">
+            <a:schemeClr val="accent1"/>
+          </a:effectRef>
+          <a:fontRef idx="minor">
+            <a:schemeClr val="lt1"/>
+          </a:fontRef>
+        </p:style>
+        <p:txBody>
+          <a:bodyPr lIns="0" tIns="0" rIns="0" bIns="0" rtlCol="0" anchor="ctr"/>
+          <a:lstStyle/>
+          <a:p>
+            <a:pPr algn="ctr"/>
+            <a:r>
+              <a:rPr lang="en-US" dirty="0">
+                <a:solidFill>
+                  <a:schemeClr val="tx1"/>
+                </a:solidFill>
+              </a:rPr>
+              <a:t>Graph</a:t>
+            </a:r>
+          </a:p>
+          <a:p>
+            <a:pPr algn="ctr"/>
+            <a:r>
+              <a:rPr lang="en-US" dirty="0">
+                <a:solidFill>
+                  <a:schemeClr val="tx1"/>
+                </a:solidFill>
+              </a:rPr>
+              <a:t>Convolution</a:t>
+            </a:r>
+          </a:p>
+          <a:p>
+            <a:pPr algn="ctr"/>
+            <a:r>
+              <a:rPr lang="en-US" dirty="0">
+                <a:solidFill>
+                  <a:schemeClr val="tx1"/>
+                </a:solidFill>
+              </a:rPr>
+              <a:t>Network – </a:t>
+            </a:r>
+          </a:p>
+          <a:p>
+            <a:pPr algn="ctr"/>
+            <a:r>
+              <a:rPr lang="en-US" dirty="0">
+                <a:solidFill>
+                  <a:schemeClr val="tx1"/>
+                </a:solidFill>
+              </a:rPr>
+              <a:t>Missing Feature</a:t>
+            </a:r>
+          </a:p>
+          <a:p>
+            <a:pPr algn="ctr"/>
+            <a:r>
+              <a:rPr lang="en-US" dirty="0">
+                <a:solidFill>
+                  <a:schemeClr val="tx1"/>
+                </a:solidFill>
+              </a:rPr>
+              <a:t>(</a:t>
+            </a:r>
+            <a:r>
+              <a:rPr lang="en-US" dirty="0" err="1">
+                <a:solidFill>
+                  <a:schemeClr val="tx1"/>
+                </a:solidFill>
+              </a:rPr>
+              <a:t>GCNmf</a:t>
+            </a:r>
+            <a:r>
+              <a:rPr lang="en-US" dirty="0">
+                <a:solidFill>
+                  <a:schemeClr val="tx1"/>
+                </a:solidFill>
+              </a:rPr>
+              <a:t>)</a:t>
+            </a:r>
+          </a:p>
+        </p:txBody>
+      </p:sp>
+      <p:grpSp>
+        <p:nvGrpSpPr>
+          <p:cNvPr id="17" name="Group 16">
+            <a:extLst>
+              <a:ext uri="{FF2B5EF4-FFF2-40B4-BE49-F238E27FC236}">
+                <a16:creationId xmlns:a16="http://schemas.microsoft.com/office/drawing/2014/main" id="{BD7646C5-6BAA-4655-B372-F0AE4A8FCFC3}"/>
+              </a:ext>
+            </a:extLst>
+          </p:cNvPr>
+          <p:cNvGrpSpPr/>
+          <p:nvPr/>
+        </p:nvGrpSpPr>
+        <p:grpSpPr>
+          <a:xfrm>
+            <a:off x="4174232" y="1630597"/>
+            <a:ext cx="720991" cy="1610870"/>
+            <a:chOff x="3547425" y="2682022"/>
+            <a:chExt cx="720991" cy="1610870"/>
+          </a:xfrm>
+        </p:grpSpPr>
+        <p:grpSp>
+          <p:nvGrpSpPr>
+            <p:cNvPr id="18" name="Group 17">
+              <a:extLst>
+                <a:ext uri="{FF2B5EF4-FFF2-40B4-BE49-F238E27FC236}">
+                  <a16:creationId xmlns:a16="http://schemas.microsoft.com/office/drawing/2014/main" id="{CBBFA48E-938A-48CF-94C0-3ACA46052A21}"/>
+                </a:ext>
+              </a:extLst>
+            </p:cNvPr>
+            <p:cNvGrpSpPr/>
+            <p:nvPr/>
+          </p:nvGrpSpPr>
+          <p:grpSpPr>
+            <a:xfrm>
+              <a:off x="3553406" y="2682022"/>
+              <a:ext cx="711200" cy="203835"/>
+              <a:chOff x="3559387" y="2503170"/>
+              <a:chExt cx="711200" cy="203835"/>
+            </a:xfrm>
+          </p:grpSpPr>
+          <p:sp>
+            <p:nvSpPr>
+              <p:cNvPr id="35" name="Rectangle: Rounded Corners 34">
+                <a:extLst>
+                  <a:ext uri="{FF2B5EF4-FFF2-40B4-BE49-F238E27FC236}">
+                    <a16:creationId xmlns:a16="http://schemas.microsoft.com/office/drawing/2014/main" id="{FFF4E45B-0D35-4473-AF3F-62CEEAC44494}"/>
+                  </a:ext>
+                </a:extLst>
+              </p:cNvPr>
+              <p:cNvSpPr/>
+              <p:nvPr/>
+            </p:nvSpPr>
+            <p:spPr>
+              <a:xfrm>
+                <a:off x="3559387" y="2503170"/>
+                <a:ext cx="711200" cy="203835"/>
+              </a:xfrm>
+              <a:prstGeom prst="roundRect">
+                <a:avLst/>
+              </a:prstGeom>
+              <a:noFill/>
+              <a:ln>
+                <a:solidFill>
+                  <a:schemeClr val="tx1"/>
+                </a:solidFill>
+              </a:ln>
+            </p:spPr>
+            <p:style>
+              <a:lnRef idx="2">
+                <a:schemeClr val="accent1">
+                  <a:shade val="50000"/>
+                </a:schemeClr>
+              </a:lnRef>
+              <a:fillRef idx="1">
+                <a:schemeClr val="accent1"/>
+              </a:fillRef>
+              <a:effectRef idx="0">
+                <a:schemeClr val="accent1"/>
+              </a:effectRef>
+              <a:fontRef idx="minor">
+                <a:schemeClr val="lt1"/>
+              </a:fontRef>
+            </p:style>
+            <p:txBody>
+              <a:bodyPr rot="0" spcFirstLastPara="0" vert="horz" wrap="square" lIns="91440" tIns="45720" rIns="91440" bIns="45720" numCol="1" spcCol="0" rtlCol="0" fromWordArt="0" anchor="ctr" anchorCtr="0" forceAA="0" compatLnSpc="1">
+                <a:prstTxWarp prst="textNoShape">
+                  <a:avLst/>
+                </a:prstTxWarp>
+                <a:noAutofit/>
+              </a:bodyPr>
+              <a:lstStyle/>
+              <a:p>
+                <a:endParaRPr lang="en-US"/>
+              </a:p>
+            </p:txBody>
+          </p:sp>
+          <p:sp>
+            <p:nvSpPr>
+              <p:cNvPr id="36" name="Oval 35">
+                <a:extLst>
+                  <a:ext uri="{FF2B5EF4-FFF2-40B4-BE49-F238E27FC236}">
+                    <a16:creationId xmlns:a16="http://schemas.microsoft.com/office/drawing/2014/main" id="{5246A7EE-3229-49B7-8F1D-08032DC4E4DB}"/>
+                  </a:ext>
+                </a:extLst>
+              </p:cNvPr>
+              <p:cNvSpPr/>
+              <p:nvPr/>
+            </p:nvSpPr>
+            <p:spPr>
+              <a:xfrm>
+                <a:off x="3640032" y="2545080"/>
+                <a:ext cx="134620" cy="128905"/>
+              </a:xfrm>
+              <a:prstGeom prst="ellipse">
+                <a:avLst/>
+              </a:prstGeom>
+              <a:solidFill>
+                <a:schemeClr val="accent1">
+                  <a:lumMod val="40000"/>
+                  <a:lumOff val="60000"/>
+                </a:schemeClr>
+              </a:solidFill>
+              <a:ln>
+                <a:solidFill>
+                  <a:schemeClr val="accent1">
+                    <a:lumMod val="60000"/>
+                    <a:lumOff val="40000"/>
+                  </a:schemeClr>
+                </a:solidFill>
+              </a:ln>
+            </p:spPr>
+            <p:style>
+              <a:lnRef idx="2">
+                <a:schemeClr val="accent1">
+                  <a:shade val="50000"/>
+                </a:schemeClr>
+              </a:lnRef>
+              <a:fillRef idx="1">
+                <a:schemeClr val="accent1"/>
+              </a:fillRef>
+              <a:effectRef idx="0">
+                <a:schemeClr val="accent1"/>
+              </a:effectRef>
+              <a:fontRef idx="minor">
+                <a:schemeClr val="lt1"/>
+              </a:fontRef>
+            </p:style>
+            <p:txBody>
+              <a:bodyPr rot="0" spcFirstLastPara="0" vert="horz" wrap="square" lIns="91440" tIns="45720" rIns="91440" bIns="45720" numCol="1" spcCol="0" rtlCol="0" fromWordArt="0" anchor="ctr" anchorCtr="0" forceAA="0" compatLnSpc="1">
+                <a:prstTxWarp prst="textNoShape">
+                  <a:avLst/>
+                </a:prstTxWarp>
+                <a:noAutofit/>
+              </a:bodyPr>
+              <a:lstStyle/>
+              <a:p>
+                <a:endParaRPr lang="en-US"/>
+              </a:p>
+            </p:txBody>
+          </p:sp>
+          <p:sp>
+            <p:nvSpPr>
+              <p:cNvPr id="37" name="Oval 36">
+                <a:extLst>
+                  <a:ext uri="{FF2B5EF4-FFF2-40B4-BE49-F238E27FC236}">
+                    <a16:creationId xmlns:a16="http://schemas.microsoft.com/office/drawing/2014/main" id="{9DC45F4D-E4AE-4106-9D41-1362B4D4EEA8}"/>
+                  </a:ext>
+                </a:extLst>
+              </p:cNvPr>
+              <p:cNvSpPr/>
+              <p:nvPr/>
+            </p:nvSpPr>
+            <p:spPr>
+              <a:xfrm>
+                <a:off x="3851487" y="2545080"/>
+                <a:ext cx="134620" cy="128905"/>
+              </a:xfrm>
+              <a:prstGeom prst="ellipse">
+                <a:avLst/>
+              </a:prstGeom>
+              <a:solidFill>
+                <a:schemeClr val="accent1">
+                  <a:lumMod val="40000"/>
+                  <a:lumOff val="60000"/>
+                </a:schemeClr>
+              </a:solidFill>
+              <a:ln>
+                <a:solidFill>
+                  <a:schemeClr val="accent1">
+                    <a:lumMod val="60000"/>
+                    <a:lumOff val="40000"/>
+                  </a:schemeClr>
+                </a:solidFill>
+              </a:ln>
+            </p:spPr>
+            <p:style>
+              <a:lnRef idx="2">
+                <a:schemeClr val="accent1">
+                  <a:shade val="50000"/>
+                </a:schemeClr>
+              </a:lnRef>
+              <a:fillRef idx="1">
+                <a:schemeClr val="accent1"/>
+              </a:fillRef>
+              <a:effectRef idx="0">
+                <a:schemeClr val="accent1"/>
+              </a:effectRef>
+              <a:fontRef idx="minor">
+                <a:schemeClr val="lt1"/>
+              </a:fontRef>
+            </p:style>
+            <p:txBody>
+              <a:bodyPr rot="0" spcFirstLastPara="0" vert="horz" wrap="square" lIns="91440" tIns="45720" rIns="91440" bIns="45720" numCol="1" spcCol="0" rtlCol="0" fromWordArt="0" anchor="ctr" anchorCtr="0" forceAA="0" compatLnSpc="1">
+                <a:prstTxWarp prst="textNoShape">
+                  <a:avLst/>
+                </a:prstTxWarp>
+                <a:noAutofit/>
+              </a:bodyPr>
+              <a:lstStyle/>
+              <a:p>
+                <a:endParaRPr lang="en-US"/>
+              </a:p>
+            </p:txBody>
+          </p:sp>
+          <p:sp>
+            <p:nvSpPr>
+              <p:cNvPr id="38" name="Oval 37">
+                <a:extLst>
+                  <a:ext uri="{FF2B5EF4-FFF2-40B4-BE49-F238E27FC236}">
+                    <a16:creationId xmlns:a16="http://schemas.microsoft.com/office/drawing/2014/main" id="{C9E727C1-BE9E-4CDA-8F11-1E0D003B27DD}"/>
+                  </a:ext>
+                </a:extLst>
+              </p:cNvPr>
+              <p:cNvSpPr/>
+              <p:nvPr/>
+            </p:nvSpPr>
+            <p:spPr>
+              <a:xfrm>
+                <a:off x="4063577" y="2545080"/>
+                <a:ext cx="134620" cy="128905"/>
+              </a:xfrm>
+              <a:prstGeom prst="ellipse">
+                <a:avLst/>
+              </a:prstGeom>
+              <a:solidFill>
+                <a:schemeClr val="accent1">
+                  <a:lumMod val="40000"/>
+                  <a:lumOff val="60000"/>
+                </a:schemeClr>
+              </a:solidFill>
+              <a:ln>
+                <a:solidFill>
+                  <a:schemeClr val="accent1">
+                    <a:lumMod val="60000"/>
+                    <a:lumOff val="40000"/>
+                  </a:schemeClr>
+                </a:solidFill>
+              </a:ln>
+            </p:spPr>
+            <p:style>
+              <a:lnRef idx="2">
+                <a:schemeClr val="accent1">
+                  <a:shade val="50000"/>
+                </a:schemeClr>
+              </a:lnRef>
+              <a:fillRef idx="1">
+                <a:schemeClr val="accent1"/>
+              </a:fillRef>
+              <a:effectRef idx="0">
+                <a:schemeClr val="accent1"/>
+              </a:effectRef>
+              <a:fontRef idx="minor">
+                <a:schemeClr val="lt1"/>
+              </a:fontRef>
+            </p:style>
+            <p:txBody>
+              <a:bodyPr rot="0" spcFirstLastPara="0" vert="horz" wrap="square" lIns="91440" tIns="45720" rIns="91440" bIns="45720" numCol="1" spcCol="0" rtlCol="0" fromWordArt="0" anchor="ctr" anchorCtr="0" forceAA="0" compatLnSpc="1">
+                <a:prstTxWarp prst="textNoShape">
+                  <a:avLst/>
+                </a:prstTxWarp>
+                <a:noAutofit/>
+              </a:bodyPr>
+              <a:lstStyle/>
+              <a:p>
+                <a:endParaRPr lang="en-US"/>
+              </a:p>
+            </p:txBody>
+          </p:sp>
+        </p:grpSp>
+        <p:grpSp>
+          <p:nvGrpSpPr>
+            <p:cNvPr id="19" name="Group 18">
+              <a:extLst>
+                <a:ext uri="{FF2B5EF4-FFF2-40B4-BE49-F238E27FC236}">
+                  <a16:creationId xmlns:a16="http://schemas.microsoft.com/office/drawing/2014/main" id="{054A2394-9CE7-42EC-AE13-8B6968EB0EA2}"/>
+                </a:ext>
+              </a:extLst>
+            </p:cNvPr>
+            <p:cNvGrpSpPr/>
+            <p:nvPr/>
+          </p:nvGrpSpPr>
+          <p:grpSpPr>
+            <a:xfrm>
+              <a:off x="3557216" y="3064709"/>
+              <a:ext cx="711200" cy="203835"/>
+              <a:chOff x="3559387" y="2503170"/>
+              <a:chExt cx="711200" cy="203835"/>
+            </a:xfrm>
+          </p:grpSpPr>
+          <p:sp>
+            <p:nvSpPr>
+              <p:cNvPr id="31" name="Rectangle: Rounded Corners 30">
+                <a:extLst>
+                  <a:ext uri="{FF2B5EF4-FFF2-40B4-BE49-F238E27FC236}">
+                    <a16:creationId xmlns:a16="http://schemas.microsoft.com/office/drawing/2014/main" id="{F4E3F44E-C6C6-4A03-A532-EC486CFF9267}"/>
+                  </a:ext>
+                </a:extLst>
+              </p:cNvPr>
+              <p:cNvSpPr/>
+              <p:nvPr/>
+            </p:nvSpPr>
+            <p:spPr>
+              <a:xfrm>
+                <a:off x="3559387" y="2503170"/>
+                <a:ext cx="711200" cy="203835"/>
+              </a:xfrm>
+              <a:prstGeom prst="roundRect">
+                <a:avLst/>
+              </a:prstGeom>
+              <a:noFill/>
+              <a:ln>
+                <a:solidFill>
+                  <a:schemeClr val="tx1"/>
+                </a:solidFill>
+              </a:ln>
+            </p:spPr>
+            <p:style>
+              <a:lnRef idx="2">
+                <a:schemeClr val="accent1">
+                  <a:shade val="50000"/>
+                </a:schemeClr>
+              </a:lnRef>
+              <a:fillRef idx="1">
+                <a:schemeClr val="accent1"/>
+              </a:fillRef>
+              <a:effectRef idx="0">
+                <a:schemeClr val="accent1"/>
+              </a:effectRef>
+              <a:fontRef idx="minor">
+                <a:schemeClr val="lt1"/>
+              </a:fontRef>
+            </p:style>
+            <p:txBody>
+              <a:bodyPr rot="0" spcFirstLastPara="0" vert="horz" wrap="square" lIns="91440" tIns="45720" rIns="91440" bIns="45720" numCol="1" spcCol="0" rtlCol="0" fromWordArt="0" anchor="ctr" anchorCtr="0" forceAA="0" compatLnSpc="1">
+                <a:prstTxWarp prst="textNoShape">
+                  <a:avLst/>
+                </a:prstTxWarp>
+                <a:noAutofit/>
+              </a:bodyPr>
+              <a:lstStyle/>
+              <a:p>
+                <a:endParaRPr lang="en-US"/>
+              </a:p>
+            </p:txBody>
+          </p:sp>
+          <p:sp>
+            <p:nvSpPr>
+              <p:cNvPr id="32" name="Oval 31">
+                <a:extLst>
+                  <a:ext uri="{FF2B5EF4-FFF2-40B4-BE49-F238E27FC236}">
+                    <a16:creationId xmlns:a16="http://schemas.microsoft.com/office/drawing/2014/main" id="{919F45A9-62DA-43F6-9692-1079E106A342}"/>
+                  </a:ext>
+                </a:extLst>
+              </p:cNvPr>
+              <p:cNvSpPr/>
+              <p:nvPr/>
+            </p:nvSpPr>
+            <p:spPr>
+              <a:xfrm>
+                <a:off x="3640032" y="2545080"/>
+                <a:ext cx="134620" cy="128905"/>
+              </a:xfrm>
+              <a:prstGeom prst="ellipse">
+                <a:avLst/>
+              </a:prstGeom>
+              <a:solidFill>
+                <a:schemeClr val="accent1">
+                  <a:lumMod val="40000"/>
+                  <a:lumOff val="60000"/>
+                </a:schemeClr>
+              </a:solidFill>
+              <a:ln>
+                <a:solidFill>
+                  <a:schemeClr val="accent1">
+                    <a:lumMod val="60000"/>
+                    <a:lumOff val="40000"/>
+                  </a:schemeClr>
+                </a:solidFill>
+              </a:ln>
+            </p:spPr>
+            <p:style>
+              <a:lnRef idx="2">
+                <a:schemeClr val="accent1">
+                  <a:shade val="50000"/>
+                </a:schemeClr>
+              </a:lnRef>
+              <a:fillRef idx="1">
+                <a:schemeClr val="accent1"/>
+              </a:fillRef>
+              <a:effectRef idx="0">
+                <a:schemeClr val="accent1"/>
+              </a:effectRef>
+              <a:fontRef idx="minor">
+                <a:schemeClr val="lt1"/>
+              </a:fontRef>
+            </p:style>
+            <p:txBody>
+              <a:bodyPr rot="0" spcFirstLastPara="0" vert="horz" wrap="square" lIns="91440" tIns="45720" rIns="91440" bIns="45720" numCol="1" spcCol="0" rtlCol="0" fromWordArt="0" anchor="ctr" anchorCtr="0" forceAA="0" compatLnSpc="1">
+                <a:prstTxWarp prst="textNoShape">
+                  <a:avLst/>
+                </a:prstTxWarp>
+                <a:noAutofit/>
+              </a:bodyPr>
+              <a:lstStyle/>
+              <a:p>
+                <a:endParaRPr lang="en-US"/>
+              </a:p>
+            </p:txBody>
+          </p:sp>
+          <p:sp>
+            <p:nvSpPr>
+              <p:cNvPr id="33" name="Oval 32">
+                <a:extLst>
+                  <a:ext uri="{FF2B5EF4-FFF2-40B4-BE49-F238E27FC236}">
+                    <a16:creationId xmlns:a16="http://schemas.microsoft.com/office/drawing/2014/main" id="{F849C353-E91D-466F-812A-56B9EC03112B}"/>
+                  </a:ext>
+                </a:extLst>
+              </p:cNvPr>
+              <p:cNvSpPr/>
+              <p:nvPr/>
+            </p:nvSpPr>
+            <p:spPr>
+              <a:xfrm>
+                <a:off x="3851487" y="2545080"/>
+                <a:ext cx="134620" cy="128905"/>
+              </a:xfrm>
+              <a:prstGeom prst="ellipse">
+                <a:avLst/>
+              </a:prstGeom>
+              <a:solidFill>
+                <a:schemeClr val="accent1">
+                  <a:lumMod val="40000"/>
+                  <a:lumOff val="60000"/>
+                </a:schemeClr>
+              </a:solidFill>
+              <a:ln>
+                <a:solidFill>
+                  <a:schemeClr val="accent1">
+                    <a:lumMod val="60000"/>
+                    <a:lumOff val="40000"/>
+                  </a:schemeClr>
+                </a:solidFill>
+              </a:ln>
+            </p:spPr>
+            <p:style>
+              <a:lnRef idx="2">
+                <a:schemeClr val="accent1">
+                  <a:shade val="50000"/>
+                </a:schemeClr>
+              </a:lnRef>
+              <a:fillRef idx="1">
+                <a:schemeClr val="accent1"/>
+              </a:fillRef>
+              <a:effectRef idx="0">
+                <a:schemeClr val="accent1"/>
+              </a:effectRef>
+              <a:fontRef idx="minor">
+                <a:schemeClr val="lt1"/>
+              </a:fontRef>
+            </p:style>
+            <p:txBody>
+              <a:bodyPr rot="0" spcFirstLastPara="0" vert="horz" wrap="square" lIns="91440" tIns="45720" rIns="91440" bIns="45720" numCol="1" spcCol="0" rtlCol="0" fromWordArt="0" anchor="ctr" anchorCtr="0" forceAA="0" compatLnSpc="1">
+                <a:prstTxWarp prst="textNoShape">
+                  <a:avLst/>
+                </a:prstTxWarp>
+                <a:noAutofit/>
+              </a:bodyPr>
+              <a:lstStyle/>
+              <a:p>
+                <a:endParaRPr lang="en-US"/>
+              </a:p>
+            </p:txBody>
+          </p:sp>
+          <p:sp>
+            <p:nvSpPr>
+              <p:cNvPr id="34" name="Oval 33">
+                <a:extLst>
+                  <a:ext uri="{FF2B5EF4-FFF2-40B4-BE49-F238E27FC236}">
+                    <a16:creationId xmlns:a16="http://schemas.microsoft.com/office/drawing/2014/main" id="{058304BF-F614-425D-9E31-9FFE92132914}"/>
+                  </a:ext>
+                </a:extLst>
+              </p:cNvPr>
+              <p:cNvSpPr/>
+              <p:nvPr/>
+            </p:nvSpPr>
+            <p:spPr>
+              <a:xfrm>
+                <a:off x="4063577" y="2545080"/>
+                <a:ext cx="134620" cy="128905"/>
+              </a:xfrm>
+              <a:prstGeom prst="ellipse">
+                <a:avLst/>
+              </a:prstGeom>
+              <a:solidFill>
+                <a:schemeClr val="accent1">
+                  <a:lumMod val="40000"/>
+                  <a:lumOff val="60000"/>
+                </a:schemeClr>
+              </a:solidFill>
+              <a:ln>
+                <a:solidFill>
+                  <a:schemeClr val="accent1">
+                    <a:lumMod val="60000"/>
+                    <a:lumOff val="40000"/>
+                  </a:schemeClr>
+                </a:solidFill>
+              </a:ln>
+            </p:spPr>
+            <p:style>
+              <a:lnRef idx="2">
+                <a:schemeClr val="accent1">
+                  <a:shade val="50000"/>
+                </a:schemeClr>
+              </a:lnRef>
+              <a:fillRef idx="1">
+                <a:schemeClr val="accent1"/>
+              </a:fillRef>
+              <a:effectRef idx="0">
+                <a:schemeClr val="accent1"/>
+              </a:effectRef>
+              <a:fontRef idx="minor">
+                <a:schemeClr val="lt1"/>
+              </a:fontRef>
+            </p:style>
+            <p:txBody>
+              <a:bodyPr rot="0" spcFirstLastPara="0" vert="horz" wrap="square" lIns="91440" tIns="45720" rIns="91440" bIns="45720" numCol="1" spcCol="0" rtlCol="0" fromWordArt="0" anchor="ctr" anchorCtr="0" forceAA="0" compatLnSpc="1">
+                <a:prstTxWarp prst="textNoShape">
+                  <a:avLst/>
+                </a:prstTxWarp>
+                <a:noAutofit/>
+              </a:bodyPr>
+              <a:lstStyle/>
+              <a:p>
+                <a:endParaRPr lang="en-US"/>
+              </a:p>
+            </p:txBody>
+          </p:sp>
+        </p:grpSp>
+        <p:grpSp>
+          <p:nvGrpSpPr>
+            <p:cNvPr id="20" name="Group 19">
+              <a:extLst>
+                <a:ext uri="{FF2B5EF4-FFF2-40B4-BE49-F238E27FC236}">
+                  <a16:creationId xmlns:a16="http://schemas.microsoft.com/office/drawing/2014/main" id="{3B21855E-2D99-4F20-B840-ABBF921E1BFA}"/>
+                </a:ext>
+              </a:extLst>
+            </p:cNvPr>
+            <p:cNvGrpSpPr/>
+            <p:nvPr/>
+          </p:nvGrpSpPr>
+          <p:grpSpPr>
+            <a:xfrm>
+              <a:off x="3557216" y="3703411"/>
+              <a:ext cx="711200" cy="203835"/>
+              <a:chOff x="3559387" y="2503170"/>
+              <a:chExt cx="711200" cy="203835"/>
+            </a:xfrm>
+          </p:grpSpPr>
+          <p:sp>
+            <p:nvSpPr>
+              <p:cNvPr id="27" name="Rectangle: Rounded Corners 26">
+                <a:extLst>
+                  <a:ext uri="{FF2B5EF4-FFF2-40B4-BE49-F238E27FC236}">
+                    <a16:creationId xmlns:a16="http://schemas.microsoft.com/office/drawing/2014/main" id="{FDE632CF-3070-479E-8CF9-1DE690F0E0C6}"/>
+                  </a:ext>
+                </a:extLst>
+              </p:cNvPr>
+              <p:cNvSpPr/>
+              <p:nvPr/>
+            </p:nvSpPr>
+            <p:spPr>
+              <a:xfrm>
+                <a:off x="3559387" y="2503170"/>
+                <a:ext cx="711200" cy="203835"/>
+              </a:xfrm>
+              <a:prstGeom prst="roundRect">
+                <a:avLst/>
+              </a:prstGeom>
+              <a:noFill/>
+              <a:ln>
+                <a:solidFill>
+                  <a:schemeClr val="tx1"/>
+                </a:solidFill>
+              </a:ln>
+            </p:spPr>
+            <p:style>
+              <a:lnRef idx="2">
+                <a:schemeClr val="accent1">
+                  <a:shade val="50000"/>
+                </a:schemeClr>
+              </a:lnRef>
+              <a:fillRef idx="1">
+                <a:schemeClr val="accent1"/>
+              </a:fillRef>
+              <a:effectRef idx="0">
+                <a:schemeClr val="accent1"/>
+              </a:effectRef>
+              <a:fontRef idx="minor">
+                <a:schemeClr val="lt1"/>
+              </a:fontRef>
+            </p:style>
+            <p:txBody>
+              <a:bodyPr rot="0" spcFirstLastPara="0" vert="horz" wrap="square" lIns="91440" tIns="45720" rIns="91440" bIns="45720" numCol="1" spcCol="0" rtlCol="0" fromWordArt="0" anchor="ctr" anchorCtr="0" forceAA="0" compatLnSpc="1">
+                <a:prstTxWarp prst="textNoShape">
+                  <a:avLst/>
+                </a:prstTxWarp>
+                <a:noAutofit/>
+              </a:bodyPr>
+              <a:lstStyle/>
+              <a:p>
+                <a:endParaRPr lang="en-US"/>
+              </a:p>
+            </p:txBody>
+          </p:sp>
+          <p:sp>
+            <p:nvSpPr>
+              <p:cNvPr id="28" name="Oval 27">
+                <a:extLst>
+                  <a:ext uri="{FF2B5EF4-FFF2-40B4-BE49-F238E27FC236}">
+                    <a16:creationId xmlns:a16="http://schemas.microsoft.com/office/drawing/2014/main" id="{ECF3A2E3-D80B-4258-AE6A-04BEDE56C900}"/>
+                  </a:ext>
+                </a:extLst>
+              </p:cNvPr>
+              <p:cNvSpPr/>
+              <p:nvPr/>
+            </p:nvSpPr>
+            <p:spPr>
+              <a:xfrm>
+                <a:off x="3640032" y="2545080"/>
+                <a:ext cx="134620" cy="128905"/>
+              </a:xfrm>
+              <a:prstGeom prst="ellipse">
+                <a:avLst/>
+              </a:prstGeom>
+              <a:solidFill>
+                <a:schemeClr val="accent1">
+                  <a:lumMod val="40000"/>
+                  <a:lumOff val="60000"/>
+                </a:schemeClr>
+              </a:solidFill>
+              <a:ln>
+                <a:solidFill>
+                  <a:schemeClr val="accent1">
+                    <a:lumMod val="60000"/>
+                    <a:lumOff val="40000"/>
+                  </a:schemeClr>
+                </a:solidFill>
+              </a:ln>
+            </p:spPr>
+            <p:style>
+              <a:lnRef idx="2">
+                <a:schemeClr val="accent1">
+                  <a:shade val="50000"/>
+                </a:schemeClr>
+              </a:lnRef>
+              <a:fillRef idx="1">
+                <a:schemeClr val="accent1"/>
+              </a:fillRef>
+              <a:effectRef idx="0">
+                <a:schemeClr val="accent1"/>
+              </a:effectRef>
+              <a:fontRef idx="minor">
+                <a:schemeClr val="lt1"/>
+              </a:fontRef>
+            </p:style>
+            <p:txBody>
+              <a:bodyPr rot="0" spcFirstLastPara="0" vert="horz" wrap="square" lIns="91440" tIns="45720" rIns="91440" bIns="45720" numCol="1" spcCol="0" rtlCol="0" fromWordArt="0" anchor="ctr" anchorCtr="0" forceAA="0" compatLnSpc="1">
+                <a:prstTxWarp prst="textNoShape">
+                  <a:avLst/>
+                </a:prstTxWarp>
+                <a:noAutofit/>
+              </a:bodyPr>
+              <a:lstStyle/>
+              <a:p>
+                <a:endParaRPr lang="en-US"/>
+              </a:p>
+            </p:txBody>
+          </p:sp>
+          <p:sp>
+            <p:nvSpPr>
+              <p:cNvPr id="29" name="Oval 28">
+                <a:extLst>
+                  <a:ext uri="{FF2B5EF4-FFF2-40B4-BE49-F238E27FC236}">
+                    <a16:creationId xmlns:a16="http://schemas.microsoft.com/office/drawing/2014/main" id="{8B309E2B-0DAB-4F51-9B68-61A581BFE109}"/>
+                  </a:ext>
+                </a:extLst>
+              </p:cNvPr>
+              <p:cNvSpPr/>
+              <p:nvPr/>
+            </p:nvSpPr>
+            <p:spPr>
+              <a:xfrm>
+                <a:off x="3851487" y="2545080"/>
+                <a:ext cx="134620" cy="128905"/>
+              </a:xfrm>
+              <a:prstGeom prst="ellipse">
+                <a:avLst/>
+              </a:prstGeom>
+              <a:solidFill>
+                <a:schemeClr val="accent1">
+                  <a:lumMod val="40000"/>
+                  <a:lumOff val="60000"/>
+                </a:schemeClr>
+              </a:solidFill>
+              <a:ln>
+                <a:solidFill>
+                  <a:schemeClr val="accent1">
+                    <a:lumMod val="60000"/>
+                    <a:lumOff val="40000"/>
+                  </a:schemeClr>
+                </a:solidFill>
+              </a:ln>
+            </p:spPr>
+            <p:style>
+              <a:lnRef idx="2">
+                <a:schemeClr val="accent1">
+                  <a:shade val="50000"/>
+                </a:schemeClr>
+              </a:lnRef>
+              <a:fillRef idx="1">
+                <a:schemeClr val="accent1"/>
+              </a:fillRef>
+              <a:effectRef idx="0">
+                <a:schemeClr val="accent1"/>
+              </a:effectRef>
+              <a:fontRef idx="minor">
+                <a:schemeClr val="lt1"/>
+              </a:fontRef>
+            </p:style>
+            <p:txBody>
+              <a:bodyPr rot="0" spcFirstLastPara="0" vert="horz" wrap="square" lIns="91440" tIns="45720" rIns="91440" bIns="45720" numCol="1" spcCol="0" rtlCol="0" fromWordArt="0" anchor="ctr" anchorCtr="0" forceAA="0" compatLnSpc="1">
+                <a:prstTxWarp prst="textNoShape">
+                  <a:avLst/>
+                </a:prstTxWarp>
+                <a:noAutofit/>
+              </a:bodyPr>
+              <a:lstStyle/>
+              <a:p>
+                <a:endParaRPr lang="en-US"/>
+              </a:p>
+            </p:txBody>
+          </p:sp>
+          <p:sp>
+            <p:nvSpPr>
+              <p:cNvPr id="30" name="Oval 29">
+                <a:extLst>
+                  <a:ext uri="{FF2B5EF4-FFF2-40B4-BE49-F238E27FC236}">
+                    <a16:creationId xmlns:a16="http://schemas.microsoft.com/office/drawing/2014/main" id="{D3472EB9-90CE-4595-A36F-F03179F4D293}"/>
+                  </a:ext>
+                </a:extLst>
+              </p:cNvPr>
+              <p:cNvSpPr/>
+              <p:nvPr/>
+            </p:nvSpPr>
+            <p:spPr>
+              <a:xfrm>
+                <a:off x="4063577" y="2545080"/>
+                <a:ext cx="134620" cy="128905"/>
+              </a:xfrm>
+              <a:prstGeom prst="ellipse">
+                <a:avLst/>
+              </a:prstGeom>
+              <a:solidFill>
+                <a:schemeClr val="accent1">
+                  <a:lumMod val="40000"/>
+                  <a:lumOff val="60000"/>
+                </a:schemeClr>
+              </a:solidFill>
+              <a:ln>
+                <a:solidFill>
+                  <a:schemeClr val="accent1">
+                    <a:lumMod val="60000"/>
+                    <a:lumOff val="40000"/>
+                  </a:schemeClr>
+                </a:solidFill>
+              </a:ln>
+            </p:spPr>
+            <p:style>
+              <a:lnRef idx="2">
+                <a:schemeClr val="accent1">
+                  <a:shade val="50000"/>
+                </a:schemeClr>
+              </a:lnRef>
+              <a:fillRef idx="1">
+                <a:schemeClr val="accent1"/>
+              </a:fillRef>
+              <a:effectRef idx="0">
+                <a:schemeClr val="accent1"/>
+              </a:effectRef>
+              <a:fontRef idx="minor">
+                <a:schemeClr val="lt1"/>
+              </a:fontRef>
+            </p:style>
+            <p:txBody>
+              <a:bodyPr rot="0" spcFirstLastPara="0" vert="horz" wrap="square" lIns="91440" tIns="45720" rIns="91440" bIns="45720" numCol="1" spcCol="0" rtlCol="0" fromWordArt="0" anchor="ctr" anchorCtr="0" forceAA="0" compatLnSpc="1">
+                <a:prstTxWarp prst="textNoShape">
+                  <a:avLst/>
+                </a:prstTxWarp>
+                <a:noAutofit/>
+              </a:bodyPr>
+              <a:lstStyle/>
+              <a:p>
+                <a:endParaRPr lang="en-US"/>
+              </a:p>
+            </p:txBody>
+          </p:sp>
+        </p:grpSp>
+        <p:grpSp>
+          <p:nvGrpSpPr>
+            <p:cNvPr id="21" name="Group 20">
+              <a:extLst>
+                <a:ext uri="{FF2B5EF4-FFF2-40B4-BE49-F238E27FC236}">
+                  <a16:creationId xmlns:a16="http://schemas.microsoft.com/office/drawing/2014/main" id="{D3418411-5B78-4CC0-893D-288A5640BBF5}"/>
+                </a:ext>
+              </a:extLst>
+            </p:cNvPr>
+            <p:cNvGrpSpPr/>
+            <p:nvPr/>
+          </p:nvGrpSpPr>
+          <p:grpSpPr>
+            <a:xfrm>
+              <a:off x="3547425" y="4089057"/>
+              <a:ext cx="711200" cy="203835"/>
+              <a:chOff x="3559387" y="2503170"/>
+              <a:chExt cx="711200" cy="203835"/>
+            </a:xfrm>
+          </p:grpSpPr>
+          <p:sp>
+            <p:nvSpPr>
+              <p:cNvPr id="23" name="Rectangle: Rounded Corners 22">
+                <a:extLst>
+                  <a:ext uri="{FF2B5EF4-FFF2-40B4-BE49-F238E27FC236}">
+                    <a16:creationId xmlns:a16="http://schemas.microsoft.com/office/drawing/2014/main" id="{E810F0D5-3F31-4355-8304-C8E04942FA60}"/>
+                  </a:ext>
+                </a:extLst>
+              </p:cNvPr>
+              <p:cNvSpPr/>
+              <p:nvPr/>
+            </p:nvSpPr>
+            <p:spPr>
+              <a:xfrm>
+                <a:off x="3559387" y="2503170"/>
+                <a:ext cx="711200" cy="203835"/>
+              </a:xfrm>
+              <a:prstGeom prst="roundRect">
+                <a:avLst/>
+              </a:prstGeom>
+              <a:noFill/>
+              <a:ln>
+                <a:solidFill>
+                  <a:schemeClr val="tx1"/>
+                </a:solidFill>
+              </a:ln>
+            </p:spPr>
+            <p:style>
+              <a:lnRef idx="2">
+                <a:schemeClr val="accent1">
+                  <a:shade val="50000"/>
+                </a:schemeClr>
+              </a:lnRef>
+              <a:fillRef idx="1">
+                <a:schemeClr val="accent1"/>
+              </a:fillRef>
+              <a:effectRef idx="0">
+                <a:schemeClr val="accent1"/>
+              </a:effectRef>
+              <a:fontRef idx="minor">
+                <a:schemeClr val="lt1"/>
+              </a:fontRef>
+            </p:style>
+            <p:txBody>
+              <a:bodyPr rot="0" spcFirstLastPara="0" vert="horz" wrap="square" lIns="91440" tIns="45720" rIns="91440" bIns="45720" numCol="1" spcCol="0" rtlCol="0" fromWordArt="0" anchor="ctr" anchorCtr="0" forceAA="0" compatLnSpc="1">
+                <a:prstTxWarp prst="textNoShape">
+                  <a:avLst/>
+                </a:prstTxWarp>
+                <a:noAutofit/>
+              </a:bodyPr>
+              <a:lstStyle/>
+              <a:p>
+                <a:endParaRPr lang="en-US"/>
+              </a:p>
+            </p:txBody>
+          </p:sp>
+          <p:sp>
+            <p:nvSpPr>
+              <p:cNvPr id="24" name="Oval 23">
+                <a:extLst>
+                  <a:ext uri="{FF2B5EF4-FFF2-40B4-BE49-F238E27FC236}">
+                    <a16:creationId xmlns:a16="http://schemas.microsoft.com/office/drawing/2014/main" id="{DCD1460E-66B5-464D-B460-C2C0F91E48C2}"/>
+                  </a:ext>
+                </a:extLst>
+              </p:cNvPr>
+              <p:cNvSpPr/>
+              <p:nvPr/>
+            </p:nvSpPr>
+            <p:spPr>
+              <a:xfrm>
+                <a:off x="3640032" y="2545080"/>
+                <a:ext cx="134620" cy="128905"/>
+              </a:xfrm>
+              <a:prstGeom prst="ellipse">
+                <a:avLst/>
+              </a:prstGeom>
+              <a:solidFill>
+                <a:schemeClr val="accent1">
+                  <a:lumMod val="40000"/>
+                  <a:lumOff val="60000"/>
+                </a:schemeClr>
+              </a:solidFill>
+              <a:ln>
+                <a:solidFill>
+                  <a:schemeClr val="accent1">
+                    <a:lumMod val="60000"/>
+                    <a:lumOff val="40000"/>
+                  </a:schemeClr>
+                </a:solidFill>
+              </a:ln>
+            </p:spPr>
+            <p:style>
+              <a:lnRef idx="2">
+                <a:schemeClr val="accent1">
+                  <a:shade val="50000"/>
+                </a:schemeClr>
+              </a:lnRef>
+              <a:fillRef idx="1">
+                <a:schemeClr val="accent1"/>
+              </a:fillRef>
+              <a:effectRef idx="0">
+                <a:schemeClr val="accent1"/>
+              </a:effectRef>
+              <a:fontRef idx="minor">
+                <a:schemeClr val="lt1"/>
+              </a:fontRef>
+            </p:style>
+            <p:txBody>
+              <a:bodyPr rot="0" spcFirstLastPara="0" vert="horz" wrap="square" lIns="91440" tIns="45720" rIns="91440" bIns="45720" numCol="1" spcCol="0" rtlCol="0" fromWordArt="0" anchor="ctr" anchorCtr="0" forceAA="0" compatLnSpc="1">
+                <a:prstTxWarp prst="textNoShape">
+                  <a:avLst/>
+                </a:prstTxWarp>
+                <a:noAutofit/>
+              </a:bodyPr>
+              <a:lstStyle/>
+              <a:p>
+                <a:endParaRPr lang="en-US"/>
+              </a:p>
+            </p:txBody>
+          </p:sp>
+          <p:sp>
+            <p:nvSpPr>
+              <p:cNvPr id="25" name="Oval 24">
+                <a:extLst>
+                  <a:ext uri="{FF2B5EF4-FFF2-40B4-BE49-F238E27FC236}">
+                    <a16:creationId xmlns:a16="http://schemas.microsoft.com/office/drawing/2014/main" id="{75E5BE2C-3C34-459A-9245-1F0AF8BA4E93}"/>
+                  </a:ext>
+                </a:extLst>
+              </p:cNvPr>
+              <p:cNvSpPr/>
+              <p:nvPr/>
+            </p:nvSpPr>
+            <p:spPr>
+              <a:xfrm>
+                <a:off x="3851487" y="2545080"/>
+                <a:ext cx="134620" cy="128905"/>
+              </a:xfrm>
+              <a:prstGeom prst="ellipse">
+                <a:avLst/>
+              </a:prstGeom>
+              <a:solidFill>
+                <a:schemeClr val="accent1">
+                  <a:lumMod val="40000"/>
+                  <a:lumOff val="60000"/>
+                </a:schemeClr>
+              </a:solidFill>
+              <a:ln>
+                <a:solidFill>
+                  <a:schemeClr val="accent1">
+                    <a:lumMod val="60000"/>
+                    <a:lumOff val="40000"/>
+                  </a:schemeClr>
+                </a:solidFill>
+              </a:ln>
+            </p:spPr>
+            <p:style>
+              <a:lnRef idx="2">
+                <a:schemeClr val="accent1">
+                  <a:shade val="50000"/>
+                </a:schemeClr>
+              </a:lnRef>
+              <a:fillRef idx="1">
+                <a:schemeClr val="accent1"/>
+              </a:fillRef>
+              <a:effectRef idx="0">
+                <a:schemeClr val="accent1"/>
+              </a:effectRef>
+              <a:fontRef idx="minor">
+                <a:schemeClr val="lt1"/>
+              </a:fontRef>
+            </p:style>
+            <p:txBody>
+              <a:bodyPr rot="0" spcFirstLastPara="0" vert="horz" wrap="square" lIns="91440" tIns="45720" rIns="91440" bIns="45720" numCol="1" spcCol="0" rtlCol="0" fromWordArt="0" anchor="ctr" anchorCtr="0" forceAA="0" compatLnSpc="1">
+                <a:prstTxWarp prst="textNoShape">
+                  <a:avLst/>
+                </a:prstTxWarp>
+                <a:noAutofit/>
+              </a:bodyPr>
+              <a:lstStyle/>
+              <a:p>
+                <a:endParaRPr lang="en-US"/>
+              </a:p>
+            </p:txBody>
+          </p:sp>
+          <p:sp>
+            <p:nvSpPr>
+              <p:cNvPr id="26" name="Oval 25">
+                <a:extLst>
+                  <a:ext uri="{FF2B5EF4-FFF2-40B4-BE49-F238E27FC236}">
+                    <a16:creationId xmlns:a16="http://schemas.microsoft.com/office/drawing/2014/main" id="{EE5E03DA-8B06-4933-933A-650E8EEC5F96}"/>
+                  </a:ext>
+                </a:extLst>
+              </p:cNvPr>
+              <p:cNvSpPr/>
+              <p:nvPr/>
+            </p:nvSpPr>
+            <p:spPr>
+              <a:xfrm>
+                <a:off x="4063577" y="2545080"/>
+                <a:ext cx="134620" cy="128905"/>
+              </a:xfrm>
+              <a:prstGeom prst="ellipse">
+                <a:avLst/>
+              </a:prstGeom>
+              <a:solidFill>
+                <a:schemeClr val="accent1">
+                  <a:lumMod val="40000"/>
+                  <a:lumOff val="60000"/>
+                </a:schemeClr>
+              </a:solidFill>
+              <a:ln>
+                <a:solidFill>
+                  <a:schemeClr val="accent1">
+                    <a:lumMod val="60000"/>
+                    <a:lumOff val="40000"/>
+                  </a:schemeClr>
+                </a:solidFill>
+              </a:ln>
+            </p:spPr>
+            <p:style>
+              <a:lnRef idx="2">
+                <a:schemeClr val="accent1">
+                  <a:shade val="50000"/>
+                </a:schemeClr>
+              </a:lnRef>
+              <a:fillRef idx="1">
+                <a:schemeClr val="accent1"/>
+              </a:fillRef>
+              <a:effectRef idx="0">
+                <a:schemeClr val="accent1"/>
+              </a:effectRef>
+              <a:fontRef idx="minor">
+                <a:schemeClr val="lt1"/>
+              </a:fontRef>
+            </p:style>
+            <p:txBody>
+              <a:bodyPr rot="0" spcFirstLastPara="0" vert="horz" wrap="square" lIns="91440" tIns="45720" rIns="91440" bIns="45720" numCol="1" spcCol="0" rtlCol="0" fromWordArt="0" anchor="ctr" anchorCtr="0" forceAA="0" compatLnSpc="1">
+                <a:prstTxWarp prst="textNoShape">
+                  <a:avLst/>
+                </a:prstTxWarp>
+                <a:noAutofit/>
+              </a:bodyPr>
+              <a:lstStyle/>
+              <a:p>
+                <a:endParaRPr lang="en-US"/>
+              </a:p>
+            </p:txBody>
+          </p:sp>
+        </p:grpSp>
+        <p:sp>
+          <p:nvSpPr>
+            <p:cNvPr id="22" name="TextBox 21">
+              <a:extLst>
+                <a:ext uri="{FF2B5EF4-FFF2-40B4-BE49-F238E27FC236}">
+                  <a16:creationId xmlns:a16="http://schemas.microsoft.com/office/drawing/2014/main" id="{8F6839A9-5229-4F58-838D-C95D41B5F4AC}"/>
+                </a:ext>
+              </a:extLst>
+            </p:cNvPr>
+            <p:cNvSpPr txBox="1"/>
+            <p:nvPr/>
+          </p:nvSpPr>
+          <p:spPr>
+            <a:xfrm>
+              <a:off x="3748522" y="3243174"/>
+              <a:ext cx="343364" cy="369332"/>
+            </a:xfrm>
+            <a:prstGeom prst="rect">
+              <a:avLst/>
+            </a:prstGeom>
+            <a:noFill/>
+          </p:spPr>
+          <p:txBody>
+            <a:bodyPr wrap="none" rtlCol="0">
+              <a:spAutoFit/>
+            </a:bodyPr>
+            <a:lstStyle/>
+            <a:p>
+              <a:r>
+                <a:rPr lang="en-US" dirty="0"/>
+                <a:t>…</a:t>
+              </a:r>
+            </a:p>
+          </p:txBody>
+        </p:sp>
+      </p:grpSp>
+      <p:sp>
+        <p:nvSpPr>
+          <p:cNvPr id="40" name="TextBox 39">
+            <a:extLst>
+              <a:ext uri="{FF2B5EF4-FFF2-40B4-BE49-F238E27FC236}">
+                <a16:creationId xmlns:a16="http://schemas.microsoft.com/office/drawing/2014/main" id="{CA72FC33-55F1-4517-8F44-2EFAD7965AF8}"/>
+              </a:ext>
+            </a:extLst>
+          </p:cNvPr>
+          <p:cNvSpPr txBox="1"/>
+          <p:nvPr/>
+        </p:nvSpPr>
+        <p:spPr>
+          <a:xfrm>
+            <a:off x="2529431" y="1511223"/>
+            <a:ext cx="1669368" cy="923330"/>
+          </a:xfrm>
+          <a:prstGeom prst="rect">
+            <a:avLst/>
+          </a:prstGeom>
+          <a:noFill/>
+        </p:spPr>
+        <p:txBody>
+          <a:bodyPr wrap="none" rtlCol="0">
+            <a:spAutoFit/>
+          </a:bodyPr>
+          <a:lstStyle/>
+          <a:p>
+            <a:pPr algn="ctr"/>
+            <a:r>
+              <a:rPr lang="en-US" dirty="0"/>
+              <a:t>Node</a:t>
+            </a:r>
+          </a:p>
+          <a:p>
+            <a:pPr algn="ctr"/>
+            <a:r>
+              <a:rPr lang="en-US" dirty="0"/>
+              <a:t>Representation</a:t>
+            </a:r>
+          </a:p>
+          <a:p>
+            <a:pPr algn="ctr"/>
+            <a:r>
+              <a:rPr lang="en-US" dirty="0"/>
+              <a:t>Vectors</a:t>
+            </a:r>
+          </a:p>
+        </p:txBody>
+      </p:sp>
+      <p:grpSp>
+        <p:nvGrpSpPr>
+          <p:cNvPr id="41" name="Group 40">
+            <a:extLst>
+              <a:ext uri="{FF2B5EF4-FFF2-40B4-BE49-F238E27FC236}">
+                <a16:creationId xmlns:a16="http://schemas.microsoft.com/office/drawing/2014/main" id="{1A6D8444-96A1-4906-86BF-AC0B1FA5D0BA}"/>
+              </a:ext>
+            </a:extLst>
+          </p:cNvPr>
+          <p:cNvGrpSpPr/>
+          <p:nvPr/>
+        </p:nvGrpSpPr>
+        <p:grpSpPr>
+          <a:xfrm>
+            <a:off x="4179127" y="3897019"/>
+            <a:ext cx="720991" cy="1610870"/>
+            <a:chOff x="3547425" y="2682022"/>
+            <a:chExt cx="720991" cy="1610870"/>
+          </a:xfrm>
+        </p:grpSpPr>
+        <p:grpSp>
+          <p:nvGrpSpPr>
+            <p:cNvPr id="42" name="Group 41">
+              <a:extLst>
+                <a:ext uri="{FF2B5EF4-FFF2-40B4-BE49-F238E27FC236}">
+                  <a16:creationId xmlns:a16="http://schemas.microsoft.com/office/drawing/2014/main" id="{BD3C18C7-AE62-41E0-9E07-F400938EDBD8}"/>
+                </a:ext>
+              </a:extLst>
+            </p:cNvPr>
+            <p:cNvGrpSpPr/>
+            <p:nvPr/>
+          </p:nvGrpSpPr>
+          <p:grpSpPr>
+            <a:xfrm>
+              <a:off x="3553406" y="2682022"/>
+              <a:ext cx="711200" cy="203835"/>
+              <a:chOff x="3559387" y="2503170"/>
+              <a:chExt cx="711200" cy="203835"/>
+            </a:xfrm>
+          </p:grpSpPr>
+          <p:sp>
+            <p:nvSpPr>
+              <p:cNvPr id="59" name="Rectangle: Rounded Corners 58">
+                <a:extLst>
+                  <a:ext uri="{FF2B5EF4-FFF2-40B4-BE49-F238E27FC236}">
+                    <a16:creationId xmlns:a16="http://schemas.microsoft.com/office/drawing/2014/main" id="{5A31863F-AC95-4FF6-AEE7-27B26AFF97DE}"/>
+                  </a:ext>
+                </a:extLst>
+              </p:cNvPr>
+              <p:cNvSpPr/>
+              <p:nvPr/>
+            </p:nvSpPr>
+            <p:spPr>
+              <a:xfrm>
+                <a:off x="3559387" y="2503170"/>
+                <a:ext cx="711200" cy="203835"/>
+              </a:xfrm>
+              <a:prstGeom prst="roundRect">
+                <a:avLst/>
+              </a:prstGeom>
+              <a:noFill/>
+              <a:ln>
+                <a:solidFill>
+                  <a:schemeClr val="tx1"/>
+                </a:solidFill>
+              </a:ln>
+            </p:spPr>
+            <p:style>
+              <a:lnRef idx="2">
+                <a:schemeClr val="accent1">
+                  <a:shade val="50000"/>
+                </a:schemeClr>
+              </a:lnRef>
+              <a:fillRef idx="1">
+                <a:schemeClr val="accent1"/>
+              </a:fillRef>
+              <a:effectRef idx="0">
+                <a:schemeClr val="accent1"/>
+              </a:effectRef>
+              <a:fontRef idx="minor">
+                <a:schemeClr val="lt1"/>
+              </a:fontRef>
+            </p:style>
+            <p:txBody>
+              <a:bodyPr rot="0" spcFirstLastPara="0" vert="horz" wrap="square" lIns="91440" tIns="45720" rIns="91440" bIns="45720" numCol="1" spcCol="0" rtlCol="0" fromWordArt="0" anchor="ctr" anchorCtr="0" forceAA="0" compatLnSpc="1">
+                <a:prstTxWarp prst="textNoShape">
+                  <a:avLst/>
+                </a:prstTxWarp>
+                <a:noAutofit/>
+              </a:bodyPr>
+              <a:lstStyle/>
+              <a:p>
+                <a:endParaRPr lang="en-US"/>
+              </a:p>
+            </p:txBody>
+          </p:sp>
+          <p:sp>
+            <p:nvSpPr>
+              <p:cNvPr id="60" name="Oval 59">
+                <a:extLst>
+                  <a:ext uri="{FF2B5EF4-FFF2-40B4-BE49-F238E27FC236}">
+                    <a16:creationId xmlns:a16="http://schemas.microsoft.com/office/drawing/2014/main" id="{A9C983F9-208B-411C-9AE4-E564A8B8B52A}"/>
+                  </a:ext>
+                </a:extLst>
+              </p:cNvPr>
+              <p:cNvSpPr/>
+              <p:nvPr/>
+            </p:nvSpPr>
+            <p:spPr>
+              <a:xfrm>
+                <a:off x="3640032" y="2545080"/>
+                <a:ext cx="134620" cy="128905"/>
+              </a:xfrm>
+              <a:prstGeom prst="ellipse">
+                <a:avLst/>
+              </a:prstGeom>
+              <a:solidFill>
+                <a:schemeClr val="accent2">
+                  <a:lumMod val="20000"/>
+                  <a:lumOff val="80000"/>
+                </a:schemeClr>
+              </a:solidFill>
+              <a:ln>
+                <a:solidFill>
+                  <a:schemeClr val="accent1">
+                    <a:lumMod val="60000"/>
+                    <a:lumOff val="40000"/>
+                  </a:schemeClr>
+                </a:solidFill>
+              </a:ln>
+            </p:spPr>
+            <p:style>
+              <a:lnRef idx="2">
+                <a:schemeClr val="accent1">
+                  <a:shade val="50000"/>
+                </a:schemeClr>
+              </a:lnRef>
+              <a:fillRef idx="1">
+                <a:schemeClr val="accent1"/>
+              </a:fillRef>
+              <a:effectRef idx="0">
+                <a:schemeClr val="accent1"/>
+              </a:effectRef>
+              <a:fontRef idx="minor">
+                <a:schemeClr val="lt1"/>
+              </a:fontRef>
+            </p:style>
+            <p:txBody>
+              <a:bodyPr rot="0" spcFirstLastPara="0" vert="horz" wrap="square" lIns="91440" tIns="45720" rIns="91440" bIns="45720" numCol="1" spcCol="0" rtlCol="0" fromWordArt="0" anchor="ctr" anchorCtr="0" forceAA="0" compatLnSpc="1">
+                <a:prstTxWarp prst="textNoShape">
+                  <a:avLst/>
+                </a:prstTxWarp>
+                <a:noAutofit/>
+              </a:bodyPr>
+              <a:lstStyle/>
+              <a:p>
+                <a:endParaRPr lang="en-US"/>
+              </a:p>
+            </p:txBody>
+          </p:sp>
+          <p:sp>
+            <p:nvSpPr>
+              <p:cNvPr id="61" name="Oval 60">
+                <a:extLst>
+                  <a:ext uri="{FF2B5EF4-FFF2-40B4-BE49-F238E27FC236}">
+                    <a16:creationId xmlns:a16="http://schemas.microsoft.com/office/drawing/2014/main" id="{DBEEB066-09E1-4AD5-B0C8-ACC81D7AF846}"/>
+                  </a:ext>
+                </a:extLst>
+              </p:cNvPr>
+              <p:cNvSpPr/>
+              <p:nvPr/>
+            </p:nvSpPr>
+            <p:spPr>
+              <a:xfrm>
+                <a:off x="3851487" y="2545080"/>
+                <a:ext cx="134620" cy="128905"/>
+              </a:xfrm>
+              <a:prstGeom prst="ellipse">
+                <a:avLst/>
+              </a:prstGeom>
+              <a:solidFill>
+                <a:schemeClr val="accent2">
+                  <a:lumMod val="20000"/>
+                  <a:lumOff val="80000"/>
+                </a:schemeClr>
+              </a:solidFill>
+              <a:ln>
+                <a:solidFill>
+                  <a:schemeClr val="accent1">
+                    <a:lumMod val="60000"/>
+                    <a:lumOff val="40000"/>
+                  </a:schemeClr>
+                </a:solidFill>
+              </a:ln>
+            </p:spPr>
+            <p:style>
+              <a:lnRef idx="2">
+                <a:schemeClr val="accent1">
+                  <a:shade val="50000"/>
+                </a:schemeClr>
+              </a:lnRef>
+              <a:fillRef idx="1">
+                <a:schemeClr val="accent1"/>
+              </a:fillRef>
+              <a:effectRef idx="0">
+                <a:schemeClr val="accent1"/>
+              </a:effectRef>
+              <a:fontRef idx="minor">
+                <a:schemeClr val="lt1"/>
+              </a:fontRef>
+            </p:style>
+            <p:txBody>
+              <a:bodyPr rot="0" spcFirstLastPara="0" vert="horz" wrap="square" lIns="91440" tIns="45720" rIns="91440" bIns="45720" numCol="1" spcCol="0" rtlCol="0" fromWordArt="0" anchor="ctr" anchorCtr="0" forceAA="0" compatLnSpc="1">
+                <a:prstTxWarp prst="textNoShape">
+                  <a:avLst/>
+                </a:prstTxWarp>
+                <a:noAutofit/>
+              </a:bodyPr>
+              <a:lstStyle/>
+              <a:p>
+                <a:endParaRPr lang="en-US"/>
+              </a:p>
+            </p:txBody>
+          </p:sp>
+          <p:sp>
+            <p:nvSpPr>
+              <p:cNvPr id="62" name="Oval 61">
+                <a:extLst>
+                  <a:ext uri="{FF2B5EF4-FFF2-40B4-BE49-F238E27FC236}">
+                    <a16:creationId xmlns:a16="http://schemas.microsoft.com/office/drawing/2014/main" id="{7ADB48A7-600D-427F-A638-4BBC9B52EBAD}"/>
+                  </a:ext>
+                </a:extLst>
+              </p:cNvPr>
+              <p:cNvSpPr/>
+              <p:nvPr/>
+            </p:nvSpPr>
+            <p:spPr>
+              <a:xfrm>
+                <a:off x="4063577" y="2545080"/>
+                <a:ext cx="134620" cy="128905"/>
+              </a:xfrm>
+              <a:prstGeom prst="ellipse">
+                <a:avLst/>
+              </a:prstGeom>
+              <a:solidFill>
+                <a:schemeClr val="accent2">
+                  <a:lumMod val="20000"/>
+                  <a:lumOff val="80000"/>
+                </a:schemeClr>
+              </a:solidFill>
+              <a:ln>
+                <a:solidFill>
+                  <a:schemeClr val="accent1">
+                    <a:lumMod val="60000"/>
+                    <a:lumOff val="40000"/>
+                  </a:schemeClr>
+                </a:solidFill>
+              </a:ln>
+            </p:spPr>
+            <p:style>
+              <a:lnRef idx="2">
+                <a:schemeClr val="accent1">
+                  <a:shade val="50000"/>
+                </a:schemeClr>
+              </a:lnRef>
+              <a:fillRef idx="1">
+                <a:schemeClr val="accent1"/>
+              </a:fillRef>
+              <a:effectRef idx="0">
+                <a:schemeClr val="accent1"/>
+              </a:effectRef>
+              <a:fontRef idx="minor">
+                <a:schemeClr val="lt1"/>
+              </a:fontRef>
+            </p:style>
+            <p:txBody>
+              <a:bodyPr rot="0" spcFirstLastPara="0" vert="horz" wrap="square" lIns="91440" tIns="45720" rIns="91440" bIns="45720" numCol="1" spcCol="0" rtlCol="0" fromWordArt="0" anchor="ctr" anchorCtr="0" forceAA="0" compatLnSpc="1">
+                <a:prstTxWarp prst="textNoShape">
+                  <a:avLst/>
+                </a:prstTxWarp>
+                <a:noAutofit/>
+              </a:bodyPr>
+              <a:lstStyle/>
+              <a:p>
+                <a:endParaRPr lang="en-US"/>
+              </a:p>
+            </p:txBody>
+          </p:sp>
+        </p:grpSp>
+        <p:grpSp>
+          <p:nvGrpSpPr>
+            <p:cNvPr id="43" name="Group 42">
+              <a:extLst>
+                <a:ext uri="{FF2B5EF4-FFF2-40B4-BE49-F238E27FC236}">
+                  <a16:creationId xmlns:a16="http://schemas.microsoft.com/office/drawing/2014/main" id="{4D692AFA-C4B7-4B43-8F6E-938183374ADB}"/>
+                </a:ext>
+              </a:extLst>
+            </p:cNvPr>
+            <p:cNvGrpSpPr/>
+            <p:nvPr/>
+          </p:nvGrpSpPr>
+          <p:grpSpPr>
+            <a:xfrm>
+              <a:off x="3557216" y="3064709"/>
+              <a:ext cx="711200" cy="203835"/>
+              <a:chOff x="3559387" y="2503170"/>
+              <a:chExt cx="711200" cy="203835"/>
+            </a:xfrm>
+          </p:grpSpPr>
+          <p:sp>
+            <p:nvSpPr>
+              <p:cNvPr id="55" name="Rectangle: Rounded Corners 54">
+                <a:extLst>
+                  <a:ext uri="{FF2B5EF4-FFF2-40B4-BE49-F238E27FC236}">
+                    <a16:creationId xmlns:a16="http://schemas.microsoft.com/office/drawing/2014/main" id="{FF6033CA-3114-43A2-84C2-59CC9E97A0EA}"/>
+                  </a:ext>
+                </a:extLst>
+              </p:cNvPr>
+              <p:cNvSpPr/>
+              <p:nvPr/>
+            </p:nvSpPr>
+            <p:spPr>
+              <a:xfrm>
+                <a:off x="3559387" y="2503170"/>
+                <a:ext cx="711200" cy="203835"/>
+              </a:xfrm>
+              <a:prstGeom prst="roundRect">
+                <a:avLst/>
+              </a:prstGeom>
+              <a:noFill/>
+              <a:ln>
+                <a:solidFill>
+                  <a:schemeClr val="tx1"/>
+                </a:solidFill>
+              </a:ln>
+            </p:spPr>
+            <p:style>
+              <a:lnRef idx="2">
+                <a:schemeClr val="accent1">
+                  <a:shade val="50000"/>
+                </a:schemeClr>
+              </a:lnRef>
+              <a:fillRef idx="1">
+                <a:schemeClr val="accent1"/>
+              </a:fillRef>
+              <a:effectRef idx="0">
+                <a:schemeClr val="accent1"/>
+              </a:effectRef>
+              <a:fontRef idx="minor">
+                <a:schemeClr val="lt1"/>
+              </a:fontRef>
+            </p:style>
+            <p:txBody>
+              <a:bodyPr rot="0" spcFirstLastPara="0" vert="horz" wrap="square" lIns="91440" tIns="45720" rIns="91440" bIns="45720" numCol="1" spcCol="0" rtlCol="0" fromWordArt="0" anchor="ctr" anchorCtr="0" forceAA="0" compatLnSpc="1">
+                <a:prstTxWarp prst="textNoShape">
+                  <a:avLst/>
+                </a:prstTxWarp>
+                <a:noAutofit/>
+              </a:bodyPr>
+              <a:lstStyle/>
+              <a:p>
+                <a:endParaRPr lang="en-US"/>
+              </a:p>
+            </p:txBody>
+          </p:sp>
+          <p:sp>
+            <p:nvSpPr>
+              <p:cNvPr id="56" name="Oval 55">
+                <a:extLst>
+                  <a:ext uri="{FF2B5EF4-FFF2-40B4-BE49-F238E27FC236}">
+                    <a16:creationId xmlns:a16="http://schemas.microsoft.com/office/drawing/2014/main" id="{DD974334-9BA3-47C2-8BB9-95AECAAE67E4}"/>
+                  </a:ext>
+                </a:extLst>
+              </p:cNvPr>
+              <p:cNvSpPr/>
+              <p:nvPr/>
+            </p:nvSpPr>
+            <p:spPr>
+              <a:xfrm>
+                <a:off x="3640032" y="2545080"/>
+                <a:ext cx="134620" cy="128905"/>
+              </a:xfrm>
+              <a:prstGeom prst="ellipse">
+                <a:avLst/>
+              </a:prstGeom>
+              <a:solidFill>
+                <a:schemeClr val="accent2">
+                  <a:lumMod val="20000"/>
+                  <a:lumOff val="80000"/>
+                </a:schemeClr>
+              </a:solidFill>
+              <a:ln>
+                <a:solidFill>
+                  <a:schemeClr val="accent1">
+                    <a:lumMod val="60000"/>
+                    <a:lumOff val="40000"/>
+                  </a:schemeClr>
+                </a:solidFill>
+              </a:ln>
+            </p:spPr>
+            <p:style>
+              <a:lnRef idx="2">
+                <a:schemeClr val="accent1">
+                  <a:shade val="50000"/>
+                </a:schemeClr>
+              </a:lnRef>
+              <a:fillRef idx="1">
+                <a:schemeClr val="accent1"/>
+              </a:fillRef>
+              <a:effectRef idx="0">
+                <a:schemeClr val="accent1"/>
+              </a:effectRef>
+              <a:fontRef idx="minor">
+                <a:schemeClr val="lt1"/>
+              </a:fontRef>
+            </p:style>
+            <p:txBody>
+              <a:bodyPr rot="0" spcFirstLastPara="0" vert="horz" wrap="square" lIns="91440" tIns="45720" rIns="91440" bIns="45720" numCol="1" spcCol="0" rtlCol="0" fromWordArt="0" anchor="ctr" anchorCtr="0" forceAA="0" compatLnSpc="1">
+                <a:prstTxWarp prst="textNoShape">
+                  <a:avLst/>
+                </a:prstTxWarp>
+                <a:noAutofit/>
+              </a:bodyPr>
+              <a:lstStyle/>
+              <a:p>
+                <a:endParaRPr lang="en-US"/>
+              </a:p>
+            </p:txBody>
+          </p:sp>
+          <p:sp>
+            <p:nvSpPr>
+              <p:cNvPr id="57" name="Oval 56">
+                <a:extLst>
+                  <a:ext uri="{FF2B5EF4-FFF2-40B4-BE49-F238E27FC236}">
+                    <a16:creationId xmlns:a16="http://schemas.microsoft.com/office/drawing/2014/main" id="{BCE8FA90-E3FF-4041-BBE0-5585613083F3}"/>
+                  </a:ext>
+                </a:extLst>
+              </p:cNvPr>
+              <p:cNvSpPr/>
+              <p:nvPr/>
+            </p:nvSpPr>
+            <p:spPr>
+              <a:xfrm>
+                <a:off x="3851487" y="2545080"/>
+                <a:ext cx="134620" cy="128905"/>
+              </a:xfrm>
+              <a:prstGeom prst="ellipse">
+                <a:avLst/>
+              </a:prstGeom>
+              <a:solidFill>
+                <a:schemeClr val="accent2">
+                  <a:lumMod val="20000"/>
+                  <a:lumOff val="80000"/>
+                </a:schemeClr>
+              </a:solidFill>
+              <a:ln>
+                <a:solidFill>
+                  <a:schemeClr val="accent1">
+                    <a:lumMod val="60000"/>
+                    <a:lumOff val="40000"/>
+                  </a:schemeClr>
+                </a:solidFill>
+              </a:ln>
+            </p:spPr>
+            <p:style>
+              <a:lnRef idx="2">
+                <a:schemeClr val="accent1">
+                  <a:shade val="50000"/>
+                </a:schemeClr>
+              </a:lnRef>
+              <a:fillRef idx="1">
+                <a:schemeClr val="accent1"/>
+              </a:fillRef>
+              <a:effectRef idx="0">
+                <a:schemeClr val="accent1"/>
+              </a:effectRef>
+              <a:fontRef idx="minor">
+                <a:schemeClr val="lt1"/>
+              </a:fontRef>
+            </p:style>
+            <p:txBody>
+              <a:bodyPr rot="0" spcFirstLastPara="0" vert="horz" wrap="square" lIns="91440" tIns="45720" rIns="91440" bIns="45720" numCol="1" spcCol="0" rtlCol="0" fromWordArt="0" anchor="ctr" anchorCtr="0" forceAA="0" compatLnSpc="1">
+                <a:prstTxWarp prst="textNoShape">
+                  <a:avLst/>
+                </a:prstTxWarp>
+                <a:noAutofit/>
+              </a:bodyPr>
+              <a:lstStyle/>
+              <a:p>
+                <a:endParaRPr lang="en-US"/>
+              </a:p>
+            </p:txBody>
+          </p:sp>
+          <p:sp>
+            <p:nvSpPr>
+              <p:cNvPr id="58" name="Oval 57">
+                <a:extLst>
+                  <a:ext uri="{FF2B5EF4-FFF2-40B4-BE49-F238E27FC236}">
+                    <a16:creationId xmlns:a16="http://schemas.microsoft.com/office/drawing/2014/main" id="{9DBD706C-F503-45CC-82A9-D7AD57F1F32E}"/>
+                  </a:ext>
+                </a:extLst>
+              </p:cNvPr>
+              <p:cNvSpPr/>
+              <p:nvPr/>
+            </p:nvSpPr>
+            <p:spPr>
+              <a:xfrm>
+                <a:off x="4063577" y="2545080"/>
+                <a:ext cx="134620" cy="128905"/>
+              </a:xfrm>
+              <a:prstGeom prst="ellipse">
+                <a:avLst/>
+              </a:prstGeom>
+              <a:solidFill>
+                <a:schemeClr val="accent2">
+                  <a:lumMod val="20000"/>
+                  <a:lumOff val="80000"/>
+                </a:schemeClr>
+              </a:solidFill>
+              <a:ln>
+                <a:solidFill>
+                  <a:schemeClr val="accent1">
+                    <a:lumMod val="60000"/>
+                    <a:lumOff val="40000"/>
+                  </a:schemeClr>
+                </a:solidFill>
+              </a:ln>
+            </p:spPr>
+            <p:style>
+              <a:lnRef idx="2">
+                <a:schemeClr val="accent1">
+                  <a:shade val="50000"/>
+                </a:schemeClr>
+              </a:lnRef>
+              <a:fillRef idx="1">
+                <a:schemeClr val="accent1"/>
+              </a:fillRef>
+              <a:effectRef idx="0">
+                <a:schemeClr val="accent1"/>
+              </a:effectRef>
+              <a:fontRef idx="minor">
+                <a:schemeClr val="lt1"/>
+              </a:fontRef>
+            </p:style>
+            <p:txBody>
+              <a:bodyPr rot="0" spcFirstLastPara="0" vert="horz" wrap="square" lIns="91440" tIns="45720" rIns="91440" bIns="45720" numCol="1" spcCol="0" rtlCol="0" fromWordArt="0" anchor="ctr" anchorCtr="0" forceAA="0" compatLnSpc="1">
+                <a:prstTxWarp prst="textNoShape">
+                  <a:avLst/>
+                </a:prstTxWarp>
+                <a:noAutofit/>
+              </a:bodyPr>
+              <a:lstStyle/>
+              <a:p>
+                <a:endParaRPr lang="en-US"/>
+              </a:p>
+            </p:txBody>
+          </p:sp>
+        </p:grpSp>
+        <p:grpSp>
+          <p:nvGrpSpPr>
+            <p:cNvPr id="44" name="Group 43">
+              <a:extLst>
+                <a:ext uri="{FF2B5EF4-FFF2-40B4-BE49-F238E27FC236}">
+                  <a16:creationId xmlns:a16="http://schemas.microsoft.com/office/drawing/2014/main" id="{271F6C86-74C6-49DD-8260-D98A8F2ABF5F}"/>
+                </a:ext>
+              </a:extLst>
+            </p:cNvPr>
+            <p:cNvGrpSpPr/>
+            <p:nvPr/>
+          </p:nvGrpSpPr>
+          <p:grpSpPr>
+            <a:xfrm>
+              <a:off x="3557216" y="3703411"/>
+              <a:ext cx="711200" cy="203835"/>
+              <a:chOff x="3559387" y="2503170"/>
+              <a:chExt cx="711200" cy="203835"/>
+            </a:xfrm>
+          </p:grpSpPr>
+          <p:sp>
+            <p:nvSpPr>
+              <p:cNvPr id="51" name="Rectangle: Rounded Corners 50">
+                <a:extLst>
+                  <a:ext uri="{FF2B5EF4-FFF2-40B4-BE49-F238E27FC236}">
+                    <a16:creationId xmlns:a16="http://schemas.microsoft.com/office/drawing/2014/main" id="{3D316C4A-B8B4-4D80-96E5-9E084920256E}"/>
+                  </a:ext>
+                </a:extLst>
+              </p:cNvPr>
+              <p:cNvSpPr/>
+              <p:nvPr/>
+            </p:nvSpPr>
+            <p:spPr>
+              <a:xfrm>
+                <a:off x="3559387" y="2503170"/>
+                <a:ext cx="711200" cy="203835"/>
+              </a:xfrm>
+              <a:prstGeom prst="roundRect">
+                <a:avLst/>
+              </a:prstGeom>
+              <a:noFill/>
+              <a:ln>
+                <a:solidFill>
+                  <a:schemeClr val="tx1"/>
+                </a:solidFill>
+              </a:ln>
+            </p:spPr>
+            <p:style>
+              <a:lnRef idx="2">
+                <a:schemeClr val="accent1">
+                  <a:shade val="50000"/>
+                </a:schemeClr>
+              </a:lnRef>
+              <a:fillRef idx="1">
+                <a:schemeClr val="accent1"/>
+              </a:fillRef>
+              <a:effectRef idx="0">
+                <a:schemeClr val="accent1"/>
+              </a:effectRef>
+              <a:fontRef idx="minor">
+                <a:schemeClr val="lt1"/>
+              </a:fontRef>
+            </p:style>
+            <p:txBody>
+              <a:bodyPr rot="0" spcFirstLastPara="0" vert="horz" wrap="square" lIns="91440" tIns="45720" rIns="91440" bIns="45720" numCol="1" spcCol="0" rtlCol="0" fromWordArt="0" anchor="ctr" anchorCtr="0" forceAA="0" compatLnSpc="1">
+                <a:prstTxWarp prst="textNoShape">
+                  <a:avLst/>
+                </a:prstTxWarp>
+                <a:noAutofit/>
+              </a:bodyPr>
+              <a:lstStyle/>
+              <a:p>
+                <a:endParaRPr lang="en-US"/>
+              </a:p>
+            </p:txBody>
+          </p:sp>
+          <p:sp>
+            <p:nvSpPr>
+              <p:cNvPr id="52" name="Oval 51">
+                <a:extLst>
+                  <a:ext uri="{FF2B5EF4-FFF2-40B4-BE49-F238E27FC236}">
+                    <a16:creationId xmlns:a16="http://schemas.microsoft.com/office/drawing/2014/main" id="{F48BDB00-F0C3-470C-9271-BEC864E2D8D2}"/>
+                  </a:ext>
+                </a:extLst>
+              </p:cNvPr>
+              <p:cNvSpPr/>
+              <p:nvPr/>
+            </p:nvSpPr>
+            <p:spPr>
+              <a:xfrm>
+                <a:off x="3640032" y="2545080"/>
+                <a:ext cx="134620" cy="128905"/>
+              </a:xfrm>
+              <a:prstGeom prst="ellipse">
+                <a:avLst/>
+              </a:prstGeom>
+              <a:solidFill>
+                <a:schemeClr val="accent2">
+                  <a:lumMod val="20000"/>
+                  <a:lumOff val="80000"/>
+                </a:schemeClr>
+              </a:solidFill>
+              <a:ln>
+                <a:solidFill>
+                  <a:schemeClr val="accent1">
+                    <a:lumMod val="60000"/>
+                    <a:lumOff val="40000"/>
+                  </a:schemeClr>
+                </a:solidFill>
+              </a:ln>
+            </p:spPr>
+            <p:style>
+              <a:lnRef idx="2">
+                <a:schemeClr val="accent1">
+                  <a:shade val="50000"/>
+                </a:schemeClr>
+              </a:lnRef>
+              <a:fillRef idx="1">
+                <a:schemeClr val="accent1"/>
+              </a:fillRef>
+              <a:effectRef idx="0">
+                <a:schemeClr val="accent1"/>
+              </a:effectRef>
+              <a:fontRef idx="minor">
+                <a:schemeClr val="lt1"/>
+              </a:fontRef>
+            </p:style>
+            <p:txBody>
+              <a:bodyPr rot="0" spcFirstLastPara="0" vert="horz" wrap="square" lIns="91440" tIns="45720" rIns="91440" bIns="45720" numCol="1" spcCol="0" rtlCol="0" fromWordArt="0" anchor="ctr" anchorCtr="0" forceAA="0" compatLnSpc="1">
+                <a:prstTxWarp prst="textNoShape">
+                  <a:avLst/>
+                </a:prstTxWarp>
+                <a:noAutofit/>
+              </a:bodyPr>
+              <a:lstStyle/>
+              <a:p>
+                <a:endParaRPr lang="en-US"/>
+              </a:p>
+            </p:txBody>
+          </p:sp>
+          <p:sp>
+            <p:nvSpPr>
+              <p:cNvPr id="53" name="Oval 52">
+                <a:extLst>
+                  <a:ext uri="{FF2B5EF4-FFF2-40B4-BE49-F238E27FC236}">
+                    <a16:creationId xmlns:a16="http://schemas.microsoft.com/office/drawing/2014/main" id="{ADE4811B-26E3-42FA-888D-9CE2FF253341}"/>
+                  </a:ext>
+                </a:extLst>
+              </p:cNvPr>
+              <p:cNvSpPr/>
+              <p:nvPr/>
+            </p:nvSpPr>
+            <p:spPr>
+              <a:xfrm>
+                <a:off x="3851487" y="2545080"/>
+                <a:ext cx="134620" cy="128905"/>
+              </a:xfrm>
+              <a:prstGeom prst="ellipse">
+                <a:avLst/>
+              </a:prstGeom>
+              <a:solidFill>
+                <a:schemeClr val="accent2">
+                  <a:lumMod val="20000"/>
+                  <a:lumOff val="80000"/>
+                </a:schemeClr>
+              </a:solidFill>
+              <a:ln>
+                <a:solidFill>
+                  <a:schemeClr val="accent1">
+                    <a:lumMod val="60000"/>
+                    <a:lumOff val="40000"/>
+                  </a:schemeClr>
+                </a:solidFill>
+              </a:ln>
+            </p:spPr>
+            <p:style>
+              <a:lnRef idx="2">
+                <a:schemeClr val="accent1">
+                  <a:shade val="50000"/>
+                </a:schemeClr>
+              </a:lnRef>
+              <a:fillRef idx="1">
+                <a:schemeClr val="accent1"/>
+              </a:fillRef>
+              <a:effectRef idx="0">
+                <a:schemeClr val="accent1"/>
+              </a:effectRef>
+              <a:fontRef idx="minor">
+                <a:schemeClr val="lt1"/>
+              </a:fontRef>
+            </p:style>
+            <p:txBody>
+              <a:bodyPr rot="0" spcFirstLastPara="0" vert="horz" wrap="square" lIns="91440" tIns="45720" rIns="91440" bIns="45720" numCol="1" spcCol="0" rtlCol="0" fromWordArt="0" anchor="ctr" anchorCtr="0" forceAA="0" compatLnSpc="1">
+                <a:prstTxWarp prst="textNoShape">
+                  <a:avLst/>
+                </a:prstTxWarp>
+                <a:noAutofit/>
+              </a:bodyPr>
+              <a:lstStyle/>
+              <a:p>
+                <a:endParaRPr lang="en-US"/>
+              </a:p>
+            </p:txBody>
+          </p:sp>
+          <p:sp>
+            <p:nvSpPr>
+              <p:cNvPr id="54" name="Oval 53">
+                <a:extLst>
+                  <a:ext uri="{FF2B5EF4-FFF2-40B4-BE49-F238E27FC236}">
+                    <a16:creationId xmlns:a16="http://schemas.microsoft.com/office/drawing/2014/main" id="{680CFE1D-9214-4619-BA82-11A636A07BA0}"/>
+                  </a:ext>
+                </a:extLst>
+              </p:cNvPr>
+              <p:cNvSpPr/>
+              <p:nvPr/>
+            </p:nvSpPr>
+            <p:spPr>
+              <a:xfrm>
+                <a:off x="4063577" y="2545080"/>
+                <a:ext cx="134620" cy="128905"/>
+              </a:xfrm>
+              <a:prstGeom prst="ellipse">
+                <a:avLst/>
+              </a:prstGeom>
+              <a:solidFill>
+                <a:schemeClr val="accent2">
+                  <a:lumMod val="20000"/>
+                  <a:lumOff val="80000"/>
+                </a:schemeClr>
+              </a:solidFill>
+              <a:ln>
+                <a:solidFill>
+                  <a:schemeClr val="accent1">
+                    <a:lumMod val="60000"/>
+                    <a:lumOff val="40000"/>
+                  </a:schemeClr>
+                </a:solidFill>
+              </a:ln>
+            </p:spPr>
+            <p:style>
+              <a:lnRef idx="2">
+                <a:schemeClr val="accent1">
+                  <a:shade val="50000"/>
+                </a:schemeClr>
+              </a:lnRef>
+              <a:fillRef idx="1">
+                <a:schemeClr val="accent1"/>
+              </a:fillRef>
+              <a:effectRef idx="0">
+                <a:schemeClr val="accent1"/>
+              </a:effectRef>
+              <a:fontRef idx="minor">
+                <a:schemeClr val="lt1"/>
+              </a:fontRef>
+            </p:style>
+            <p:txBody>
+              <a:bodyPr rot="0" spcFirstLastPara="0" vert="horz" wrap="square" lIns="91440" tIns="45720" rIns="91440" bIns="45720" numCol="1" spcCol="0" rtlCol="0" fromWordArt="0" anchor="ctr" anchorCtr="0" forceAA="0" compatLnSpc="1">
+                <a:prstTxWarp prst="textNoShape">
+                  <a:avLst/>
+                </a:prstTxWarp>
+                <a:noAutofit/>
+              </a:bodyPr>
+              <a:lstStyle/>
+              <a:p>
+                <a:endParaRPr lang="en-US"/>
+              </a:p>
+            </p:txBody>
+          </p:sp>
+        </p:grpSp>
+        <p:grpSp>
+          <p:nvGrpSpPr>
+            <p:cNvPr id="45" name="Group 44">
+              <a:extLst>
+                <a:ext uri="{FF2B5EF4-FFF2-40B4-BE49-F238E27FC236}">
+                  <a16:creationId xmlns:a16="http://schemas.microsoft.com/office/drawing/2014/main" id="{FA4826E6-25FD-49E2-BC94-D48069C2551D}"/>
+                </a:ext>
+              </a:extLst>
+            </p:cNvPr>
+            <p:cNvGrpSpPr/>
+            <p:nvPr/>
+          </p:nvGrpSpPr>
+          <p:grpSpPr>
+            <a:xfrm>
+              <a:off x="3547425" y="4089057"/>
+              <a:ext cx="711200" cy="203835"/>
+              <a:chOff x="3559387" y="2503170"/>
+              <a:chExt cx="711200" cy="203835"/>
+            </a:xfrm>
+          </p:grpSpPr>
+          <p:sp>
+            <p:nvSpPr>
+              <p:cNvPr id="47" name="Rectangle: Rounded Corners 46">
+                <a:extLst>
+                  <a:ext uri="{FF2B5EF4-FFF2-40B4-BE49-F238E27FC236}">
+                    <a16:creationId xmlns:a16="http://schemas.microsoft.com/office/drawing/2014/main" id="{67E404A8-E6F1-40AD-922C-5B0290EF76DB}"/>
+                  </a:ext>
+                </a:extLst>
+              </p:cNvPr>
+              <p:cNvSpPr/>
+              <p:nvPr/>
+            </p:nvSpPr>
+            <p:spPr>
+              <a:xfrm>
+                <a:off x="3559387" y="2503170"/>
+                <a:ext cx="711200" cy="203835"/>
+              </a:xfrm>
+              <a:prstGeom prst="roundRect">
+                <a:avLst/>
+              </a:prstGeom>
+              <a:noFill/>
+              <a:ln>
+                <a:solidFill>
+                  <a:schemeClr val="tx1"/>
+                </a:solidFill>
+              </a:ln>
+            </p:spPr>
+            <p:style>
+              <a:lnRef idx="2">
+                <a:schemeClr val="accent1">
+                  <a:shade val="50000"/>
+                </a:schemeClr>
+              </a:lnRef>
+              <a:fillRef idx="1">
+                <a:schemeClr val="accent1"/>
+              </a:fillRef>
+              <a:effectRef idx="0">
+                <a:schemeClr val="accent1"/>
+              </a:effectRef>
+              <a:fontRef idx="minor">
+                <a:schemeClr val="lt1"/>
+              </a:fontRef>
+            </p:style>
+            <p:txBody>
+              <a:bodyPr rot="0" spcFirstLastPara="0" vert="horz" wrap="square" lIns="91440" tIns="45720" rIns="91440" bIns="45720" numCol="1" spcCol="0" rtlCol="0" fromWordArt="0" anchor="ctr" anchorCtr="0" forceAA="0" compatLnSpc="1">
+                <a:prstTxWarp prst="textNoShape">
+                  <a:avLst/>
+                </a:prstTxWarp>
+                <a:noAutofit/>
+              </a:bodyPr>
+              <a:lstStyle/>
+              <a:p>
+                <a:endParaRPr lang="en-US"/>
+              </a:p>
+            </p:txBody>
+          </p:sp>
+          <p:sp>
+            <p:nvSpPr>
+              <p:cNvPr id="48" name="Oval 47">
+                <a:extLst>
+                  <a:ext uri="{FF2B5EF4-FFF2-40B4-BE49-F238E27FC236}">
+                    <a16:creationId xmlns:a16="http://schemas.microsoft.com/office/drawing/2014/main" id="{24290721-4BB0-4F5E-8017-2667E7D6E4C8}"/>
+                  </a:ext>
+                </a:extLst>
+              </p:cNvPr>
+              <p:cNvSpPr/>
+              <p:nvPr/>
+            </p:nvSpPr>
+            <p:spPr>
+              <a:xfrm>
+                <a:off x="3640032" y="2545080"/>
+                <a:ext cx="134620" cy="128905"/>
+              </a:xfrm>
+              <a:prstGeom prst="ellipse">
+                <a:avLst/>
+              </a:prstGeom>
+              <a:solidFill>
+                <a:schemeClr val="accent2">
+                  <a:lumMod val="20000"/>
+                  <a:lumOff val="80000"/>
+                </a:schemeClr>
+              </a:solidFill>
+              <a:ln>
+                <a:solidFill>
+                  <a:schemeClr val="accent1">
+                    <a:lumMod val="60000"/>
+                    <a:lumOff val="40000"/>
+                  </a:schemeClr>
+                </a:solidFill>
+              </a:ln>
+            </p:spPr>
+            <p:style>
+              <a:lnRef idx="2">
+                <a:schemeClr val="accent1">
+                  <a:shade val="50000"/>
+                </a:schemeClr>
+              </a:lnRef>
+              <a:fillRef idx="1">
+                <a:schemeClr val="accent1"/>
+              </a:fillRef>
+              <a:effectRef idx="0">
+                <a:schemeClr val="accent1"/>
+              </a:effectRef>
+              <a:fontRef idx="minor">
+                <a:schemeClr val="lt1"/>
+              </a:fontRef>
+            </p:style>
+            <p:txBody>
+              <a:bodyPr rot="0" spcFirstLastPara="0" vert="horz" wrap="square" lIns="91440" tIns="45720" rIns="91440" bIns="45720" numCol="1" spcCol="0" rtlCol="0" fromWordArt="0" anchor="ctr" anchorCtr="0" forceAA="0" compatLnSpc="1">
+                <a:prstTxWarp prst="textNoShape">
+                  <a:avLst/>
+                </a:prstTxWarp>
+                <a:noAutofit/>
+              </a:bodyPr>
+              <a:lstStyle/>
+              <a:p>
+                <a:endParaRPr lang="en-US"/>
+              </a:p>
+            </p:txBody>
+          </p:sp>
+          <p:sp>
+            <p:nvSpPr>
+              <p:cNvPr id="49" name="Oval 48">
+                <a:extLst>
+                  <a:ext uri="{FF2B5EF4-FFF2-40B4-BE49-F238E27FC236}">
+                    <a16:creationId xmlns:a16="http://schemas.microsoft.com/office/drawing/2014/main" id="{BE5B4187-A07D-4D88-B8A7-804FE3231BAF}"/>
+                  </a:ext>
+                </a:extLst>
+              </p:cNvPr>
+              <p:cNvSpPr/>
+              <p:nvPr/>
+            </p:nvSpPr>
+            <p:spPr>
+              <a:xfrm>
+                <a:off x="3851487" y="2545080"/>
+                <a:ext cx="134620" cy="128905"/>
+              </a:xfrm>
+              <a:prstGeom prst="ellipse">
+                <a:avLst/>
+              </a:prstGeom>
+              <a:solidFill>
+                <a:schemeClr val="accent2">
+                  <a:lumMod val="20000"/>
+                  <a:lumOff val="80000"/>
+                </a:schemeClr>
+              </a:solidFill>
+              <a:ln>
+                <a:solidFill>
+                  <a:schemeClr val="accent1">
+                    <a:lumMod val="60000"/>
+                    <a:lumOff val="40000"/>
+                  </a:schemeClr>
+                </a:solidFill>
+              </a:ln>
+            </p:spPr>
+            <p:style>
+              <a:lnRef idx="2">
+                <a:schemeClr val="accent1">
+                  <a:shade val="50000"/>
+                </a:schemeClr>
+              </a:lnRef>
+              <a:fillRef idx="1">
+                <a:schemeClr val="accent1"/>
+              </a:fillRef>
+              <a:effectRef idx="0">
+                <a:schemeClr val="accent1"/>
+              </a:effectRef>
+              <a:fontRef idx="minor">
+                <a:schemeClr val="lt1"/>
+              </a:fontRef>
+            </p:style>
+            <p:txBody>
+              <a:bodyPr rot="0" spcFirstLastPara="0" vert="horz" wrap="square" lIns="91440" tIns="45720" rIns="91440" bIns="45720" numCol="1" spcCol="0" rtlCol="0" fromWordArt="0" anchor="ctr" anchorCtr="0" forceAA="0" compatLnSpc="1">
+                <a:prstTxWarp prst="textNoShape">
+                  <a:avLst/>
+                </a:prstTxWarp>
+                <a:noAutofit/>
+              </a:bodyPr>
+              <a:lstStyle/>
+              <a:p>
+                <a:endParaRPr lang="en-US"/>
+              </a:p>
+            </p:txBody>
+          </p:sp>
+          <p:sp>
+            <p:nvSpPr>
+              <p:cNvPr id="50" name="Oval 49">
+                <a:extLst>
+                  <a:ext uri="{FF2B5EF4-FFF2-40B4-BE49-F238E27FC236}">
+                    <a16:creationId xmlns:a16="http://schemas.microsoft.com/office/drawing/2014/main" id="{327E4A96-80C6-40AD-9F0B-801F6B2FF711}"/>
+                  </a:ext>
+                </a:extLst>
+              </p:cNvPr>
+              <p:cNvSpPr/>
+              <p:nvPr/>
+            </p:nvSpPr>
+            <p:spPr>
+              <a:xfrm>
+                <a:off x="4063577" y="2545080"/>
+                <a:ext cx="134620" cy="128905"/>
+              </a:xfrm>
+              <a:prstGeom prst="ellipse">
+                <a:avLst/>
+              </a:prstGeom>
+              <a:solidFill>
+                <a:schemeClr val="accent2">
+                  <a:lumMod val="20000"/>
+                  <a:lumOff val="80000"/>
+                </a:schemeClr>
+              </a:solidFill>
+              <a:ln>
+                <a:solidFill>
+                  <a:schemeClr val="accent1">
+                    <a:lumMod val="60000"/>
+                    <a:lumOff val="40000"/>
+                  </a:schemeClr>
+                </a:solidFill>
+              </a:ln>
+            </p:spPr>
+            <p:style>
+              <a:lnRef idx="2">
+                <a:schemeClr val="accent1">
+                  <a:shade val="50000"/>
+                </a:schemeClr>
+              </a:lnRef>
+              <a:fillRef idx="1">
+                <a:schemeClr val="accent1"/>
+              </a:fillRef>
+              <a:effectRef idx="0">
+                <a:schemeClr val="accent1"/>
+              </a:effectRef>
+              <a:fontRef idx="minor">
+                <a:schemeClr val="lt1"/>
+              </a:fontRef>
+            </p:style>
+            <p:txBody>
+              <a:bodyPr rot="0" spcFirstLastPara="0" vert="horz" wrap="square" lIns="91440" tIns="45720" rIns="91440" bIns="45720" numCol="1" spcCol="0" rtlCol="0" fromWordArt="0" anchor="ctr" anchorCtr="0" forceAA="0" compatLnSpc="1">
+                <a:prstTxWarp prst="textNoShape">
+                  <a:avLst/>
+                </a:prstTxWarp>
+                <a:noAutofit/>
+              </a:bodyPr>
+              <a:lstStyle/>
+              <a:p>
+                <a:endParaRPr lang="en-US"/>
+              </a:p>
+            </p:txBody>
+          </p:sp>
+        </p:grpSp>
+        <p:sp>
+          <p:nvSpPr>
+            <p:cNvPr id="46" name="TextBox 45">
+              <a:extLst>
+                <a:ext uri="{FF2B5EF4-FFF2-40B4-BE49-F238E27FC236}">
+                  <a16:creationId xmlns:a16="http://schemas.microsoft.com/office/drawing/2014/main" id="{FCDAE5D3-0FE4-495B-9E28-03161F358F18}"/>
+                </a:ext>
+              </a:extLst>
+            </p:cNvPr>
+            <p:cNvSpPr txBox="1"/>
+            <p:nvPr/>
+          </p:nvSpPr>
+          <p:spPr>
+            <a:xfrm>
+              <a:off x="3748522" y="3243174"/>
+              <a:ext cx="343364" cy="369332"/>
+            </a:xfrm>
+            <a:prstGeom prst="rect">
+              <a:avLst/>
+            </a:prstGeom>
+            <a:noFill/>
+          </p:spPr>
+          <p:txBody>
+            <a:bodyPr wrap="none" rtlCol="0">
+              <a:spAutoFit/>
+            </a:bodyPr>
+            <a:lstStyle/>
+            <a:p>
+              <a:r>
+                <a:rPr lang="en-US" dirty="0"/>
+                <a:t>…</a:t>
+              </a:r>
+            </a:p>
+          </p:txBody>
+        </p:sp>
+      </p:grpSp>
+      <p:sp>
+        <p:nvSpPr>
+          <p:cNvPr id="85" name="TextBox 84">
+            <a:extLst>
+              <a:ext uri="{FF2B5EF4-FFF2-40B4-BE49-F238E27FC236}">
+                <a16:creationId xmlns:a16="http://schemas.microsoft.com/office/drawing/2014/main" id="{BDF2BD93-5BFD-441E-8718-BEEC9608E8FE}"/>
+              </a:ext>
+            </a:extLst>
+          </p:cNvPr>
+          <p:cNvSpPr txBox="1"/>
+          <p:nvPr/>
+        </p:nvSpPr>
+        <p:spPr>
+          <a:xfrm>
+            <a:off x="2421787" y="4558660"/>
+            <a:ext cx="1686166" cy="923330"/>
+          </a:xfrm>
+          <a:prstGeom prst="rect">
+            <a:avLst/>
+          </a:prstGeom>
+          <a:noFill/>
+        </p:spPr>
+        <p:txBody>
+          <a:bodyPr wrap="none" rtlCol="0">
+            <a:spAutoFit/>
+          </a:bodyPr>
+          <a:lstStyle/>
+          <a:p>
+            <a:pPr algn="ctr"/>
+            <a:r>
+              <a:rPr lang="en-US" dirty="0"/>
+              <a:t>Missing-Feature</a:t>
+            </a:r>
+          </a:p>
+          <a:p>
+            <a:pPr algn="ctr"/>
+            <a:r>
+              <a:rPr lang="en-US" dirty="0"/>
+              <a:t>Representation</a:t>
+            </a:r>
+          </a:p>
+          <a:p>
+            <a:pPr algn="ctr"/>
+            <a:r>
+              <a:rPr lang="en-US" dirty="0"/>
+              <a:t>Vectors</a:t>
+            </a:r>
+          </a:p>
+        </p:txBody>
+      </p:sp>
+      <p:sp>
+        <p:nvSpPr>
+          <p:cNvPr id="86" name="TextBox 85">
+            <a:extLst>
+              <a:ext uri="{FF2B5EF4-FFF2-40B4-BE49-F238E27FC236}">
+                <a16:creationId xmlns:a16="http://schemas.microsoft.com/office/drawing/2014/main" id="{D71AEBFD-B11C-41DD-8B4A-6417C6555484}"/>
+              </a:ext>
+            </a:extLst>
+          </p:cNvPr>
+          <p:cNvSpPr txBox="1"/>
+          <p:nvPr/>
+        </p:nvSpPr>
+        <p:spPr>
+          <a:xfrm>
+            <a:off x="5131729" y="1594384"/>
+            <a:ext cx="1928541" cy="646331"/>
+          </a:xfrm>
+          <a:prstGeom prst="rect">
+            <a:avLst/>
+          </a:prstGeom>
+          <a:noFill/>
+        </p:spPr>
+        <p:txBody>
+          <a:bodyPr wrap="square" rtlCol="0">
+            <a:spAutoFit/>
+          </a:bodyPr>
+          <a:lstStyle/>
+          <a:p>
+            <a:pPr algn="ctr"/>
+            <a:r>
+              <a:rPr lang="en-US" dirty="0"/>
+              <a:t>To Variable Type </a:t>
+            </a:r>
+          </a:p>
+          <a:p>
+            <a:pPr algn="ctr"/>
+            <a:r>
+              <a:rPr lang="en-US" dirty="0"/>
+              <a:t>Prediction Model</a:t>
+            </a:r>
+          </a:p>
+        </p:txBody>
+      </p:sp>
+      <p:sp>
+        <p:nvSpPr>
+          <p:cNvPr id="87" name="Rectangle 86">
+            <a:extLst>
+              <a:ext uri="{FF2B5EF4-FFF2-40B4-BE49-F238E27FC236}">
+                <a16:creationId xmlns:a16="http://schemas.microsoft.com/office/drawing/2014/main" id="{4AE1CADC-9F95-4EE8-B45F-F6DBF0EDD59A}"/>
+              </a:ext>
+            </a:extLst>
+          </p:cNvPr>
+          <p:cNvSpPr/>
+          <p:nvPr/>
+        </p:nvSpPr>
+        <p:spPr>
+          <a:xfrm>
+            <a:off x="5457150" y="3928424"/>
+            <a:ext cx="436326" cy="1610870"/>
+          </a:xfrm>
+          <a:prstGeom prst="rect">
+            <a:avLst/>
+          </a:prstGeom>
+          <a:ln/>
+          <a:effectLst>
+            <a:outerShdw blurRad="50800" dist="38100" dir="2700000" algn="tl" rotWithShape="0">
+              <a:prstClr val="black">
+                <a:alpha val="40000"/>
+              </a:prstClr>
+            </a:outerShdw>
+          </a:effectLst>
+        </p:spPr>
+        <p:style>
+          <a:lnRef idx="1">
+            <a:schemeClr val="accent6"/>
+          </a:lnRef>
+          <a:fillRef idx="2">
+            <a:schemeClr val="accent6"/>
+          </a:fillRef>
+          <a:effectRef idx="1">
+            <a:schemeClr val="accent6"/>
+          </a:effectRef>
+          <a:fontRef idx="minor">
+            <a:schemeClr val="dk1"/>
+          </a:fontRef>
+        </p:style>
+        <p:txBody>
+          <a:bodyPr rtlCol="0" anchor="ctr"/>
+          <a:lstStyle/>
+          <a:p>
+            <a:pPr algn="ctr"/>
+            <a:endParaRPr lang="en-US" dirty="0"/>
+          </a:p>
+        </p:txBody>
+      </p:sp>
+      <p:sp>
+        <p:nvSpPr>
+          <p:cNvPr id="88" name="TextBox 87">
+            <a:extLst>
+              <a:ext uri="{FF2B5EF4-FFF2-40B4-BE49-F238E27FC236}">
+                <a16:creationId xmlns:a16="http://schemas.microsoft.com/office/drawing/2014/main" id="{ED95EFEE-5C76-4437-A99D-78570D13E300}"/>
+              </a:ext>
+            </a:extLst>
+          </p:cNvPr>
+          <p:cNvSpPr txBox="1"/>
+          <p:nvPr/>
+        </p:nvSpPr>
+        <p:spPr>
+          <a:xfrm>
+            <a:off x="5174268" y="3209694"/>
+            <a:ext cx="977832" cy="646331"/>
+          </a:xfrm>
+          <a:prstGeom prst="rect">
+            <a:avLst/>
+          </a:prstGeom>
+          <a:noFill/>
+        </p:spPr>
+        <p:txBody>
+          <a:bodyPr wrap="none" rtlCol="0">
+            <a:spAutoFit/>
+          </a:bodyPr>
+          <a:lstStyle/>
+          <a:p>
+            <a:pPr algn="ctr"/>
+            <a:r>
+              <a:rPr lang="en-US" dirty="0"/>
+              <a:t>GRU</a:t>
+            </a:r>
+          </a:p>
+          <a:p>
+            <a:pPr algn="ctr"/>
+            <a:r>
+              <a:rPr lang="en-US" dirty="0"/>
+              <a:t>Decoder</a:t>
+            </a:r>
+          </a:p>
+        </p:txBody>
+      </p:sp>
+      <p:sp>
+        <p:nvSpPr>
+          <p:cNvPr id="89" name="Rectangle 88">
+            <a:extLst>
+              <a:ext uri="{FF2B5EF4-FFF2-40B4-BE49-F238E27FC236}">
+                <a16:creationId xmlns:a16="http://schemas.microsoft.com/office/drawing/2014/main" id="{B3ABC764-9F6C-4CB9-8282-9F6946E932B4}"/>
+              </a:ext>
+            </a:extLst>
+          </p:cNvPr>
+          <p:cNvSpPr/>
+          <p:nvPr/>
+        </p:nvSpPr>
+        <p:spPr>
+          <a:xfrm>
+            <a:off x="6623944" y="3928424"/>
+            <a:ext cx="436326" cy="1610870"/>
+          </a:xfrm>
+          <a:prstGeom prst="rect">
+            <a:avLst/>
+          </a:prstGeom>
+          <a:solidFill>
+            <a:schemeClr val="accent5">
+              <a:lumMod val="20000"/>
+              <a:lumOff val="80000"/>
+            </a:schemeClr>
+          </a:solidFill>
+          <a:ln>
+            <a:solidFill>
+              <a:srgbClr val="0070C0"/>
+            </a:solidFill>
+          </a:ln>
+        </p:spPr>
+        <p:style>
+          <a:lnRef idx="2">
+            <a:schemeClr val="accent1">
+              <a:shade val="50000"/>
+            </a:schemeClr>
+          </a:lnRef>
+          <a:fillRef idx="1">
+            <a:schemeClr val="accent1"/>
+          </a:fillRef>
+          <a:effectRef idx="0">
+            <a:schemeClr val="accent1"/>
+          </a:effectRef>
+          <a:fontRef idx="minor">
+            <a:schemeClr val="lt1"/>
+          </a:fontRef>
+        </p:style>
+        <p:txBody>
+          <a:bodyPr rtlCol="0" anchor="ctr"/>
+          <a:lstStyle/>
+          <a:p>
+            <a:pPr algn="ctr"/>
+            <a:endParaRPr lang="en-US"/>
+          </a:p>
+        </p:txBody>
+      </p:sp>
+      <p:sp>
+        <p:nvSpPr>
+          <p:cNvPr id="90" name="TextBox 89">
+            <a:extLst>
+              <a:ext uri="{FF2B5EF4-FFF2-40B4-BE49-F238E27FC236}">
+                <a16:creationId xmlns:a16="http://schemas.microsoft.com/office/drawing/2014/main" id="{A54495A0-A138-46A8-90B9-3D8C90E2A997}"/>
+              </a:ext>
+            </a:extLst>
+          </p:cNvPr>
+          <p:cNvSpPr txBox="1"/>
+          <p:nvPr/>
+        </p:nvSpPr>
+        <p:spPr>
+          <a:xfrm>
+            <a:off x="6286953" y="3209694"/>
+            <a:ext cx="1080039" cy="646331"/>
+          </a:xfrm>
+          <a:prstGeom prst="rect">
+            <a:avLst/>
+          </a:prstGeom>
+          <a:noFill/>
+        </p:spPr>
+        <p:txBody>
+          <a:bodyPr wrap="none" rtlCol="0">
+            <a:spAutoFit/>
+          </a:bodyPr>
+          <a:lstStyle/>
+          <a:p>
+            <a:pPr algn="ctr"/>
+            <a:r>
+              <a:rPr lang="en-US" dirty="0"/>
+              <a:t>Predicted</a:t>
+            </a:r>
+          </a:p>
+          <a:p>
+            <a:pPr algn="ctr"/>
+            <a:r>
+              <a:rPr lang="en-US" dirty="0"/>
+              <a:t>Names</a:t>
+            </a:r>
+          </a:p>
+        </p:txBody>
+      </p:sp>
+      <p:sp>
+        <p:nvSpPr>
+          <p:cNvPr id="91" name="TextBox 90">
+            <a:extLst>
+              <a:ext uri="{FF2B5EF4-FFF2-40B4-BE49-F238E27FC236}">
+                <a16:creationId xmlns:a16="http://schemas.microsoft.com/office/drawing/2014/main" id="{F69D2426-7A44-404E-89AE-36ACD467EE11}"/>
+              </a:ext>
+            </a:extLst>
+          </p:cNvPr>
+          <p:cNvSpPr txBox="1"/>
+          <p:nvPr/>
+        </p:nvSpPr>
+        <p:spPr>
+          <a:xfrm>
+            <a:off x="6620024" y="3912690"/>
+            <a:ext cx="450764" cy="369332"/>
+          </a:xfrm>
+          <a:prstGeom prst="rect">
+            <a:avLst/>
+          </a:prstGeom>
+          <a:noFill/>
+        </p:spPr>
+        <p:txBody>
+          <a:bodyPr wrap="none" rtlCol="0">
+            <a:spAutoFit/>
+          </a:bodyPr>
+          <a:lstStyle/>
+          <a:p>
+            <a:r>
+              <a:rPr lang="en-US" dirty="0"/>
+              <a:t>N1</a:t>
+            </a:r>
+          </a:p>
+        </p:txBody>
+      </p:sp>
+      <p:sp>
+        <p:nvSpPr>
+          <p:cNvPr id="92" name="TextBox 91">
+            <a:extLst>
+              <a:ext uri="{FF2B5EF4-FFF2-40B4-BE49-F238E27FC236}">
+                <a16:creationId xmlns:a16="http://schemas.microsoft.com/office/drawing/2014/main" id="{EEE447DC-C366-43C5-A0A8-285D4A3F86BE}"/>
+              </a:ext>
+            </a:extLst>
+          </p:cNvPr>
+          <p:cNvSpPr txBox="1"/>
+          <p:nvPr/>
+        </p:nvSpPr>
+        <p:spPr>
+          <a:xfrm>
+            <a:off x="6620975" y="4229311"/>
+            <a:ext cx="450764" cy="369332"/>
+          </a:xfrm>
+          <a:prstGeom prst="rect">
+            <a:avLst/>
+          </a:prstGeom>
+          <a:noFill/>
+        </p:spPr>
+        <p:txBody>
+          <a:bodyPr wrap="none" rtlCol="0">
+            <a:spAutoFit/>
+          </a:bodyPr>
+          <a:lstStyle/>
+          <a:p>
+            <a:r>
+              <a:rPr lang="en-US" dirty="0"/>
+              <a:t>N2</a:t>
+            </a:r>
+          </a:p>
+        </p:txBody>
+      </p:sp>
+      <p:sp>
+        <p:nvSpPr>
+          <p:cNvPr id="93" name="TextBox 92">
+            <a:extLst>
+              <a:ext uri="{FF2B5EF4-FFF2-40B4-BE49-F238E27FC236}">
+                <a16:creationId xmlns:a16="http://schemas.microsoft.com/office/drawing/2014/main" id="{57C81594-566F-4BAD-9BAD-8D413AF91D6F}"/>
+              </a:ext>
+            </a:extLst>
+          </p:cNvPr>
+          <p:cNvSpPr txBox="1"/>
+          <p:nvPr/>
+        </p:nvSpPr>
+        <p:spPr>
+          <a:xfrm>
+            <a:off x="6670425" y="4620700"/>
+            <a:ext cx="343364" cy="369332"/>
+          </a:xfrm>
+          <a:prstGeom prst="rect">
+            <a:avLst/>
+          </a:prstGeom>
+          <a:noFill/>
+        </p:spPr>
+        <p:txBody>
+          <a:bodyPr wrap="none" rtlCol="0">
+            <a:spAutoFit/>
+          </a:bodyPr>
+          <a:lstStyle/>
+          <a:p>
+            <a:r>
+              <a:rPr lang="en-US" dirty="0"/>
+              <a:t>…</a:t>
+            </a:r>
+          </a:p>
+        </p:txBody>
+      </p:sp>
+      <p:sp>
+        <p:nvSpPr>
+          <p:cNvPr id="94" name="Rectangle 93">
+            <a:extLst>
+              <a:ext uri="{FF2B5EF4-FFF2-40B4-BE49-F238E27FC236}">
+                <a16:creationId xmlns:a16="http://schemas.microsoft.com/office/drawing/2014/main" id="{4CF78E2C-9142-4000-84AA-AF4057B0FD8E}"/>
+              </a:ext>
+            </a:extLst>
+          </p:cNvPr>
+          <p:cNvSpPr/>
+          <p:nvPr/>
+        </p:nvSpPr>
+        <p:spPr>
+          <a:xfrm>
+            <a:off x="7786818" y="3928424"/>
+            <a:ext cx="436326" cy="1610870"/>
+          </a:xfrm>
+          <a:prstGeom prst="rect">
+            <a:avLst/>
+          </a:prstGeom>
+          <a:solidFill>
+            <a:schemeClr val="accent2">
+              <a:lumMod val="40000"/>
+              <a:lumOff val="60000"/>
+            </a:schemeClr>
+          </a:solidFill>
+          <a:ln/>
+          <a:effectLst>
+            <a:outerShdw blurRad="50800" dist="38100" dir="2700000" algn="tl" rotWithShape="0">
+              <a:prstClr val="black">
+                <a:alpha val="40000"/>
+              </a:prstClr>
+            </a:outerShdw>
+          </a:effectLst>
+        </p:spPr>
+        <p:style>
+          <a:lnRef idx="1">
+            <a:schemeClr val="accent6"/>
+          </a:lnRef>
+          <a:fillRef idx="2">
+            <a:schemeClr val="accent6"/>
+          </a:fillRef>
+          <a:effectRef idx="1">
+            <a:schemeClr val="accent6"/>
+          </a:effectRef>
+          <a:fontRef idx="minor">
+            <a:schemeClr val="dk1"/>
+          </a:fontRef>
+        </p:style>
+        <p:txBody>
+          <a:bodyPr rtlCol="0" anchor="ctr"/>
+          <a:lstStyle/>
+          <a:p>
+            <a:pPr algn="ctr"/>
+            <a:endParaRPr lang="en-US" dirty="0"/>
+          </a:p>
+        </p:txBody>
+      </p:sp>
+      <p:sp>
+        <p:nvSpPr>
+          <p:cNvPr id="95" name="TextBox 94">
+            <a:extLst>
+              <a:ext uri="{FF2B5EF4-FFF2-40B4-BE49-F238E27FC236}">
+                <a16:creationId xmlns:a16="http://schemas.microsoft.com/office/drawing/2014/main" id="{64158782-8F25-4F36-89CA-CC3C31494752}"/>
+              </a:ext>
+            </a:extLst>
+          </p:cNvPr>
+          <p:cNvSpPr txBox="1"/>
+          <p:nvPr/>
+        </p:nvSpPr>
+        <p:spPr>
+          <a:xfrm>
+            <a:off x="7488786" y="3212004"/>
+            <a:ext cx="1031051" cy="646331"/>
+          </a:xfrm>
+          <a:prstGeom prst="rect">
+            <a:avLst/>
+          </a:prstGeom>
+          <a:noFill/>
+        </p:spPr>
+        <p:txBody>
+          <a:bodyPr wrap="none" rtlCol="0">
+            <a:spAutoFit/>
+          </a:bodyPr>
+          <a:lstStyle/>
+          <a:p>
+            <a:pPr algn="ctr"/>
+            <a:r>
+              <a:rPr lang="en-US" dirty="0"/>
+              <a:t>Name </a:t>
+            </a:r>
+          </a:p>
+          <a:p>
+            <a:pPr algn="ctr"/>
+            <a:r>
+              <a:rPr lang="en-US" dirty="0"/>
+              <a:t>Checking</a:t>
+            </a:r>
+          </a:p>
+        </p:txBody>
+      </p:sp>
+      <p:sp>
+        <p:nvSpPr>
+          <p:cNvPr id="96" name="Rectangle 95">
+            <a:extLst>
+              <a:ext uri="{FF2B5EF4-FFF2-40B4-BE49-F238E27FC236}">
+                <a16:creationId xmlns:a16="http://schemas.microsoft.com/office/drawing/2014/main" id="{99FCBC9B-C493-4103-8652-9562BCC3CA92}"/>
+              </a:ext>
+            </a:extLst>
+          </p:cNvPr>
+          <p:cNvSpPr/>
+          <p:nvPr/>
+        </p:nvSpPr>
+        <p:spPr>
+          <a:xfrm>
+            <a:off x="8938223" y="3938929"/>
+            <a:ext cx="436326" cy="1610870"/>
+          </a:xfrm>
+          <a:prstGeom prst="rect">
+            <a:avLst/>
+          </a:prstGeom>
+          <a:solidFill>
+            <a:schemeClr val="accent5">
+              <a:lumMod val="20000"/>
+              <a:lumOff val="80000"/>
+            </a:schemeClr>
+          </a:solidFill>
+          <a:ln>
+            <a:solidFill>
+              <a:srgbClr val="0070C0"/>
+            </a:solidFill>
+          </a:ln>
+        </p:spPr>
+        <p:style>
+          <a:lnRef idx="2">
+            <a:schemeClr val="accent1">
+              <a:shade val="50000"/>
+            </a:schemeClr>
+          </a:lnRef>
+          <a:fillRef idx="1">
+            <a:schemeClr val="accent1"/>
+          </a:fillRef>
+          <a:effectRef idx="0">
+            <a:schemeClr val="accent1"/>
+          </a:effectRef>
+          <a:fontRef idx="minor">
+            <a:schemeClr val="lt1"/>
+          </a:fontRef>
+        </p:style>
+        <p:txBody>
+          <a:bodyPr rtlCol="0" anchor="ctr"/>
+          <a:lstStyle/>
+          <a:p>
+            <a:pPr algn="ctr"/>
+            <a:endParaRPr lang="en-US"/>
+          </a:p>
+        </p:txBody>
+      </p:sp>
+      <p:sp>
+        <p:nvSpPr>
+          <p:cNvPr id="97" name="TextBox 96">
+            <a:extLst>
+              <a:ext uri="{FF2B5EF4-FFF2-40B4-BE49-F238E27FC236}">
+                <a16:creationId xmlns:a16="http://schemas.microsoft.com/office/drawing/2014/main" id="{33C760A8-4E88-4694-9A88-D4844ED837D9}"/>
+              </a:ext>
+            </a:extLst>
+          </p:cNvPr>
+          <p:cNvSpPr txBox="1"/>
+          <p:nvPr/>
+        </p:nvSpPr>
+        <p:spPr>
+          <a:xfrm>
+            <a:off x="8724310" y="3220199"/>
+            <a:ext cx="833883" cy="646331"/>
+          </a:xfrm>
+          <a:prstGeom prst="rect">
+            <a:avLst/>
+          </a:prstGeom>
+          <a:noFill/>
+        </p:spPr>
+        <p:txBody>
+          <a:bodyPr wrap="none" rtlCol="0">
+            <a:spAutoFit/>
+          </a:bodyPr>
+          <a:lstStyle/>
+          <a:p>
+            <a:pPr algn="ctr"/>
+            <a:r>
+              <a:rPr lang="en-US" dirty="0"/>
+              <a:t>Final</a:t>
+            </a:r>
+          </a:p>
+          <a:p>
+            <a:pPr algn="ctr"/>
+            <a:r>
+              <a:rPr lang="en-US" dirty="0"/>
+              <a:t>Names</a:t>
+            </a:r>
+          </a:p>
+        </p:txBody>
+      </p:sp>
+      <p:sp>
+        <p:nvSpPr>
+          <p:cNvPr id="98" name="TextBox 97">
+            <a:extLst>
+              <a:ext uri="{FF2B5EF4-FFF2-40B4-BE49-F238E27FC236}">
+                <a16:creationId xmlns:a16="http://schemas.microsoft.com/office/drawing/2014/main" id="{2E571D84-CEF9-44E4-918E-928EE66F0D1E}"/>
+              </a:ext>
+            </a:extLst>
+          </p:cNvPr>
+          <p:cNvSpPr txBox="1"/>
+          <p:nvPr/>
+        </p:nvSpPr>
+        <p:spPr>
+          <a:xfrm>
+            <a:off x="8893614" y="3919606"/>
+            <a:ext cx="566181" cy="369332"/>
+          </a:xfrm>
+          <a:prstGeom prst="rect">
+            <a:avLst/>
+          </a:prstGeom>
+          <a:noFill/>
+        </p:spPr>
+        <p:txBody>
+          <a:bodyPr wrap="none" rtlCol="0">
+            <a:spAutoFit/>
+          </a:bodyPr>
+          <a:lstStyle/>
+          <a:p>
+            <a:r>
+              <a:rPr lang="en-US" dirty="0"/>
+              <a:t>N1*</a:t>
+            </a:r>
+          </a:p>
+        </p:txBody>
+      </p:sp>
+      <p:sp>
+        <p:nvSpPr>
+          <p:cNvPr id="99" name="TextBox 98">
+            <a:extLst>
+              <a:ext uri="{FF2B5EF4-FFF2-40B4-BE49-F238E27FC236}">
+                <a16:creationId xmlns:a16="http://schemas.microsoft.com/office/drawing/2014/main" id="{1DD3E74E-0589-48E3-AC29-961EE2F0B505}"/>
+              </a:ext>
+            </a:extLst>
+          </p:cNvPr>
+          <p:cNvSpPr txBox="1"/>
+          <p:nvPr/>
+        </p:nvSpPr>
+        <p:spPr>
+          <a:xfrm>
+            <a:off x="8908162" y="4239816"/>
+            <a:ext cx="566181" cy="369332"/>
+          </a:xfrm>
+          <a:prstGeom prst="rect">
+            <a:avLst/>
+          </a:prstGeom>
+          <a:noFill/>
+        </p:spPr>
+        <p:txBody>
+          <a:bodyPr wrap="none" rtlCol="0">
+            <a:spAutoFit/>
+          </a:bodyPr>
+          <a:lstStyle/>
+          <a:p>
+            <a:r>
+              <a:rPr lang="en-US" dirty="0"/>
+              <a:t>N2*</a:t>
+            </a:r>
+          </a:p>
+        </p:txBody>
+      </p:sp>
+      <p:sp>
+        <p:nvSpPr>
+          <p:cNvPr id="100" name="TextBox 99">
+            <a:extLst>
+              <a:ext uri="{FF2B5EF4-FFF2-40B4-BE49-F238E27FC236}">
+                <a16:creationId xmlns:a16="http://schemas.microsoft.com/office/drawing/2014/main" id="{1F666038-EC46-41C0-BF89-0765A61BCBEC}"/>
+              </a:ext>
+            </a:extLst>
+          </p:cNvPr>
+          <p:cNvSpPr txBox="1"/>
+          <p:nvPr/>
+        </p:nvSpPr>
+        <p:spPr>
+          <a:xfrm>
+            <a:off x="8984704" y="4631205"/>
+            <a:ext cx="343364" cy="369332"/>
+          </a:xfrm>
+          <a:prstGeom prst="rect">
+            <a:avLst/>
+          </a:prstGeom>
+          <a:noFill/>
+        </p:spPr>
+        <p:txBody>
+          <a:bodyPr wrap="none" rtlCol="0">
+            <a:spAutoFit/>
+          </a:bodyPr>
+          <a:lstStyle/>
+          <a:p>
+            <a:r>
+              <a:rPr lang="en-US" dirty="0"/>
+              <a:t>…</a:t>
+            </a:r>
+          </a:p>
+        </p:txBody>
+      </p:sp>
+      <p:cxnSp>
+        <p:nvCxnSpPr>
+          <p:cNvPr id="101" name="Straight Arrow Connector 100">
+            <a:extLst>
+              <a:ext uri="{FF2B5EF4-FFF2-40B4-BE49-F238E27FC236}">
+                <a16:creationId xmlns:a16="http://schemas.microsoft.com/office/drawing/2014/main" id="{5DCED083-DB8D-4F8A-8E09-3FFDAADC526E}"/>
+              </a:ext>
+            </a:extLst>
+          </p:cNvPr>
+          <p:cNvCxnSpPr>
+            <a:cxnSpLocks/>
+          </p:cNvCxnSpPr>
+          <p:nvPr/>
+        </p:nvCxnSpPr>
+        <p:spPr>
+          <a:xfrm>
+            <a:off x="1519364" y="3520975"/>
+            <a:ext cx="371628" cy="0"/>
+          </a:xfrm>
+          <a:prstGeom prst="straightConnector1">
+            <a:avLst/>
+          </a:prstGeom>
+          <a:ln w="19050">
+            <a:tailEnd type="triangle"/>
+          </a:ln>
+        </p:spPr>
+        <p:style>
+          <a:lnRef idx="1">
+            <a:schemeClr val="accent1"/>
+          </a:lnRef>
+          <a:fillRef idx="0">
+            <a:schemeClr val="accent1"/>
+          </a:fillRef>
+          <a:effectRef idx="0">
+            <a:schemeClr val="accent1"/>
+          </a:effectRef>
+          <a:fontRef idx="minor">
+            <a:schemeClr val="tx1"/>
+          </a:fontRef>
+        </p:style>
+      </p:cxnSp>
+      <p:cxnSp>
+        <p:nvCxnSpPr>
+          <p:cNvPr id="103" name="Straight Arrow Connector 102">
+            <a:extLst>
+              <a:ext uri="{FF2B5EF4-FFF2-40B4-BE49-F238E27FC236}">
+                <a16:creationId xmlns:a16="http://schemas.microsoft.com/office/drawing/2014/main" id="{EC8E8842-C366-4C48-BD59-E47907DFC8F7}"/>
+              </a:ext>
+            </a:extLst>
+          </p:cNvPr>
+          <p:cNvCxnSpPr>
+            <a:stCxn id="16" idx="3"/>
+          </p:cNvCxnSpPr>
+          <p:nvPr/>
+        </p:nvCxnSpPr>
+        <p:spPr>
+          <a:xfrm flipV="1">
+            <a:off x="3488267" y="2434553"/>
+            <a:ext cx="673832" cy="1089372"/>
+          </a:xfrm>
+          <a:prstGeom prst="straightConnector1">
+            <a:avLst/>
+          </a:prstGeom>
+          <a:ln w="19050">
+            <a:tailEnd type="triangle"/>
+          </a:ln>
+        </p:spPr>
+        <p:style>
+          <a:lnRef idx="1">
+            <a:schemeClr val="accent1"/>
+          </a:lnRef>
+          <a:fillRef idx="0">
+            <a:schemeClr val="accent1"/>
+          </a:fillRef>
+          <a:effectRef idx="0">
+            <a:schemeClr val="accent1"/>
+          </a:effectRef>
+          <a:fontRef idx="minor">
+            <a:schemeClr val="tx1"/>
+          </a:fontRef>
+        </p:style>
+      </p:cxnSp>
+      <p:cxnSp>
+        <p:nvCxnSpPr>
+          <p:cNvPr id="105" name="Connector: Elbow 104">
+            <a:extLst>
+              <a:ext uri="{FF2B5EF4-FFF2-40B4-BE49-F238E27FC236}">
+                <a16:creationId xmlns:a16="http://schemas.microsoft.com/office/drawing/2014/main" id="{D813AC20-05C5-4B67-A58C-490034B10C39}"/>
+              </a:ext>
+            </a:extLst>
+          </p:cNvPr>
+          <p:cNvCxnSpPr>
+            <a:cxnSpLocks/>
+            <a:endCxn id="86" idx="2"/>
+          </p:cNvCxnSpPr>
+          <p:nvPr/>
+        </p:nvCxnSpPr>
+        <p:spPr>
+          <a:xfrm flipV="1">
+            <a:off x="5080000" y="2240715"/>
+            <a:ext cx="1016000" cy="320366"/>
+          </a:xfrm>
+          <a:prstGeom prst="bentConnector2">
+            <a:avLst/>
+          </a:prstGeom>
+          <a:ln w="19050">
+            <a:tailEnd type="triangle"/>
+          </a:ln>
+        </p:spPr>
+        <p:style>
+          <a:lnRef idx="1">
+            <a:schemeClr val="accent1"/>
+          </a:lnRef>
+          <a:fillRef idx="0">
+            <a:schemeClr val="accent1"/>
+          </a:fillRef>
+          <a:effectRef idx="0">
+            <a:schemeClr val="accent1"/>
+          </a:effectRef>
+          <a:fontRef idx="minor">
+            <a:schemeClr val="tx1"/>
+          </a:fontRef>
+        </p:style>
+      </p:cxnSp>
+      <p:cxnSp>
+        <p:nvCxnSpPr>
+          <p:cNvPr id="108" name="Straight Arrow Connector 107">
+            <a:extLst>
+              <a:ext uri="{FF2B5EF4-FFF2-40B4-BE49-F238E27FC236}">
+                <a16:creationId xmlns:a16="http://schemas.microsoft.com/office/drawing/2014/main" id="{4C1D4A03-2110-43CE-AB4D-2C0CEBE8917E}"/>
+              </a:ext>
+            </a:extLst>
+          </p:cNvPr>
+          <p:cNvCxnSpPr>
+            <a:stCxn id="16" idx="3"/>
+          </p:cNvCxnSpPr>
+          <p:nvPr/>
+        </p:nvCxnSpPr>
+        <p:spPr>
+          <a:xfrm>
+            <a:off x="3488267" y="3523925"/>
+            <a:ext cx="623366" cy="1034735"/>
+          </a:xfrm>
+          <a:prstGeom prst="straightConnector1">
+            <a:avLst/>
+          </a:prstGeom>
+          <a:ln w="19050">
+            <a:tailEnd type="triangle"/>
+          </a:ln>
+        </p:spPr>
+        <p:style>
+          <a:lnRef idx="1">
+            <a:schemeClr val="accent1"/>
+          </a:lnRef>
+          <a:fillRef idx="0">
+            <a:schemeClr val="accent1"/>
+          </a:fillRef>
+          <a:effectRef idx="0">
+            <a:schemeClr val="accent1"/>
+          </a:effectRef>
+          <a:fontRef idx="minor">
+            <a:schemeClr val="tx1"/>
+          </a:fontRef>
+        </p:style>
+      </p:cxnSp>
+      <p:cxnSp>
+        <p:nvCxnSpPr>
+          <p:cNvPr id="109" name="Straight Arrow Connector 108">
+            <a:extLst>
+              <a:ext uri="{FF2B5EF4-FFF2-40B4-BE49-F238E27FC236}">
+                <a16:creationId xmlns:a16="http://schemas.microsoft.com/office/drawing/2014/main" id="{701CDFBA-42AB-4579-9B72-EE3F9FD1A7B3}"/>
+              </a:ext>
+            </a:extLst>
+          </p:cNvPr>
+          <p:cNvCxnSpPr>
+            <a:cxnSpLocks/>
+          </p:cNvCxnSpPr>
+          <p:nvPr/>
+        </p:nvCxnSpPr>
+        <p:spPr>
+          <a:xfrm>
+            <a:off x="5080000" y="4733859"/>
+            <a:ext cx="371628" cy="0"/>
+          </a:xfrm>
+          <a:prstGeom prst="straightConnector1">
+            <a:avLst/>
+          </a:prstGeom>
+          <a:ln w="19050">
+            <a:tailEnd type="triangle"/>
+          </a:ln>
+        </p:spPr>
+        <p:style>
+          <a:lnRef idx="1">
+            <a:schemeClr val="accent1"/>
+          </a:lnRef>
+          <a:fillRef idx="0">
+            <a:schemeClr val="accent1"/>
+          </a:fillRef>
+          <a:effectRef idx="0">
+            <a:schemeClr val="accent1"/>
+          </a:effectRef>
+          <a:fontRef idx="minor">
+            <a:schemeClr val="tx1"/>
+          </a:fontRef>
+        </p:style>
+      </p:cxnSp>
+      <p:cxnSp>
+        <p:nvCxnSpPr>
+          <p:cNvPr id="110" name="Straight Arrow Connector 109">
+            <a:extLst>
+              <a:ext uri="{FF2B5EF4-FFF2-40B4-BE49-F238E27FC236}">
+                <a16:creationId xmlns:a16="http://schemas.microsoft.com/office/drawing/2014/main" id="{83D7EB43-99AE-44CD-B9BE-5B1110E9CC4A}"/>
+              </a:ext>
+            </a:extLst>
+          </p:cNvPr>
+          <p:cNvCxnSpPr>
+            <a:cxnSpLocks/>
+            <a:stCxn id="87" idx="3"/>
+            <a:endCxn id="89" idx="1"/>
+          </p:cNvCxnSpPr>
+          <p:nvPr/>
+        </p:nvCxnSpPr>
+        <p:spPr>
+          <a:xfrm>
+            <a:off x="5893476" y="4733859"/>
+            <a:ext cx="730468" cy="0"/>
+          </a:xfrm>
+          <a:prstGeom prst="straightConnector1">
+            <a:avLst/>
+          </a:prstGeom>
+          <a:ln w="19050">
+            <a:tailEnd type="triangle"/>
+          </a:ln>
+        </p:spPr>
+        <p:style>
+          <a:lnRef idx="1">
+            <a:schemeClr val="accent1"/>
+          </a:lnRef>
+          <a:fillRef idx="0">
+            <a:schemeClr val="accent1"/>
+          </a:fillRef>
+          <a:effectRef idx="0">
+            <a:schemeClr val="accent1"/>
+          </a:effectRef>
+          <a:fontRef idx="minor">
+            <a:schemeClr val="tx1"/>
+          </a:fontRef>
+        </p:style>
+      </p:cxnSp>
+      <p:cxnSp>
+        <p:nvCxnSpPr>
+          <p:cNvPr id="116" name="Straight Arrow Connector 115">
+            <a:extLst>
+              <a:ext uri="{FF2B5EF4-FFF2-40B4-BE49-F238E27FC236}">
+                <a16:creationId xmlns:a16="http://schemas.microsoft.com/office/drawing/2014/main" id="{490E58B6-7263-43D0-B894-2EEEE0347743}"/>
+              </a:ext>
+            </a:extLst>
+          </p:cNvPr>
+          <p:cNvCxnSpPr>
+            <a:cxnSpLocks/>
+          </p:cNvCxnSpPr>
+          <p:nvPr/>
+        </p:nvCxnSpPr>
+        <p:spPr>
+          <a:xfrm>
+            <a:off x="7070788" y="4733859"/>
+            <a:ext cx="730468" cy="0"/>
+          </a:xfrm>
+          <a:prstGeom prst="straightConnector1">
+            <a:avLst/>
+          </a:prstGeom>
+          <a:ln w="19050">
+            <a:tailEnd type="triangle"/>
+          </a:ln>
+        </p:spPr>
+        <p:style>
+          <a:lnRef idx="1">
+            <a:schemeClr val="accent1"/>
+          </a:lnRef>
+          <a:fillRef idx="0">
+            <a:schemeClr val="accent1"/>
+          </a:fillRef>
+          <a:effectRef idx="0">
+            <a:schemeClr val="accent1"/>
+          </a:effectRef>
+          <a:fontRef idx="minor">
+            <a:schemeClr val="tx1"/>
+          </a:fontRef>
+        </p:style>
+      </p:cxnSp>
+      <p:cxnSp>
+        <p:nvCxnSpPr>
+          <p:cNvPr id="117" name="Straight Arrow Connector 116">
+            <a:extLst>
+              <a:ext uri="{FF2B5EF4-FFF2-40B4-BE49-F238E27FC236}">
+                <a16:creationId xmlns:a16="http://schemas.microsoft.com/office/drawing/2014/main" id="{B4A49520-9B24-4318-82EE-B3288907EA89}"/>
+              </a:ext>
+            </a:extLst>
+          </p:cNvPr>
+          <p:cNvCxnSpPr>
+            <a:cxnSpLocks/>
+          </p:cNvCxnSpPr>
+          <p:nvPr/>
+        </p:nvCxnSpPr>
+        <p:spPr>
+          <a:xfrm>
+            <a:off x="8223144" y="4744364"/>
+            <a:ext cx="730468" cy="0"/>
+          </a:xfrm>
+          <a:prstGeom prst="straightConnector1">
+            <a:avLst/>
+          </a:prstGeom>
+          <a:ln w="19050">
+            <a:tailEnd type="triangle"/>
+          </a:ln>
+        </p:spPr>
+        <p:style>
+          <a:lnRef idx="1">
+            <a:schemeClr val="accent1"/>
+          </a:lnRef>
+          <a:fillRef idx="0">
+            <a:schemeClr val="accent1"/>
+          </a:fillRef>
+          <a:effectRef idx="0">
+            <a:schemeClr val="accent1"/>
+          </a:effectRef>
+          <a:fontRef idx="minor">
+            <a:schemeClr val="tx1"/>
+          </a:fontRef>
+        </p:style>
+      </p:cxnSp>
+    </p:spTree>
+    <p:extLst>
+      <p:ext uri="{BB962C8B-B14F-4D97-AF65-F5344CB8AC3E}">
+        <p14:creationId xmlns:p14="http://schemas.microsoft.com/office/powerpoint/2010/main" val="345213280"/>
       </p:ext>
     </p:extLst>
   </p:cSld>

</xml_diff>

<commit_message>
temp for Section 5
</commit_message>
<xml_diff>
--- a/figures/figures.pptx
+++ b/figures/figures.pptx
@@ -12,6 +12,7 @@
     <p:sldId id="260" r:id="rId6"/>
     <p:sldId id="261" r:id="rId7"/>
     <p:sldId id="262" r:id="rId8"/>
+    <p:sldId id="263" r:id="rId9"/>
   </p:sldIdLst>
   <p:sldSz cx="12192000" cy="6858000"/>
   <p:notesSz cx="6858000" cy="9144000"/>
@@ -265,7 +266,7 @@
           <a:p>
             <a:fld id="{4B9CF307-EB09-4B6C-AE6A-0B77EE827448}" type="datetimeFigureOut">
               <a:rPr lang="en-US" smtClean="0"/>
-              <a:t>1/29/2023</a:t>
+              <a:t>1/30/2023</a:t>
             </a:fld>
             <a:endParaRPr lang="en-US"/>
           </a:p>
@@ -463,7 +464,7 @@
           <a:p>
             <a:fld id="{4B9CF307-EB09-4B6C-AE6A-0B77EE827448}" type="datetimeFigureOut">
               <a:rPr lang="en-US" smtClean="0"/>
-              <a:t>1/29/2023</a:t>
+              <a:t>1/30/2023</a:t>
             </a:fld>
             <a:endParaRPr lang="en-US"/>
           </a:p>
@@ -671,7 +672,7 @@
           <a:p>
             <a:fld id="{4B9CF307-EB09-4B6C-AE6A-0B77EE827448}" type="datetimeFigureOut">
               <a:rPr lang="en-US" smtClean="0"/>
-              <a:t>1/29/2023</a:t>
+              <a:t>1/30/2023</a:t>
             </a:fld>
             <a:endParaRPr lang="en-US"/>
           </a:p>
@@ -869,7 +870,7 @@
           <a:p>
             <a:fld id="{4B9CF307-EB09-4B6C-AE6A-0B77EE827448}" type="datetimeFigureOut">
               <a:rPr lang="en-US" smtClean="0"/>
-              <a:t>1/29/2023</a:t>
+              <a:t>1/30/2023</a:t>
             </a:fld>
             <a:endParaRPr lang="en-US"/>
           </a:p>
@@ -1144,7 +1145,7 @@
           <a:p>
             <a:fld id="{4B9CF307-EB09-4B6C-AE6A-0B77EE827448}" type="datetimeFigureOut">
               <a:rPr lang="en-US" smtClean="0"/>
-              <a:t>1/29/2023</a:t>
+              <a:t>1/30/2023</a:t>
             </a:fld>
             <a:endParaRPr lang="en-US"/>
           </a:p>
@@ -1409,7 +1410,7 @@
           <a:p>
             <a:fld id="{4B9CF307-EB09-4B6C-AE6A-0B77EE827448}" type="datetimeFigureOut">
               <a:rPr lang="en-US" smtClean="0"/>
-              <a:t>1/29/2023</a:t>
+              <a:t>1/30/2023</a:t>
             </a:fld>
             <a:endParaRPr lang="en-US"/>
           </a:p>
@@ -1821,7 +1822,7 @@
           <a:p>
             <a:fld id="{4B9CF307-EB09-4B6C-AE6A-0B77EE827448}" type="datetimeFigureOut">
               <a:rPr lang="en-US" smtClean="0"/>
-              <a:t>1/29/2023</a:t>
+              <a:t>1/30/2023</a:t>
             </a:fld>
             <a:endParaRPr lang="en-US"/>
           </a:p>
@@ -1962,7 +1963,7 @@
           <a:p>
             <a:fld id="{4B9CF307-EB09-4B6C-AE6A-0B77EE827448}" type="datetimeFigureOut">
               <a:rPr lang="en-US" smtClean="0"/>
-              <a:t>1/29/2023</a:t>
+              <a:t>1/30/2023</a:t>
             </a:fld>
             <a:endParaRPr lang="en-US"/>
           </a:p>
@@ -2075,7 +2076,7 @@
           <a:p>
             <a:fld id="{4B9CF307-EB09-4B6C-AE6A-0B77EE827448}" type="datetimeFigureOut">
               <a:rPr lang="en-US" smtClean="0"/>
-              <a:t>1/29/2023</a:t>
+              <a:t>1/30/2023</a:t>
             </a:fld>
             <a:endParaRPr lang="en-US"/>
           </a:p>
@@ -2386,7 +2387,7 @@
           <a:p>
             <a:fld id="{4B9CF307-EB09-4B6C-AE6A-0B77EE827448}" type="datetimeFigureOut">
               <a:rPr lang="en-US" smtClean="0"/>
-              <a:t>1/29/2023</a:t>
+              <a:t>1/30/2023</a:t>
             </a:fld>
             <a:endParaRPr lang="en-US"/>
           </a:p>
@@ -2674,7 +2675,7 @@
           <a:p>
             <a:fld id="{4B9CF307-EB09-4B6C-AE6A-0B77EE827448}" type="datetimeFigureOut">
               <a:rPr lang="en-US" smtClean="0"/>
-              <a:t>1/29/2023</a:t>
+              <a:t>1/30/2023</a:t>
             </a:fld>
             <a:endParaRPr lang="en-US"/>
           </a:p>
@@ -2915,7 +2916,7 @@
           <a:p>
             <a:fld id="{4B9CF307-EB09-4B6C-AE6A-0B77EE827448}" type="datetimeFigureOut">
               <a:rPr lang="en-US" smtClean="0"/>
-              <a:t>1/29/2023</a:t>
+              <a:t>1/30/2023</a:t>
             </a:fld>
             <a:endParaRPr lang="en-US"/>
           </a:p>
@@ -23377,6 +23378,4132 @@
 </p:sld>
 </file>
 
+<file path=ppt/slides/slide8.xml><?xml version="1.0" encoding="utf-8"?>
+<p:sld xmlns:a="http://schemas.openxmlformats.org/drawingml/2006/main" xmlns:r="http://schemas.openxmlformats.org/officeDocument/2006/relationships" xmlns:p="http://schemas.openxmlformats.org/presentationml/2006/main">
+  <p:cSld>
+    <p:spTree>
+      <p:nvGrpSpPr>
+        <p:cNvPr id="1" name=""/>
+        <p:cNvGrpSpPr/>
+        <p:nvPr/>
+      </p:nvGrpSpPr>
+      <p:grpSpPr>
+        <a:xfrm>
+          <a:off x="0" y="0"/>
+          <a:ext cx="0" cy="0"/>
+          <a:chOff x="0" y="0"/>
+          <a:chExt cx="0" cy="0"/>
+        </a:xfrm>
+      </p:grpSpPr>
+      <p:grpSp>
+        <p:nvGrpSpPr>
+          <p:cNvPr id="4" name="Group 3">
+            <a:extLst>
+              <a:ext uri="{FF2B5EF4-FFF2-40B4-BE49-F238E27FC236}">
+                <a16:creationId xmlns:a16="http://schemas.microsoft.com/office/drawing/2014/main" id="{05BD183D-0B86-42EB-88F6-042196F2497E}"/>
+              </a:ext>
+            </a:extLst>
+          </p:cNvPr>
+          <p:cNvGrpSpPr/>
+          <p:nvPr/>
+        </p:nvGrpSpPr>
+        <p:grpSpPr>
+          <a:xfrm>
+            <a:off x="39859" y="2885857"/>
+            <a:ext cx="1261872" cy="1309146"/>
+            <a:chOff x="3666744" y="2717780"/>
+            <a:chExt cx="1261872" cy="1309146"/>
+          </a:xfrm>
+        </p:grpSpPr>
+        <p:sp>
+          <p:nvSpPr>
+            <p:cNvPr id="5" name="Oval 4">
+              <a:extLst>
+                <a:ext uri="{FF2B5EF4-FFF2-40B4-BE49-F238E27FC236}">
+                  <a16:creationId xmlns:a16="http://schemas.microsoft.com/office/drawing/2014/main" id="{E5788072-969C-4C1D-B81B-3E02357D4D70}"/>
+                </a:ext>
+              </a:extLst>
+            </p:cNvPr>
+            <p:cNvSpPr/>
+            <p:nvPr/>
+          </p:nvSpPr>
+          <p:spPr>
+            <a:xfrm>
+              <a:off x="4197096" y="2717780"/>
+              <a:ext cx="182880" cy="182880"/>
+            </a:xfrm>
+            <a:prstGeom prst="ellipse">
+              <a:avLst/>
+            </a:prstGeom>
+            <a:solidFill>
+              <a:schemeClr val="accent6">
+                <a:lumMod val="20000"/>
+                <a:lumOff val="80000"/>
+              </a:schemeClr>
+            </a:solidFill>
+            <a:ln>
+              <a:solidFill>
+                <a:schemeClr val="accent6">
+                  <a:lumMod val="75000"/>
+                </a:schemeClr>
+              </a:solidFill>
+            </a:ln>
+          </p:spPr>
+          <p:style>
+            <a:lnRef idx="2">
+              <a:schemeClr val="accent1">
+                <a:shade val="50000"/>
+              </a:schemeClr>
+            </a:lnRef>
+            <a:fillRef idx="1">
+              <a:schemeClr val="accent1"/>
+            </a:fillRef>
+            <a:effectRef idx="0">
+              <a:schemeClr val="accent1"/>
+            </a:effectRef>
+            <a:fontRef idx="minor">
+              <a:schemeClr val="lt1"/>
+            </a:fontRef>
+          </p:style>
+          <p:txBody>
+            <a:bodyPr rtlCol="0" anchor="ctr"/>
+            <a:lstStyle/>
+            <a:p>
+              <a:pPr algn="ctr"/>
+              <a:endParaRPr lang="en-US"/>
+            </a:p>
+          </p:txBody>
+        </p:sp>
+        <p:sp>
+          <p:nvSpPr>
+            <p:cNvPr id="6" name="Oval 5">
+              <a:extLst>
+                <a:ext uri="{FF2B5EF4-FFF2-40B4-BE49-F238E27FC236}">
+                  <a16:creationId xmlns:a16="http://schemas.microsoft.com/office/drawing/2014/main" id="{3B97AC91-CC66-418C-9804-A8FD2A250815}"/>
+                </a:ext>
+              </a:extLst>
+            </p:cNvPr>
+            <p:cNvSpPr/>
+            <p:nvPr/>
+          </p:nvSpPr>
+          <p:spPr>
+            <a:xfrm>
+              <a:off x="3849624" y="3172968"/>
+              <a:ext cx="182880" cy="182880"/>
+            </a:xfrm>
+            <a:prstGeom prst="ellipse">
+              <a:avLst/>
+            </a:prstGeom>
+            <a:solidFill>
+              <a:schemeClr val="accent6">
+                <a:lumMod val="20000"/>
+                <a:lumOff val="80000"/>
+              </a:schemeClr>
+            </a:solidFill>
+            <a:ln>
+              <a:solidFill>
+                <a:schemeClr val="accent6">
+                  <a:lumMod val="75000"/>
+                </a:schemeClr>
+              </a:solidFill>
+            </a:ln>
+          </p:spPr>
+          <p:style>
+            <a:lnRef idx="2">
+              <a:schemeClr val="accent1">
+                <a:shade val="50000"/>
+              </a:schemeClr>
+            </a:lnRef>
+            <a:fillRef idx="1">
+              <a:schemeClr val="accent1"/>
+            </a:fillRef>
+            <a:effectRef idx="0">
+              <a:schemeClr val="accent1"/>
+            </a:effectRef>
+            <a:fontRef idx="minor">
+              <a:schemeClr val="lt1"/>
+            </a:fontRef>
+          </p:style>
+          <p:txBody>
+            <a:bodyPr rtlCol="0" anchor="ctr"/>
+            <a:lstStyle/>
+            <a:p>
+              <a:pPr algn="ctr"/>
+              <a:endParaRPr lang="en-US"/>
+            </a:p>
+          </p:txBody>
+        </p:sp>
+        <p:sp>
+          <p:nvSpPr>
+            <p:cNvPr id="7" name="Oval 6">
+              <a:extLst>
+                <a:ext uri="{FF2B5EF4-FFF2-40B4-BE49-F238E27FC236}">
+                  <a16:creationId xmlns:a16="http://schemas.microsoft.com/office/drawing/2014/main" id="{A6E73F57-C031-497D-9C5F-87AD0FD44C34}"/>
+                </a:ext>
+              </a:extLst>
+            </p:cNvPr>
+            <p:cNvSpPr/>
+            <p:nvPr/>
+          </p:nvSpPr>
+          <p:spPr>
+            <a:xfrm>
+              <a:off x="4288536" y="3661166"/>
+              <a:ext cx="182880" cy="182880"/>
+            </a:xfrm>
+            <a:prstGeom prst="ellipse">
+              <a:avLst/>
+            </a:prstGeom>
+            <a:solidFill>
+              <a:schemeClr val="accent6">
+                <a:lumMod val="20000"/>
+                <a:lumOff val="80000"/>
+              </a:schemeClr>
+            </a:solidFill>
+            <a:ln>
+              <a:solidFill>
+                <a:schemeClr val="accent6">
+                  <a:lumMod val="75000"/>
+                </a:schemeClr>
+              </a:solidFill>
+            </a:ln>
+          </p:spPr>
+          <p:style>
+            <a:lnRef idx="2">
+              <a:schemeClr val="accent1">
+                <a:shade val="50000"/>
+              </a:schemeClr>
+            </a:lnRef>
+            <a:fillRef idx="1">
+              <a:schemeClr val="accent1"/>
+            </a:fillRef>
+            <a:effectRef idx="0">
+              <a:schemeClr val="accent1"/>
+            </a:effectRef>
+            <a:fontRef idx="minor">
+              <a:schemeClr val="lt1"/>
+            </a:fontRef>
+          </p:style>
+          <p:txBody>
+            <a:bodyPr rtlCol="0" anchor="ctr"/>
+            <a:lstStyle/>
+            <a:p>
+              <a:pPr algn="ctr"/>
+              <a:endParaRPr lang="en-US"/>
+            </a:p>
+          </p:txBody>
+        </p:sp>
+        <p:sp>
+          <p:nvSpPr>
+            <p:cNvPr id="8" name="Oval 7">
+              <a:extLst>
+                <a:ext uri="{FF2B5EF4-FFF2-40B4-BE49-F238E27FC236}">
+                  <a16:creationId xmlns:a16="http://schemas.microsoft.com/office/drawing/2014/main" id="{41ADC034-E8C9-493E-907B-53D7BDF021A5}"/>
+                </a:ext>
+              </a:extLst>
+            </p:cNvPr>
+            <p:cNvSpPr/>
+            <p:nvPr/>
+          </p:nvSpPr>
+          <p:spPr>
+            <a:xfrm>
+              <a:off x="4745736" y="3246120"/>
+              <a:ext cx="182880" cy="182880"/>
+            </a:xfrm>
+            <a:prstGeom prst="ellipse">
+              <a:avLst/>
+            </a:prstGeom>
+            <a:solidFill>
+              <a:schemeClr val="accent6">
+                <a:lumMod val="20000"/>
+                <a:lumOff val="80000"/>
+              </a:schemeClr>
+            </a:solidFill>
+            <a:ln>
+              <a:solidFill>
+                <a:schemeClr val="accent6">
+                  <a:lumMod val="75000"/>
+                </a:schemeClr>
+              </a:solidFill>
+            </a:ln>
+          </p:spPr>
+          <p:style>
+            <a:lnRef idx="2">
+              <a:schemeClr val="accent1">
+                <a:shade val="50000"/>
+              </a:schemeClr>
+            </a:lnRef>
+            <a:fillRef idx="1">
+              <a:schemeClr val="accent1"/>
+            </a:fillRef>
+            <a:effectRef idx="0">
+              <a:schemeClr val="accent1"/>
+            </a:effectRef>
+            <a:fontRef idx="minor">
+              <a:schemeClr val="lt1"/>
+            </a:fontRef>
+          </p:style>
+          <p:txBody>
+            <a:bodyPr rtlCol="0" anchor="ctr"/>
+            <a:lstStyle/>
+            <a:p>
+              <a:pPr algn="ctr"/>
+              <a:endParaRPr lang="en-US" dirty="0"/>
+            </a:p>
+          </p:txBody>
+        </p:sp>
+        <p:sp>
+          <p:nvSpPr>
+            <p:cNvPr id="9" name="Oval 8">
+              <a:extLst>
+                <a:ext uri="{FF2B5EF4-FFF2-40B4-BE49-F238E27FC236}">
+                  <a16:creationId xmlns:a16="http://schemas.microsoft.com/office/drawing/2014/main" id="{44AFACC5-88D5-420B-8C0D-019D8D431DCD}"/>
+                </a:ext>
+              </a:extLst>
+            </p:cNvPr>
+            <p:cNvSpPr/>
+            <p:nvPr/>
+          </p:nvSpPr>
+          <p:spPr>
+            <a:xfrm>
+              <a:off x="3666744" y="3844046"/>
+              <a:ext cx="182880" cy="182880"/>
+            </a:xfrm>
+            <a:prstGeom prst="ellipse">
+              <a:avLst/>
+            </a:prstGeom>
+            <a:solidFill>
+              <a:schemeClr val="accent6">
+                <a:lumMod val="20000"/>
+                <a:lumOff val="80000"/>
+              </a:schemeClr>
+            </a:solidFill>
+            <a:ln>
+              <a:solidFill>
+                <a:schemeClr val="accent6">
+                  <a:lumMod val="75000"/>
+                </a:schemeClr>
+              </a:solidFill>
+            </a:ln>
+          </p:spPr>
+          <p:style>
+            <a:lnRef idx="2">
+              <a:schemeClr val="accent1">
+                <a:shade val="50000"/>
+              </a:schemeClr>
+            </a:lnRef>
+            <a:fillRef idx="1">
+              <a:schemeClr val="accent1"/>
+            </a:fillRef>
+            <a:effectRef idx="0">
+              <a:schemeClr val="accent1"/>
+            </a:effectRef>
+            <a:fontRef idx="minor">
+              <a:schemeClr val="lt1"/>
+            </a:fontRef>
+          </p:style>
+          <p:txBody>
+            <a:bodyPr rtlCol="0" anchor="ctr"/>
+            <a:lstStyle/>
+            <a:p>
+              <a:pPr algn="ctr"/>
+              <a:endParaRPr lang="en-US"/>
+            </a:p>
+          </p:txBody>
+        </p:sp>
+        <p:cxnSp>
+          <p:nvCxnSpPr>
+            <p:cNvPr id="10" name="Straight Arrow Connector 9">
+              <a:extLst>
+                <a:ext uri="{FF2B5EF4-FFF2-40B4-BE49-F238E27FC236}">
+                  <a16:creationId xmlns:a16="http://schemas.microsoft.com/office/drawing/2014/main" id="{45C6A2D0-B5FF-45E2-8CE4-C7B8D13F4913}"/>
+                </a:ext>
+              </a:extLst>
+            </p:cNvPr>
+            <p:cNvCxnSpPr>
+              <a:stCxn id="5" idx="3"/>
+              <a:endCxn id="6" idx="7"/>
+            </p:cNvCxnSpPr>
+            <p:nvPr/>
+          </p:nvCxnSpPr>
+          <p:spPr>
+            <a:xfrm flipH="1">
+              <a:off x="4005722" y="2873878"/>
+              <a:ext cx="218156" cy="325872"/>
+            </a:xfrm>
+            <a:prstGeom prst="straightConnector1">
+              <a:avLst/>
+            </a:prstGeom>
+            <a:ln>
+              <a:solidFill>
+                <a:srgbClr val="0070C0"/>
+              </a:solidFill>
+              <a:tailEnd type="triangle"/>
+            </a:ln>
+          </p:spPr>
+          <p:style>
+            <a:lnRef idx="1">
+              <a:schemeClr val="accent1"/>
+            </a:lnRef>
+            <a:fillRef idx="0">
+              <a:schemeClr val="accent1"/>
+            </a:fillRef>
+            <a:effectRef idx="0">
+              <a:schemeClr val="accent1"/>
+            </a:effectRef>
+            <a:fontRef idx="minor">
+              <a:schemeClr val="tx1"/>
+            </a:fontRef>
+          </p:style>
+        </p:cxnSp>
+        <p:cxnSp>
+          <p:nvCxnSpPr>
+            <p:cNvPr id="11" name="Straight Arrow Connector 10">
+              <a:extLst>
+                <a:ext uri="{FF2B5EF4-FFF2-40B4-BE49-F238E27FC236}">
+                  <a16:creationId xmlns:a16="http://schemas.microsoft.com/office/drawing/2014/main" id="{916F75C0-A6E5-42E8-AF7F-65F22B32AB94}"/>
+                </a:ext>
+              </a:extLst>
+            </p:cNvPr>
+            <p:cNvCxnSpPr>
+              <a:cxnSpLocks/>
+              <a:stCxn id="5" idx="4"/>
+              <a:endCxn id="7" idx="0"/>
+            </p:cNvCxnSpPr>
+            <p:nvPr/>
+          </p:nvCxnSpPr>
+          <p:spPr>
+            <a:xfrm>
+              <a:off x="4288536" y="2900660"/>
+              <a:ext cx="91440" cy="760506"/>
+            </a:xfrm>
+            <a:prstGeom prst="straightConnector1">
+              <a:avLst/>
+            </a:prstGeom>
+            <a:ln>
+              <a:solidFill>
+                <a:srgbClr val="0070C0"/>
+              </a:solidFill>
+              <a:tailEnd type="triangle"/>
+            </a:ln>
+          </p:spPr>
+          <p:style>
+            <a:lnRef idx="1">
+              <a:schemeClr val="accent1"/>
+            </a:lnRef>
+            <a:fillRef idx="0">
+              <a:schemeClr val="accent1"/>
+            </a:fillRef>
+            <a:effectRef idx="0">
+              <a:schemeClr val="accent1"/>
+            </a:effectRef>
+            <a:fontRef idx="minor">
+              <a:schemeClr val="tx1"/>
+            </a:fontRef>
+          </p:style>
+        </p:cxnSp>
+        <p:cxnSp>
+          <p:nvCxnSpPr>
+            <p:cNvPr id="12" name="Straight Arrow Connector 11">
+              <a:extLst>
+                <a:ext uri="{FF2B5EF4-FFF2-40B4-BE49-F238E27FC236}">
+                  <a16:creationId xmlns:a16="http://schemas.microsoft.com/office/drawing/2014/main" id="{C0937B8F-C243-4DBB-AEB0-59A785F1B80D}"/>
+                </a:ext>
+              </a:extLst>
+            </p:cNvPr>
+            <p:cNvCxnSpPr>
+              <a:cxnSpLocks/>
+              <a:stCxn id="5" idx="5"/>
+              <a:endCxn id="8" idx="1"/>
+            </p:cNvCxnSpPr>
+            <p:nvPr/>
+          </p:nvCxnSpPr>
+          <p:spPr>
+            <a:xfrm>
+              <a:off x="4353194" y="2873878"/>
+              <a:ext cx="419324" cy="399024"/>
+            </a:xfrm>
+            <a:prstGeom prst="straightConnector1">
+              <a:avLst/>
+            </a:prstGeom>
+            <a:ln>
+              <a:solidFill>
+                <a:srgbClr val="0070C0"/>
+              </a:solidFill>
+              <a:tailEnd type="triangle"/>
+            </a:ln>
+          </p:spPr>
+          <p:style>
+            <a:lnRef idx="1">
+              <a:schemeClr val="accent1"/>
+            </a:lnRef>
+            <a:fillRef idx="0">
+              <a:schemeClr val="accent1"/>
+            </a:fillRef>
+            <a:effectRef idx="0">
+              <a:schemeClr val="accent1"/>
+            </a:effectRef>
+            <a:fontRef idx="minor">
+              <a:schemeClr val="tx1"/>
+            </a:fontRef>
+          </p:style>
+        </p:cxnSp>
+        <p:cxnSp>
+          <p:nvCxnSpPr>
+            <p:cNvPr id="13" name="Straight Arrow Connector 12">
+              <a:extLst>
+                <a:ext uri="{FF2B5EF4-FFF2-40B4-BE49-F238E27FC236}">
+                  <a16:creationId xmlns:a16="http://schemas.microsoft.com/office/drawing/2014/main" id="{29B04A20-B743-4B82-B885-6F329C49A813}"/>
+                </a:ext>
+              </a:extLst>
+            </p:cNvPr>
+            <p:cNvCxnSpPr>
+              <a:cxnSpLocks/>
+              <a:stCxn id="8" idx="3"/>
+              <a:endCxn id="7" idx="7"/>
+            </p:cNvCxnSpPr>
+            <p:nvPr/>
+          </p:nvCxnSpPr>
+          <p:spPr>
+            <a:xfrm flipH="1">
+              <a:off x="4444634" y="3402218"/>
+              <a:ext cx="327884" cy="285730"/>
+            </a:xfrm>
+            <a:prstGeom prst="straightConnector1">
+              <a:avLst/>
+            </a:prstGeom>
+            <a:ln>
+              <a:solidFill>
+                <a:srgbClr val="0070C0"/>
+              </a:solidFill>
+              <a:tailEnd type="triangle"/>
+            </a:ln>
+          </p:spPr>
+          <p:style>
+            <a:lnRef idx="1">
+              <a:schemeClr val="accent1"/>
+            </a:lnRef>
+            <a:fillRef idx="0">
+              <a:schemeClr val="accent1"/>
+            </a:fillRef>
+            <a:effectRef idx="0">
+              <a:schemeClr val="accent1"/>
+            </a:effectRef>
+            <a:fontRef idx="minor">
+              <a:schemeClr val="tx1"/>
+            </a:fontRef>
+          </p:style>
+        </p:cxnSp>
+        <p:cxnSp>
+          <p:nvCxnSpPr>
+            <p:cNvPr id="14" name="Straight Arrow Connector 13">
+              <a:extLst>
+                <a:ext uri="{FF2B5EF4-FFF2-40B4-BE49-F238E27FC236}">
+                  <a16:creationId xmlns:a16="http://schemas.microsoft.com/office/drawing/2014/main" id="{90D13FC1-B4C7-460F-B970-1132AD8B942E}"/>
+                </a:ext>
+              </a:extLst>
+            </p:cNvPr>
+            <p:cNvCxnSpPr>
+              <a:cxnSpLocks/>
+              <a:stCxn id="9" idx="6"/>
+              <a:endCxn id="7" idx="2"/>
+            </p:cNvCxnSpPr>
+            <p:nvPr/>
+          </p:nvCxnSpPr>
+          <p:spPr>
+            <a:xfrm flipV="1">
+              <a:off x="3849624" y="3752606"/>
+              <a:ext cx="438912" cy="182880"/>
+            </a:xfrm>
+            <a:prstGeom prst="straightConnector1">
+              <a:avLst/>
+            </a:prstGeom>
+            <a:ln>
+              <a:solidFill>
+                <a:srgbClr val="0070C0"/>
+              </a:solidFill>
+              <a:tailEnd type="triangle"/>
+            </a:ln>
+          </p:spPr>
+          <p:style>
+            <a:lnRef idx="1">
+              <a:schemeClr val="accent1"/>
+            </a:lnRef>
+            <a:fillRef idx="0">
+              <a:schemeClr val="accent1"/>
+            </a:fillRef>
+            <a:effectRef idx="0">
+              <a:schemeClr val="accent1"/>
+            </a:effectRef>
+            <a:fontRef idx="minor">
+              <a:schemeClr val="tx1"/>
+            </a:fontRef>
+          </p:style>
+        </p:cxnSp>
+        <p:cxnSp>
+          <p:nvCxnSpPr>
+            <p:cNvPr id="15" name="Straight Arrow Connector 14">
+              <a:extLst>
+                <a:ext uri="{FF2B5EF4-FFF2-40B4-BE49-F238E27FC236}">
+                  <a16:creationId xmlns:a16="http://schemas.microsoft.com/office/drawing/2014/main" id="{421A8B38-18BD-4BA4-B448-C3D8EBBE5D14}"/>
+                </a:ext>
+              </a:extLst>
+            </p:cNvPr>
+            <p:cNvCxnSpPr>
+              <a:cxnSpLocks/>
+              <a:stCxn id="9" idx="0"/>
+              <a:endCxn id="6" idx="4"/>
+            </p:cNvCxnSpPr>
+            <p:nvPr/>
+          </p:nvCxnSpPr>
+          <p:spPr>
+            <a:xfrm flipV="1">
+              <a:off x="3758184" y="3355848"/>
+              <a:ext cx="182880" cy="488198"/>
+            </a:xfrm>
+            <a:prstGeom prst="straightConnector1">
+              <a:avLst/>
+            </a:prstGeom>
+            <a:ln>
+              <a:solidFill>
+                <a:srgbClr val="0070C0"/>
+              </a:solidFill>
+              <a:tailEnd type="triangle"/>
+            </a:ln>
+          </p:spPr>
+          <p:style>
+            <a:lnRef idx="1">
+              <a:schemeClr val="accent1"/>
+            </a:lnRef>
+            <a:fillRef idx="0">
+              <a:schemeClr val="accent1"/>
+            </a:fillRef>
+            <a:effectRef idx="0">
+              <a:schemeClr val="accent1"/>
+            </a:effectRef>
+            <a:fontRef idx="minor">
+              <a:schemeClr val="tx1"/>
+            </a:fontRef>
+          </p:style>
+        </p:cxnSp>
+      </p:grpSp>
+      <p:sp>
+        <p:nvSpPr>
+          <p:cNvPr id="16" name="Rectangle: Rounded Corners 15">
+            <a:extLst>
+              <a:ext uri="{FF2B5EF4-FFF2-40B4-BE49-F238E27FC236}">
+                <a16:creationId xmlns:a16="http://schemas.microsoft.com/office/drawing/2014/main" id="{EEFE1ACB-AB9F-4E48-87EB-ED655D5C73ED}"/>
+              </a:ext>
+            </a:extLst>
+          </p:cNvPr>
+          <p:cNvSpPr/>
+          <p:nvPr/>
+        </p:nvSpPr>
+        <p:spPr>
+          <a:xfrm>
+            <a:off x="1890992" y="2753203"/>
+            <a:ext cx="1597275" cy="1541444"/>
+          </a:xfrm>
+          <a:prstGeom prst="roundRect">
+            <a:avLst>
+              <a:gd name="adj" fmla="val 10106"/>
+            </a:avLst>
+          </a:prstGeom>
+          <a:solidFill>
+            <a:schemeClr val="accent4">
+              <a:lumMod val="20000"/>
+              <a:lumOff val="80000"/>
+            </a:schemeClr>
+          </a:solidFill>
+          <a:ln>
+            <a:solidFill>
+              <a:srgbClr val="FFC000"/>
+            </a:solidFill>
+          </a:ln>
+          <a:effectLst>
+            <a:outerShdw blurRad="50800" dist="38100" dir="2700000" algn="tl" rotWithShape="0">
+              <a:prstClr val="black">
+                <a:alpha val="40000"/>
+              </a:prstClr>
+            </a:outerShdw>
+          </a:effectLst>
+        </p:spPr>
+        <p:style>
+          <a:lnRef idx="2">
+            <a:schemeClr val="accent1">
+              <a:shade val="50000"/>
+            </a:schemeClr>
+          </a:lnRef>
+          <a:fillRef idx="1">
+            <a:schemeClr val="accent1"/>
+          </a:fillRef>
+          <a:effectRef idx="0">
+            <a:schemeClr val="accent1"/>
+          </a:effectRef>
+          <a:fontRef idx="minor">
+            <a:schemeClr val="lt1"/>
+          </a:fontRef>
+        </p:style>
+        <p:txBody>
+          <a:bodyPr lIns="0" tIns="0" rIns="0" bIns="0" rtlCol="0" anchor="ctr"/>
+          <a:lstStyle/>
+          <a:p>
+            <a:pPr algn="ctr"/>
+            <a:r>
+              <a:rPr lang="en-US" dirty="0">
+                <a:solidFill>
+                  <a:schemeClr val="tx1"/>
+                </a:solidFill>
+              </a:rPr>
+              <a:t>Graph</a:t>
+            </a:r>
+          </a:p>
+          <a:p>
+            <a:pPr algn="ctr"/>
+            <a:r>
+              <a:rPr lang="en-US" dirty="0">
+                <a:solidFill>
+                  <a:schemeClr val="tx1"/>
+                </a:solidFill>
+              </a:rPr>
+              <a:t>Convolution</a:t>
+            </a:r>
+          </a:p>
+          <a:p>
+            <a:pPr algn="ctr"/>
+            <a:r>
+              <a:rPr lang="en-US" dirty="0">
+                <a:solidFill>
+                  <a:schemeClr val="tx1"/>
+                </a:solidFill>
+              </a:rPr>
+              <a:t>Network – </a:t>
+            </a:r>
+          </a:p>
+          <a:p>
+            <a:pPr algn="ctr"/>
+            <a:r>
+              <a:rPr lang="en-US" dirty="0">
+                <a:solidFill>
+                  <a:schemeClr val="tx1"/>
+                </a:solidFill>
+              </a:rPr>
+              <a:t>Missing Feature</a:t>
+            </a:r>
+          </a:p>
+          <a:p>
+            <a:pPr algn="ctr"/>
+            <a:r>
+              <a:rPr lang="en-US" dirty="0">
+                <a:solidFill>
+                  <a:schemeClr val="tx1"/>
+                </a:solidFill>
+              </a:rPr>
+              <a:t>(</a:t>
+            </a:r>
+            <a:r>
+              <a:rPr lang="en-US" dirty="0" err="1">
+                <a:solidFill>
+                  <a:schemeClr val="tx1"/>
+                </a:solidFill>
+              </a:rPr>
+              <a:t>GCNmf</a:t>
+            </a:r>
+            <a:r>
+              <a:rPr lang="en-US" dirty="0">
+                <a:solidFill>
+                  <a:schemeClr val="tx1"/>
+                </a:solidFill>
+              </a:rPr>
+              <a:t>)</a:t>
+            </a:r>
+          </a:p>
+        </p:txBody>
+      </p:sp>
+      <p:grpSp>
+        <p:nvGrpSpPr>
+          <p:cNvPr id="17" name="Group 16">
+            <a:extLst>
+              <a:ext uri="{FF2B5EF4-FFF2-40B4-BE49-F238E27FC236}">
+                <a16:creationId xmlns:a16="http://schemas.microsoft.com/office/drawing/2014/main" id="{BD7646C5-6BAA-4655-B372-F0AE4A8FCFC3}"/>
+              </a:ext>
+            </a:extLst>
+          </p:cNvPr>
+          <p:cNvGrpSpPr/>
+          <p:nvPr/>
+        </p:nvGrpSpPr>
+        <p:grpSpPr>
+          <a:xfrm>
+            <a:off x="4174232" y="1630597"/>
+            <a:ext cx="720991" cy="1610870"/>
+            <a:chOff x="3547425" y="2682022"/>
+            <a:chExt cx="720991" cy="1610870"/>
+          </a:xfrm>
+        </p:grpSpPr>
+        <p:grpSp>
+          <p:nvGrpSpPr>
+            <p:cNvPr id="18" name="Group 17">
+              <a:extLst>
+                <a:ext uri="{FF2B5EF4-FFF2-40B4-BE49-F238E27FC236}">
+                  <a16:creationId xmlns:a16="http://schemas.microsoft.com/office/drawing/2014/main" id="{CBBFA48E-938A-48CF-94C0-3ACA46052A21}"/>
+                </a:ext>
+              </a:extLst>
+            </p:cNvPr>
+            <p:cNvGrpSpPr/>
+            <p:nvPr/>
+          </p:nvGrpSpPr>
+          <p:grpSpPr>
+            <a:xfrm>
+              <a:off x="3553406" y="2682022"/>
+              <a:ext cx="711200" cy="203835"/>
+              <a:chOff x="3559387" y="2503170"/>
+              <a:chExt cx="711200" cy="203835"/>
+            </a:xfrm>
+          </p:grpSpPr>
+          <p:sp>
+            <p:nvSpPr>
+              <p:cNvPr id="35" name="Rectangle: Rounded Corners 34">
+                <a:extLst>
+                  <a:ext uri="{FF2B5EF4-FFF2-40B4-BE49-F238E27FC236}">
+                    <a16:creationId xmlns:a16="http://schemas.microsoft.com/office/drawing/2014/main" id="{FFF4E45B-0D35-4473-AF3F-62CEEAC44494}"/>
+                  </a:ext>
+                </a:extLst>
+              </p:cNvPr>
+              <p:cNvSpPr/>
+              <p:nvPr/>
+            </p:nvSpPr>
+            <p:spPr>
+              <a:xfrm>
+                <a:off x="3559387" y="2503170"/>
+                <a:ext cx="711200" cy="203835"/>
+              </a:xfrm>
+              <a:prstGeom prst="roundRect">
+                <a:avLst/>
+              </a:prstGeom>
+              <a:noFill/>
+              <a:ln>
+                <a:solidFill>
+                  <a:schemeClr val="tx1"/>
+                </a:solidFill>
+              </a:ln>
+            </p:spPr>
+            <p:style>
+              <a:lnRef idx="2">
+                <a:schemeClr val="accent1">
+                  <a:shade val="50000"/>
+                </a:schemeClr>
+              </a:lnRef>
+              <a:fillRef idx="1">
+                <a:schemeClr val="accent1"/>
+              </a:fillRef>
+              <a:effectRef idx="0">
+                <a:schemeClr val="accent1"/>
+              </a:effectRef>
+              <a:fontRef idx="minor">
+                <a:schemeClr val="lt1"/>
+              </a:fontRef>
+            </p:style>
+            <p:txBody>
+              <a:bodyPr rot="0" spcFirstLastPara="0" vert="horz" wrap="square" lIns="91440" tIns="45720" rIns="91440" bIns="45720" numCol="1" spcCol="0" rtlCol="0" fromWordArt="0" anchor="ctr" anchorCtr="0" forceAA="0" compatLnSpc="1">
+                <a:prstTxWarp prst="textNoShape">
+                  <a:avLst/>
+                </a:prstTxWarp>
+                <a:noAutofit/>
+              </a:bodyPr>
+              <a:lstStyle/>
+              <a:p>
+                <a:endParaRPr lang="en-US"/>
+              </a:p>
+            </p:txBody>
+          </p:sp>
+          <p:sp>
+            <p:nvSpPr>
+              <p:cNvPr id="36" name="Oval 35">
+                <a:extLst>
+                  <a:ext uri="{FF2B5EF4-FFF2-40B4-BE49-F238E27FC236}">
+                    <a16:creationId xmlns:a16="http://schemas.microsoft.com/office/drawing/2014/main" id="{5246A7EE-3229-49B7-8F1D-08032DC4E4DB}"/>
+                  </a:ext>
+                </a:extLst>
+              </p:cNvPr>
+              <p:cNvSpPr/>
+              <p:nvPr/>
+            </p:nvSpPr>
+            <p:spPr>
+              <a:xfrm>
+                <a:off x="3640032" y="2545080"/>
+                <a:ext cx="134620" cy="128905"/>
+              </a:xfrm>
+              <a:prstGeom prst="ellipse">
+                <a:avLst/>
+              </a:prstGeom>
+              <a:solidFill>
+                <a:schemeClr val="accent1">
+                  <a:lumMod val="40000"/>
+                  <a:lumOff val="60000"/>
+                </a:schemeClr>
+              </a:solidFill>
+              <a:ln>
+                <a:solidFill>
+                  <a:schemeClr val="accent1">
+                    <a:lumMod val="60000"/>
+                    <a:lumOff val="40000"/>
+                  </a:schemeClr>
+                </a:solidFill>
+              </a:ln>
+            </p:spPr>
+            <p:style>
+              <a:lnRef idx="2">
+                <a:schemeClr val="accent1">
+                  <a:shade val="50000"/>
+                </a:schemeClr>
+              </a:lnRef>
+              <a:fillRef idx="1">
+                <a:schemeClr val="accent1"/>
+              </a:fillRef>
+              <a:effectRef idx="0">
+                <a:schemeClr val="accent1"/>
+              </a:effectRef>
+              <a:fontRef idx="minor">
+                <a:schemeClr val="lt1"/>
+              </a:fontRef>
+            </p:style>
+            <p:txBody>
+              <a:bodyPr rot="0" spcFirstLastPara="0" vert="horz" wrap="square" lIns="91440" tIns="45720" rIns="91440" bIns="45720" numCol="1" spcCol="0" rtlCol="0" fromWordArt="0" anchor="ctr" anchorCtr="0" forceAA="0" compatLnSpc="1">
+                <a:prstTxWarp prst="textNoShape">
+                  <a:avLst/>
+                </a:prstTxWarp>
+                <a:noAutofit/>
+              </a:bodyPr>
+              <a:lstStyle/>
+              <a:p>
+                <a:endParaRPr lang="en-US"/>
+              </a:p>
+            </p:txBody>
+          </p:sp>
+          <p:sp>
+            <p:nvSpPr>
+              <p:cNvPr id="37" name="Oval 36">
+                <a:extLst>
+                  <a:ext uri="{FF2B5EF4-FFF2-40B4-BE49-F238E27FC236}">
+                    <a16:creationId xmlns:a16="http://schemas.microsoft.com/office/drawing/2014/main" id="{9DC45F4D-E4AE-4106-9D41-1362B4D4EEA8}"/>
+                  </a:ext>
+                </a:extLst>
+              </p:cNvPr>
+              <p:cNvSpPr/>
+              <p:nvPr/>
+            </p:nvSpPr>
+            <p:spPr>
+              <a:xfrm>
+                <a:off x="3851487" y="2545080"/>
+                <a:ext cx="134620" cy="128905"/>
+              </a:xfrm>
+              <a:prstGeom prst="ellipse">
+                <a:avLst/>
+              </a:prstGeom>
+              <a:solidFill>
+                <a:schemeClr val="accent1">
+                  <a:lumMod val="40000"/>
+                  <a:lumOff val="60000"/>
+                </a:schemeClr>
+              </a:solidFill>
+              <a:ln>
+                <a:solidFill>
+                  <a:schemeClr val="accent1">
+                    <a:lumMod val="60000"/>
+                    <a:lumOff val="40000"/>
+                  </a:schemeClr>
+                </a:solidFill>
+              </a:ln>
+            </p:spPr>
+            <p:style>
+              <a:lnRef idx="2">
+                <a:schemeClr val="accent1">
+                  <a:shade val="50000"/>
+                </a:schemeClr>
+              </a:lnRef>
+              <a:fillRef idx="1">
+                <a:schemeClr val="accent1"/>
+              </a:fillRef>
+              <a:effectRef idx="0">
+                <a:schemeClr val="accent1"/>
+              </a:effectRef>
+              <a:fontRef idx="minor">
+                <a:schemeClr val="lt1"/>
+              </a:fontRef>
+            </p:style>
+            <p:txBody>
+              <a:bodyPr rot="0" spcFirstLastPara="0" vert="horz" wrap="square" lIns="91440" tIns="45720" rIns="91440" bIns="45720" numCol="1" spcCol="0" rtlCol="0" fromWordArt="0" anchor="ctr" anchorCtr="0" forceAA="0" compatLnSpc="1">
+                <a:prstTxWarp prst="textNoShape">
+                  <a:avLst/>
+                </a:prstTxWarp>
+                <a:noAutofit/>
+              </a:bodyPr>
+              <a:lstStyle/>
+              <a:p>
+                <a:endParaRPr lang="en-US"/>
+              </a:p>
+            </p:txBody>
+          </p:sp>
+          <p:sp>
+            <p:nvSpPr>
+              <p:cNvPr id="38" name="Oval 37">
+                <a:extLst>
+                  <a:ext uri="{FF2B5EF4-FFF2-40B4-BE49-F238E27FC236}">
+                    <a16:creationId xmlns:a16="http://schemas.microsoft.com/office/drawing/2014/main" id="{C9E727C1-BE9E-4CDA-8F11-1E0D003B27DD}"/>
+                  </a:ext>
+                </a:extLst>
+              </p:cNvPr>
+              <p:cNvSpPr/>
+              <p:nvPr/>
+            </p:nvSpPr>
+            <p:spPr>
+              <a:xfrm>
+                <a:off x="4063577" y="2545080"/>
+                <a:ext cx="134620" cy="128905"/>
+              </a:xfrm>
+              <a:prstGeom prst="ellipse">
+                <a:avLst/>
+              </a:prstGeom>
+              <a:solidFill>
+                <a:schemeClr val="accent1">
+                  <a:lumMod val="40000"/>
+                  <a:lumOff val="60000"/>
+                </a:schemeClr>
+              </a:solidFill>
+              <a:ln>
+                <a:solidFill>
+                  <a:schemeClr val="accent1">
+                    <a:lumMod val="60000"/>
+                    <a:lumOff val="40000"/>
+                  </a:schemeClr>
+                </a:solidFill>
+              </a:ln>
+            </p:spPr>
+            <p:style>
+              <a:lnRef idx="2">
+                <a:schemeClr val="accent1">
+                  <a:shade val="50000"/>
+                </a:schemeClr>
+              </a:lnRef>
+              <a:fillRef idx="1">
+                <a:schemeClr val="accent1"/>
+              </a:fillRef>
+              <a:effectRef idx="0">
+                <a:schemeClr val="accent1"/>
+              </a:effectRef>
+              <a:fontRef idx="minor">
+                <a:schemeClr val="lt1"/>
+              </a:fontRef>
+            </p:style>
+            <p:txBody>
+              <a:bodyPr rot="0" spcFirstLastPara="0" vert="horz" wrap="square" lIns="91440" tIns="45720" rIns="91440" bIns="45720" numCol="1" spcCol="0" rtlCol="0" fromWordArt="0" anchor="ctr" anchorCtr="0" forceAA="0" compatLnSpc="1">
+                <a:prstTxWarp prst="textNoShape">
+                  <a:avLst/>
+                </a:prstTxWarp>
+                <a:noAutofit/>
+              </a:bodyPr>
+              <a:lstStyle/>
+              <a:p>
+                <a:endParaRPr lang="en-US"/>
+              </a:p>
+            </p:txBody>
+          </p:sp>
+        </p:grpSp>
+        <p:grpSp>
+          <p:nvGrpSpPr>
+            <p:cNvPr id="19" name="Group 18">
+              <a:extLst>
+                <a:ext uri="{FF2B5EF4-FFF2-40B4-BE49-F238E27FC236}">
+                  <a16:creationId xmlns:a16="http://schemas.microsoft.com/office/drawing/2014/main" id="{054A2394-9CE7-42EC-AE13-8B6968EB0EA2}"/>
+                </a:ext>
+              </a:extLst>
+            </p:cNvPr>
+            <p:cNvGrpSpPr/>
+            <p:nvPr/>
+          </p:nvGrpSpPr>
+          <p:grpSpPr>
+            <a:xfrm>
+              <a:off x="3557216" y="3064709"/>
+              <a:ext cx="711200" cy="203835"/>
+              <a:chOff x="3559387" y="2503170"/>
+              <a:chExt cx="711200" cy="203835"/>
+            </a:xfrm>
+          </p:grpSpPr>
+          <p:sp>
+            <p:nvSpPr>
+              <p:cNvPr id="31" name="Rectangle: Rounded Corners 30">
+                <a:extLst>
+                  <a:ext uri="{FF2B5EF4-FFF2-40B4-BE49-F238E27FC236}">
+                    <a16:creationId xmlns:a16="http://schemas.microsoft.com/office/drawing/2014/main" id="{F4E3F44E-C6C6-4A03-A532-EC486CFF9267}"/>
+                  </a:ext>
+                </a:extLst>
+              </p:cNvPr>
+              <p:cNvSpPr/>
+              <p:nvPr/>
+            </p:nvSpPr>
+            <p:spPr>
+              <a:xfrm>
+                <a:off x="3559387" y="2503170"/>
+                <a:ext cx="711200" cy="203835"/>
+              </a:xfrm>
+              <a:prstGeom prst="roundRect">
+                <a:avLst/>
+              </a:prstGeom>
+              <a:noFill/>
+              <a:ln>
+                <a:solidFill>
+                  <a:schemeClr val="tx1"/>
+                </a:solidFill>
+              </a:ln>
+            </p:spPr>
+            <p:style>
+              <a:lnRef idx="2">
+                <a:schemeClr val="accent1">
+                  <a:shade val="50000"/>
+                </a:schemeClr>
+              </a:lnRef>
+              <a:fillRef idx="1">
+                <a:schemeClr val="accent1"/>
+              </a:fillRef>
+              <a:effectRef idx="0">
+                <a:schemeClr val="accent1"/>
+              </a:effectRef>
+              <a:fontRef idx="minor">
+                <a:schemeClr val="lt1"/>
+              </a:fontRef>
+            </p:style>
+            <p:txBody>
+              <a:bodyPr rot="0" spcFirstLastPara="0" vert="horz" wrap="square" lIns="91440" tIns="45720" rIns="91440" bIns="45720" numCol="1" spcCol="0" rtlCol="0" fromWordArt="0" anchor="ctr" anchorCtr="0" forceAA="0" compatLnSpc="1">
+                <a:prstTxWarp prst="textNoShape">
+                  <a:avLst/>
+                </a:prstTxWarp>
+                <a:noAutofit/>
+              </a:bodyPr>
+              <a:lstStyle/>
+              <a:p>
+                <a:endParaRPr lang="en-US"/>
+              </a:p>
+            </p:txBody>
+          </p:sp>
+          <p:sp>
+            <p:nvSpPr>
+              <p:cNvPr id="32" name="Oval 31">
+                <a:extLst>
+                  <a:ext uri="{FF2B5EF4-FFF2-40B4-BE49-F238E27FC236}">
+                    <a16:creationId xmlns:a16="http://schemas.microsoft.com/office/drawing/2014/main" id="{919F45A9-62DA-43F6-9692-1079E106A342}"/>
+                  </a:ext>
+                </a:extLst>
+              </p:cNvPr>
+              <p:cNvSpPr/>
+              <p:nvPr/>
+            </p:nvSpPr>
+            <p:spPr>
+              <a:xfrm>
+                <a:off x="3640032" y="2545080"/>
+                <a:ext cx="134620" cy="128905"/>
+              </a:xfrm>
+              <a:prstGeom prst="ellipse">
+                <a:avLst/>
+              </a:prstGeom>
+              <a:solidFill>
+                <a:schemeClr val="accent1">
+                  <a:lumMod val="40000"/>
+                  <a:lumOff val="60000"/>
+                </a:schemeClr>
+              </a:solidFill>
+              <a:ln>
+                <a:solidFill>
+                  <a:schemeClr val="accent1">
+                    <a:lumMod val="60000"/>
+                    <a:lumOff val="40000"/>
+                  </a:schemeClr>
+                </a:solidFill>
+              </a:ln>
+            </p:spPr>
+            <p:style>
+              <a:lnRef idx="2">
+                <a:schemeClr val="accent1">
+                  <a:shade val="50000"/>
+                </a:schemeClr>
+              </a:lnRef>
+              <a:fillRef idx="1">
+                <a:schemeClr val="accent1"/>
+              </a:fillRef>
+              <a:effectRef idx="0">
+                <a:schemeClr val="accent1"/>
+              </a:effectRef>
+              <a:fontRef idx="minor">
+                <a:schemeClr val="lt1"/>
+              </a:fontRef>
+            </p:style>
+            <p:txBody>
+              <a:bodyPr rot="0" spcFirstLastPara="0" vert="horz" wrap="square" lIns="91440" tIns="45720" rIns="91440" bIns="45720" numCol="1" spcCol="0" rtlCol="0" fromWordArt="0" anchor="ctr" anchorCtr="0" forceAA="0" compatLnSpc="1">
+                <a:prstTxWarp prst="textNoShape">
+                  <a:avLst/>
+                </a:prstTxWarp>
+                <a:noAutofit/>
+              </a:bodyPr>
+              <a:lstStyle/>
+              <a:p>
+                <a:endParaRPr lang="en-US"/>
+              </a:p>
+            </p:txBody>
+          </p:sp>
+          <p:sp>
+            <p:nvSpPr>
+              <p:cNvPr id="33" name="Oval 32">
+                <a:extLst>
+                  <a:ext uri="{FF2B5EF4-FFF2-40B4-BE49-F238E27FC236}">
+                    <a16:creationId xmlns:a16="http://schemas.microsoft.com/office/drawing/2014/main" id="{F849C353-E91D-466F-812A-56B9EC03112B}"/>
+                  </a:ext>
+                </a:extLst>
+              </p:cNvPr>
+              <p:cNvSpPr/>
+              <p:nvPr/>
+            </p:nvSpPr>
+            <p:spPr>
+              <a:xfrm>
+                <a:off x="3851487" y="2545080"/>
+                <a:ext cx="134620" cy="128905"/>
+              </a:xfrm>
+              <a:prstGeom prst="ellipse">
+                <a:avLst/>
+              </a:prstGeom>
+              <a:solidFill>
+                <a:schemeClr val="accent1">
+                  <a:lumMod val="40000"/>
+                  <a:lumOff val="60000"/>
+                </a:schemeClr>
+              </a:solidFill>
+              <a:ln>
+                <a:solidFill>
+                  <a:schemeClr val="accent1">
+                    <a:lumMod val="60000"/>
+                    <a:lumOff val="40000"/>
+                  </a:schemeClr>
+                </a:solidFill>
+              </a:ln>
+            </p:spPr>
+            <p:style>
+              <a:lnRef idx="2">
+                <a:schemeClr val="accent1">
+                  <a:shade val="50000"/>
+                </a:schemeClr>
+              </a:lnRef>
+              <a:fillRef idx="1">
+                <a:schemeClr val="accent1"/>
+              </a:fillRef>
+              <a:effectRef idx="0">
+                <a:schemeClr val="accent1"/>
+              </a:effectRef>
+              <a:fontRef idx="minor">
+                <a:schemeClr val="lt1"/>
+              </a:fontRef>
+            </p:style>
+            <p:txBody>
+              <a:bodyPr rot="0" spcFirstLastPara="0" vert="horz" wrap="square" lIns="91440" tIns="45720" rIns="91440" bIns="45720" numCol="1" spcCol="0" rtlCol="0" fromWordArt="0" anchor="ctr" anchorCtr="0" forceAA="0" compatLnSpc="1">
+                <a:prstTxWarp prst="textNoShape">
+                  <a:avLst/>
+                </a:prstTxWarp>
+                <a:noAutofit/>
+              </a:bodyPr>
+              <a:lstStyle/>
+              <a:p>
+                <a:endParaRPr lang="en-US"/>
+              </a:p>
+            </p:txBody>
+          </p:sp>
+          <p:sp>
+            <p:nvSpPr>
+              <p:cNvPr id="34" name="Oval 33">
+                <a:extLst>
+                  <a:ext uri="{FF2B5EF4-FFF2-40B4-BE49-F238E27FC236}">
+                    <a16:creationId xmlns:a16="http://schemas.microsoft.com/office/drawing/2014/main" id="{058304BF-F614-425D-9E31-9FFE92132914}"/>
+                  </a:ext>
+                </a:extLst>
+              </p:cNvPr>
+              <p:cNvSpPr/>
+              <p:nvPr/>
+            </p:nvSpPr>
+            <p:spPr>
+              <a:xfrm>
+                <a:off x="4063577" y="2545080"/>
+                <a:ext cx="134620" cy="128905"/>
+              </a:xfrm>
+              <a:prstGeom prst="ellipse">
+                <a:avLst/>
+              </a:prstGeom>
+              <a:solidFill>
+                <a:schemeClr val="accent1">
+                  <a:lumMod val="40000"/>
+                  <a:lumOff val="60000"/>
+                </a:schemeClr>
+              </a:solidFill>
+              <a:ln>
+                <a:solidFill>
+                  <a:schemeClr val="accent1">
+                    <a:lumMod val="60000"/>
+                    <a:lumOff val="40000"/>
+                  </a:schemeClr>
+                </a:solidFill>
+              </a:ln>
+            </p:spPr>
+            <p:style>
+              <a:lnRef idx="2">
+                <a:schemeClr val="accent1">
+                  <a:shade val="50000"/>
+                </a:schemeClr>
+              </a:lnRef>
+              <a:fillRef idx="1">
+                <a:schemeClr val="accent1"/>
+              </a:fillRef>
+              <a:effectRef idx="0">
+                <a:schemeClr val="accent1"/>
+              </a:effectRef>
+              <a:fontRef idx="minor">
+                <a:schemeClr val="lt1"/>
+              </a:fontRef>
+            </p:style>
+            <p:txBody>
+              <a:bodyPr rot="0" spcFirstLastPara="0" vert="horz" wrap="square" lIns="91440" tIns="45720" rIns="91440" bIns="45720" numCol="1" spcCol="0" rtlCol="0" fromWordArt="0" anchor="ctr" anchorCtr="0" forceAA="0" compatLnSpc="1">
+                <a:prstTxWarp prst="textNoShape">
+                  <a:avLst/>
+                </a:prstTxWarp>
+                <a:noAutofit/>
+              </a:bodyPr>
+              <a:lstStyle/>
+              <a:p>
+                <a:endParaRPr lang="en-US"/>
+              </a:p>
+            </p:txBody>
+          </p:sp>
+        </p:grpSp>
+        <p:grpSp>
+          <p:nvGrpSpPr>
+            <p:cNvPr id="20" name="Group 19">
+              <a:extLst>
+                <a:ext uri="{FF2B5EF4-FFF2-40B4-BE49-F238E27FC236}">
+                  <a16:creationId xmlns:a16="http://schemas.microsoft.com/office/drawing/2014/main" id="{3B21855E-2D99-4F20-B840-ABBF921E1BFA}"/>
+                </a:ext>
+              </a:extLst>
+            </p:cNvPr>
+            <p:cNvGrpSpPr/>
+            <p:nvPr/>
+          </p:nvGrpSpPr>
+          <p:grpSpPr>
+            <a:xfrm>
+              <a:off x="3557216" y="3703411"/>
+              <a:ext cx="711200" cy="203835"/>
+              <a:chOff x="3559387" y="2503170"/>
+              <a:chExt cx="711200" cy="203835"/>
+            </a:xfrm>
+          </p:grpSpPr>
+          <p:sp>
+            <p:nvSpPr>
+              <p:cNvPr id="27" name="Rectangle: Rounded Corners 26">
+                <a:extLst>
+                  <a:ext uri="{FF2B5EF4-FFF2-40B4-BE49-F238E27FC236}">
+                    <a16:creationId xmlns:a16="http://schemas.microsoft.com/office/drawing/2014/main" id="{FDE632CF-3070-479E-8CF9-1DE690F0E0C6}"/>
+                  </a:ext>
+                </a:extLst>
+              </p:cNvPr>
+              <p:cNvSpPr/>
+              <p:nvPr/>
+            </p:nvSpPr>
+            <p:spPr>
+              <a:xfrm>
+                <a:off x="3559387" y="2503170"/>
+                <a:ext cx="711200" cy="203835"/>
+              </a:xfrm>
+              <a:prstGeom prst="roundRect">
+                <a:avLst/>
+              </a:prstGeom>
+              <a:noFill/>
+              <a:ln>
+                <a:solidFill>
+                  <a:schemeClr val="tx1"/>
+                </a:solidFill>
+              </a:ln>
+            </p:spPr>
+            <p:style>
+              <a:lnRef idx="2">
+                <a:schemeClr val="accent1">
+                  <a:shade val="50000"/>
+                </a:schemeClr>
+              </a:lnRef>
+              <a:fillRef idx="1">
+                <a:schemeClr val="accent1"/>
+              </a:fillRef>
+              <a:effectRef idx="0">
+                <a:schemeClr val="accent1"/>
+              </a:effectRef>
+              <a:fontRef idx="minor">
+                <a:schemeClr val="lt1"/>
+              </a:fontRef>
+            </p:style>
+            <p:txBody>
+              <a:bodyPr rot="0" spcFirstLastPara="0" vert="horz" wrap="square" lIns="91440" tIns="45720" rIns="91440" bIns="45720" numCol="1" spcCol="0" rtlCol="0" fromWordArt="0" anchor="ctr" anchorCtr="0" forceAA="0" compatLnSpc="1">
+                <a:prstTxWarp prst="textNoShape">
+                  <a:avLst/>
+                </a:prstTxWarp>
+                <a:noAutofit/>
+              </a:bodyPr>
+              <a:lstStyle/>
+              <a:p>
+                <a:endParaRPr lang="en-US"/>
+              </a:p>
+            </p:txBody>
+          </p:sp>
+          <p:sp>
+            <p:nvSpPr>
+              <p:cNvPr id="28" name="Oval 27">
+                <a:extLst>
+                  <a:ext uri="{FF2B5EF4-FFF2-40B4-BE49-F238E27FC236}">
+                    <a16:creationId xmlns:a16="http://schemas.microsoft.com/office/drawing/2014/main" id="{ECF3A2E3-D80B-4258-AE6A-04BEDE56C900}"/>
+                  </a:ext>
+                </a:extLst>
+              </p:cNvPr>
+              <p:cNvSpPr/>
+              <p:nvPr/>
+            </p:nvSpPr>
+            <p:spPr>
+              <a:xfrm>
+                <a:off x="3640032" y="2545080"/>
+                <a:ext cx="134620" cy="128905"/>
+              </a:xfrm>
+              <a:prstGeom prst="ellipse">
+                <a:avLst/>
+              </a:prstGeom>
+              <a:solidFill>
+                <a:schemeClr val="accent1">
+                  <a:lumMod val="40000"/>
+                  <a:lumOff val="60000"/>
+                </a:schemeClr>
+              </a:solidFill>
+              <a:ln>
+                <a:solidFill>
+                  <a:schemeClr val="accent1">
+                    <a:lumMod val="60000"/>
+                    <a:lumOff val="40000"/>
+                  </a:schemeClr>
+                </a:solidFill>
+              </a:ln>
+            </p:spPr>
+            <p:style>
+              <a:lnRef idx="2">
+                <a:schemeClr val="accent1">
+                  <a:shade val="50000"/>
+                </a:schemeClr>
+              </a:lnRef>
+              <a:fillRef idx="1">
+                <a:schemeClr val="accent1"/>
+              </a:fillRef>
+              <a:effectRef idx="0">
+                <a:schemeClr val="accent1"/>
+              </a:effectRef>
+              <a:fontRef idx="minor">
+                <a:schemeClr val="lt1"/>
+              </a:fontRef>
+            </p:style>
+            <p:txBody>
+              <a:bodyPr rot="0" spcFirstLastPara="0" vert="horz" wrap="square" lIns="91440" tIns="45720" rIns="91440" bIns="45720" numCol="1" spcCol="0" rtlCol="0" fromWordArt="0" anchor="ctr" anchorCtr="0" forceAA="0" compatLnSpc="1">
+                <a:prstTxWarp prst="textNoShape">
+                  <a:avLst/>
+                </a:prstTxWarp>
+                <a:noAutofit/>
+              </a:bodyPr>
+              <a:lstStyle/>
+              <a:p>
+                <a:endParaRPr lang="en-US"/>
+              </a:p>
+            </p:txBody>
+          </p:sp>
+          <p:sp>
+            <p:nvSpPr>
+              <p:cNvPr id="29" name="Oval 28">
+                <a:extLst>
+                  <a:ext uri="{FF2B5EF4-FFF2-40B4-BE49-F238E27FC236}">
+                    <a16:creationId xmlns:a16="http://schemas.microsoft.com/office/drawing/2014/main" id="{8B309E2B-0DAB-4F51-9B68-61A581BFE109}"/>
+                  </a:ext>
+                </a:extLst>
+              </p:cNvPr>
+              <p:cNvSpPr/>
+              <p:nvPr/>
+            </p:nvSpPr>
+            <p:spPr>
+              <a:xfrm>
+                <a:off x="3851487" y="2545080"/>
+                <a:ext cx="134620" cy="128905"/>
+              </a:xfrm>
+              <a:prstGeom prst="ellipse">
+                <a:avLst/>
+              </a:prstGeom>
+              <a:solidFill>
+                <a:schemeClr val="accent1">
+                  <a:lumMod val="40000"/>
+                  <a:lumOff val="60000"/>
+                </a:schemeClr>
+              </a:solidFill>
+              <a:ln>
+                <a:solidFill>
+                  <a:schemeClr val="accent1">
+                    <a:lumMod val="60000"/>
+                    <a:lumOff val="40000"/>
+                  </a:schemeClr>
+                </a:solidFill>
+              </a:ln>
+            </p:spPr>
+            <p:style>
+              <a:lnRef idx="2">
+                <a:schemeClr val="accent1">
+                  <a:shade val="50000"/>
+                </a:schemeClr>
+              </a:lnRef>
+              <a:fillRef idx="1">
+                <a:schemeClr val="accent1"/>
+              </a:fillRef>
+              <a:effectRef idx="0">
+                <a:schemeClr val="accent1"/>
+              </a:effectRef>
+              <a:fontRef idx="minor">
+                <a:schemeClr val="lt1"/>
+              </a:fontRef>
+            </p:style>
+            <p:txBody>
+              <a:bodyPr rot="0" spcFirstLastPara="0" vert="horz" wrap="square" lIns="91440" tIns="45720" rIns="91440" bIns="45720" numCol="1" spcCol="0" rtlCol="0" fromWordArt="0" anchor="ctr" anchorCtr="0" forceAA="0" compatLnSpc="1">
+                <a:prstTxWarp prst="textNoShape">
+                  <a:avLst/>
+                </a:prstTxWarp>
+                <a:noAutofit/>
+              </a:bodyPr>
+              <a:lstStyle/>
+              <a:p>
+                <a:endParaRPr lang="en-US"/>
+              </a:p>
+            </p:txBody>
+          </p:sp>
+          <p:sp>
+            <p:nvSpPr>
+              <p:cNvPr id="30" name="Oval 29">
+                <a:extLst>
+                  <a:ext uri="{FF2B5EF4-FFF2-40B4-BE49-F238E27FC236}">
+                    <a16:creationId xmlns:a16="http://schemas.microsoft.com/office/drawing/2014/main" id="{D3472EB9-90CE-4595-A36F-F03179F4D293}"/>
+                  </a:ext>
+                </a:extLst>
+              </p:cNvPr>
+              <p:cNvSpPr/>
+              <p:nvPr/>
+            </p:nvSpPr>
+            <p:spPr>
+              <a:xfrm>
+                <a:off x="4063577" y="2545080"/>
+                <a:ext cx="134620" cy="128905"/>
+              </a:xfrm>
+              <a:prstGeom prst="ellipse">
+                <a:avLst/>
+              </a:prstGeom>
+              <a:solidFill>
+                <a:schemeClr val="accent1">
+                  <a:lumMod val="40000"/>
+                  <a:lumOff val="60000"/>
+                </a:schemeClr>
+              </a:solidFill>
+              <a:ln>
+                <a:solidFill>
+                  <a:schemeClr val="accent1">
+                    <a:lumMod val="60000"/>
+                    <a:lumOff val="40000"/>
+                  </a:schemeClr>
+                </a:solidFill>
+              </a:ln>
+            </p:spPr>
+            <p:style>
+              <a:lnRef idx="2">
+                <a:schemeClr val="accent1">
+                  <a:shade val="50000"/>
+                </a:schemeClr>
+              </a:lnRef>
+              <a:fillRef idx="1">
+                <a:schemeClr val="accent1"/>
+              </a:fillRef>
+              <a:effectRef idx="0">
+                <a:schemeClr val="accent1"/>
+              </a:effectRef>
+              <a:fontRef idx="minor">
+                <a:schemeClr val="lt1"/>
+              </a:fontRef>
+            </p:style>
+            <p:txBody>
+              <a:bodyPr rot="0" spcFirstLastPara="0" vert="horz" wrap="square" lIns="91440" tIns="45720" rIns="91440" bIns="45720" numCol="1" spcCol="0" rtlCol="0" fromWordArt="0" anchor="ctr" anchorCtr="0" forceAA="0" compatLnSpc="1">
+                <a:prstTxWarp prst="textNoShape">
+                  <a:avLst/>
+                </a:prstTxWarp>
+                <a:noAutofit/>
+              </a:bodyPr>
+              <a:lstStyle/>
+              <a:p>
+                <a:endParaRPr lang="en-US"/>
+              </a:p>
+            </p:txBody>
+          </p:sp>
+        </p:grpSp>
+        <p:grpSp>
+          <p:nvGrpSpPr>
+            <p:cNvPr id="21" name="Group 20">
+              <a:extLst>
+                <a:ext uri="{FF2B5EF4-FFF2-40B4-BE49-F238E27FC236}">
+                  <a16:creationId xmlns:a16="http://schemas.microsoft.com/office/drawing/2014/main" id="{D3418411-5B78-4CC0-893D-288A5640BBF5}"/>
+                </a:ext>
+              </a:extLst>
+            </p:cNvPr>
+            <p:cNvGrpSpPr/>
+            <p:nvPr/>
+          </p:nvGrpSpPr>
+          <p:grpSpPr>
+            <a:xfrm>
+              <a:off x="3547425" y="4089057"/>
+              <a:ext cx="711200" cy="203835"/>
+              <a:chOff x="3559387" y="2503170"/>
+              <a:chExt cx="711200" cy="203835"/>
+            </a:xfrm>
+          </p:grpSpPr>
+          <p:sp>
+            <p:nvSpPr>
+              <p:cNvPr id="23" name="Rectangle: Rounded Corners 22">
+                <a:extLst>
+                  <a:ext uri="{FF2B5EF4-FFF2-40B4-BE49-F238E27FC236}">
+                    <a16:creationId xmlns:a16="http://schemas.microsoft.com/office/drawing/2014/main" id="{E810F0D5-3F31-4355-8304-C8E04942FA60}"/>
+                  </a:ext>
+                </a:extLst>
+              </p:cNvPr>
+              <p:cNvSpPr/>
+              <p:nvPr/>
+            </p:nvSpPr>
+            <p:spPr>
+              <a:xfrm>
+                <a:off x="3559387" y="2503170"/>
+                <a:ext cx="711200" cy="203835"/>
+              </a:xfrm>
+              <a:prstGeom prst="roundRect">
+                <a:avLst/>
+              </a:prstGeom>
+              <a:noFill/>
+              <a:ln>
+                <a:solidFill>
+                  <a:schemeClr val="tx1"/>
+                </a:solidFill>
+              </a:ln>
+            </p:spPr>
+            <p:style>
+              <a:lnRef idx="2">
+                <a:schemeClr val="accent1">
+                  <a:shade val="50000"/>
+                </a:schemeClr>
+              </a:lnRef>
+              <a:fillRef idx="1">
+                <a:schemeClr val="accent1"/>
+              </a:fillRef>
+              <a:effectRef idx="0">
+                <a:schemeClr val="accent1"/>
+              </a:effectRef>
+              <a:fontRef idx="minor">
+                <a:schemeClr val="lt1"/>
+              </a:fontRef>
+            </p:style>
+            <p:txBody>
+              <a:bodyPr rot="0" spcFirstLastPara="0" vert="horz" wrap="square" lIns="91440" tIns="45720" rIns="91440" bIns="45720" numCol="1" spcCol="0" rtlCol="0" fromWordArt="0" anchor="ctr" anchorCtr="0" forceAA="0" compatLnSpc="1">
+                <a:prstTxWarp prst="textNoShape">
+                  <a:avLst/>
+                </a:prstTxWarp>
+                <a:noAutofit/>
+              </a:bodyPr>
+              <a:lstStyle/>
+              <a:p>
+                <a:endParaRPr lang="en-US"/>
+              </a:p>
+            </p:txBody>
+          </p:sp>
+          <p:sp>
+            <p:nvSpPr>
+              <p:cNvPr id="24" name="Oval 23">
+                <a:extLst>
+                  <a:ext uri="{FF2B5EF4-FFF2-40B4-BE49-F238E27FC236}">
+                    <a16:creationId xmlns:a16="http://schemas.microsoft.com/office/drawing/2014/main" id="{DCD1460E-66B5-464D-B460-C2C0F91E48C2}"/>
+                  </a:ext>
+                </a:extLst>
+              </p:cNvPr>
+              <p:cNvSpPr/>
+              <p:nvPr/>
+            </p:nvSpPr>
+            <p:spPr>
+              <a:xfrm>
+                <a:off x="3640032" y="2545080"/>
+                <a:ext cx="134620" cy="128905"/>
+              </a:xfrm>
+              <a:prstGeom prst="ellipse">
+                <a:avLst/>
+              </a:prstGeom>
+              <a:solidFill>
+                <a:schemeClr val="accent1">
+                  <a:lumMod val="40000"/>
+                  <a:lumOff val="60000"/>
+                </a:schemeClr>
+              </a:solidFill>
+              <a:ln>
+                <a:solidFill>
+                  <a:schemeClr val="accent1">
+                    <a:lumMod val="60000"/>
+                    <a:lumOff val="40000"/>
+                  </a:schemeClr>
+                </a:solidFill>
+              </a:ln>
+            </p:spPr>
+            <p:style>
+              <a:lnRef idx="2">
+                <a:schemeClr val="accent1">
+                  <a:shade val="50000"/>
+                </a:schemeClr>
+              </a:lnRef>
+              <a:fillRef idx="1">
+                <a:schemeClr val="accent1"/>
+              </a:fillRef>
+              <a:effectRef idx="0">
+                <a:schemeClr val="accent1"/>
+              </a:effectRef>
+              <a:fontRef idx="minor">
+                <a:schemeClr val="lt1"/>
+              </a:fontRef>
+            </p:style>
+            <p:txBody>
+              <a:bodyPr rot="0" spcFirstLastPara="0" vert="horz" wrap="square" lIns="91440" tIns="45720" rIns="91440" bIns="45720" numCol="1" spcCol="0" rtlCol="0" fromWordArt="0" anchor="ctr" anchorCtr="0" forceAA="0" compatLnSpc="1">
+                <a:prstTxWarp prst="textNoShape">
+                  <a:avLst/>
+                </a:prstTxWarp>
+                <a:noAutofit/>
+              </a:bodyPr>
+              <a:lstStyle/>
+              <a:p>
+                <a:endParaRPr lang="en-US"/>
+              </a:p>
+            </p:txBody>
+          </p:sp>
+          <p:sp>
+            <p:nvSpPr>
+              <p:cNvPr id="25" name="Oval 24">
+                <a:extLst>
+                  <a:ext uri="{FF2B5EF4-FFF2-40B4-BE49-F238E27FC236}">
+                    <a16:creationId xmlns:a16="http://schemas.microsoft.com/office/drawing/2014/main" id="{75E5BE2C-3C34-459A-9245-1F0AF8BA4E93}"/>
+                  </a:ext>
+                </a:extLst>
+              </p:cNvPr>
+              <p:cNvSpPr/>
+              <p:nvPr/>
+            </p:nvSpPr>
+            <p:spPr>
+              <a:xfrm>
+                <a:off x="3851487" y="2545080"/>
+                <a:ext cx="134620" cy="128905"/>
+              </a:xfrm>
+              <a:prstGeom prst="ellipse">
+                <a:avLst/>
+              </a:prstGeom>
+              <a:solidFill>
+                <a:schemeClr val="accent1">
+                  <a:lumMod val="40000"/>
+                  <a:lumOff val="60000"/>
+                </a:schemeClr>
+              </a:solidFill>
+              <a:ln>
+                <a:solidFill>
+                  <a:schemeClr val="accent1">
+                    <a:lumMod val="60000"/>
+                    <a:lumOff val="40000"/>
+                  </a:schemeClr>
+                </a:solidFill>
+              </a:ln>
+            </p:spPr>
+            <p:style>
+              <a:lnRef idx="2">
+                <a:schemeClr val="accent1">
+                  <a:shade val="50000"/>
+                </a:schemeClr>
+              </a:lnRef>
+              <a:fillRef idx="1">
+                <a:schemeClr val="accent1"/>
+              </a:fillRef>
+              <a:effectRef idx="0">
+                <a:schemeClr val="accent1"/>
+              </a:effectRef>
+              <a:fontRef idx="minor">
+                <a:schemeClr val="lt1"/>
+              </a:fontRef>
+            </p:style>
+            <p:txBody>
+              <a:bodyPr rot="0" spcFirstLastPara="0" vert="horz" wrap="square" lIns="91440" tIns="45720" rIns="91440" bIns="45720" numCol="1" spcCol="0" rtlCol="0" fromWordArt="0" anchor="ctr" anchorCtr="0" forceAA="0" compatLnSpc="1">
+                <a:prstTxWarp prst="textNoShape">
+                  <a:avLst/>
+                </a:prstTxWarp>
+                <a:noAutofit/>
+              </a:bodyPr>
+              <a:lstStyle/>
+              <a:p>
+                <a:endParaRPr lang="en-US"/>
+              </a:p>
+            </p:txBody>
+          </p:sp>
+          <p:sp>
+            <p:nvSpPr>
+              <p:cNvPr id="26" name="Oval 25">
+                <a:extLst>
+                  <a:ext uri="{FF2B5EF4-FFF2-40B4-BE49-F238E27FC236}">
+                    <a16:creationId xmlns:a16="http://schemas.microsoft.com/office/drawing/2014/main" id="{EE5E03DA-8B06-4933-933A-650E8EEC5F96}"/>
+                  </a:ext>
+                </a:extLst>
+              </p:cNvPr>
+              <p:cNvSpPr/>
+              <p:nvPr/>
+            </p:nvSpPr>
+            <p:spPr>
+              <a:xfrm>
+                <a:off x="4063577" y="2545080"/>
+                <a:ext cx="134620" cy="128905"/>
+              </a:xfrm>
+              <a:prstGeom prst="ellipse">
+                <a:avLst/>
+              </a:prstGeom>
+              <a:solidFill>
+                <a:schemeClr val="accent1">
+                  <a:lumMod val="40000"/>
+                  <a:lumOff val="60000"/>
+                </a:schemeClr>
+              </a:solidFill>
+              <a:ln>
+                <a:solidFill>
+                  <a:schemeClr val="accent1">
+                    <a:lumMod val="60000"/>
+                    <a:lumOff val="40000"/>
+                  </a:schemeClr>
+                </a:solidFill>
+              </a:ln>
+            </p:spPr>
+            <p:style>
+              <a:lnRef idx="2">
+                <a:schemeClr val="accent1">
+                  <a:shade val="50000"/>
+                </a:schemeClr>
+              </a:lnRef>
+              <a:fillRef idx="1">
+                <a:schemeClr val="accent1"/>
+              </a:fillRef>
+              <a:effectRef idx="0">
+                <a:schemeClr val="accent1"/>
+              </a:effectRef>
+              <a:fontRef idx="minor">
+                <a:schemeClr val="lt1"/>
+              </a:fontRef>
+            </p:style>
+            <p:txBody>
+              <a:bodyPr rot="0" spcFirstLastPara="0" vert="horz" wrap="square" lIns="91440" tIns="45720" rIns="91440" bIns="45720" numCol="1" spcCol="0" rtlCol="0" fromWordArt="0" anchor="ctr" anchorCtr="0" forceAA="0" compatLnSpc="1">
+                <a:prstTxWarp prst="textNoShape">
+                  <a:avLst/>
+                </a:prstTxWarp>
+                <a:noAutofit/>
+              </a:bodyPr>
+              <a:lstStyle/>
+              <a:p>
+                <a:endParaRPr lang="en-US"/>
+              </a:p>
+            </p:txBody>
+          </p:sp>
+        </p:grpSp>
+        <p:sp>
+          <p:nvSpPr>
+            <p:cNvPr id="22" name="TextBox 21">
+              <a:extLst>
+                <a:ext uri="{FF2B5EF4-FFF2-40B4-BE49-F238E27FC236}">
+                  <a16:creationId xmlns:a16="http://schemas.microsoft.com/office/drawing/2014/main" id="{8F6839A9-5229-4F58-838D-C95D41B5F4AC}"/>
+                </a:ext>
+              </a:extLst>
+            </p:cNvPr>
+            <p:cNvSpPr txBox="1"/>
+            <p:nvPr/>
+          </p:nvSpPr>
+          <p:spPr>
+            <a:xfrm>
+              <a:off x="3748522" y="3243174"/>
+              <a:ext cx="343364" cy="369332"/>
+            </a:xfrm>
+            <a:prstGeom prst="rect">
+              <a:avLst/>
+            </a:prstGeom>
+            <a:noFill/>
+          </p:spPr>
+          <p:txBody>
+            <a:bodyPr wrap="none" rtlCol="0">
+              <a:spAutoFit/>
+            </a:bodyPr>
+            <a:lstStyle/>
+            <a:p>
+              <a:r>
+                <a:rPr lang="en-US" dirty="0"/>
+                <a:t>…</a:t>
+              </a:r>
+            </a:p>
+          </p:txBody>
+        </p:sp>
+      </p:grpSp>
+      <p:sp>
+        <p:nvSpPr>
+          <p:cNvPr id="40" name="TextBox 39">
+            <a:extLst>
+              <a:ext uri="{FF2B5EF4-FFF2-40B4-BE49-F238E27FC236}">
+                <a16:creationId xmlns:a16="http://schemas.microsoft.com/office/drawing/2014/main" id="{CA72FC33-55F1-4517-8F44-2EFAD7965AF8}"/>
+              </a:ext>
+            </a:extLst>
+          </p:cNvPr>
+          <p:cNvSpPr txBox="1"/>
+          <p:nvPr/>
+        </p:nvSpPr>
+        <p:spPr>
+          <a:xfrm>
+            <a:off x="3133717" y="1594384"/>
+            <a:ext cx="880305" cy="646331"/>
+          </a:xfrm>
+          <a:prstGeom prst="rect">
+            <a:avLst/>
+          </a:prstGeom>
+          <a:noFill/>
+        </p:spPr>
+        <p:txBody>
+          <a:bodyPr wrap="none" rtlCol="0">
+            <a:spAutoFit/>
+          </a:bodyPr>
+          <a:lstStyle/>
+          <a:p>
+            <a:pPr algn="ctr"/>
+            <a:r>
+              <a:rPr lang="en-US" dirty="0"/>
+              <a:t>Node</a:t>
+            </a:r>
+          </a:p>
+          <a:p>
+            <a:pPr algn="ctr"/>
+            <a:r>
+              <a:rPr lang="en-US" dirty="0"/>
+              <a:t>Vectors</a:t>
+            </a:r>
+          </a:p>
+        </p:txBody>
+      </p:sp>
+      <p:grpSp>
+        <p:nvGrpSpPr>
+          <p:cNvPr id="41" name="Group 40">
+            <a:extLst>
+              <a:ext uri="{FF2B5EF4-FFF2-40B4-BE49-F238E27FC236}">
+                <a16:creationId xmlns:a16="http://schemas.microsoft.com/office/drawing/2014/main" id="{1A6D8444-96A1-4906-86BF-AC0B1FA5D0BA}"/>
+              </a:ext>
+            </a:extLst>
+          </p:cNvPr>
+          <p:cNvGrpSpPr/>
+          <p:nvPr/>
+        </p:nvGrpSpPr>
+        <p:grpSpPr>
+          <a:xfrm>
+            <a:off x="4179127" y="3897019"/>
+            <a:ext cx="720991" cy="1610870"/>
+            <a:chOff x="3547425" y="2682022"/>
+            <a:chExt cx="720991" cy="1610870"/>
+          </a:xfrm>
+        </p:grpSpPr>
+        <p:grpSp>
+          <p:nvGrpSpPr>
+            <p:cNvPr id="42" name="Group 41">
+              <a:extLst>
+                <a:ext uri="{FF2B5EF4-FFF2-40B4-BE49-F238E27FC236}">
+                  <a16:creationId xmlns:a16="http://schemas.microsoft.com/office/drawing/2014/main" id="{BD3C18C7-AE62-41E0-9E07-F400938EDBD8}"/>
+                </a:ext>
+              </a:extLst>
+            </p:cNvPr>
+            <p:cNvGrpSpPr/>
+            <p:nvPr/>
+          </p:nvGrpSpPr>
+          <p:grpSpPr>
+            <a:xfrm>
+              <a:off x="3553406" y="2682022"/>
+              <a:ext cx="711200" cy="203835"/>
+              <a:chOff x="3559387" y="2503170"/>
+              <a:chExt cx="711200" cy="203835"/>
+            </a:xfrm>
+          </p:grpSpPr>
+          <p:sp>
+            <p:nvSpPr>
+              <p:cNvPr id="59" name="Rectangle: Rounded Corners 58">
+                <a:extLst>
+                  <a:ext uri="{FF2B5EF4-FFF2-40B4-BE49-F238E27FC236}">
+                    <a16:creationId xmlns:a16="http://schemas.microsoft.com/office/drawing/2014/main" id="{5A31863F-AC95-4FF6-AEE7-27B26AFF97DE}"/>
+                  </a:ext>
+                </a:extLst>
+              </p:cNvPr>
+              <p:cNvSpPr/>
+              <p:nvPr/>
+            </p:nvSpPr>
+            <p:spPr>
+              <a:xfrm>
+                <a:off x="3559387" y="2503170"/>
+                <a:ext cx="711200" cy="203835"/>
+              </a:xfrm>
+              <a:prstGeom prst="roundRect">
+                <a:avLst/>
+              </a:prstGeom>
+              <a:noFill/>
+              <a:ln>
+                <a:solidFill>
+                  <a:schemeClr val="tx1"/>
+                </a:solidFill>
+              </a:ln>
+            </p:spPr>
+            <p:style>
+              <a:lnRef idx="2">
+                <a:schemeClr val="accent1">
+                  <a:shade val="50000"/>
+                </a:schemeClr>
+              </a:lnRef>
+              <a:fillRef idx="1">
+                <a:schemeClr val="accent1"/>
+              </a:fillRef>
+              <a:effectRef idx="0">
+                <a:schemeClr val="accent1"/>
+              </a:effectRef>
+              <a:fontRef idx="minor">
+                <a:schemeClr val="lt1"/>
+              </a:fontRef>
+            </p:style>
+            <p:txBody>
+              <a:bodyPr rot="0" spcFirstLastPara="0" vert="horz" wrap="square" lIns="91440" tIns="45720" rIns="91440" bIns="45720" numCol="1" spcCol="0" rtlCol="0" fromWordArt="0" anchor="ctr" anchorCtr="0" forceAA="0" compatLnSpc="1">
+                <a:prstTxWarp prst="textNoShape">
+                  <a:avLst/>
+                </a:prstTxWarp>
+                <a:noAutofit/>
+              </a:bodyPr>
+              <a:lstStyle/>
+              <a:p>
+                <a:endParaRPr lang="en-US"/>
+              </a:p>
+            </p:txBody>
+          </p:sp>
+          <p:sp>
+            <p:nvSpPr>
+              <p:cNvPr id="60" name="Oval 59">
+                <a:extLst>
+                  <a:ext uri="{FF2B5EF4-FFF2-40B4-BE49-F238E27FC236}">
+                    <a16:creationId xmlns:a16="http://schemas.microsoft.com/office/drawing/2014/main" id="{A9C983F9-208B-411C-9AE4-E564A8B8B52A}"/>
+                  </a:ext>
+                </a:extLst>
+              </p:cNvPr>
+              <p:cNvSpPr/>
+              <p:nvPr/>
+            </p:nvSpPr>
+            <p:spPr>
+              <a:xfrm>
+                <a:off x="3640032" y="2545080"/>
+                <a:ext cx="134620" cy="128905"/>
+              </a:xfrm>
+              <a:prstGeom prst="ellipse">
+                <a:avLst/>
+              </a:prstGeom>
+              <a:solidFill>
+                <a:schemeClr val="accent2">
+                  <a:lumMod val="20000"/>
+                  <a:lumOff val="80000"/>
+                </a:schemeClr>
+              </a:solidFill>
+              <a:ln>
+                <a:solidFill>
+                  <a:schemeClr val="accent1">
+                    <a:lumMod val="60000"/>
+                    <a:lumOff val="40000"/>
+                  </a:schemeClr>
+                </a:solidFill>
+              </a:ln>
+            </p:spPr>
+            <p:style>
+              <a:lnRef idx="2">
+                <a:schemeClr val="accent1">
+                  <a:shade val="50000"/>
+                </a:schemeClr>
+              </a:lnRef>
+              <a:fillRef idx="1">
+                <a:schemeClr val="accent1"/>
+              </a:fillRef>
+              <a:effectRef idx="0">
+                <a:schemeClr val="accent1"/>
+              </a:effectRef>
+              <a:fontRef idx="minor">
+                <a:schemeClr val="lt1"/>
+              </a:fontRef>
+            </p:style>
+            <p:txBody>
+              <a:bodyPr rot="0" spcFirstLastPara="0" vert="horz" wrap="square" lIns="91440" tIns="45720" rIns="91440" bIns="45720" numCol="1" spcCol="0" rtlCol="0" fromWordArt="0" anchor="ctr" anchorCtr="0" forceAA="0" compatLnSpc="1">
+                <a:prstTxWarp prst="textNoShape">
+                  <a:avLst/>
+                </a:prstTxWarp>
+                <a:noAutofit/>
+              </a:bodyPr>
+              <a:lstStyle/>
+              <a:p>
+                <a:endParaRPr lang="en-US"/>
+              </a:p>
+            </p:txBody>
+          </p:sp>
+          <p:sp>
+            <p:nvSpPr>
+              <p:cNvPr id="61" name="Oval 60">
+                <a:extLst>
+                  <a:ext uri="{FF2B5EF4-FFF2-40B4-BE49-F238E27FC236}">
+                    <a16:creationId xmlns:a16="http://schemas.microsoft.com/office/drawing/2014/main" id="{DBEEB066-09E1-4AD5-B0C8-ACC81D7AF846}"/>
+                  </a:ext>
+                </a:extLst>
+              </p:cNvPr>
+              <p:cNvSpPr/>
+              <p:nvPr/>
+            </p:nvSpPr>
+            <p:spPr>
+              <a:xfrm>
+                <a:off x="3851487" y="2545080"/>
+                <a:ext cx="134620" cy="128905"/>
+              </a:xfrm>
+              <a:prstGeom prst="ellipse">
+                <a:avLst/>
+              </a:prstGeom>
+              <a:solidFill>
+                <a:schemeClr val="accent2">
+                  <a:lumMod val="20000"/>
+                  <a:lumOff val="80000"/>
+                </a:schemeClr>
+              </a:solidFill>
+              <a:ln>
+                <a:solidFill>
+                  <a:schemeClr val="accent1">
+                    <a:lumMod val="60000"/>
+                    <a:lumOff val="40000"/>
+                  </a:schemeClr>
+                </a:solidFill>
+              </a:ln>
+            </p:spPr>
+            <p:style>
+              <a:lnRef idx="2">
+                <a:schemeClr val="accent1">
+                  <a:shade val="50000"/>
+                </a:schemeClr>
+              </a:lnRef>
+              <a:fillRef idx="1">
+                <a:schemeClr val="accent1"/>
+              </a:fillRef>
+              <a:effectRef idx="0">
+                <a:schemeClr val="accent1"/>
+              </a:effectRef>
+              <a:fontRef idx="minor">
+                <a:schemeClr val="lt1"/>
+              </a:fontRef>
+            </p:style>
+            <p:txBody>
+              <a:bodyPr rot="0" spcFirstLastPara="0" vert="horz" wrap="square" lIns="91440" tIns="45720" rIns="91440" bIns="45720" numCol="1" spcCol="0" rtlCol="0" fromWordArt="0" anchor="ctr" anchorCtr="0" forceAA="0" compatLnSpc="1">
+                <a:prstTxWarp prst="textNoShape">
+                  <a:avLst/>
+                </a:prstTxWarp>
+                <a:noAutofit/>
+              </a:bodyPr>
+              <a:lstStyle/>
+              <a:p>
+                <a:endParaRPr lang="en-US"/>
+              </a:p>
+            </p:txBody>
+          </p:sp>
+          <p:sp>
+            <p:nvSpPr>
+              <p:cNvPr id="62" name="Oval 61">
+                <a:extLst>
+                  <a:ext uri="{FF2B5EF4-FFF2-40B4-BE49-F238E27FC236}">
+                    <a16:creationId xmlns:a16="http://schemas.microsoft.com/office/drawing/2014/main" id="{7ADB48A7-600D-427F-A638-4BBC9B52EBAD}"/>
+                  </a:ext>
+                </a:extLst>
+              </p:cNvPr>
+              <p:cNvSpPr/>
+              <p:nvPr/>
+            </p:nvSpPr>
+            <p:spPr>
+              <a:xfrm>
+                <a:off x="4063577" y="2545080"/>
+                <a:ext cx="134620" cy="128905"/>
+              </a:xfrm>
+              <a:prstGeom prst="ellipse">
+                <a:avLst/>
+              </a:prstGeom>
+              <a:solidFill>
+                <a:schemeClr val="accent2">
+                  <a:lumMod val="20000"/>
+                  <a:lumOff val="80000"/>
+                </a:schemeClr>
+              </a:solidFill>
+              <a:ln>
+                <a:solidFill>
+                  <a:schemeClr val="accent1">
+                    <a:lumMod val="60000"/>
+                    <a:lumOff val="40000"/>
+                  </a:schemeClr>
+                </a:solidFill>
+              </a:ln>
+            </p:spPr>
+            <p:style>
+              <a:lnRef idx="2">
+                <a:schemeClr val="accent1">
+                  <a:shade val="50000"/>
+                </a:schemeClr>
+              </a:lnRef>
+              <a:fillRef idx="1">
+                <a:schemeClr val="accent1"/>
+              </a:fillRef>
+              <a:effectRef idx="0">
+                <a:schemeClr val="accent1"/>
+              </a:effectRef>
+              <a:fontRef idx="minor">
+                <a:schemeClr val="lt1"/>
+              </a:fontRef>
+            </p:style>
+            <p:txBody>
+              <a:bodyPr rot="0" spcFirstLastPara="0" vert="horz" wrap="square" lIns="91440" tIns="45720" rIns="91440" bIns="45720" numCol="1" spcCol="0" rtlCol="0" fromWordArt="0" anchor="ctr" anchorCtr="0" forceAA="0" compatLnSpc="1">
+                <a:prstTxWarp prst="textNoShape">
+                  <a:avLst/>
+                </a:prstTxWarp>
+                <a:noAutofit/>
+              </a:bodyPr>
+              <a:lstStyle/>
+              <a:p>
+                <a:endParaRPr lang="en-US"/>
+              </a:p>
+            </p:txBody>
+          </p:sp>
+        </p:grpSp>
+        <p:grpSp>
+          <p:nvGrpSpPr>
+            <p:cNvPr id="43" name="Group 42">
+              <a:extLst>
+                <a:ext uri="{FF2B5EF4-FFF2-40B4-BE49-F238E27FC236}">
+                  <a16:creationId xmlns:a16="http://schemas.microsoft.com/office/drawing/2014/main" id="{4D692AFA-C4B7-4B43-8F6E-938183374ADB}"/>
+                </a:ext>
+              </a:extLst>
+            </p:cNvPr>
+            <p:cNvGrpSpPr/>
+            <p:nvPr/>
+          </p:nvGrpSpPr>
+          <p:grpSpPr>
+            <a:xfrm>
+              <a:off x="3557216" y="3064709"/>
+              <a:ext cx="711200" cy="203835"/>
+              <a:chOff x="3559387" y="2503170"/>
+              <a:chExt cx="711200" cy="203835"/>
+            </a:xfrm>
+          </p:grpSpPr>
+          <p:sp>
+            <p:nvSpPr>
+              <p:cNvPr id="55" name="Rectangle: Rounded Corners 54">
+                <a:extLst>
+                  <a:ext uri="{FF2B5EF4-FFF2-40B4-BE49-F238E27FC236}">
+                    <a16:creationId xmlns:a16="http://schemas.microsoft.com/office/drawing/2014/main" id="{FF6033CA-3114-43A2-84C2-59CC9E97A0EA}"/>
+                  </a:ext>
+                </a:extLst>
+              </p:cNvPr>
+              <p:cNvSpPr/>
+              <p:nvPr/>
+            </p:nvSpPr>
+            <p:spPr>
+              <a:xfrm>
+                <a:off x="3559387" y="2503170"/>
+                <a:ext cx="711200" cy="203835"/>
+              </a:xfrm>
+              <a:prstGeom prst="roundRect">
+                <a:avLst/>
+              </a:prstGeom>
+              <a:noFill/>
+              <a:ln>
+                <a:solidFill>
+                  <a:schemeClr val="tx1"/>
+                </a:solidFill>
+              </a:ln>
+            </p:spPr>
+            <p:style>
+              <a:lnRef idx="2">
+                <a:schemeClr val="accent1">
+                  <a:shade val="50000"/>
+                </a:schemeClr>
+              </a:lnRef>
+              <a:fillRef idx="1">
+                <a:schemeClr val="accent1"/>
+              </a:fillRef>
+              <a:effectRef idx="0">
+                <a:schemeClr val="accent1"/>
+              </a:effectRef>
+              <a:fontRef idx="minor">
+                <a:schemeClr val="lt1"/>
+              </a:fontRef>
+            </p:style>
+            <p:txBody>
+              <a:bodyPr rot="0" spcFirstLastPara="0" vert="horz" wrap="square" lIns="91440" tIns="45720" rIns="91440" bIns="45720" numCol="1" spcCol="0" rtlCol="0" fromWordArt="0" anchor="ctr" anchorCtr="0" forceAA="0" compatLnSpc="1">
+                <a:prstTxWarp prst="textNoShape">
+                  <a:avLst/>
+                </a:prstTxWarp>
+                <a:noAutofit/>
+              </a:bodyPr>
+              <a:lstStyle/>
+              <a:p>
+                <a:endParaRPr lang="en-US"/>
+              </a:p>
+            </p:txBody>
+          </p:sp>
+          <p:sp>
+            <p:nvSpPr>
+              <p:cNvPr id="56" name="Oval 55">
+                <a:extLst>
+                  <a:ext uri="{FF2B5EF4-FFF2-40B4-BE49-F238E27FC236}">
+                    <a16:creationId xmlns:a16="http://schemas.microsoft.com/office/drawing/2014/main" id="{DD974334-9BA3-47C2-8BB9-95AECAAE67E4}"/>
+                  </a:ext>
+                </a:extLst>
+              </p:cNvPr>
+              <p:cNvSpPr/>
+              <p:nvPr/>
+            </p:nvSpPr>
+            <p:spPr>
+              <a:xfrm>
+                <a:off x="3640032" y="2545080"/>
+                <a:ext cx="134620" cy="128905"/>
+              </a:xfrm>
+              <a:prstGeom prst="ellipse">
+                <a:avLst/>
+              </a:prstGeom>
+              <a:solidFill>
+                <a:schemeClr val="accent2">
+                  <a:lumMod val="20000"/>
+                  <a:lumOff val="80000"/>
+                </a:schemeClr>
+              </a:solidFill>
+              <a:ln>
+                <a:solidFill>
+                  <a:schemeClr val="accent1">
+                    <a:lumMod val="60000"/>
+                    <a:lumOff val="40000"/>
+                  </a:schemeClr>
+                </a:solidFill>
+              </a:ln>
+            </p:spPr>
+            <p:style>
+              <a:lnRef idx="2">
+                <a:schemeClr val="accent1">
+                  <a:shade val="50000"/>
+                </a:schemeClr>
+              </a:lnRef>
+              <a:fillRef idx="1">
+                <a:schemeClr val="accent1"/>
+              </a:fillRef>
+              <a:effectRef idx="0">
+                <a:schemeClr val="accent1"/>
+              </a:effectRef>
+              <a:fontRef idx="minor">
+                <a:schemeClr val="lt1"/>
+              </a:fontRef>
+            </p:style>
+            <p:txBody>
+              <a:bodyPr rot="0" spcFirstLastPara="0" vert="horz" wrap="square" lIns="91440" tIns="45720" rIns="91440" bIns="45720" numCol="1" spcCol="0" rtlCol="0" fromWordArt="0" anchor="ctr" anchorCtr="0" forceAA="0" compatLnSpc="1">
+                <a:prstTxWarp prst="textNoShape">
+                  <a:avLst/>
+                </a:prstTxWarp>
+                <a:noAutofit/>
+              </a:bodyPr>
+              <a:lstStyle/>
+              <a:p>
+                <a:endParaRPr lang="en-US"/>
+              </a:p>
+            </p:txBody>
+          </p:sp>
+          <p:sp>
+            <p:nvSpPr>
+              <p:cNvPr id="57" name="Oval 56">
+                <a:extLst>
+                  <a:ext uri="{FF2B5EF4-FFF2-40B4-BE49-F238E27FC236}">
+                    <a16:creationId xmlns:a16="http://schemas.microsoft.com/office/drawing/2014/main" id="{BCE8FA90-E3FF-4041-BBE0-5585613083F3}"/>
+                  </a:ext>
+                </a:extLst>
+              </p:cNvPr>
+              <p:cNvSpPr/>
+              <p:nvPr/>
+            </p:nvSpPr>
+            <p:spPr>
+              <a:xfrm>
+                <a:off x="3851487" y="2545080"/>
+                <a:ext cx="134620" cy="128905"/>
+              </a:xfrm>
+              <a:prstGeom prst="ellipse">
+                <a:avLst/>
+              </a:prstGeom>
+              <a:solidFill>
+                <a:schemeClr val="accent2">
+                  <a:lumMod val="20000"/>
+                  <a:lumOff val="80000"/>
+                </a:schemeClr>
+              </a:solidFill>
+              <a:ln>
+                <a:solidFill>
+                  <a:schemeClr val="accent1">
+                    <a:lumMod val="60000"/>
+                    <a:lumOff val="40000"/>
+                  </a:schemeClr>
+                </a:solidFill>
+              </a:ln>
+            </p:spPr>
+            <p:style>
+              <a:lnRef idx="2">
+                <a:schemeClr val="accent1">
+                  <a:shade val="50000"/>
+                </a:schemeClr>
+              </a:lnRef>
+              <a:fillRef idx="1">
+                <a:schemeClr val="accent1"/>
+              </a:fillRef>
+              <a:effectRef idx="0">
+                <a:schemeClr val="accent1"/>
+              </a:effectRef>
+              <a:fontRef idx="minor">
+                <a:schemeClr val="lt1"/>
+              </a:fontRef>
+            </p:style>
+            <p:txBody>
+              <a:bodyPr rot="0" spcFirstLastPara="0" vert="horz" wrap="square" lIns="91440" tIns="45720" rIns="91440" bIns="45720" numCol="1" spcCol="0" rtlCol="0" fromWordArt="0" anchor="ctr" anchorCtr="0" forceAA="0" compatLnSpc="1">
+                <a:prstTxWarp prst="textNoShape">
+                  <a:avLst/>
+                </a:prstTxWarp>
+                <a:noAutofit/>
+              </a:bodyPr>
+              <a:lstStyle/>
+              <a:p>
+                <a:endParaRPr lang="en-US"/>
+              </a:p>
+            </p:txBody>
+          </p:sp>
+          <p:sp>
+            <p:nvSpPr>
+              <p:cNvPr id="58" name="Oval 57">
+                <a:extLst>
+                  <a:ext uri="{FF2B5EF4-FFF2-40B4-BE49-F238E27FC236}">
+                    <a16:creationId xmlns:a16="http://schemas.microsoft.com/office/drawing/2014/main" id="{9DBD706C-F503-45CC-82A9-D7AD57F1F32E}"/>
+                  </a:ext>
+                </a:extLst>
+              </p:cNvPr>
+              <p:cNvSpPr/>
+              <p:nvPr/>
+            </p:nvSpPr>
+            <p:spPr>
+              <a:xfrm>
+                <a:off x="4063577" y="2545080"/>
+                <a:ext cx="134620" cy="128905"/>
+              </a:xfrm>
+              <a:prstGeom prst="ellipse">
+                <a:avLst/>
+              </a:prstGeom>
+              <a:solidFill>
+                <a:schemeClr val="accent2">
+                  <a:lumMod val="20000"/>
+                  <a:lumOff val="80000"/>
+                </a:schemeClr>
+              </a:solidFill>
+              <a:ln>
+                <a:solidFill>
+                  <a:schemeClr val="accent1">
+                    <a:lumMod val="60000"/>
+                    <a:lumOff val="40000"/>
+                  </a:schemeClr>
+                </a:solidFill>
+              </a:ln>
+            </p:spPr>
+            <p:style>
+              <a:lnRef idx="2">
+                <a:schemeClr val="accent1">
+                  <a:shade val="50000"/>
+                </a:schemeClr>
+              </a:lnRef>
+              <a:fillRef idx="1">
+                <a:schemeClr val="accent1"/>
+              </a:fillRef>
+              <a:effectRef idx="0">
+                <a:schemeClr val="accent1"/>
+              </a:effectRef>
+              <a:fontRef idx="minor">
+                <a:schemeClr val="lt1"/>
+              </a:fontRef>
+            </p:style>
+            <p:txBody>
+              <a:bodyPr rot="0" spcFirstLastPara="0" vert="horz" wrap="square" lIns="91440" tIns="45720" rIns="91440" bIns="45720" numCol="1" spcCol="0" rtlCol="0" fromWordArt="0" anchor="ctr" anchorCtr="0" forceAA="0" compatLnSpc="1">
+                <a:prstTxWarp prst="textNoShape">
+                  <a:avLst/>
+                </a:prstTxWarp>
+                <a:noAutofit/>
+              </a:bodyPr>
+              <a:lstStyle/>
+              <a:p>
+                <a:endParaRPr lang="en-US"/>
+              </a:p>
+            </p:txBody>
+          </p:sp>
+        </p:grpSp>
+        <p:grpSp>
+          <p:nvGrpSpPr>
+            <p:cNvPr id="44" name="Group 43">
+              <a:extLst>
+                <a:ext uri="{FF2B5EF4-FFF2-40B4-BE49-F238E27FC236}">
+                  <a16:creationId xmlns:a16="http://schemas.microsoft.com/office/drawing/2014/main" id="{271F6C86-74C6-49DD-8260-D98A8F2ABF5F}"/>
+                </a:ext>
+              </a:extLst>
+            </p:cNvPr>
+            <p:cNvGrpSpPr/>
+            <p:nvPr/>
+          </p:nvGrpSpPr>
+          <p:grpSpPr>
+            <a:xfrm>
+              <a:off x="3557216" y="3703411"/>
+              <a:ext cx="711200" cy="203835"/>
+              <a:chOff x="3559387" y="2503170"/>
+              <a:chExt cx="711200" cy="203835"/>
+            </a:xfrm>
+          </p:grpSpPr>
+          <p:sp>
+            <p:nvSpPr>
+              <p:cNvPr id="51" name="Rectangle: Rounded Corners 50">
+                <a:extLst>
+                  <a:ext uri="{FF2B5EF4-FFF2-40B4-BE49-F238E27FC236}">
+                    <a16:creationId xmlns:a16="http://schemas.microsoft.com/office/drawing/2014/main" id="{3D316C4A-B8B4-4D80-96E5-9E084920256E}"/>
+                  </a:ext>
+                </a:extLst>
+              </p:cNvPr>
+              <p:cNvSpPr/>
+              <p:nvPr/>
+            </p:nvSpPr>
+            <p:spPr>
+              <a:xfrm>
+                <a:off x="3559387" y="2503170"/>
+                <a:ext cx="711200" cy="203835"/>
+              </a:xfrm>
+              <a:prstGeom prst="roundRect">
+                <a:avLst/>
+              </a:prstGeom>
+              <a:noFill/>
+              <a:ln>
+                <a:solidFill>
+                  <a:schemeClr val="tx1"/>
+                </a:solidFill>
+              </a:ln>
+            </p:spPr>
+            <p:style>
+              <a:lnRef idx="2">
+                <a:schemeClr val="accent1">
+                  <a:shade val="50000"/>
+                </a:schemeClr>
+              </a:lnRef>
+              <a:fillRef idx="1">
+                <a:schemeClr val="accent1"/>
+              </a:fillRef>
+              <a:effectRef idx="0">
+                <a:schemeClr val="accent1"/>
+              </a:effectRef>
+              <a:fontRef idx="minor">
+                <a:schemeClr val="lt1"/>
+              </a:fontRef>
+            </p:style>
+            <p:txBody>
+              <a:bodyPr rot="0" spcFirstLastPara="0" vert="horz" wrap="square" lIns="91440" tIns="45720" rIns="91440" bIns="45720" numCol="1" spcCol="0" rtlCol="0" fromWordArt="0" anchor="ctr" anchorCtr="0" forceAA="0" compatLnSpc="1">
+                <a:prstTxWarp prst="textNoShape">
+                  <a:avLst/>
+                </a:prstTxWarp>
+                <a:noAutofit/>
+              </a:bodyPr>
+              <a:lstStyle/>
+              <a:p>
+                <a:endParaRPr lang="en-US"/>
+              </a:p>
+            </p:txBody>
+          </p:sp>
+          <p:sp>
+            <p:nvSpPr>
+              <p:cNvPr id="52" name="Oval 51">
+                <a:extLst>
+                  <a:ext uri="{FF2B5EF4-FFF2-40B4-BE49-F238E27FC236}">
+                    <a16:creationId xmlns:a16="http://schemas.microsoft.com/office/drawing/2014/main" id="{F48BDB00-F0C3-470C-9271-BEC864E2D8D2}"/>
+                  </a:ext>
+                </a:extLst>
+              </p:cNvPr>
+              <p:cNvSpPr/>
+              <p:nvPr/>
+            </p:nvSpPr>
+            <p:spPr>
+              <a:xfrm>
+                <a:off x="3640032" y="2545080"/>
+                <a:ext cx="134620" cy="128905"/>
+              </a:xfrm>
+              <a:prstGeom prst="ellipse">
+                <a:avLst/>
+              </a:prstGeom>
+              <a:solidFill>
+                <a:schemeClr val="accent2">
+                  <a:lumMod val="20000"/>
+                  <a:lumOff val="80000"/>
+                </a:schemeClr>
+              </a:solidFill>
+              <a:ln>
+                <a:solidFill>
+                  <a:schemeClr val="accent1">
+                    <a:lumMod val="60000"/>
+                    <a:lumOff val="40000"/>
+                  </a:schemeClr>
+                </a:solidFill>
+              </a:ln>
+            </p:spPr>
+            <p:style>
+              <a:lnRef idx="2">
+                <a:schemeClr val="accent1">
+                  <a:shade val="50000"/>
+                </a:schemeClr>
+              </a:lnRef>
+              <a:fillRef idx="1">
+                <a:schemeClr val="accent1"/>
+              </a:fillRef>
+              <a:effectRef idx="0">
+                <a:schemeClr val="accent1"/>
+              </a:effectRef>
+              <a:fontRef idx="minor">
+                <a:schemeClr val="lt1"/>
+              </a:fontRef>
+            </p:style>
+            <p:txBody>
+              <a:bodyPr rot="0" spcFirstLastPara="0" vert="horz" wrap="square" lIns="91440" tIns="45720" rIns="91440" bIns="45720" numCol="1" spcCol="0" rtlCol="0" fromWordArt="0" anchor="ctr" anchorCtr="0" forceAA="0" compatLnSpc="1">
+                <a:prstTxWarp prst="textNoShape">
+                  <a:avLst/>
+                </a:prstTxWarp>
+                <a:noAutofit/>
+              </a:bodyPr>
+              <a:lstStyle/>
+              <a:p>
+                <a:endParaRPr lang="en-US"/>
+              </a:p>
+            </p:txBody>
+          </p:sp>
+          <p:sp>
+            <p:nvSpPr>
+              <p:cNvPr id="53" name="Oval 52">
+                <a:extLst>
+                  <a:ext uri="{FF2B5EF4-FFF2-40B4-BE49-F238E27FC236}">
+                    <a16:creationId xmlns:a16="http://schemas.microsoft.com/office/drawing/2014/main" id="{ADE4811B-26E3-42FA-888D-9CE2FF253341}"/>
+                  </a:ext>
+                </a:extLst>
+              </p:cNvPr>
+              <p:cNvSpPr/>
+              <p:nvPr/>
+            </p:nvSpPr>
+            <p:spPr>
+              <a:xfrm>
+                <a:off x="3851487" y="2545080"/>
+                <a:ext cx="134620" cy="128905"/>
+              </a:xfrm>
+              <a:prstGeom prst="ellipse">
+                <a:avLst/>
+              </a:prstGeom>
+              <a:solidFill>
+                <a:schemeClr val="accent2">
+                  <a:lumMod val="20000"/>
+                  <a:lumOff val="80000"/>
+                </a:schemeClr>
+              </a:solidFill>
+              <a:ln>
+                <a:solidFill>
+                  <a:schemeClr val="accent1">
+                    <a:lumMod val="60000"/>
+                    <a:lumOff val="40000"/>
+                  </a:schemeClr>
+                </a:solidFill>
+              </a:ln>
+            </p:spPr>
+            <p:style>
+              <a:lnRef idx="2">
+                <a:schemeClr val="accent1">
+                  <a:shade val="50000"/>
+                </a:schemeClr>
+              </a:lnRef>
+              <a:fillRef idx="1">
+                <a:schemeClr val="accent1"/>
+              </a:fillRef>
+              <a:effectRef idx="0">
+                <a:schemeClr val="accent1"/>
+              </a:effectRef>
+              <a:fontRef idx="minor">
+                <a:schemeClr val="lt1"/>
+              </a:fontRef>
+            </p:style>
+            <p:txBody>
+              <a:bodyPr rot="0" spcFirstLastPara="0" vert="horz" wrap="square" lIns="91440" tIns="45720" rIns="91440" bIns="45720" numCol="1" spcCol="0" rtlCol="0" fromWordArt="0" anchor="ctr" anchorCtr="0" forceAA="0" compatLnSpc="1">
+                <a:prstTxWarp prst="textNoShape">
+                  <a:avLst/>
+                </a:prstTxWarp>
+                <a:noAutofit/>
+              </a:bodyPr>
+              <a:lstStyle/>
+              <a:p>
+                <a:endParaRPr lang="en-US"/>
+              </a:p>
+            </p:txBody>
+          </p:sp>
+          <p:sp>
+            <p:nvSpPr>
+              <p:cNvPr id="54" name="Oval 53">
+                <a:extLst>
+                  <a:ext uri="{FF2B5EF4-FFF2-40B4-BE49-F238E27FC236}">
+                    <a16:creationId xmlns:a16="http://schemas.microsoft.com/office/drawing/2014/main" id="{680CFE1D-9214-4619-BA82-11A636A07BA0}"/>
+                  </a:ext>
+                </a:extLst>
+              </p:cNvPr>
+              <p:cNvSpPr/>
+              <p:nvPr/>
+            </p:nvSpPr>
+            <p:spPr>
+              <a:xfrm>
+                <a:off x="4063577" y="2545080"/>
+                <a:ext cx="134620" cy="128905"/>
+              </a:xfrm>
+              <a:prstGeom prst="ellipse">
+                <a:avLst/>
+              </a:prstGeom>
+              <a:solidFill>
+                <a:schemeClr val="accent2">
+                  <a:lumMod val="20000"/>
+                  <a:lumOff val="80000"/>
+                </a:schemeClr>
+              </a:solidFill>
+              <a:ln>
+                <a:solidFill>
+                  <a:schemeClr val="accent1">
+                    <a:lumMod val="60000"/>
+                    <a:lumOff val="40000"/>
+                  </a:schemeClr>
+                </a:solidFill>
+              </a:ln>
+            </p:spPr>
+            <p:style>
+              <a:lnRef idx="2">
+                <a:schemeClr val="accent1">
+                  <a:shade val="50000"/>
+                </a:schemeClr>
+              </a:lnRef>
+              <a:fillRef idx="1">
+                <a:schemeClr val="accent1"/>
+              </a:fillRef>
+              <a:effectRef idx="0">
+                <a:schemeClr val="accent1"/>
+              </a:effectRef>
+              <a:fontRef idx="minor">
+                <a:schemeClr val="lt1"/>
+              </a:fontRef>
+            </p:style>
+            <p:txBody>
+              <a:bodyPr rot="0" spcFirstLastPara="0" vert="horz" wrap="square" lIns="91440" tIns="45720" rIns="91440" bIns="45720" numCol="1" spcCol="0" rtlCol="0" fromWordArt="0" anchor="ctr" anchorCtr="0" forceAA="0" compatLnSpc="1">
+                <a:prstTxWarp prst="textNoShape">
+                  <a:avLst/>
+                </a:prstTxWarp>
+                <a:noAutofit/>
+              </a:bodyPr>
+              <a:lstStyle/>
+              <a:p>
+                <a:endParaRPr lang="en-US"/>
+              </a:p>
+            </p:txBody>
+          </p:sp>
+        </p:grpSp>
+        <p:grpSp>
+          <p:nvGrpSpPr>
+            <p:cNvPr id="45" name="Group 44">
+              <a:extLst>
+                <a:ext uri="{FF2B5EF4-FFF2-40B4-BE49-F238E27FC236}">
+                  <a16:creationId xmlns:a16="http://schemas.microsoft.com/office/drawing/2014/main" id="{FA4826E6-25FD-49E2-BC94-D48069C2551D}"/>
+                </a:ext>
+              </a:extLst>
+            </p:cNvPr>
+            <p:cNvGrpSpPr/>
+            <p:nvPr/>
+          </p:nvGrpSpPr>
+          <p:grpSpPr>
+            <a:xfrm>
+              <a:off x="3547425" y="4089057"/>
+              <a:ext cx="711200" cy="203835"/>
+              <a:chOff x="3559387" y="2503170"/>
+              <a:chExt cx="711200" cy="203835"/>
+            </a:xfrm>
+          </p:grpSpPr>
+          <p:sp>
+            <p:nvSpPr>
+              <p:cNvPr id="47" name="Rectangle: Rounded Corners 46">
+                <a:extLst>
+                  <a:ext uri="{FF2B5EF4-FFF2-40B4-BE49-F238E27FC236}">
+                    <a16:creationId xmlns:a16="http://schemas.microsoft.com/office/drawing/2014/main" id="{67E404A8-E6F1-40AD-922C-5B0290EF76DB}"/>
+                  </a:ext>
+                </a:extLst>
+              </p:cNvPr>
+              <p:cNvSpPr/>
+              <p:nvPr/>
+            </p:nvSpPr>
+            <p:spPr>
+              <a:xfrm>
+                <a:off x="3559387" y="2503170"/>
+                <a:ext cx="711200" cy="203835"/>
+              </a:xfrm>
+              <a:prstGeom prst="roundRect">
+                <a:avLst/>
+              </a:prstGeom>
+              <a:noFill/>
+              <a:ln>
+                <a:solidFill>
+                  <a:schemeClr val="tx1"/>
+                </a:solidFill>
+              </a:ln>
+            </p:spPr>
+            <p:style>
+              <a:lnRef idx="2">
+                <a:schemeClr val="accent1">
+                  <a:shade val="50000"/>
+                </a:schemeClr>
+              </a:lnRef>
+              <a:fillRef idx="1">
+                <a:schemeClr val="accent1"/>
+              </a:fillRef>
+              <a:effectRef idx="0">
+                <a:schemeClr val="accent1"/>
+              </a:effectRef>
+              <a:fontRef idx="minor">
+                <a:schemeClr val="lt1"/>
+              </a:fontRef>
+            </p:style>
+            <p:txBody>
+              <a:bodyPr rot="0" spcFirstLastPara="0" vert="horz" wrap="square" lIns="91440" tIns="45720" rIns="91440" bIns="45720" numCol="1" spcCol="0" rtlCol="0" fromWordArt="0" anchor="ctr" anchorCtr="0" forceAA="0" compatLnSpc="1">
+                <a:prstTxWarp prst="textNoShape">
+                  <a:avLst/>
+                </a:prstTxWarp>
+                <a:noAutofit/>
+              </a:bodyPr>
+              <a:lstStyle/>
+              <a:p>
+                <a:endParaRPr lang="en-US"/>
+              </a:p>
+            </p:txBody>
+          </p:sp>
+          <p:sp>
+            <p:nvSpPr>
+              <p:cNvPr id="48" name="Oval 47">
+                <a:extLst>
+                  <a:ext uri="{FF2B5EF4-FFF2-40B4-BE49-F238E27FC236}">
+                    <a16:creationId xmlns:a16="http://schemas.microsoft.com/office/drawing/2014/main" id="{24290721-4BB0-4F5E-8017-2667E7D6E4C8}"/>
+                  </a:ext>
+                </a:extLst>
+              </p:cNvPr>
+              <p:cNvSpPr/>
+              <p:nvPr/>
+            </p:nvSpPr>
+            <p:spPr>
+              <a:xfrm>
+                <a:off x="3640032" y="2545080"/>
+                <a:ext cx="134620" cy="128905"/>
+              </a:xfrm>
+              <a:prstGeom prst="ellipse">
+                <a:avLst/>
+              </a:prstGeom>
+              <a:solidFill>
+                <a:schemeClr val="accent2">
+                  <a:lumMod val="20000"/>
+                  <a:lumOff val="80000"/>
+                </a:schemeClr>
+              </a:solidFill>
+              <a:ln>
+                <a:solidFill>
+                  <a:schemeClr val="accent1">
+                    <a:lumMod val="60000"/>
+                    <a:lumOff val="40000"/>
+                  </a:schemeClr>
+                </a:solidFill>
+              </a:ln>
+            </p:spPr>
+            <p:style>
+              <a:lnRef idx="2">
+                <a:schemeClr val="accent1">
+                  <a:shade val="50000"/>
+                </a:schemeClr>
+              </a:lnRef>
+              <a:fillRef idx="1">
+                <a:schemeClr val="accent1"/>
+              </a:fillRef>
+              <a:effectRef idx="0">
+                <a:schemeClr val="accent1"/>
+              </a:effectRef>
+              <a:fontRef idx="minor">
+                <a:schemeClr val="lt1"/>
+              </a:fontRef>
+            </p:style>
+            <p:txBody>
+              <a:bodyPr rot="0" spcFirstLastPara="0" vert="horz" wrap="square" lIns="91440" tIns="45720" rIns="91440" bIns="45720" numCol="1" spcCol="0" rtlCol="0" fromWordArt="0" anchor="ctr" anchorCtr="0" forceAA="0" compatLnSpc="1">
+                <a:prstTxWarp prst="textNoShape">
+                  <a:avLst/>
+                </a:prstTxWarp>
+                <a:noAutofit/>
+              </a:bodyPr>
+              <a:lstStyle/>
+              <a:p>
+                <a:endParaRPr lang="en-US"/>
+              </a:p>
+            </p:txBody>
+          </p:sp>
+          <p:sp>
+            <p:nvSpPr>
+              <p:cNvPr id="49" name="Oval 48">
+                <a:extLst>
+                  <a:ext uri="{FF2B5EF4-FFF2-40B4-BE49-F238E27FC236}">
+                    <a16:creationId xmlns:a16="http://schemas.microsoft.com/office/drawing/2014/main" id="{BE5B4187-A07D-4D88-B8A7-804FE3231BAF}"/>
+                  </a:ext>
+                </a:extLst>
+              </p:cNvPr>
+              <p:cNvSpPr/>
+              <p:nvPr/>
+            </p:nvSpPr>
+            <p:spPr>
+              <a:xfrm>
+                <a:off x="3851487" y="2545080"/>
+                <a:ext cx="134620" cy="128905"/>
+              </a:xfrm>
+              <a:prstGeom prst="ellipse">
+                <a:avLst/>
+              </a:prstGeom>
+              <a:solidFill>
+                <a:schemeClr val="accent2">
+                  <a:lumMod val="20000"/>
+                  <a:lumOff val="80000"/>
+                </a:schemeClr>
+              </a:solidFill>
+              <a:ln>
+                <a:solidFill>
+                  <a:schemeClr val="accent1">
+                    <a:lumMod val="60000"/>
+                    <a:lumOff val="40000"/>
+                  </a:schemeClr>
+                </a:solidFill>
+              </a:ln>
+            </p:spPr>
+            <p:style>
+              <a:lnRef idx="2">
+                <a:schemeClr val="accent1">
+                  <a:shade val="50000"/>
+                </a:schemeClr>
+              </a:lnRef>
+              <a:fillRef idx="1">
+                <a:schemeClr val="accent1"/>
+              </a:fillRef>
+              <a:effectRef idx="0">
+                <a:schemeClr val="accent1"/>
+              </a:effectRef>
+              <a:fontRef idx="minor">
+                <a:schemeClr val="lt1"/>
+              </a:fontRef>
+            </p:style>
+            <p:txBody>
+              <a:bodyPr rot="0" spcFirstLastPara="0" vert="horz" wrap="square" lIns="91440" tIns="45720" rIns="91440" bIns="45720" numCol="1" spcCol="0" rtlCol="0" fromWordArt="0" anchor="ctr" anchorCtr="0" forceAA="0" compatLnSpc="1">
+                <a:prstTxWarp prst="textNoShape">
+                  <a:avLst/>
+                </a:prstTxWarp>
+                <a:noAutofit/>
+              </a:bodyPr>
+              <a:lstStyle/>
+              <a:p>
+                <a:endParaRPr lang="en-US"/>
+              </a:p>
+            </p:txBody>
+          </p:sp>
+          <p:sp>
+            <p:nvSpPr>
+              <p:cNvPr id="50" name="Oval 49">
+                <a:extLst>
+                  <a:ext uri="{FF2B5EF4-FFF2-40B4-BE49-F238E27FC236}">
+                    <a16:creationId xmlns:a16="http://schemas.microsoft.com/office/drawing/2014/main" id="{327E4A96-80C6-40AD-9F0B-801F6B2FF711}"/>
+                  </a:ext>
+                </a:extLst>
+              </p:cNvPr>
+              <p:cNvSpPr/>
+              <p:nvPr/>
+            </p:nvSpPr>
+            <p:spPr>
+              <a:xfrm>
+                <a:off x="4063577" y="2545080"/>
+                <a:ext cx="134620" cy="128905"/>
+              </a:xfrm>
+              <a:prstGeom prst="ellipse">
+                <a:avLst/>
+              </a:prstGeom>
+              <a:solidFill>
+                <a:schemeClr val="accent2">
+                  <a:lumMod val="20000"/>
+                  <a:lumOff val="80000"/>
+                </a:schemeClr>
+              </a:solidFill>
+              <a:ln>
+                <a:solidFill>
+                  <a:schemeClr val="accent1">
+                    <a:lumMod val="60000"/>
+                    <a:lumOff val="40000"/>
+                  </a:schemeClr>
+                </a:solidFill>
+              </a:ln>
+            </p:spPr>
+            <p:style>
+              <a:lnRef idx="2">
+                <a:schemeClr val="accent1">
+                  <a:shade val="50000"/>
+                </a:schemeClr>
+              </a:lnRef>
+              <a:fillRef idx="1">
+                <a:schemeClr val="accent1"/>
+              </a:fillRef>
+              <a:effectRef idx="0">
+                <a:schemeClr val="accent1"/>
+              </a:effectRef>
+              <a:fontRef idx="minor">
+                <a:schemeClr val="lt1"/>
+              </a:fontRef>
+            </p:style>
+            <p:txBody>
+              <a:bodyPr rot="0" spcFirstLastPara="0" vert="horz" wrap="square" lIns="91440" tIns="45720" rIns="91440" bIns="45720" numCol="1" spcCol="0" rtlCol="0" fromWordArt="0" anchor="ctr" anchorCtr="0" forceAA="0" compatLnSpc="1">
+                <a:prstTxWarp prst="textNoShape">
+                  <a:avLst/>
+                </a:prstTxWarp>
+                <a:noAutofit/>
+              </a:bodyPr>
+              <a:lstStyle/>
+              <a:p>
+                <a:endParaRPr lang="en-US"/>
+              </a:p>
+            </p:txBody>
+          </p:sp>
+        </p:grpSp>
+        <p:sp>
+          <p:nvSpPr>
+            <p:cNvPr id="46" name="TextBox 45">
+              <a:extLst>
+                <a:ext uri="{FF2B5EF4-FFF2-40B4-BE49-F238E27FC236}">
+                  <a16:creationId xmlns:a16="http://schemas.microsoft.com/office/drawing/2014/main" id="{FCDAE5D3-0FE4-495B-9E28-03161F358F18}"/>
+                </a:ext>
+              </a:extLst>
+            </p:cNvPr>
+            <p:cNvSpPr txBox="1"/>
+            <p:nvPr/>
+          </p:nvSpPr>
+          <p:spPr>
+            <a:xfrm>
+              <a:off x="3748522" y="3243174"/>
+              <a:ext cx="343364" cy="369332"/>
+            </a:xfrm>
+            <a:prstGeom prst="rect">
+              <a:avLst/>
+            </a:prstGeom>
+            <a:noFill/>
+          </p:spPr>
+          <p:txBody>
+            <a:bodyPr wrap="none" rtlCol="0">
+              <a:spAutoFit/>
+            </a:bodyPr>
+            <a:lstStyle/>
+            <a:p>
+              <a:r>
+                <a:rPr lang="en-US" dirty="0"/>
+                <a:t>…</a:t>
+              </a:r>
+            </a:p>
+          </p:txBody>
+        </p:sp>
+      </p:grpSp>
+      <p:sp>
+        <p:nvSpPr>
+          <p:cNvPr id="85" name="TextBox 84">
+            <a:extLst>
+              <a:ext uri="{FF2B5EF4-FFF2-40B4-BE49-F238E27FC236}">
+                <a16:creationId xmlns:a16="http://schemas.microsoft.com/office/drawing/2014/main" id="{BDF2BD93-5BFD-441E-8718-BEEC9608E8FE}"/>
+              </a:ext>
+            </a:extLst>
+          </p:cNvPr>
+          <p:cNvSpPr txBox="1"/>
+          <p:nvPr/>
+        </p:nvSpPr>
+        <p:spPr>
+          <a:xfrm>
+            <a:off x="2446480" y="4585303"/>
+            <a:ext cx="1686166" cy="923330"/>
+          </a:xfrm>
+          <a:prstGeom prst="rect">
+            <a:avLst/>
+          </a:prstGeom>
+          <a:noFill/>
+        </p:spPr>
+        <p:txBody>
+          <a:bodyPr wrap="none" rtlCol="0">
+            <a:spAutoFit/>
+          </a:bodyPr>
+          <a:lstStyle/>
+          <a:p>
+            <a:pPr algn="ctr"/>
+            <a:r>
+              <a:rPr lang="en-US" dirty="0"/>
+              <a:t>Missing-Feature</a:t>
+            </a:r>
+          </a:p>
+          <a:p>
+            <a:pPr algn="ctr"/>
+            <a:r>
+              <a:rPr lang="en-US" dirty="0"/>
+              <a:t>Representation</a:t>
+            </a:r>
+          </a:p>
+          <a:p>
+            <a:pPr algn="ctr"/>
+            <a:r>
+              <a:rPr lang="en-US" dirty="0"/>
+              <a:t>Vectors</a:t>
+            </a:r>
+          </a:p>
+        </p:txBody>
+      </p:sp>
+      <p:sp>
+        <p:nvSpPr>
+          <p:cNvPr id="86" name="TextBox 85">
+            <a:extLst>
+              <a:ext uri="{FF2B5EF4-FFF2-40B4-BE49-F238E27FC236}">
+                <a16:creationId xmlns:a16="http://schemas.microsoft.com/office/drawing/2014/main" id="{D71AEBFD-B11C-41DD-8B4A-6417C6555484}"/>
+              </a:ext>
+            </a:extLst>
+          </p:cNvPr>
+          <p:cNvSpPr txBox="1"/>
+          <p:nvPr/>
+        </p:nvSpPr>
+        <p:spPr>
+          <a:xfrm>
+            <a:off x="5131729" y="1594384"/>
+            <a:ext cx="1928541" cy="646331"/>
+          </a:xfrm>
+          <a:prstGeom prst="rect">
+            <a:avLst/>
+          </a:prstGeom>
+          <a:noFill/>
+        </p:spPr>
+        <p:txBody>
+          <a:bodyPr wrap="square" rtlCol="0">
+            <a:spAutoFit/>
+          </a:bodyPr>
+          <a:lstStyle/>
+          <a:p>
+            <a:pPr algn="ctr"/>
+            <a:r>
+              <a:rPr lang="en-US" dirty="0"/>
+              <a:t>To Variable Type </a:t>
+            </a:r>
+          </a:p>
+          <a:p>
+            <a:pPr algn="ctr"/>
+            <a:r>
+              <a:rPr lang="en-US" dirty="0"/>
+              <a:t>Generation Model</a:t>
+            </a:r>
+          </a:p>
+        </p:txBody>
+      </p:sp>
+      <p:sp>
+        <p:nvSpPr>
+          <p:cNvPr id="87" name="Rectangle 86">
+            <a:extLst>
+              <a:ext uri="{FF2B5EF4-FFF2-40B4-BE49-F238E27FC236}">
+                <a16:creationId xmlns:a16="http://schemas.microsoft.com/office/drawing/2014/main" id="{4AE1CADC-9F95-4EE8-B45F-F6DBF0EDD59A}"/>
+              </a:ext>
+            </a:extLst>
+          </p:cNvPr>
+          <p:cNvSpPr/>
+          <p:nvPr/>
+        </p:nvSpPr>
+        <p:spPr>
+          <a:xfrm>
+            <a:off x="5457150" y="3928424"/>
+            <a:ext cx="436326" cy="1610870"/>
+          </a:xfrm>
+          <a:prstGeom prst="rect">
+            <a:avLst/>
+          </a:prstGeom>
+          <a:ln/>
+          <a:effectLst>
+            <a:outerShdw blurRad="50800" dist="38100" dir="2700000" algn="tl" rotWithShape="0">
+              <a:prstClr val="black">
+                <a:alpha val="40000"/>
+              </a:prstClr>
+            </a:outerShdw>
+          </a:effectLst>
+        </p:spPr>
+        <p:style>
+          <a:lnRef idx="1">
+            <a:schemeClr val="accent6"/>
+          </a:lnRef>
+          <a:fillRef idx="2">
+            <a:schemeClr val="accent6"/>
+          </a:fillRef>
+          <a:effectRef idx="1">
+            <a:schemeClr val="accent6"/>
+          </a:effectRef>
+          <a:fontRef idx="minor">
+            <a:schemeClr val="dk1"/>
+          </a:fontRef>
+        </p:style>
+        <p:txBody>
+          <a:bodyPr rtlCol="0" anchor="ctr"/>
+          <a:lstStyle/>
+          <a:p>
+            <a:pPr algn="ctr"/>
+            <a:endParaRPr lang="en-US" dirty="0"/>
+          </a:p>
+        </p:txBody>
+      </p:sp>
+      <p:sp>
+        <p:nvSpPr>
+          <p:cNvPr id="88" name="TextBox 87">
+            <a:extLst>
+              <a:ext uri="{FF2B5EF4-FFF2-40B4-BE49-F238E27FC236}">
+                <a16:creationId xmlns:a16="http://schemas.microsoft.com/office/drawing/2014/main" id="{ED95EFEE-5C76-4437-A99D-78570D13E300}"/>
+              </a:ext>
+            </a:extLst>
+          </p:cNvPr>
+          <p:cNvSpPr txBox="1"/>
+          <p:nvPr/>
+        </p:nvSpPr>
+        <p:spPr>
+          <a:xfrm>
+            <a:off x="5174268" y="3209694"/>
+            <a:ext cx="977832" cy="646331"/>
+          </a:xfrm>
+          <a:prstGeom prst="rect">
+            <a:avLst/>
+          </a:prstGeom>
+          <a:noFill/>
+        </p:spPr>
+        <p:txBody>
+          <a:bodyPr wrap="none" rtlCol="0">
+            <a:spAutoFit/>
+          </a:bodyPr>
+          <a:lstStyle/>
+          <a:p>
+            <a:pPr algn="ctr"/>
+            <a:r>
+              <a:rPr lang="en-US" dirty="0"/>
+              <a:t>GRU</a:t>
+            </a:r>
+          </a:p>
+          <a:p>
+            <a:pPr algn="ctr"/>
+            <a:r>
+              <a:rPr lang="en-US" dirty="0"/>
+              <a:t>Decoder</a:t>
+            </a:r>
+          </a:p>
+        </p:txBody>
+      </p:sp>
+      <p:sp>
+        <p:nvSpPr>
+          <p:cNvPr id="89" name="Rectangle 88">
+            <a:extLst>
+              <a:ext uri="{FF2B5EF4-FFF2-40B4-BE49-F238E27FC236}">
+                <a16:creationId xmlns:a16="http://schemas.microsoft.com/office/drawing/2014/main" id="{B3ABC764-9F6C-4CB9-8282-9F6946E932B4}"/>
+              </a:ext>
+            </a:extLst>
+          </p:cNvPr>
+          <p:cNvSpPr/>
+          <p:nvPr/>
+        </p:nvSpPr>
+        <p:spPr>
+          <a:xfrm>
+            <a:off x="6623944" y="3928424"/>
+            <a:ext cx="436326" cy="1610870"/>
+          </a:xfrm>
+          <a:prstGeom prst="rect">
+            <a:avLst/>
+          </a:prstGeom>
+          <a:solidFill>
+            <a:schemeClr val="accent5">
+              <a:lumMod val="20000"/>
+              <a:lumOff val="80000"/>
+            </a:schemeClr>
+          </a:solidFill>
+          <a:ln>
+            <a:solidFill>
+              <a:srgbClr val="0070C0"/>
+            </a:solidFill>
+          </a:ln>
+        </p:spPr>
+        <p:style>
+          <a:lnRef idx="2">
+            <a:schemeClr val="accent1">
+              <a:shade val="50000"/>
+            </a:schemeClr>
+          </a:lnRef>
+          <a:fillRef idx="1">
+            <a:schemeClr val="accent1"/>
+          </a:fillRef>
+          <a:effectRef idx="0">
+            <a:schemeClr val="accent1"/>
+          </a:effectRef>
+          <a:fontRef idx="minor">
+            <a:schemeClr val="lt1"/>
+          </a:fontRef>
+        </p:style>
+        <p:txBody>
+          <a:bodyPr rtlCol="0" anchor="ctr"/>
+          <a:lstStyle/>
+          <a:p>
+            <a:pPr algn="ctr"/>
+            <a:endParaRPr lang="en-US"/>
+          </a:p>
+        </p:txBody>
+      </p:sp>
+      <p:sp>
+        <p:nvSpPr>
+          <p:cNvPr id="90" name="TextBox 89">
+            <a:extLst>
+              <a:ext uri="{FF2B5EF4-FFF2-40B4-BE49-F238E27FC236}">
+                <a16:creationId xmlns:a16="http://schemas.microsoft.com/office/drawing/2014/main" id="{A54495A0-A138-46A8-90B9-3D8C90E2A997}"/>
+              </a:ext>
+            </a:extLst>
+          </p:cNvPr>
+          <p:cNvSpPr txBox="1"/>
+          <p:nvPr/>
+        </p:nvSpPr>
+        <p:spPr>
+          <a:xfrm>
+            <a:off x="6286953" y="3209694"/>
+            <a:ext cx="1080039" cy="646331"/>
+          </a:xfrm>
+          <a:prstGeom prst="rect">
+            <a:avLst/>
+          </a:prstGeom>
+          <a:noFill/>
+        </p:spPr>
+        <p:txBody>
+          <a:bodyPr wrap="none" rtlCol="0">
+            <a:spAutoFit/>
+          </a:bodyPr>
+          <a:lstStyle/>
+          <a:p>
+            <a:pPr algn="ctr"/>
+            <a:r>
+              <a:rPr lang="en-US" dirty="0"/>
+              <a:t>Predicted</a:t>
+            </a:r>
+          </a:p>
+          <a:p>
+            <a:pPr algn="ctr"/>
+            <a:r>
+              <a:rPr lang="en-US" dirty="0"/>
+              <a:t>Names</a:t>
+            </a:r>
+          </a:p>
+        </p:txBody>
+      </p:sp>
+      <p:sp>
+        <p:nvSpPr>
+          <p:cNvPr id="91" name="TextBox 90">
+            <a:extLst>
+              <a:ext uri="{FF2B5EF4-FFF2-40B4-BE49-F238E27FC236}">
+                <a16:creationId xmlns:a16="http://schemas.microsoft.com/office/drawing/2014/main" id="{F69D2426-7A44-404E-89AE-36ACD467EE11}"/>
+              </a:ext>
+            </a:extLst>
+          </p:cNvPr>
+          <p:cNvSpPr txBox="1"/>
+          <p:nvPr/>
+        </p:nvSpPr>
+        <p:spPr>
+          <a:xfrm>
+            <a:off x="6620024" y="3912690"/>
+            <a:ext cx="450764" cy="369332"/>
+          </a:xfrm>
+          <a:prstGeom prst="rect">
+            <a:avLst/>
+          </a:prstGeom>
+          <a:noFill/>
+        </p:spPr>
+        <p:txBody>
+          <a:bodyPr wrap="none" rtlCol="0">
+            <a:spAutoFit/>
+          </a:bodyPr>
+          <a:lstStyle/>
+          <a:p>
+            <a:r>
+              <a:rPr lang="en-US" dirty="0"/>
+              <a:t>N1</a:t>
+            </a:r>
+          </a:p>
+        </p:txBody>
+      </p:sp>
+      <p:sp>
+        <p:nvSpPr>
+          <p:cNvPr id="92" name="TextBox 91">
+            <a:extLst>
+              <a:ext uri="{FF2B5EF4-FFF2-40B4-BE49-F238E27FC236}">
+                <a16:creationId xmlns:a16="http://schemas.microsoft.com/office/drawing/2014/main" id="{EEE447DC-C366-43C5-A0A8-285D4A3F86BE}"/>
+              </a:ext>
+            </a:extLst>
+          </p:cNvPr>
+          <p:cNvSpPr txBox="1"/>
+          <p:nvPr/>
+        </p:nvSpPr>
+        <p:spPr>
+          <a:xfrm>
+            <a:off x="6620975" y="4229311"/>
+            <a:ext cx="450764" cy="369332"/>
+          </a:xfrm>
+          <a:prstGeom prst="rect">
+            <a:avLst/>
+          </a:prstGeom>
+          <a:noFill/>
+        </p:spPr>
+        <p:txBody>
+          <a:bodyPr wrap="none" rtlCol="0">
+            <a:spAutoFit/>
+          </a:bodyPr>
+          <a:lstStyle/>
+          <a:p>
+            <a:r>
+              <a:rPr lang="en-US" dirty="0"/>
+              <a:t>N2</a:t>
+            </a:r>
+          </a:p>
+        </p:txBody>
+      </p:sp>
+      <p:sp>
+        <p:nvSpPr>
+          <p:cNvPr id="93" name="TextBox 92">
+            <a:extLst>
+              <a:ext uri="{FF2B5EF4-FFF2-40B4-BE49-F238E27FC236}">
+                <a16:creationId xmlns:a16="http://schemas.microsoft.com/office/drawing/2014/main" id="{57C81594-566F-4BAD-9BAD-8D413AF91D6F}"/>
+              </a:ext>
+            </a:extLst>
+          </p:cNvPr>
+          <p:cNvSpPr txBox="1"/>
+          <p:nvPr/>
+        </p:nvSpPr>
+        <p:spPr>
+          <a:xfrm>
+            <a:off x="6670425" y="4620700"/>
+            <a:ext cx="343364" cy="369332"/>
+          </a:xfrm>
+          <a:prstGeom prst="rect">
+            <a:avLst/>
+          </a:prstGeom>
+          <a:noFill/>
+        </p:spPr>
+        <p:txBody>
+          <a:bodyPr wrap="none" rtlCol="0">
+            <a:spAutoFit/>
+          </a:bodyPr>
+          <a:lstStyle/>
+          <a:p>
+            <a:r>
+              <a:rPr lang="en-US" dirty="0"/>
+              <a:t>…</a:t>
+            </a:r>
+          </a:p>
+        </p:txBody>
+      </p:sp>
+      <p:sp>
+        <p:nvSpPr>
+          <p:cNvPr id="94" name="Rectangle 93">
+            <a:extLst>
+              <a:ext uri="{FF2B5EF4-FFF2-40B4-BE49-F238E27FC236}">
+                <a16:creationId xmlns:a16="http://schemas.microsoft.com/office/drawing/2014/main" id="{4CF78E2C-9142-4000-84AA-AF4057B0FD8E}"/>
+              </a:ext>
+            </a:extLst>
+          </p:cNvPr>
+          <p:cNvSpPr/>
+          <p:nvPr/>
+        </p:nvSpPr>
+        <p:spPr>
+          <a:xfrm>
+            <a:off x="7786818" y="3928424"/>
+            <a:ext cx="436326" cy="1610870"/>
+          </a:xfrm>
+          <a:prstGeom prst="rect">
+            <a:avLst/>
+          </a:prstGeom>
+          <a:solidFill>
+            <a:schemeClr val="accent2">
+              <a:lumMod val="40000"/>
+              <a:lumOff val="60000"/>
+            </a:schemeClr>
+          </a:solidFill>
+          <a:ln/>
+          <a:effectLst>
+            <a:outerShdw blurRad="50800" dist="38100" dir="2700000" algn="tl" rotWithShape="0">
+              <a:prstClr val="black">
+                <a:alpha val="40000"/>
+              </a:prstClr>
+            </a:outerShdw>
+          </a:effectLst>
+        </p:spPr>
+        <p:style>
+          <a:lnRef idx="1">
+            <a:schemeClr val="accent6"/>
+          </a:lnRef>
+          <a:fillRef idx="2">
+            <a:schemeClr val="accent6"/>
+          </a:fillRef>
+          <a:effectRef idx="1">
+            <a:schemeClr val="accent6"/>
+          </a:effectRef>
+          <a:fontRef idx="minor">
+            <a:schemeClr val="dk1"/>
+          </a:fontRef>
+        </p:style>
+        <p:txBody>
+          <a:bodyPr rtlCol="0" anchor="ctr"/>
+          <a:lstStyle/>
+          <a:p>
+            <a:pPr algn="ctr"/>
+            <a:endParaRPr lang="en-US" dirty="0"/>
+          </a:p>
+        </p:txBody>
+      </p:sp>
+      <p:sp>
+        <p:nvSpPr>
+          <p:cNvPr id="95" name="TextBox 94">
+            <a:extLst>
+              <a:ext uri="{FF2B5EF4-FFF2-40B4-BE49-F238E27FC236}">
+                <a16:creationId xmlns:a16="http://schemas.microsoft.com/office/drawing/2014/main" id="{64158782-8F25-4F36-89CA-CC3C31494752}"/>
+              </a:ext>
+            </a:extLst>
+          </p:cNvPr>
+          <p:cNvSpPr txBox="1"/>
+          <p:nvPr/>
+        </p:nvSpPr>
+        <p:spPr>
+          <a:xfrm>
+            <a:off x="7488786" y="3212004"/>
+            <a:ext cx="1031051" cy="646331"/>
+          </a:xfrm>
+          <a:prstGeom prst="rect">
+            <a:avLst/>
+          </a:prstGeom>
+          <a:noFill/>
+        </p:spPr>
+        <p:txBody>
+          <a:bodyPr wrap="none" rtlCol="0">
+            <a:spAutoFit/>
+          </a:bodyPr>
+          <a:lstStyle/>
+          <a:p>
+            <a:pPr algn="ctr"/>
+            <a:r>
+              <a:rPr lang="en-US" dirty="0"/>
+              <a:t>Name </a:t>
+            </a:r>
+          </a:p>
+          <a:p>
+            <a:pPr algn="ctr"/>
+            <a:r>
+              <a:rPr lang="en-US" dirty="0"/>
+              <a:t>Checking</a:t>
+            </a:r>
+          </a:p>
+        </p:txBody>
+      </p:sp>
+      <p:sp>
+        <p:nvSpPr>
+          <p:cNvPr id="96" name="Rectangle 95">
+            <a:extLst>
+              <a:ext uri="{FF2B5EF4-FFF2-40B4-BE49-F238E27FC236}">
+                <a16:creationId xmlns:a16="http://schemas.microsoft.com/office/drawing/2014/main" id="{99FCBC9B-C493-4103-8652-9562BCC3CA92}"/>
+              </a:ext>
+            </a:extLst>
+          </p:cNvPr>
+          <p:cNvSpPr/>
+          <p:nvPr/>
+        </p:nvSpPr>
+        <p:spPr>
+          <a:xfrm>
+            <a:off x="8938223" y="3938929"/>
+            <a:ext cx="436326" cy="1610870"/>
+          </a:xfrm>
+          <a:prstGeom prst="rect">
+            <a:avLst/>
+          </a:prstGeom>
+          <a:solidFill>
+            <a:schemeClr val="accent5">
+              <a:lumMod val="20000"/>
+              <a:lumOff val="80000"/>
+            </a:schemeClr>
+          </a:solidFill>
+          <a:ln>
+            <a:solidFill>
+              <a:srgbClr val="0070C0"/>
+            </a:solidFill>
+          </a:ln>
+        </p:spPr>
+        <p:style>
+          <a:lnRef idx="2">
+            <a:schemeClr val="accent1">
+              <a:shade val="50000"/>
+            </a:schemeClr>
+          </a:lnRef>
+          <a:fillRef idx="1">
+            <a:schemeClr val="accent1"/>
+          </a:fillRef>
+          <a:effectRef idx="0">
+            <a:schemeClr val="accent1"/>
+          </a:effectRef>
+          <a:fontRef idx="minor">
+            <a:schemeClr val="lt1"/>
+          </a:fontRef>
+        </p:style>
+        <p:txBody>
+          <a:bodyPr rtlCol="0" anchor="ctr"/>
+          <a:lstStyle/>
+          <a:p>
+            <a:pPr algn="ctr"/>
+            <a:endParaRPr lang="en-US"/>
+          </a:p>
+        </p:txBody>
+      </p:sp>
+      <p:sp>
+        <p:nvSpPr>
+          <p:cNvPr id="97" name="TextBox 96">
+            <a:extLst>
+              <a:ext uri="{FF2B5EF4-FFF2-40B4-BE49-F238E27FC236}">
+                <a16:creationId xmlns:a16="http://schemas.microsoft.com/office/drawing/2014/main" id="{33C760A8-4E88-4694-9A88-D4844ED837D9}"/>
+              </a:ext>
+            </a:extLst>
+          </p:cNvPr>
+          <p:cNvSpPr txBox="1"/>
+          <p:nvPr/>
+        </p:nvSpPr>
+        <p:spPr>
+          <a:xfrm>
+            <a:off x="8724310" y="3220199"/>
+            <a:ext cx="833883" cy="646331"/>
+          </a:xfrm>
+          <a:prstGeom prst="rect">
+            <a:avLst/>
+          </a:prstGeom>
+          <a:noFill/>
+        </p:spPr>
+        <p:txBody>
+          <a:bodyPr wrap="none" rtlCol="0">
+            <a:spAutoFit/>
+          </a:bodyPr>
+          <a:lstStyle/>
+          <a:p>
+            <a:pPr algn="ctr"/>
+            <a:r>
+              <a:rPr lang="en-US" dirty="0"/>
+              <a:t>Final</a:t>
+            </a:r>
+          </a:p>
+          <a:p>
+            <a:pPr algn="ctr"/>
+            <a:r>
+              <a:rPr lang="en-US" dirty="0"/>
+              <a:t>Names</a:t>
+            </a:r>
+          </a:p>
+        </p:txBody>
+      </p:sp>
+      <p:sp>
+        <p:nvSpPr>
+          <p:cNvPr id="98" name="TextBox 97">
+            <a:extLst>
+              <a:ext uri="{FF2B5EF4-FFF2-40B4-BE49-F238E27FC236}">
+                <a16:creationId xmlns:a16="http://schemas.microsoft.com/office/drawing/2014/main" id="{2E571D84-CEF9-44E4-918E-928EE66F0D1E}"/>
+              </a:ext>
+            </a:extLst>
+          </p:cNvPr>
+          <p:cNvSpPr txBox="1"/>
+          <p:nvPr/>
+        </p:nvSpPr>
+        <p:spPr>
+          <a:xfrm>
+            <a:off x="8893614" y="3919606"/>
+            <a:ext cx="566181" cy="369332"/>
+          </a:xfrm>
+          <a:prstGeom prst="rect">
+            <a:avLst/>
+          </a:prstGeom>
+          <a:noFill/>
+        </p:spPr>
+        <p:txBody>
+          <a:bodyPr wrap="none" rtlCol="0">
+            <a:spAutoFit/>
+          </a:bodyPr>
+          <a:lstStyle/>
+          <a:p>
+            <a:r>
+              <a:rPr lang="en-US" dirty="0"/>
+              <a:t>N1*</a:t>
+            </a:r>
+          </a:p>
+        </p:txBody>
+      </p:sp>
+      <p:sp>
+        <p:nvSpPr>
+          <p:cNvPr id="99" name="TextBox 98">
+            <a:extLst>
+              <a:ext uri="{FF2B5EF4-FFF2-40B4-BE49-F238E27FC236}">
+                <a16:creationId xmlns:a16="http://schemas.microsoft.com/office/drawing/2014/main" id="{1DD3E74E-0589-48E3-AC29-961EE2F0B505}"/>
+              </a:ext>
+            </a:extLst>
+          </p:cNvPr>
+          <p:cNvSpPr txBox="1"/>
+          <p:nvPr/>
+        </p:nvSpPr>
+        <p:spPr>
+          <a:xfrm>
+            <a:off x="8908162" y="4239816"/>
+            <a:ext cx="566181" cy="369332"/>
+          </a:xfrm>
+          <a:prstGeom prst="rect">
+            <a:avLst/>
+          </a:prstGeom>
+          <a:noFill/>
+        </p:spPr>
+        <p:txBody>
+          <a:bodyPr wrap="none" rtlCol="0">
+            <a:spAutoFit/>
+          </a:bodyPr>
+          <a:lstStyle/>
+          <a:p>
+            <a:r>
+              <a:rPr lang="en-US" dirty="0"/>
+              <a:t>N2*</a:t>
+            </a:r>
+          </a:p>
+        </p:txBody>
+      </p:sp>
+      <p:sp>
+        <p:nvSpPr>
+          <p:cNvPr id="100" name="TextBox 99">
+            <a:extLst>
+              <a:ext uri="{FF2B5EF4-FFF2-40B4-BE49-F238E27FC236}">
+                <a16:creationId xmlns:a16="http://schemas.microsoft.com/office/drawing/2014/main" id="{1F666038-EC46-41C0-BF89-0765A61BCBEC}"/>
+              </a:ext>
+            </a:extLst>
+          </p:cNvPr>
+          <p:cNvSpPr txBox="1"/>
+          <p:nvPr/>
+        </p:nvSpPr>
+        <p:spPr>
+          <a:xfrm>
+            <a:off x="8984704" y="4631205"/>
+            <a:ext cx="343364" cy="369332"/>
+          </a:xfrm>
+          <a:prstGeom prst="rect">
+            <a:avLst/>
+          </a:prstGeom>
+          <a:noFill/>
+        </p:spPr>
+        <p:txBody>
+          <a:bodyPr wrap="none" rtlCol="0">
+            <a:spAutoFit/>
+          </a:bodyPr>
+          <a:lstStyle/>
+          <a:p>
+            <a:r>
+              <a:rPr lang="en-US" dirty="0"/>
+              <a:t>…</a:t>
+            </a:r>
+          </a:p>
+        </p:txBody>
+      </p:sp>
+      <p:cxnSp>
+        <p:nvCxnSpPr>
+          <p:cNvPr id="101" name="Straight Arrow Connector 100">
+            <a:extLst>
+              <a:ext uri="{FF2B5EF4-FFF2-40B4-BE49-F238E27FC236}">
+                <a16:creationId xmlns:a16="http://schemas.microsoft.com/office/drawing/2014/main" id="{5DCED083-DB8D-4F8A-8E09-3FFDAADC526E}"/>
+              </a:ext>
+            </a:extLst>
+          </p:cNvPr>
+          <p:cNvCxnSpPr>
+            <a:cxnSpLocks/>
+          </p:cNvCxnSpPr>
+          <p:nvPr/>
+        </p:nvCxnSpPr>
+        <p:spPr>
+          <a:xfrm>
+            <a:off x="1519364" y="3520975"/>
+            <a:ext cx="371628" cy="0"/>
+          </a:xfrm>
+          <a:prstGeom prst="straightConnector1">
+            <a:avLst/>
+          </a:prstGeom>
+          <a:ln w="19050">
+            <a:tailEnd type="triangle"/>
+          </a:ln>
+        </p:spPr>
+        <p:style>
+          <a:lnRef idx="1">
+            <a:schemeClr val="accent1"/>
+          </a:lnRef>
+          <a:fillRef idx="0">
+            <a:schemeClr val="accent1"/>
+          </a:fillRef>
+          <a:effectRef idx="0">
+            <a:schemeClr val="accent1"/>
+          </a:effectRef>
+          <a:fontRef idx="minor">
+            <a:schemeClr val="tx1"/>
+          </a:fontRef>
+        </p:style>
+      </p:cxnSp>
+      <p:cxnSp>
+        <p:nvCxnSpPr>
+          <p:cNvPr id="103" name="Straight Arrow Connector 102">
+            <a:extLst>
+              <a:ext uri="{FF2B5EF4-FFF2-40B4-BE49-F238E27FC236}">
+                <a16:creationId xmlns:a16="http://schemas.microsoft.com/office/drawing/2014/main" id="{EC8E8842-C366-4C48-BD59-E47907DFC8F7}"/>
+              </a:ext>
+            </a:extLst>
+          </p:cNvPr>
+          <p:cNvCxnSpPr>
+            <a:stCxn id="16" idx="3"/>
+          </p:cNvCxnSpPr>
+          <p:nvPr/>
+        </p:nvCxnSpPr>
+        <p:spPr>
+          <a:xfrm flipV="1">
+            <a:off x="3488267" y="2434553"/>
+            <a:ext cx="673832" cy="1089372"/>
+          </a:xfrm>
+          <a:prstGeom prst="straightConnector1">
+            <a:avLst/>
+          </a:prstGeom>
+          <a:ln w="19050">
+            <a:tailEnd type="triangle"/>
+          </a:ln>
+        </p:spPr>
+        <p:style>
+          <a:lnRef idx="1">
+            <a:schemeClr val="accent1"/>
+          </a:lnRef>
+          <a:fillRef idx="0">
+            <a:schemeClr val="accent1"/>
+          </a:fillRef>
+          <a:effectRef idx="0">
+            <a:schemeClr val="accent1"/>
+          </a:effectRef>
+          <a:fontRef idx="minor">
+            <a:schemeClr val="tx1"/>
+          </a:fontRef>
+        </p:style>
+      </p:cxnSp>
+      <p:cxnSp>
+        <p:nvCxnSpPr>
+          <p:cNvPr id="105" name="Connector: Elbow 104">
+            <a:extLst>
+              <a:ext uri="{FF2B5EF4-FFF2-40B4-BE49-F238E27FC236}">
+                <a16:creationId xmlns:a16="http://schemas.microsoft.com/office/drawing/2014/main" id="{D813AC20-05C5-4B67-A58C-490034B10C39}"/>
+              </a:ext>
+            </a:extLst>
+          </p:cNvPr>
+          <p:cNvCxnSpPr>
+            <a:cxnSpLocks/>
+            <a:endCxn id="86" idx="2"/>
+          </p:cNvCxnSpPr>
+          <p:nvPr/>
+        </p:nvCxnSpPr>
+        <p:spPr>
+          <a:xfrm flipV="1">
+            <a:off x="5080000" y="2240715"/>
+            <a:ext cx="1016000" cy="320366"/>
+          </a:xfrm>
+          <a:prstGeom prst="bentConnector2">
+            <a:avLst/>
+          </a:prstGeom>
+          <a:ln w="19050">
+            <a:tailEnd type="triangle"/>
+          </a:ln>
+        </p:spPr>
+        <p:style>
+          <a:lnRef idx="1">
+            <a:schemeClr val="accent1"/>
+          </a:lnRef>
+          <a:fillRef idx="0">
+            <a:schemeClr val="accent1"/>
+          </a:fillRef>
+          <a:effectRef idx="0">
+            <a:schemeClr val="accent1"/>
+          </a:effectRef>
+          <a:fontRef idx="minor">
+            <a:schemeClr val="tx1"/>
+          </a:fontRef>
+        </p:style>
+      </p:cxnSp>
+      <p:cxnSp>
+        <p:nvCxnSpPr>
+          <p:cNvPr id="108" name="Straight Arrow Connector 107">
+            <a:extLst>
+              <a:ext uri="{FF2B5EF4-FFF2-40B4-BE49-F238E27FC236}">
+                <a16:creationId xmlns:a16="http://schemas.microsoft.com/office/drawing/2014/main" id="{4C1D4A03-2110-43CE-AB4D-2C0CEBE8917E}"/>
+              </a:ext>
+            </a:extLst>
+          </p:cNvPr>
+          <p:cNvCxnSpPr>
+            <a:stCxn id="16" idx="3"/>
+          </p:cNvCxnSpPr>
+          <p:nvPr/>
+        </p:nvCxnSpPr>
+        <p:spPr>
+          <a:xfrm>
+            <a:off x="3488267" y="3523925"/>
+            <a:ext cx="623366" cy="1034735"/>
+          </a:xfrm>
+          <a:prstGeom prst="straightConnector1">
+            <a:avLst/>
+          </a:prstGeom>
+          <a:ln w="19050">
+            <a:tailEnd type="triangle"/>
+          </a:ln>
+        </p:spPr>
+        <p:style>
+          <a:lnRef idx="1">
+            <a:schemeClr val="accent1"/>
+          </a:lnRef>
+          <a:fillRef idx="0">
+            <a:schemeClr val="accent1"/>
+          </a:fillRef>
+          <a:effectRef idx="0">
+            <a:schemeClr val="accent1"/>
+          </a:effectRef>
+          <a:fontRef idx="minor">
+            <a:schemeClr val="tx1"/>
+          </a:fontRef>
+        </p:style>
+      </p:cxnSp>
+      <p:cxnSp>
+        <p:nvCxnSpPr>
+          <p:cNvPr id="109" name="Straight Arrow Connector 108">
+            <a:extLst>
+              <a:ext uri="{FF2B5EF4-FFF2-40B4-BE49-F238E27FC236}">
+                <a16:creationId xmlns:a16="http://schemas.microsoft.com/office/drawing/2014/main" id="{701CDFBA-42AB-4579-9B72-EE3F9FD1A7B3}"/>
+              </a:ext>
+            </a:extLst>
+          </p:cNvPr>
+          <p:cNvCxnSpPr>
+            <a:cxnSpLocks/>
+          </p:cNvCxnSpPr>
+          <p:nvPr/>
+        </p:nvCxnSpPr>
+        <p:spPr>
+          <a:xfrm>
+            <a:off x="5080000" y="4733859"/>
+            <a:ext cx="371628" cy="0"/>
+          </a:xfrm>
+          <a:prstGeom prst="straightConnector1">
+            <a:avLst/>
+          </a:prstGeom>
+          <a:ln w="19050">
+            <a:tailEnd type="triangle"/>
+          </a:ln>
+        </p:spPr>
+        <p:style>
+          <a:lnRef idx="1">
+            <a:schemeClr val="accent1"/>
+          </a:lnRef>
+          <a:fillRef idx="0">
+            <a:schemeClr val="accent1"/>
+          </a:fillRef>
+          <a:effectRef idx="0">
+            <a:schemeClr val="accent1"/>
+          </a:effectRef>
+          <a:fontRef idx="minor">
+            <a:schemeClr val="tx1"/>
+          </a:fontRef>
+        </p:style>
+      </p:cxnSp>
+      <p:cxnSp>
+        <p:nvCxnSpPr>
+          <p:cNvPr id="110" name="Straight Arrow Connector 109">
+            <a:extLst>
+              <a:ext uri="{FF2B5EF4-FFF2-40B4-BE49-F238E27FC236}">
+                <a16:creationId xmlns:a16="http://schemas.microsoft.com/office/drawing/2014/main" id="{83D7EB43-99AE-44CD-B9BE-5B1110E9CC4A}"/>
+              </a:ext>
+            </a:extLst>
+          </p:cNvPr>
+          <p:cNvCxnSpPr>
+            <a:cxnSpLocks/>
+            <a:stCxn id="87" idx="3"/>
+            <a:endCxn id="89" idx="1"/>
+          </p:cNvCxnSpPr>
+          <p:nvPr/>
+        </p:nvCxnSpPr>
+        <p:spPr>
+          <a:xfrm>
+            <a:off x="5893476" y="4733859"/>
+            <a:ext cx="730468" cy="0"/>
+          </a:xfrm>
+          <a:prstGeom prst="straightConnector1">
+            <a:avLst/>
+          </a:prstGeom>
+          <a:ln w="19050">
+            <a:tailEnd type="triangle"/>
+          </a:ln>
+        </p:spPr>
+        <p:style>
+          <a:lnRef idx="1">
+            <a:schemeClr val="accent1"/>
+          </a:lnRef>
+          <a:fillRef idx="0">
+            <a:schemeClr val="accent1"/>
+          </a:fillRef>
+          <a:effectRef idx="0">
+            <a:schemeClr val="accent1"/>
+          </a:effectRef>
+          <a:fontRef idx="minor">
+            <a:schemeClr val="tx1"/>
+          </a:fontRef>
+        </p:style>
+      </p:cxnSp>
+      <p:cxnSp>
+        <p:nvCxnSpPr>
+          <p:cNvPr id="116" name="Straight Arrow Connector 115">
+            <a:extLst>
+              <a:ext uri="{FF2B5EF4-FFF2-40B4-BE49-F238E27FC236}">
+                <a16:creationId xmlns:a16="http://schemas.microsoft.com/office/drawing/2014/main" id="{490E58B6-7263-43D0-B894-2EEEE0347743}"/>
+              </a:ext>
+            </a:extLst>
+          </p:cNvPr>
+          <p:cNvCxnSpPr>
+            <a:cxnSpLocks/>
+          </p:cNvCxnSpPr>
+          <p:nvPr/>
+        </p:nvCxnSpPr>
+        <p:spPr>
+          <a:xfrm>
+            <a:off x="7070788" y="4733859"/>
+            <a:ext cx="730468" cy="0"/>
+          </a:xfrm>
+          <a:prstGeom prst="straightConnector1">
+            <a:avLst/>
+          </a:prstGeom>
+          <a:ln w="19050">
+            <a:tailEnd type="triangle"/>
+          </a:ln>
+        </p:spPr>
+        <p:style>
+          <a:lnRef idx="1">
+            <a:schemeClr val="accent1"/>
+          </a:lnRef>
+          <a:fillRef idx="0">
+            <a:schemeClr val="accent1"/>
+          </a:fillRef>
+          <a:effectRef idx="0">
+            <a:schemeClr val="accent1"/>
+          </a:effectRef>
+          <a:fontRef idx="minor">
+            <a:schemeClr val="tx1"/>
+          </a:fontRef>
+        </p:style>
+      </p:cxnSp>
+      <p:cxnSp>
+        <p:nvCxnSpPr>
+          <p:cNvPr id="117" name="Straight Arrow Connector 116">
+            <a:extLst>
+              <a:ext uri="{FF2B5EF4-FFF2-40B4-BE49-F238E27FC236}">
+                <a16:creationId xmlns:a16="http://schemas.microsoft.com/office/drawing/2014/main" id="{B4A49520-9B24-4318-82EE-B3288907EA89}"/>
+              </a:ext>
+            </a:extLst>
+          </p:cNvPr>
+          <p:cNvCxnSpPr>
+            <a:cxnSpLocks/>
+          </p:cNvCxnSpPr>
+          <p:nvPr/>
+        </p:nvCxnSpPr>
+        <p:spPr>
+          <a:xfrm>
+            <a:off x="8223144" y="4744364"/>
+            <a:ext cx="730468" cy="0"/>
+          </a:xfrm>
+          <a:prstGeom prst="straightConnector1">
+            <a:avLst/>
+          </a:prstGeom>
+          <a:ln w="19050">
+            <a:tailEnd type="triangle"/>
+          </a:ln>
+        </p:spPr>
+        <p:style>
+          <a:lnRef idx="1">
+            <a:schemeClr val="accent1"/>
+          </a:lnRef>
+          <a:fillRef idx="0">
+            <a:schemeClr val="accent1"/>
+          </a:fillRef>
+          <a:effectRef idx="0">
+            <a:schemeClr val="accent1"/>
+          </a:effectRef>
+          <a:fontRef idx="minor">
+            <a:schemeClr val="tx1"/>
+          </a:fontRef>
+        </p:style>
+      </p:cxnSp>
+      <p:sp>
+        <p:nvSpPr>
+          <p:cNvPr id="2" name="TextBox 1">
+            <a:extLst>
+              <a:ext uri="{FF2B5EF4-FFF2-40B4-BE49-F238E27FC236}">
+                <a16:creationId xmlns:a16="http://schemas.microsoft.com/office/drawing/2014/main" id="{044D2E26-74CA-0915-2DB2-61A0EC96321B}"/>
+              </a:ext>
+            </a:extLst>
+          </p:cNvPr>
+          <p:cNvSpPr txBox="1"/>
+          <p:nvPr/>
+        </p:nvSpPr>
+        <p:spPr>
+          <a:xfrm>
+            <a:off x="293341" y="2507617"/>
+            <a:ext cx="760208" cy="369332"/>
+          </a:xfrm>
+          <a:prstGeom prst="rect">
+            <a:avLst/>
+          </a:prstGeom>
+          <a:noFill/>
+        </p:spPr>
+        <p:txBody>
+          <a:bodyPr wrap="none" rtlCol="0">
+            <a:spAutoFit/>
+          </a:bodyPr>
+          <a:lstStyle/>
+          <a:p>
+            <a:r>
+              <a:rPr lang="en-US" dirty="0"/>
+              <a:t>Graph</a:t>
+            </a:r>
+          </a:p>
+        </p:txBody>
+      </p:sp>
+    </p:spTree>
+    <p:extLst>
+      <p:ext uri="{BB962C8B-B14F-4D97-AF65-F5344CB8AC3E}">
+        <p14:creationId xmlns:p14="http://schemas.microsoft.com/office/powerpoint/2010/main" val="1273081125"/>
+      </p:ext>
+    </p:extLst>
+  </p:cSld>
+  <p:clrMapOvr>
+    <a:masterClrMapping/>
+  </p:clrMapOvr>
+</p:sld>
+</file>
+
 <file path=ppt/theme/theme1.xml><?xml version="1.0" encoding="utf-8"?>
 <a:theme xmlns:a="http://schemas.openxmlformats.org/drawingml/2006/main" name="Office Theme">
   <a:themeElements>

</xml_diff>

<commit_message>
adding type-dep-graph from Yi
</commit_message>
<xml_diff>
--- a/figures/figures.pptx
+++ b/figures/figures.pptx
@@ -14,7 +14,7 @@
     <p:sldId id="262" r:id="rId8"/>
     <p:sldId id="263" r:id="rId9"/>
     <p:sldId id="264" r:id="rId10"/>
-    <p:sldId id="265" r:id="rId11"/>
+    <p:sldId id="266" r:id="rId11"/>
   </p:sldIdLst>
   <p:sldSz cx="12192000" cy="6858000"/>
   <p:notesSz cx="6858000" cy="9144000"/>
@@ -3417,38 +3417,1408 @@
       </p:grpSpPr>
       <p:sp>
         <p:nvSpPr>
-          <p:cNvPr id="2" name="Title 1">
-            <a:extLst>
-              <a:ext uri="{FF2B5EF4-FFF2-40B4-BE49-F238E27FC236}">
-                <a16:creationId xmlns:a16="http://schemas.microsoft.com/office/drawing/2014/main" id="{0F4E9BB2-E7A3-FA4D-A2C8-36BADAAF4AE0}"/>
-              </a:ext>
-            </a:extLst>
-          </p:cNvPr>
-          <p:cNvSpPr>
-            <a:spLocks noGrp="1"/>
-          </p:cNvSpPr>
-          <p:nvPr>
-            <p:ph type="title"/>
-          </p:nvPr>
+          <p:cNvPr id="4" name="Rectangle: Rounded Corners 3">
+            <a:extLst>
+              <a:ext uri="{FF2B5EF4-FFF2-40B4-BE49-F238E27FC236}">
+                <a16:creationId xmlns:a16="http://schemas.microsoft.com/office/drawing/2014/main" id="{CA1F39E4-A527-A537-37EE-E2BFE4460FD6}"/>
+              </a:ext>
+            </a:extLst>
+          </p:cNvPr>
+          <p:cNvSpPr/>
+          <p:nvPr/>
         </p:nvSpPr>
         <p:spPr>
           <a:xfrm>
-            <a:off x="0" y="0"/>
-            <a:ext cx="10515600" cy="1325563"/>
+            <a:off x="5692879" y="3334106"/>
+            <a:ext cx="1415844" cy="788521"/>
           </a:xfrm>
+          <a:prstGeom prst="roundRect">
+            <a:avLst/>
+          </a:prstGeom>
+          <a:solidFill>
+            <a:schemeClr val="accent5">
+              <a:lumMod val="20000"/>
+              <a:lumOff val="80000"/>
+            </a:schemeClr>
+          </a:solidFill>
+          <a:ln>
+            <a:solidFill>
+              <a:schemeClr val="accent5">
+                <a:lumMod val="75000"/>
+              </a:schemeClr>
+            </a:solidFill>
+          </a:ln>
+        </p:spPr>
+        <p:style>
+          <a:lnRef idx="2">
+            <a:schemeClr val="accent1">
+              <a:shade val="50000"/>
+            </a:schemeClr>
+          </a:lnRef>
+          <a:fillRef idx="1">
+            <a:schemeClr val="accent1"/>
+          </a:fillRef>
+          <a:effectRef idx="0">
+            <a:schemeClr val="accent1"/>
+          </a:effectRef>
+          <a:fontRef idx="minor">
+            <a:schemeClr val="lt1"/>
+          </a:fontRef>
+        </p:style>
+        <p:txBody>
+          <a:bodyPr rtlCol="0" anchor="ctr"/>
+          <a:lstStyle/>
+          <a:p>
+            <a:pPr algn="ctr"/>
+            <a:r>
+              <a:rPr lang="en-US" altLang="zh-CN" dirty="0">
+                <a:solidFill>
+                  <a:schemeClr val="tx1"/>
+                </a:solidFill>
+              </a:rPr>
+              <a:t>p1(5)</a:t>
+            </a:r>
+          </a:p>
+          <a:p>
+            <a:pPr algn="ctr"/>
+            <a:r>
+              <a:rPr lang="en-US" dirty="0">
+                <a:solidFill>
+                  <a:srgbClr val="FF0000"/>
+                </a:solidFill>
+              </a:rPr>
+              <a:t>Null</a:t>
+            </a:r>
+          </a:p>
+        </p:txBody>
+      </p:sp>
+      <p:sp>
+        <p:nvSpPr>
+          <p:cNvPr id="5" name="Rectangle: Rounded Corners 4">
+            <a:extLst>
+              <a:ext uri="{FF2B5EF4-FFF2-40B4-BE49-F238E27FC236}">
+                <a16:creationId xmlns:a16="http://schemas.microsoft.com/office/drawing/2014/main" id="{428073A7-2ECF-864D-99C4-2740AF3D0DFF}"/>
+              </a:ext>
+            </a:extLst>
+          </p:cNvPr>
+          <p:cNvSpPr/>
+          <p:nvPr/>
+        </p:nvSpPr>
+        <p:spPr>
+          <a:xfrm>
+            <a:off x="5692879" y="4402112"/>
+            <a:ext cx="1415844" cy="788521"/>
+          </a:xfrm>
+          <a:prstGeom prst="roundRect">
+            <a:avLst/>
+          </a:prstGeom>
+          <a:solidFill>
+            <a:schemeClr val="accent2">
+              <a:lumMod val="20000"/>
+              <a:lumOff val="80000"/>
+            </a:schemeClr>
+          </a:solidFill>
+          <a:ln>
+            <a:solidFill>
+              <a:schemeClr val="accent2">
+                <a:lumMod val="75000"/>
+              </a:schemeClr>
+            </a:solidFill>
+          </a:ln>
+        </p:spPr>
+        <p:style>
+          <a:lnRef idx="2">
+            <a:schemeClr val="accent1">
+              <a:shade val="50000"/>
+            </a:schemeClr>
+          </a:lnRef>
+          <a:fillRef idx="1">
+            <a:schemeClr val="accent1"/>
+          </a:fillRef>
+          <a:effectRef idx="0">
+            <a:schemeClr val="accent1"/>
+          </a:effectRef>
+          <a:fontRef idx="minor">
+            <a:schemeClr val="lt1"/>
+          </a:fontRef>
+        </p:style>
+        <p:txBody>
+          <a:bodyPr rtlCol="0" anchor="ctr"/>
+          <a:lstStyle/>
+          <a:p>
+            <a:pPr algn="ctr"/>
+            <a:r>
+              <a:rPr lang="en-US" altLang="zh-CN" dirty="0" err="1">
+                <a:solidFill>
+                  <a:schemeClr val="tx1"/>
+                </a:solidFill>
+              </a:rPr>
+              <a:t>Dict_write</a:t>
+            </a:r>
+            <a:endParaRPr lang="en-US" dirty="0">
+              <a:solidFill>
+                <a:srgbClr val="FF0000"/>
+              </a:solidFill>
+            </a:endParaRPr>
+          </a:p>
+        </p:txBody>
+      </p:sp>
+      <p:sp>
+        <p:nvSpPr>
+          <p:cNvPr id="6" name="Rectangle: Rounded Corners 5">
+            <a:extLst>
+              <a:ext uri="{FF2B5EF4-FFF2-40B4-BE49-F238E27FC236}">
+                <a16:creationId xmlns:a16="http://schemas.microsoft.com/office/drawing/2014/main" id="{76A8187A-E841-1A68-C629-F4FD6B5D709F}"/>
+              </a:ext>
+            </a:extLst>
+          </p:cNvPr>
+          <p:cNvSpPr/>
+          <p:nvPr/>
+        </p:nvSpPr>
+        <p:spPr>
+          <a:xfrm>
+            <a:off x="5692879" y="5466676"/>
+            <a:ext cx="1415844" cy="788521"/>
+          </a:xfrm>
+          <a:prstGeom prst="roundRect">
+            <a:avLst/>
+          </a:prstGeom>
+          <a:solidFill>
+            <a:schemeClr val="accent5">
+              <a:lumMod val="20000"/>
+              <a:lumOff val="80000"/>
+            </a:schemeClr>
+          </a:solidFill>
+          <a:ln>
+            <a:solidFill>
+              <a:schemeClr val="accent5">
+                <a:lumMod val="75000"/>
+              </a:schemeClr>
+            </a:solidFill>
+          </a:ln>
+        </p:spPr>
+        <p:style>
+          <a:lnRef idx="2">
+            <a:schemeClr val="accent1">
+              <a:shade val="50000"/>
+            </a:schemeClr>
+          </a:lnRef>
+          <a:fillRef idx="1">
+            <a:schemeClr val="accent1"/>
+          </a:fillRef>
+          <a:effectRef idx="0">
+            <a:schemeClr val="accent1"/>
+          </a:effectRef>
+          <a:fontRef idx="minor">
+            <a:schemeClr val="lt1"/>
+          </a:fontRef>
+        </p:style>
+        <p:txBody>
+          <a:bodyPr rtlCol="0" anchor="ctr"/>
+          <a:lstStyle/>
+          <a:p>
+            <a:pPr algn="ctr"/>
+            <a:r>
+              <a:rPr lang="en-US" altLang="zh-CN" dirty="0">
+                <a:solidFill>
+                  <a:schemeClr val="tx1"/>
+                </a:solidFill>
+              </a:rPr>
+              <a:t>p2(11)</a:t>
+            </a:r>
+          </a:p>
+          <a:p>
+            <a:pPr algn="ctr"/>
+            <a:r>
+              <a:rPr lang="en-US" dirty="0" err="1">
+                <a:solidFill>
+                  <a:srgbClr val="FF0000"/>
+                </a:solidFill>
+              </a:rPr>
+              <a:t>Dict</a:t>
+            </a:r>
+            <a:r>
+              <a:rPr lang="en-US" dirty="0">
+                <a:solidFill>
+                  <a:srgbClr val="FF0000"/>
+                </a:solidFill>
+              </a:rPr>
+              <a:t>[str, int]</a:t>
+            </a:r>
+          </a:p>
+        </p:txBody>
+      </p:sp>
+      <p:sp>
+        <p:nvSpPr>
+          <p:cNvPr id="7" name="Rectangle: Rounded Corners 6">
+            <a:extLst>
+              <a:ext uri="{FF2B5EF4-FFF2-40B4-BE49-F238E27FC236}">
+                <a16:creationId xmlns:a16="http://schemas.microsoft.com/office/drawing/2014/main" id="{24E622FB-C5D6-F4AB-5801-8C37CCCB7536}"/>
+              </a:ext>
+            </a:extLst>
+          </p:cNvPr>
+          <p:cNvSpPr/>
+          <p:nvPr/>
+        </p:nvSpPr>
+        <p:spPr>
+          <a:xfrm>
+            <a:off x="3244645" y="1201536"/>
+            <a:ext cx="1415844" cy="788521"/>
+          </a:xfrm>
+          <a:prstGeom prst="roundRect">
+            <a:avLst/>
+          </a:prstGeom>
+          <a:solidFill>
+            <a:schemeClr val="accent5">
+              <a:lumMod val="20000"/>
+              <a:lumOff val="80000"/>
+            </a:schemeClr>
+          </a:solidFill>
+          <a:ln>
+            <a:solidFill>
+              <a:schemeClr val="accent5">
+                <a:lumMod val="75000"/>
+              </a:schemeClr>
+            </a:solidFill>
+          </a:ln>
+        </p:spPr>
+        <p:style>
+          <a:lnRef idx="2">
+            <a:schemeClr val="accent1">
+              <a:shade val="50000"/>
+            </a:schemeClr>
+          </a:lnRef>
+          <a:fillRef idx="1">
+            <a:schemeClr val="accent1"/>
+          </a:fillRef>
+          <a:effectRef idx="0">
+            <a:schemeClr val="accent1"/>
+          </a:effectRef>
+          <a:fontRef idx="minor">
+            <a:schemeClr val="lt1"/>
+          </a:fontRef>
+        </p:style>
+        <p:txBody>
+          <a:bodyPr rtlCol="0" anchor="ctr"/>
+          <a:lstStyle/>
+          <a:p>
+            <a:pPr algn="ctr"/>
+            <a:r>
+              <a:rPr lang="en-US" altLang="zh-CN" dirty="0">
+                <a:solidFill>
+                  <a:schemeClr val="tx1"/>
+                </a:solidFill>
+              </a:rPr>
+              <a:t>m1(7)</a:t>
+            </a:r>
+          </a:p>
+          <a:p>
+            <a:pPr algn="ctr"/>
+            <a:r>
+              <a:rPr lang="en-US" dirty="0">
+                <a:solidFill>
+                  <a:srgbClr val="FF0000"/>
+                </a:solidFill>
+              </a:rPr>
+              <a:t>Unknown</a:t>
+            </a:r>
+          </a:p>
+        </p:txBody>
+      </p:sp>
+      <p:sp>
+        <p:nvSpPr>
+          <p:cNvPr id="8" name="Rectangle: Rounded Corners 7">
+            <a:extLst>
+              <a:ext uri="{FF2B5EF4-FFF2-40B4-BE49-F238E27FC236}">
+                <a16:creationId xmlns:a16="http://schemas.microsoft.com/office/drawing/2014/main" id="{7E84499C-CDCB-8283-25E3-8FED0644EFE1}"/>
+              </a:ext>
+            </a:extLst>
+          </p:cNvPr>
+          <p:cNvSpPr/>
+          <p:nvPr/>
+        </p:nvSpPr>
+        <p:spPr>
+          <a:xfrm>
+            <a:off x="3244645" y="2267821"/>
+            <a:ext cx="1415844" cy="788521"/>
+          </a:xfrm>
+          <a:prstGeom prst="roundRect">
+            <a:avLst/>
+          </a:prstGeom>
+          <a:solidFill>
+            <a:schemeClr val="accent2">
+              <a:lumMod val="20000"/>
+              <a:lumOff val="80000"/>
+            </a:schemeClr>
+          </a:solidFill>
+          <a:ln>
+            <a:solidFill>
+              <a:schemeClr val="accent2">
+                <a:lumMod val="75000"/>
+              </a:schemeClr>
+            </a:solidFill>
+          </a:ln>
+        </p:spPr>
+        <p:style>
+          <a:lnRef idx="2">
+            <a:schemeClr val="accent1">
+              <a:shade val="50000"/>
+            </a:schemeClr>
+          </a:lnRef>
+          <a:fillRef idx="1">
+            <a:schemeClr val="accent1"/>
+          </a:fillRef>
+          <a:effectRef idx="0">
+            <a:schemeClr val="accent1"/>
+          </a:effectRef>
+          <a:fontRef idx="minor">
+            <a:schemeClr val="lt1"/>
+          </a:fontRef>
+        </p:style>
+        <p:txBody>
+          <a:bodyPr rtlCol="0" anchor="ctr"/>
+          <a:lstStyle/>
+          <a:p>
+            <a:pPr algn="ctr"/>
+            <a:r>
+              <a:rPr lang="en-US" altLang="zh-CN" dirty="0">
+                <a:solidFill>
+                  <a:schemeClr val="tx1"/>
+                </a:solidFill>
+              </a:rPr>
+              <a:t>Call length</a:t>
+            </a:r>
+            <a:endParaRPr lang="en-US" dirty="0">
+              <a:solidFill>
+                <a:srgbClr val="FF0000"/>
+              </a:solidFill>
+            </a:endParaRPr>
+          </a:p>
+        </p:txBody>
+      </p:sp>
+      <p:sp>
+        <p:nvSpPr>
+          <p:cNvPr id="9" name="Rectangle: Rounded Corners 8">
+            <a:extLst>
+              <a:ext uri="{FF2B5EF4-FFF2-40B4-BE49-F238E27FC236}">
+                <a16:creationId xmlns:a16="http://schemas.microsoft.com/office/drawing/2014/main" id="{91154D63-5599-EFF9-279F-44BCDE312A73}"/>
+              </a:ext>
+            </a:extLst>
+          </p:cNvPr>
+          <p:cNvSpPr/>
+          <p:nvPr/>
+        </p:nvSpPr>
+        <p:spPr>
+          <a:xfrm>
+            <a:off x="3244645" y="3334106"/>
+            <a:ext cx="1415844" cy="788521"/>
+          </a:xfrm>
+          <a:prstGeom prst="roundRect">
+            <a:avLst/>
+          </a:prstGeom>
+          <a:solidFill>
+            <a:schemeClr val="accent5">
+              <a:lumMod val="20000"/>
+              <a:lumOff val="80000"/>
+            </a:schemeClr>
+          </a:solidFill>
+          <a:ln>
+            <a:solidFill>
+              <a:schemeClr val="accent5">
+                <a:lumMod val="75000"/>
+              </a:schemeClr>
+            </a:solidFill>
+          </a:ln>
+        </p:spPr>
+        <p:style>
+          <a:lnRef idx="2">
+            <a:schemeClr val="accent1">
+              <a:shade val="50000"/>
+            </a:schemeClr>
+          </a:lnRef>
+          <a:fillRef idx="1">
+            <a:schemeClr val="accent1"/>
+          </a:fillRef>
+          <a:effectRef idx="0">
+            <a:schemeClr val="accent1"/>
+          </a:effectRef>
+          <a:fontRef idx="minor">
+            <a:schemeClr val="lt1"/>
+          </a:fontRef>
+        </p:style>
+        <p:txBody>
+          <a:bodyPr rtlCol="0" anchor="ctr"/>
+          <a:lstStyle/>
+          <a:p>
+            <a:pPr algn="ctr"/>
+            <a:r>
+              <a:rPr lang="en-US" altLang="zh-CN" dirty="0">
+                <a:solidFill>
+                  <a:schemeClr val="tx1"/>
+                </a:solidFill>
+              </a:rPr>
+              <a:t>m2(10)</a:t>
+            </a:r>
+          </a:p>
+          <a:p>
+            <a:pPr algn="ctr"/>
+            <a:r>
+              <a:rPr lang="en-US" dirty="0">
+                <a:solidFill>
+                  <a:srgbClr val="FF0000"/>
+                </a:solidFill>
+              </a:rPr>
+              <a:t>int</a:t>
+            </a:r>
+          </a:p>
+        </p:txBody>
+      </p:sp>
+      <p:sp>
+        <p:nvSpPr>
+          <p:cNvPr id="10" name="Rectangle: Rounded Corners 9">
+            <a:extLst>
+              <a:ext uri="{FF2B5EF4-FFF2-40B4-BE49-F238E27FC236}">
+                <a16:creationId xmlns:a16="http://schemas.microsoft.com/office/drawing/2014/main" id="{01C8FAE7-9A81-B63B-28BD-0958BACC848E}"/>
+              </a:ext>
+            </a:extLst>
+          </p:cNvPr>
+          <p:cNvSpPr/>
+          <p:nvPr/>
+        </p:nvSpPr>
+        <p:spPr>
+          <a:xfrm>
+            <a:off x="7897760" y="135251"/>
+            <a:ext cx="1415844" cy="788521"/>
+          </a:xfrm>
+          <a:prstGeom prst="roundRect">
+            <a:avLst/>
+          </a:prstGeom>
+          <a:solidFill>
+            <a:schemeClr val="accent2">
+              <a:lumMod val="20000"/>
+              <a:lumOff val="80000"/>
+            </a:schemeClr>
+          </a:solidFill>
+          <a:ln>
+            <a:solidFill>
+              <a:schemeClr val="accent2">
+                <a:lumMod val="75000"/>
+              </a:schemeClr>
+            </a:solidFill>
+          </a:ln>
+        </p:spPr>
+        <p:style>
+          <a:lnRef idx="2">
+            <a:schemeClr val="accent1">
+              <a:shade val="50000"/>
+            </a:schemeClr>
+          </a:lnRef>
+          <a:fillRef idx="1">
+            <a:schemeClr val="accent1"/>
+          </a:fillRef>
+          <a:effectRef idx="0">
+            <a:schemeClr val="accent1"/>
+          </a:effectRef>
+          <a:fontRef idx="minor">
+            <a:schemeClr val="lt1"/>
+          </a:fontRef>
+        </p:style>
+        <p:txBody>
+          <a:bodyPr rtlCol="0" anchor="ctr"/>
+          <a:lstStyle/>
+          <a:p>
+            <a:pPr algn="ctr"/>
+            <a:r>
+              <a:rPr lang="en-US" altLang="zh-CN" dirty="0">
+                <a:solidFill>
+                  <a:schemeClr val="tx1"/>
+                </a:solidFill>
+              </a:rPr>
+              <a:t>Call </a:t>
+            </a:r>
+            <a:r>
+              <a:rPr lang="en-US" altLang="zh-CN" dirty="0" err="1">
+                <a:solidFill>
+                  <a:schemeClr val="tx1"/>
+                </a:solidFill>
+              </a:rPr>
+              <a:t>getRangeAt</a:t>
+            </a:r>
+            <a:endParaRPr lang="en-US" dirty="0">
+              <a:solidFill>
+                <a:srgbClr val="FF0000"/>
+              </a:solidFill>
+            </a:endParaRPr>
+          </a:p>
+        </p:txBody>
+      </p:sp>
+      <p:sp>
+        <p:nvSpPr>
+          <p:cNvPr id="11" name="Rectangle: Rounded Corners 10">
+            <a:extLst>
+              <a:ext uri="{FF2B5EF4-FFF2-40B4-BE49-F238E27FC236}">
+                <a16:creationId xmlns:a16="http://schemas.microsoft.com/office/drawing/2014/main" id="{9577DAC0-99AD-381E-322C-9B79A30F310C}"/>
+              </a:ext>
+            </a:extLst>
+          </p:cNvPr>
+          <p:cNvSpPr/>
+          <p:nvPr/>
+        </p:nvSpPr>
+        <p:spPr>
+          <a:xfrm>
+            <a:off x="7897760" y="1201536"/>
+            <a:ext cx="1415844" cy="788521"/>
+          </a:xfrm>
+          <a:prstGeom prst="roundRect">
+            <a:avLst/>
+          </a:prstGeom>
+          <a:solidFill>
+            <a:schemeClr val="accent5">
+              <a:lumMod val="20000"/>
+              <a:lumOff val="80000"/>
+            </a:schemeClr>
+          </a:solidFill>
+          <a:ln>
+            <a:solidFill>
+              <a:schemeClr val="accent5">
+                <a:lumMod val="75000"/>
+              </a:schemeClr>
+            </a:solidFill>
+          </a:ln>
+        </p:spPr>
+        <p:style>
+          <a:lnRef idx="2">
+            <a:schemeClr val="accent1">
+              <a:shade val="50000"/>
+            </a:schemeClr>
+          </a:lnRef>
+          <a:fillRef idx="1">
+            <a:schemeClr val="accent1"/>
+          </a:fillRef>
+          <a:effectRef idx="0">
+            <a:schemeClr val="accent1"/>
+          </a:effectRef>
+          <a:fontRef idx="minor">
+            <a:schemeClr val="lt1"/>
+          </a:fontRef>
+        </p:style>
+        <p:txBody>
+          <a:bodyPr rtlCol="0" anchor="ctr"/>
+          <a:lstStyle/>
+          <a:p>
+            <a:pPr algn="ctr"/>
+            <a:r>
+              <a:rPr lang="en-US" altLang="zh-CN" dirty="0">
+                <a:solidFill>
+                  <a:schemeClr val="tx1"/>
+                </a:solidFill>
+              </a:rPr>
+              <a:t>r1(7)</a:t>
+            </a:r>
+          </a:p>
+          <a:p>
+            <a:pPr algn="ctr"/>
+            <a:r>
+              <a:rPr lang="en-US" dirty="0" err="1">
+                <a:solidFill>
+                  <a:srgbClr val="FF0000"/>
+                </a:solidFill>
+              </a:rPr>
+              <a:t>getRangeAt</a:t>
+            </a:r>
+            <a:endParaRPr lang="en-US" dirty="0">
+              <a:solidFill>
+                <a:srgbClr val="FF0000"/>
+              </a:solidFill>
+            </a:endParaRPr>
+          </a:p>
+        </p:txBody>
+      </p:sp>
+      <p:sp>
+        <p:nvSpPr>
+          <p:cNvPr id="12" name="Rectangle: Rounded Corners 11">
+            <a:extLst>
+              <a:ext uri="{FF2B5EF4-FFF2-40B4-BE49-F238E27FC236}">
+                <a16:creationId xmlns:a16="http://schemas.microsoft.com/office/drawing/2014/main" id="{E5168E16-F256-6847-3150-03777B2E61A3}"/>
+              </a:ext>
+            </a:extLst>
+          </p:cNvPr>
+          <p:cNvSpPr/>
+          <p:nvPr/>
+        </p:nvSpPr>
+        <p:spPr>
+          <a:xfrm>
+            <a:off x="7897760" y="2267821"/>
+            <a:ext cx="1415844" cy="788521"/>
+          </a:xfrm>
+          <a:prstGeom prst="roundRect">
+            <a:avLst/>
+          </a:prstGeom>
+          <a:solidFill>
+            <a:schemeClr val="accent5">
+              <a:lumMod val="20000"/>
+              <a:lumOff val="80000"/>
+            </a:schemeClr>
+          </a:solidFill>
+          <a:ln>
+            <a:solidFill>
+              <a:schemeClr val="accent5">
+                <a:lumMod val="75000"/>
+              </a:schemeClr>
+            </a:solidFill>
+          </a:ln>
+        </p:spPr>
+        <p:style>
+          <a:lnRef idx="2">
+            <a:schemeClr val="accent1">
+              <a:shade val="50000"/>
+            </a:schemeClr>
+          </a:lnRef>
+          <a:fillRef idx="1">
+            <a:schemeClr val="accent1"/>
+          </a:fillRef>
+          <a:effectRef idx="0">
+            <a:schemeClr val="accent1"/>
+          </a:effectRef>
+          <a:fontRef idx="minor">
+            <a:schemeClr val="lt1"/>
+          </a:fontRef>
+        </p:style>
+        <p:txBody>
+          <a:bodyPr rtlCol="0" anchor="ctr"/>
+          <a:lstStyle/>
+          <a:p>
+            <a:pPr algn="ctr"/>
+            <a:r>
+              <a:rPr lang="en-US" altLang="zh-CN" dirty="0">
+                <a:solidFill>
+                  <a:schemeClr val="tx1"/>
+                </a:solidFill>
+              </a:rPr>
+              <a:t>r2(9)</a:t>
+            </a:r>
+          </a:p>
+          <a:p>
+            <a:pPr algn="ctr"/>
+            <a:r>
+              <a:rPr lang="en-US" dirty="0" err="1">
+                <a:solidFill>
+                  <a:srgbClr val="FF0000"/>
+                </a:solidFill>
+              </a:rPr>
+              <a:t>getRangeAt</a:t>
+            </a:r>
+            <a:endParaRPr lang="en-US" dirty="0">
+              <a:solidFill>
+                <a:srgbClr val="FF0000"/>
+              </a:solidFill>
+            </a:endParaRPr>
+          </a:p>
+        </p:txBody>
+      </p:sp>
+      <p:sp>
+        <p:nvSpPr>
+          <p:cNvPr id="13" name="Rectangle: Rounded Corners 12">
+            <a:extLst>
+              <a:ext uri="{FF2B5EF4-FFF2-40B4-BE49-F238E27FC236}">
+                <a16:creationId xmlns:a16="http://schemas.microsoft.com/office/drawing/2014/main" id="{3758C776-88F2-6E9E-A734-2AAC935BDACB}"/>
+              </a:ext>
+            </a:extLst>
+          </p:cNvPr>
+          <p:cNvSpPr/>
+          <p:nvPr/>
+        </p:nvSpPr>
+        <p:spPr>
+          <a:xfrm>
+            <a:off x="7897760" y="3303119"/>
+            <a:ext cx="1415844" cy="788521"/>
+          </a:xfrm>
+          <a:prstGeom prst="roundRect">
+            <a:avLst/>
+          </a:prstGeom>
+          <a:solidFill>
+            <a:schemeClr val="accent5">
+              <a:lumMod val="20000"/>
+              <a:lumOff val="80000"/>
+            </a:schemeClr>
+          </a:solidFill>
+          <a:ln>
+            <a:solidFill>
+              <a:schemeClr val="accent5">
+                <a:lumMod val="75000"/>
+              </a:schemeClr>
+            </a:solidFill>
+          </a:ln>
+        </p:spPr>
+        <p:style>
+          <a:lnRef idx="2">
+            <a:schemeClr val="accent1">
+              <a:shade val="50000"/>
+            </a:schemeClr>
+          </a:lnRef>
+          <a:fillRef idx="1">
+            <a:schemeClr val="accent1"/>
+          </a:fillRef>
+          <a:effectRef idx="0">
+            <a:schemeClr val="accent1"/>
+          </a:effectRef>
+          <a:fontRef idx="minor">
+            <a:schemeClr val="lt1"/>
+          </a:fontRef>
+        </p:style>
+        <p:txBody>
+          <a:bodyPr rtlCol="0" anchor="ctr"/>
+          <a:lstStyle/>
+          <a:p>
+            <a:pPr algn="ctr"/>
+            <a:r>
+              <a:rPr lang="en-US" altLang="zh-CN" dirty="0">
+                <a:solidFill>
+                  <a:schemeClr val="tx1"/>
+                </a:solidFill>
+              </a:rPr>
+              <a:t>r3(13)</a:t>
+            </a:r>
+          </a:p>
+          <a:p>
+            <a:pPr algn="ctr"/>
+            <a:r>
+              <a:rPr lang="en-US" dirty="0" err="1">
+                <a:solidFill>
+                  <a:srgbClr val="FF0000"/>
+                </a:solidFill>
+              </a:rPr>
+              <a:t>getRangeAt</a:t>
+            </a:r>
+            <a:endParaRPr lang="en-US" dirty="0">
+              <a:solidFill>
+                <a:srgbClr val="FF0000"/>
+              </a:solidFill>
+            </a:endParaRPr>
+          </a:p>
+        </p:txBody>
+      </p:sp>
+      <p:cxnSp>
+        <p:nvCxnSpPr>
+          <p:cNvPr id="15" name="Straight Arrow Connector 14">
+            <a:extLst>
+              <a:ext uri="{FF2B5EF4-FFF2-40B4-BE49-F238E27FC236}">
+                <a16:creationId xmlns:a16="http://schemas.microsoft.com/office/drawing/2014/main" id="{6F06EC58-5C78-480E-8D4F-0A44555D22E9}"/>
+              </a:ext>
+            </a:extLst>
+          </p:cNvPr>
+          <p:cNvCxnSpPr>
+            <a:stCxn id="7" idx="2"/>
+            <a:endCxn id="8" idx="0"/>
+          </p:cNvCxnSpPr>
+          <p:nvPr/>
+        </p:nvCxnSpPr>
+        <p:spPr>
+          <a:xfrm>
+            <a:off x="3952567" y="1990057"/>
+            <a:ext cx="0" cy="277764"/>
+          </a:xfrm>
+          <a:prstGeom prst="straightConnector1">
+            <a:avLst/>
+          </a:prstGeom>
+          <a:ln>
+            <a:tailEnd type="triangle"/>
+          </a:ln>
+        </p:spPr>
+        <p:style>
+          <a:lnRef idx="1">
+            <a:schemeClr val="accent1"/>
+          </a:lnRef>
+          <a:fillRef idx="0">
+            <a:schemeClr val="accent1"/>
+          </a:fillRef>
+          <a:effectRef idx="0">
+            <a:schemeClr val="accent1"/>
+          </a:effectRef>
+          <a:fontRef idx="minor">
+            <a:schemeClr val="tx1"/>
+          </a:fontRef>
+        </p:style>
+      </p:cxnSp>
+      <p:cxnSp>
+        <p:nvCxnSpPr>
+          <p:cNvPr id="16" name="Straight Arrow Connector 15">
+            <a:extLst>
+              <a:ext uri="{FF2B5EF4-FFF2-40B4-BE49-F238E27FC236}">
+                <a16:creationId xmlns:a16="http://schemas.microsoft.com/office/drawing/2014/main" id="{EE9D5372-0E8F-C461-19C6-E04AF5BC0E73}"/>
+              </a:ext>
+            </a:extLst>
+          </p:cNvPr>
+          <p:cNvCxnSpPr>
+            <a:cxnSpLocks/>
+            <a:stCxn id="8" idx="2"/>
+            <a:endCxn id="9" idx="0"/>
+          </p:cNvCxnSpPr>
+          <p:nvPr/>
+        </p:nvCxnSpPr>
+        <p:spPr>
+          <a:xfrm>
+            <a:off x="3952567" y="3056342"/>
+            <a:ext cx="0" cy="277764"/>
+          </a:xfrm>
+          <a:prstGeom prst="straightConnector1">
+            <a:avLst/>
+          </a:prstGeom>
+          <a:ln>
+            <a:tailEnd type="triangle"/>
+          </a:ln>
+        </p:spPr>
+        <p:style>
+          <a:lnRef idx="1">
+            <a:schemeClr val="accent1"/>
+          </a:lnRef>
+          <a:fillRef idx="0">
+            <a:schemeClr val="accent1"/>
+          </a:fillRef>
+          <a:effectRef idx="0">
+            <a:schemeClr val="accent1"/>
+          </a:effectRef>
+          <a:fontRef idx="minor">
+            <a:schemeClr val="tx1"/>
+          </a:fontRef>
+        </p:style>
+      </p:cxnSp>
+      <p:cxnSp>
+        <p:nvCxnSpPr>
+          <p:cNvPr id="17" name="Straight Arrow Connector 16">
+            <a:extLst>
+              <a:ext uri="{FF2B5EF4-FFF2-40B4-BE49-F238E27FC236}">
+                <a16:creationId xmlns:a16="http://schemas.microsoft.com/office/drawing/2014/main" id="{76364F1C-F5EE-3F63-862B-C2B4CB5B8B96}"/>
+              </a:ext>
+            </a:extLst>
+          </p:cNvPr>
+          <p:cNvCxnSpPr>
+            <a:cxnSpLocks/>
+            <a:stCxn id="10" idx="2"/>
+            <a:endCxn id="11" idx="0"/>
+          </p:cNvCxnSpPr>
+          <p:nvPr/>
+        </p:nvCxnSpPr>
+        <p:spPr>
+          <a:xfrm>
+            <a:off x="8605682" y="923772"/>
+            <a:ext cx="0" cy="277764"/>
+          </a:xfrm>
+          <a:prstGeom prst="straightConnector1">
+            <a:avLst/>
+          </a:prstGeom>
+          <a:ln>
+            <a:tailEnd type="triangle"/>
+          </a:ln>
+        </p:spPr>
+        <p:style>
+          <a:lnRef idx="1">
+            <a:schemeClr val="accent1"/>
+          </a:lnRef>
+          <a:fillRef idx="0">
+            <a:schemeClr val="accent1"/>
+          </a:fillRef>
+          <a:effectRef idx="0">
+            <a:schemeClr val="accent1"/>
+          </a:effectRef>
+          <a:fontRef idx="minor">
+            <a:schemeClr val="tx1"/>
+          </a:fontRef>
+        </p:style>
+      </p:cxnSp>
+      <p:cxnSp>
+        <p:nvCxnSpPr>
+          <p:cNvPr id="18" name="Straight Arrow Connector 17">
+            <a:extLst>
+              <a:ext uri="{FF2B5EF4-FFF2-40B4-BE49-F238E27FC236}">
+                <a16:creationId xmlns:a16="http://schemas.microsoft.com/office/drawing/2014/main" id="{9DA6EC7A-3178-387E-929F-E1488AE5A738}"/>
+              </a:ext>
+            </a:extLst>
+          </p:cNvPr>
+          <p:cNvCxnSpPr>
+            <a:cxnSpLocks/>
+            <a:stCxn id="11" idx="2"/>
+            <a:endCxn id="12" idx="0"/>
+          </p:cNvCxnSpPr>
+          <p:nvPr/>
+        </p:nvCxnSpPr>
+        <p:spPr>
+          <a:xfrm>
+            <a:off x="8605682" y="1990057"/>
+            <a:ext cx="0" cy="277764"/>
+          </a:xfrm>
+          <a:prstGeom prst="straightConnector1">
+            <a:avLst/>
+          </a:prstGeom>
+          <a:ln>
+            <a:tailEnd type="triangle"/>
+          </a:ln>
+        </p:spPr>
+        <p:style>
+          <a:lnRef idx="1">
+            <a:schemeClr val="accent1"/>
+          </a:lnRef>
+          <a:fillRef idx="0">
+            <a:schemeClr val="accent1"/>
+          </a:fillRef>
+          <a:effectRef idx="0">
+            <a:schemeClr val="accent1"/>
+          </a:effectRef>
+          <a:fontRef idx="minor">
+            <a:schemeClr val="tx1"/>
+          </a:fontRef>
+        </p:style>
+      </p:cxnSp>
+      <p:cxnSp>
+        <p:nvCxnSpPr>
+          <p:cNvPr id="19" name="Straight Arrow Connector 18">
+            <a:extLst>
+              <a:ext uri="{FF2B5EF4-FFF2-40B4-BE49-F238E27FC236}">
+                <a16:creationId xmlns:a16="http://schemas.microsoft.com/office/drawing/2014/main" id="{A79D0EC6-78FA-942A-F83F-27F2E9FBDB75}"/>
+              </a:ext>
+            </a:extLst>
+          </p:cNvPr>
+          <p:cNvCxnSpPr>
+            <a:cxnSpLocks/>
+            <a:stCxn id="12" idx="2"/>
+            <a:endCxn id="13" idx="0"/>
+          </p:cNvCxnSpPr>
+          <p:nvPr/>
+        </p:nvCxnSpPr>
+        <p:spPr>
+          <a:xfrm>
+            <a:off x="8605682" y="3056342"/>
+            <a:ext cx="0" cy="246777"/>
+          </a:xfrm>
+          <a:prstGeom prst="straightConnector1">
+            <a:avLst/>
+          </a:prstGeom>
+          <a:ln>
+            <a:tailEnd type="triangle"/>
+          </a:ln>
+        </p:spPr>
+        <p:style>
+          <a:lnRef idx="1">
+            <a:schemeClr val="accent1"/>
+          </a:lnRef>
+          <a:fillRef idx="0">
+            <a:schemeClr val="accent1"/>
+          </a:fillRef>
+          <a:effectRef idx="0">
+            <a:schemeClr val="accent1"/>
+          </a:effectRef>
+          <a:fontRef idx="minor">
+            <a:schemeClr val="tx1"/>
+          </a:fontRef>
+        </p:style>
+      </p:cxnSp>
+      <p:cxnSp>
+        <p:nvCxnSpPr>
+          <p:cNvPr id="20" name="Straight Arrow Connector 19">
+            <a:extLst>
+              <a:ext uri="{FF2B5EF4-FFF2-40B4-BE49-F238E27FC236}">
+                <a16:creationId xmlns:a16="http://schemas.microsoft.com/office/drawing/2014/main" id="{75B20009-50D4-484F-8B01-D64CD5F9849A}"/>
+              </a:ext>
+            </a:extLst>
+          </p:cNvPr>
+          <p:cNvCxnSpPr>
+            <a:cxnSpLocks/>
+            <a:stCxn id="13" idx="2"/>
+            <a:endCxn id="5" idx="0"/>
+          </p:cNvCxnSpPr>
+          <p:nvPr/>
+        </p:nvCxnSpPr>
+        <p:spPr>
+          <a:xfrm flipH="1">
+            <a:off x="6400801" y="4091640"/>
+            <a:ext cx="2204881" cy="310472"/>
+          </a:xfrm>
+          <a:prstGeom prst="straightConnector1">
+            <a:avLst/>
+          </a:prstGeom>
+          <a:ln>
+            <a:tailEnd type="triangle"/>
+          </a:ln>
+        </p:spPr>
+        <p:style>
+          <a:lnRef idx="1">
+            <a:schemeClr val="accent1"/>
+          </a:lnRef>
+          <a:fillRef idx="0">
+            <a:schemeClr val="accent1"/>
+          </a:fillRef>
+          <a:effectRef idx="0">
+            <a:schemeClr val="accent1"/>
+          </a:effectRef>
+          <a:fontRef idx="minor">
+            <a:schemeClr val="tx1"/>
+          </a:fontRef>
+        </p:style>
+      </p:cxnSp>
+      <p:cxnSp>
+        <p:nvCxnSpPr>
+          <p:cNvPr id="23" name="Straight Arrow Connector 22">
+            <a:extLst>
+              <a:ext uri="{FF2B5EF4-FFF2-40B4-BE49-F238E27FC236}">
+                <a16:creationId xmlns:a16="http://schemas.microsoft.com/office/drawing/2014/main" id="{8EFFA105-8D17-61C5-FA03-8C7F0C578393}"/>
+              </a:ext>
+            </a:extLst>
+          </p:cNvPr>
+          <p:cNvCxnSpPr>
+            <a:cxnSpLocks/>
+            <a:stCxn id="9" idx="2"/>
+            <a:endCxn id="5" idx="0"/>
+          </p:cNvCxnSpPr>
+          <p:nvPr/>
+        </p:nvCxnSpPr>
+        <p:spPr>
+          <a:xfrm>
+            <a:off x="3952567" y="4122627"/>
+            <a:ext cx="2448234" cy="279485"/>
+          </a:xfrm>
+          <a:prstGeom prst="straightConnector1">
+            <a:avLst/>
+          </a:prstGeom>
+          <a:ln>
+            <a:tailEnd type="triangle"/>
+          </a:ln>
+        </p:spPr>
+        <p:style>
+          <a:lnRef idx="1">
+            <a:schemeClr val="accent1"/>
+          </a:lnRef>
+          <a:fillRef idx="0">
+            <a:schemeClr val="accent1"/>
+          </a:fillRef>
+          <a:effectRef idx="0">
+            <a:schemeClr val="accent1"/>
+          </a:effectRef>
+          <a:fontRef idx="minor">
+            <a:schemeClr val="tx1"/>
+          </a:fontRef>
+        </p:style>
+      </p:cxnSp>
+      <p:cxnSp>
+        <p:nvCxnSpPr>
+          <p:cNvPr id="26" name="Straight Arrow Connector 25">
+            <a:extLst>
+              <a:ext uri="{FF2B5EF4-FFF2-40B4-BE49-F238E27FC236}">
+                <a16:creationId xmlns:a16="http://schemas.microsoft.com/office/drawing/2014/main" id="{BEA563E3-25BC-631C-B762-DBF1A110F242}"/>
+              </a:ext>
+            </a:extLst>
+          </p:cNvPr>
+          <p:cNvCxnSpPr>
+            <a:cxnSpLocks/>
+            <a:stCxn id="4" idx="2"/>
+            <a:endCxn id="5" idx="0"/>
+          </p:cNvCxnSpPr>
+          <p:nvPr/>
+        </p:nvCxnSpPr>
+        <p:spPr>
+          <a:xfrm>
+            <a:off x="6400801" y="4122627"/>
+            <a:ext cx="0" cy="279485"/>
+          </a:xfrm>
+          <a:prstGeom prst="straightConnector1">
+            <a:avLst/>
+          </a:prstGeom>
+          <a:ln>
+            <a:tailEnd type="triangle"/>
+          </a:ln>
+        </p:spPr>
+        <p:style>
+          <a:lnRef idx="1">
+            <a:schemeClr val="accent1"/>
+          </a:lnRef>
+          <a:fillRef idx="0">
+            <a:schemeClr val="accent1"/>
+          </a:fillRef>
+          <a:effectRef idx="0">
+            <a:schemeClr val="accent1"/>
+          </a:effectRef>
+          <a:fontRef idx="minor">
+            <a:schemeClr val="tx1"/>
+          </a:fontRef>
+        </p:style>
+      </p:cxnSp>
+      <p:cxnSp>
+        <p:nvCxnSpPr>
+          <p:cNvPr id="29" name="Straight Arrow Connector 28">
+            <a:extLst>
+              <a:ext uri="{FF2B5EF4-FFF2-40B4-BE49-F238E27FC236}">
+                <a16:creationId xmlns:a16="http://schemas.microsoft.com/office/drawing/2014/main" id="{E44D37C4-3282-24CF-CF00-49E909DA3B98}"/>
+              </a:ext>
+            </a:extLst>
+          </p:cNvPr>
+          <p:cNvCxnSpPr>
+            <a:cxnSpLocks/>
+            <a:stCxn id="5" idx="2"/>
+            <a:endCxn id="6" idx="0"/>
+          </p:cNvCxnSpPr>
+          <p:nvPr/>
+        </p:nvCxnSpPr>
+        <p:spPr>
+          <a:xfrm>
+            <a:off x="6400801" y="5190633"/>
+            <a:ext cx="0" cy="276043"/>
+          </a:xfrm>
+          <a:prstGeom prst="straightConnector1">
+            <a:avLst/>
+          </a:prstGeom>
+          <a:ln>
+            <a:tailEnd type="triangle"/>
+          </a:ln>
+        </p:spPr>
+        <p:style>
+          <a:lnRef idx="1">
+            <a:schemeClr val="accent1"/>
+          </a:lnRef>
+          <a:fillRef idx="0">
+            <a:schemeClr val="accent1"/>
+          </a:fillRef>
+          <a:effectRef idx="0">
+            <a:schemeClr val="accent1"/>
+          </a:effectRef>
+          <a:fontRef idx="minor">
+            <a:schemeClr val="tx1"/>
+          </a:fontRef>
+        </p:style>
+      </p:cxnSp>
+      <p:cxnSp>
+        <p:nvCxnSpPr>
+          <p:cNvPr id="55" name="Straight Arrow Connector 54">
+            <a:extLst>
+              <a:ext uri="{FF2B5EF4-FFF2-40B4-BE49-F238E27FC236}">
+                <a16:creationId xmlns:a16="http://schemas.microsoft.com/office/drawing/2014/main" id="{E9FDB852-6B18-D03E-E655-04A52FC37585}"/>
+              </a:ext>
+            </a:extLst>
+          </p:cNvPr>
+          <p:cNvCxnSpPr>
+            <a:cxnSpLocks/>
+            <a:stCxn id="13" idx="2"/>
+          </p:cNvCxnSpPr>
+          <p:nvPr/>
+        </p:nvCxnSpPr>
+        <p:spPr>
+          <a:xfrm>
+            <a:off x="8605682" y="4091640"/>
+            <a:ext cx="0" cy="310472"/>
+          </a:xfrm>
+          <a:prstGeom prst="straightConnector1">
+            <a:avLst/>
+          </a:prstGeom>
+          <a:ln>
+            <a:tailEnd type="triangle"/>
+          </a:ln>
+        </p:spPr>
+        <p:style>
+          <a:lnRef idx="1">
+            <a:schemeClr val="accent1"/>
+          </a:lnRef>
+          <a:fillRef idx="0">
+            <a:schemeClr val="accent1"/>
+          </a:fillRef>
+          <a:effectRef idx="0">
+            <a:schemeClr val="accent1"/>
+          </a:effectRef>
+          <a:fontRef idx="minor">
+            <a:schemeClr val="tx1"/>
+          </a:fontRef>
+        </p:style>
+      </p:cxnSp>
+      <p:cxnSp>
+        <p:nvCxnSpPr>
+          <p:cNvPr id="56" name="Straight Arrow Connector 55">
+            <a:extLst>
+              <a:ext uri="{FF2B5EF4-FFF2-40B4-BE49-F238E27FC236}">
+                <a16:creationId xmlns:a16="http://schemas.microsoft.com/office/drawing/2014/main" id="{0CE12F07-2546-3E12-766C-6D132D05B8DD}"/>
+              </a:ext>
+            </a:extLst>
+          </p:cNvPr>
+          <p:cNvCxnSpPr>
+            <a:cxnSpLocks/>
+            <a:stCxn id="6" idx="2"/>
+          </p:cNvCxnSpPr>
+          <p:nvPr/>
+        </p:nvCxnSpPr>
+        <p:spPr>
+          <a:xfrm flipH="1">
+            <a:off x="6393424" y="6255197"/>
+            <a:ext cx="7377" cy="246777"/>
+          </a:xfrm>
+          <a:prstGeom prst="straightConnector1">
+            <a:avLst/>
+          </a:prstGeom>
+          <a:ln>
+            <a:tailEnd type="triangle"/>
+          </a:ln>
+        </p:spPr>
+        <p:style>
+          <a:lnRef idx="1">
+            <a:schemeClr val="accent1"/>
+          </a:lnRef>
+          <a:fillRef idx="0">
+            <a:schemeClr val="accent1"/>
+          </a:fillRef>
+          <a:effectRef idx="0">
+            <a:schemeClr val="accent1"/>
+          </a:effectRef>
+          <a:fontRef idx="minor">
+            <a:schemeClr val="tx1"/>
+          </a:fontRef>
+        </p:style>
+      </p:cxnSp>
+      <p:cxnSp>
+        <p:nvCxnSpPr>
+          <p:cNvPr id="57" name="Straight Arrow Connector 56">
+            <a:extLst>
+              <a:ext uri="{FF2B5EF4-FFF2-40B4-BE49-F238E27FC236}">
+                <a16:creationId xmlns:a16="http://schemas.microsoft.com/office/drawing/2014/main" id="{7342D304-61E8-F837-4970-DF4CD5AE7E86}"/>
+              </a:ext>
+            </a:extLst>
+          </p:cNvPr>
+          <p:cNvCxnSpPr>
+            <a:cxnSpLocks/>
+            <a:stCxn id="9" idx="2"/>
+          </p:cNvCxnSpPr>
+          <p:nvPr/>
+        </p:nvCxnSpPr>
+        <p:spPr>
+          <a:xfrm>
+            <a:off x="3952567" y="4122627"/>
+            <a:ext cx="0" cy="246777"/>
+          </a:xfrm>
+          <a:prstGeom prst="straightConnector1">
+            <a:avLst/>
+          </a:prstGeom>
+          <a:ln>
+            <a:tailEnd type="triangle"/>
+          </a:ln>
+        </p:spPr>
+        <p:style>
+          <a:lnRef idx="1">
+            <a:schemeClr val="accent1"/>
+          </a:lnRef>
+          <a:fillRef idx="0">
+            <a:schemeClr val="accent1"/>
+          </a:fillRef>
+          <a:effectRef idx="0">
+            <a:schemeClr val="accent1"/>
+          </a:effectRef>
+          <a:fontRef idx="minor">
+            <a:schemeClr val="tx1"/>
+          </a:fontRef>
+        </p:style>
+      </p:cxnSp>
+      <p:sp>
+        <p:nvSpPr>
+          <p:cNvPr id="61" name="TextBox 60">
+            <a:extLst>
+              <a:ext uri="{FF2B5EF4-FFF2-40B4-BE49-F238E27FC236}">
+                <a16:creationId xmlns:a16="http://schemas.microsoft.com/office/drawing/2014/main" id="{47136017-D864-AAA7-36EC-F1E7794A6CE4}"/>
+              </a:ext>
+            </a:extLst>
+          </p:cNvPr>
+          <p:cNvSpPr txBox="1"/>
+          <p:nvPr/>
+        </p:nvSpPr>
+        <p:spPr>
+          <a:xfrm>
+            <a:off x="3780884" y="4332221"/>
+            <a:ext cx="343364" cy="369332"/>
+          </a:xfrm>
+          <a:prstGeom prst="rect">
+            <a:avLst/>
+          </a:prstGeom>
+          <a:noFill/>
         </p:spPr>
         <p:txBody>
-          <a:bodyPr/>
+          <a:bodyPr wrap="none" rtlCol="0">
+            <a:spAutoFit/>
+          </a:bodyPr>
           <a:lstStyle/>
           <a:p>
-            <a:endParaRPr lang="en-US"/>
+            <a:r>
+              <a:rPr lang="en-US" dirty="0"/>
+              <a:t>…</a:t>
+            </a:r>
+          </a:p>
+        </p:txBody>
+      </p:sp>
+      <p:sp>
+        <p:nvSpPr>
+          <p:cNvPr id="62" name="TextBox 61">
+            <a:extLst>
+              <a:ext uri="{FF2B5EF4-FFF2-40B4-BE49-F238E27FC236}">
+                <a16:creationId xmlns:a16="http://schemas.microsoft.com/office/drawing/2014/main" id="{52906713-364E-C8A4-D268-BBF92DCBDC55}"/>
+              </a:ext>
+            </a:extLst>
+          </p:cNvPr>
+          <p:cNvSpPr txBox="1"/>
+          <p:nvPr/>
+        </p:nvSpPr>
+        <p:spPr>
+          <a:xfrm>
+            <a:off x="8444596" y="4332221"/>
+            <a:ext cx="343364" cy="369332"/>
+          </a:xfrm>
+          <a:prstGeom prst="rect">
+            <a:avLst/>
+          </a:prstGeom>
+          <a:noFill/>
+        </p:spPr>
+        <p:txBody>
+          <a:bodyPr wrap="none" rtlCol="0">
+            <a:spAutoFit/>
+          </a:bodyPr>
+          <a:lstStyle/>
+          <a:p>
+            <a:r>
+              <a:rPr lang="en-US" dirty="0"/>
+              <a:t>…</a:t>
+            </a:r>
+          </a:p>
+        </p:txBody>
+      </p:sp>
+      <p:sp>
+        <p:nvSpPr>
+          <p:cNvPr id="63" name="TextBox 62">
+            <a:extLst>
+              <a:ext uri="{FF2B5EF4-FFF2-40B4-BE49-F238E27FC236}">
+                <a16:creationId xmlns:a16="http://schemas.microsoft.com/office/drawing/2014/main" id="{ED06E9BA-AF06-AD80-816A-526569AE2393}"/>
+              </a:ext>
+            </a:extLst>
+          </p:cNvPr>
+          <p:cNvSpPr txBox="1"/>
+          <p:nvPr/>
+        </p:nvSpPr>
+        <p:spPr>
+          <a:xfrm>
+            <a:off x="6221742" y="6378585"/>
+            <a:ext cx="343364" cy="369332"/>
+          </a:xfrm>
+          <a:prstGeom prst="rect">
+            <a:avLst/>
+          </a:prstGeom>
+          <a:noFill/>
+        </p:spPr>
+        <p:txBody>
+          <a:bodyPr wrap="none" rtlCol="0">
+            <a:spAutoFit/>
+          </a:bodyPr>
+          <a:lstStyle/>
+          <a:p>
+            <a:r>
+              <a:rPr lang="en-US" dirty="0"/>
+              <a:t>…</a:t>
+            </a:r>
           </a:p>
         </p:txBody>
       </p:sp>
     </p:spTree>
     <p:extLst>
       <p:ext uri="{BB962C8B-B14F-4D97-AF65-F5344CB8AC3E}">
-        <p14:creationId xmlns:p14="http://schemas.microsoft.com/office/powerpoint/2010/main" val="969528821"/>
+        <p14:creationId xmlns:p14="http://schemas.microsoft.com/office/powerpoint/2010/main" val="2179981605"/>
       </p:ext>
     </p:extLst>
   </p:cSld>

</xml_diff>

<commit_message>
fixing the examples and relevant line info
</commit_message>
<xml_diff>
--- a/figures/figures.pptx
+++ b/figures/figures.pptx
@@ -17,6 +17,7 @@
     <p:sldId id="266" r:id="rId11"/>
     <p:sldId id="267" r:id="rId12"/>
     <p:sldId id="268" r:id="rId13"/>
+    <p:sldId id="269" r:id="rId14"/>
   </p:sldIdLst>
   <p:sldSz cx="12192000" cy="6858000"/>
   <p:notesSz cx="6858000" cy="9144000"/>
@@ -12947,6 +12948,1237 @@
 </p:sld>
 </file>
 
+<file path=ppt/slides/slide13.xml><?xml version="1.0" encoding="utf-8"?>
+<p:sld xmlns:a="http://schemas.openxmlformats.org/drawingml/2006/main" xmlns:r="http://schemas.openxmlformats.org/officeDocument/2006/relationships" xmlns:p="http://schemas.openxmlformats.org/presentationml/2006/main">
+  <p:cSld>
+    <p:spTree>
+      <p:nvGrpSpPr>
+        <p:cNvPr id="1" name=""/>
+        <p:cNvGrpSpPr/>
+        <p:nvPr/>
+      </p:nvGrpSpPr>
+      <p:grpSpPr>
+        <a:xfrm>
+          <a:off x="0" y="0"/>
+          <a:ext cx="0" cy="0"/>
+          <a:chOff x="0" y="0"/>
+          <a:chExt cx="0" cy="0"/>
+        </a:xfrm>
+      </p:grpSpPr>
+      <p:sp>
+        <p:nvSpPr>
+          <p:cNvPr id="5" name="Rectangle: Rounded Corners 4">
+            <a:extLst>
+              <a:ext uri="{FF2B5EF4-FFF2-40B4-BE49-F238E27FC236}">
+                <a16:creationId xmlns:a16="http://schemas.microsoft.com/office/drawing/2014/main" id="{428073A7-2ECF-864D-99C4-2740AF3D0DFF}"/>
+              </a:ext>
+            </a:extLst>
+          </p:cNvPr>
+          <p:cNvSpPr/>
+          <p:nvPr/>
+        </p:nvSpPr>
+        <p:spPr>
+          <a:xfrm>
+            <a:off x="5692879" y="4402112"/>
+            <a:ext cx="1415844" cy="788521"/>
+          </a:xfrm>
+          <a:prstGeom prst="roundRect">
+            <a:avLst/>
+          </a:prstGeom>
+          <a:solidFill>
+            <a:schemeClr val="accent2">
+              <a:lumMod val="20000"/>
+              <a:lumOff val="80000"/>
+            </a:schemeClr>
+          </a:solidFill>
+          <a:ln>
+            <a:solidFill>
+              <a:schemeClr val="accent2">
+                <a:lumMod val="75000"/>
+              </a:schemeClr>
+            </a:solidFill>
+          </a:ln>
+        </p:spPr>
+        <p:style>
+          <a:lnRef idx="2">
+            <a:schemeClr val="accent1">
+              <a:shade val="50000"/>
+            </a:schemeClr>
+          </a:lnRef>
+          <a:fillRef idx="1">
+            <a:schemeClr val="accent1"/>
+          </a:fillRef>
+          <a:effectRef idx="0">
+            <a:schemeClr val="accent1"/>
+          </a:effectRef>
+          <a:fontRef idx="minor">
+            <a:schemeClr val="lt1"/>
+          </a:fontRef>
+        </p:style>
+        <p:txBody>
+          <a:bodyPr rtlCol="0" anchor="ctr"/>
+          <a:lstStyle/>
+          <a:p>
+            <a:pPr algn="ctr"/>
+            <a:r>
+              <a:rPr lang="en-US" altLang="zh-CN" dirty="0" err="1">
+                <a:solidFill>
+                  <a:schemeClr val="tx1"/>
+                </a:solidFill>
+              </a:rPr>
+              <a:t>Dict_write</a:t>
+            </a:r>
+            <a:endParaRPr lang="en-US" dirty="0">
+              <a:solidFill>
+                <a:srgbClr val="FF0000"/>
+              </a:solidFill>
+            </a:endParaRPr>
+          </a:p>
+        </p:txBody>
+      </p:sp>
+      <p:sp>
+        <p:nvSpPr>
+          <p:cNvPr id="6" name="Rectangle: Rounded Corners 5">
+            <a:extLst>
+              <a:ext uri="{FF2B5EF4-FFF2-40B4-BE49-F238E27FC236}">
+                <a16:creationId xmlns:a16="http://schemas.microsoft.com/office/drawing/2014/main" id="{76A8187A-E841-1A68-C629-F4FD6B5D709F}"/>
+              </a:ext>
+            </a:extLst>
+          </p:cNvPr>
+          <p:cNvSpPr/>
+          <p:nvPr/>
+        </p:nvSpPr>
+        <p:spPr>
+          <a:xfrm>
+            <a:off x="5692879" y="5466676"/>
+            <a:ext cx="1415844" cy="788521"/>
+          </a:xfrm>
+          <a:prstGeom prst="roundRect">
+            <a:avLst/>
+          </a:prstGeom>
+          <a:solidFill>
+            <a:schemeClr val="accent5">
+              <a:lumMod val="20000"/>
+              <a:lumOff val="80000"/>
+            </a:schemeClr>
+          </a:solidFill>
+          <a:ln>
+            <a:solidFill>
+              <a:schemeClr val="accent5">
+                <a:lumMod val="75000"/>
+              </a:schemeClr>
+            </a:solidFill>
+          </a:ln>
+        </p:spPr>
+        <p:style>
+          <a:lnRef idx="2">
+            <a:schemeClr val="accent1">
+              <a:shade val="50000"/>
+            </a:schemeClr>
+          </a:lnRef>
+          <a:fillRef idx="1">
+            <a:schemeClr val="accent1"/>
+          </a:fillRef>
+          <a:effectRef idx="0">
+            <a:schemeClr val="accent1"/>
+          </a:effectRef>
+          <a:fontRef idx="minor">
+            <a:schemeClr val="lt1"/>
+          </a:fontRef>
+        </p:style>
+        <p:txBody>
+          <a:bodyPr rtlCol="0" anchor="ctr"/>
+          <a:lstStyle/>
+          <a:p>
+            <a:pPr algn="ctr"/>
+            <a:r>
+              <a:rPr lang="en-US" altLang="zh-CN" dirty="0">
+                <a:solidFill>
+                  <a:schemeClr val="tx1"/>
+                </a:solidFill>
+              </a:rPr>
+              <a:t>p1(11)</a:t>
+            </a:r>
+          </a:p>
+          <a:p>
+            <a:pPr algn="ctr"/>
+            <a:r>
+              <a:rPr lang="en-US" dirty="0" err="1">
+                <a:solidFill>
+                  <a:srgbClr val="FF0000"/>
+                </a:solidFill>
+              </a:rPr>
+              <a:t>Dict</a:t>
+            </a:r>
+            <a:r>
+              <a:rPr lang="en-US" dirty="0">
+                <a:solidFill>
+                  <a:srgbClr val="FF0000"/>
+                </a:solidFill>
+              </a:rPr>
+              <a:t>[str, int]</a:t>
+            </a:r>
+          </a:p>
+        </p:txBody>
+      </p:sp>
+      <p:sp>
+        <p:nvSpPr>
+          <p:cNvPr id="8" name="Rectangle: Rounded Corners 7">
+            <a:extLst>
+              <a:ext uri="{FF2B5EF4-FFF2-40B4-BE49-F238E27FC236}">
+                <a16:creationId xmlns:a16="http://schemas.microsoft.com/office/drawing/2014/main" id="{7E84499C-CDCB-8283-25E3-8FED0644EFE1}"/>
+              </a:ext>
+            </a:extLst>
+          </p:cNvPr>
+          <p:cNvSpPr/>
+          <p:nvPr/>
+        </p:nvSpPr>
+        <p:spPr>
+          <a:xfrm>
+            <a:off x="3244645" y="2267821"/>
+            <a:ext cx="1415844" cy="788521"/>
+          </a:xfrm>
+          <a:prstGeom prst="roundRect">
+            <a:avLst/>
+          </a:prstGeom>
+          <a:solidFill>
+            <a:schemeClr val="accent2">
+              <a:lumMod val="20000"/>
+              <a:lumOff val="80000"/>
+            </a:schemeClr>
+          </a:solidFill>
+          <a:ln>
+            <a:solidFill>
+              <a:schemeClr val="accent2">
+                <a:lumMod val="75000"/>
+              </a:schemeClr>
+            </a:solidFill>
+          </a:ln>
+        </p:spPr>
+        <p:style>
+          <a:lnRef idx="2">
+            <a:schemeClr val="accent1">
+              <a:shade val="50000"/>
+            </a:schemeClr>
+          </a:lnRef>
+          <a:fillRef idx="1">
+            <a:schemeClr val="accent1"/>
+          </a:fillRef>
+          <a:effectRef idx="0">
+            <a:schemeClr val="accent1"/>
+          </a:effectRef>
+          <a:fontRef idx="minor">
+            <a:schemeClr val="lt1"/>
+          </a:fontRef>
+        </p:style>
+        <p:txBody>
+          <a:bodyPr rtlCol="0" anchor="ctr"/>
+          <a:lstStyle/>
+          <a:p>
+            <a:pPr algn="ctr"/>
+            <a:r>
+              <a:rPr lang="en-US" altLang="zh-CN" dirty="0">
+                <a:solidFill>
+                  <a:schemeClr val="tx1"/>
+                </a:solidFill>
+              </a:rPr>
+              <a:t>CALL </a:t>
+            </a:r>
+            <a:r>
+              <a:rPr lang="en-US" altLang="zh-CN" dirty="0" err="1">
+                <a:solidFill>
+                  <a:schemeClr val="tx1"/>
+                </a:solidFill>
+              </a:rPr>
+              <a:t>len</a:t>
+            </a:r>
+            <a:endParaRPr lang="en-US" dirty="0">
+              <a:solidFill>
+                <a:srgbClr val="FF0000"/>
+              </a:solidFill>
+            </a:endParaRPr>
+          </a:p>
+        </p:txBody>
+      </p:sp>
+      <p:sp>
+        <p:nvSpPr>
+          <p:cNvPr id="9" name="Rectangle: Rounded Corners 8">
+            <a:extLst>
+              <a:ext uri="{FF2B5EF4-FFF2-40B4-BE49-F238E27FC236}">
+                <a16:creationId xmlns:a16="http://schemas.microsoft.com/office/drawing/2014/main" id="{91154D63-5599-EFF9-279F-44BCDE312A73}"/>
+              </a:ext>
+            </a:extLst>
+          </p:cNvPr>
+          <p:cNvSpPr/>
+          <p:nvPr/>
+        </p:nvSpPr>
+        <p:spPr>
+          <a:xfrm>
+            <a:off x="3244645" y="3334106"/>
+            <a:ext cx="1415844" cy="788521"/>
+          </a:xfrm>
+          <a:prstGeom prst="roundRect">
+            <a:avLst/>
+          </a:prstGeom>
+          <a:solidFill>
+            <a:schemeClr val="accent5">
+              <a:lumMod val="20000"/>
+              <a:lumOff val="80000"/>
+            </a:schemeClr>
+          </a:solidFill>
+          <a:ln>
+            <a:solidFill>
+              <a:schemeClr val="accent5">
+                <a:lumMod val="75000"/>
+              </a:schemeClr>
+            </a:solidFill>
+          </a:ln>
+        </p:spPr>
+        <p:style>
+          <a:lnRef idx="2">
+            <a:schemeClr val="accent1">
+              <a:shade val="50000"/>
+            </a:schemeClr>
+          </a:lnRef>
+          <a:fillRef idx="1">
+            <a:schemeClr val="accent1"/>
+          </a:fillRef>
+          <a:effectRef idx="0">
+            <a:schemeClr val="accent1"/>
+          </a:effectRef>
+          <a:fontRef idx="minor">
+            <a:schemeClr val="lt1"/>
+          </a:fontRef>
+        </p:style>
+        <p:txBody>
+          <a:bodyPr rtlCol="0" anchor="ctr"/>
+          <a:lstStyle/>
+          <a:p>
+            <a:pPr algn="ctr"/>
+            <a:r>
+              <a:rPr lang="en-US" altLang="zh-CN" dirty="0">
+                <a:solidFill>
+                  <a:schemeClr val="tx1"/>
+                </a:solidFill>
+              </a:rPr>
+              <a:t>m1(10)</a:t>
+            </a:r>
+          </a:p>
+          <a:p>
+            <a:pPr algn="ctr"/>
+            <a:r>
+              <a:rPr lang="en-US" dirty="0">
+                <a:solidFill>
+                  <a:srgbClr val="FF0000"/>
+                </a:solidFill>
+              </a:rPr>
+              <a:t>int</a:t>
+            </a:r>
+          </a:p>
+        </p:txBody>
+      </p:sp>
+      <p:sp>
+        <p:nvSpPr>
+          <p:cNvPr id="10" name="Rectangle: Rounded Corners 9">
+            <a:extLst>
+              <a:ext uri="{FF2B5EF4-FFF2-40B4-BE49-F238E27FC236}">
+                <a16:creationId xmlns:a16="http://schemas.microsoft.com/office/drawing/2014/main" id="{01C8FAE7-9A81-B63B-28BD-0958BACC848E}"/>
+              </a:ext>
+            </a:extLst>
+          </p:cNvPr>
+          <p:cNvSpPr/>
+          <p:nvPr/>
+        </p:nvSpPr>
+        <p:spPr>
+          <a:xfrm>
+            <a:off x="7897760" y="135251"/>
+            <a:ext cx="1415844" cy="788521"/>
+          </a:xfrm>
+          <a:prstGeom prst="roundRect">
+            <a:avLst/>
+          </a:prstGeom>
+          <a:solidFill>
+            <a:schemeClr val="accent2">
+              <a:lumMod val="20000"/>
+              <a:lumOff val="80000"/>
+            </a:schemeClr>
+          </a:solidFill>
+          <a:ln>
+            <a:solidFill>
+              <a:schemeClr val="accent2">
+                <a:lumMod val="75000"/>
+              </a:schemeClr>
+            </a:solidFill>
+          </a:ln>
+        </p:spPr>
+        <p:style>
+          <a:lnRef idx="2">
+            <a:schemeClr val="accent1">
+              <a:shade val="50000"/>
+            </a:schemeClr>
+          </a:lnRef>
+          <a:fillRef idx="1">
+            <a:schemeClr val="accent1"/>
+          </a:fillRef>
+          <a:effectRef idx="0">
+            <a:schemeClr val="accent1"/>
+          </a:effectRef>
+          <a:fontRef idx="minor">
+            <a:schemeClr val="lt1"/>
+          </a:fontRef>
+        </p:style>
+        <p:txBody>
+          <a:bodyPr rtlCol="0" anchor="ctr"/>
+          <a:lstStyle/>
+          <a:p>
+            <a:pPr algn="ctr"/>
+            <a:r>
+              <a:rPr lang="en-US" altLang="zh-CN" dirty="0">
+                <a:solidFill>
+                  <a:schemeClr val="tx1"/>
+                </a:solidFill>
+              </a:rPr>
+              <a:t>CALL </a:t>
+            </a:r>
+            <a:r>
+              <a:rPr lang="en-US" altLang="zh-CN" dirty="0" err="1">
+                <a:solidFill>
+                  <a:schemeClr val="tx1"/>
+                </a:solidFill>
+              </a:rPr>
+              <a:t>getRangeAt</a:t>
+            </a:r>
+            <a:endParaRPr lang="en-US" dirty="0">
+              <a:solidFill>
+                <a:srgbClr val="FF0000"/>
+              </a:solidFill>
+            </a:endParaRPr>
+          </a:p>
+        </p:txBody>
+      </p:sp>
+      <p:sp>
+        <p:nvSpPr>
+          <p:cNvPr id="11" name="Rectangle: Rounded Corners 10">
+            <a:extLst>
+              <a:ext uri="{FF2B5EF4-FFF2-40B4-BE49-F238E27FC236}">
+                <a16:creationId xmlns:a16="http://schemas.microsoft.com/office/drawing/2014/main" id="{9577DAC0-99AD-381E-322C-9B79A30F310C}"/>
+              </a:ext>
+            </a:extLst>
+          </p:cNvPr>
+          <p:cNvSpPr/>
+          <p:nvPr/>
+        </p:nvSpPr>
+        <p:spPr>
+          <a:xfrm>
+            <a:off x="7897760" y="1201536"/>
+            <a:ext cx="1415844" cy="788521"/>
+          </a:xfrm>
+          <a:prstGeom prst="roundRect">
+            <a:avLst/>
+          </a:prstGeom>
+          <a:solidFill>
+            <a:schemeClr val="accent5">
+              <a:lumMod val="20000"/>
+              <a:lumOff val="80000"/>
+            </a:schemeClr>
+          </a:solidFill>
+          <a:ln>
+            <a:solidFill>
+              <a:schemeClr val="accent5">
+                <a:lumMod val="75000"/>
+              </a:schemeClr>
+            </a:solidFill>
+          </a:ln>
+        </p:spPr>
+        <p:style>
+          <a:lnRef idx="2">
+            <a:schemeClr val="accent1">
+              <a:shade val="50000"/>
+            </a:schemeClr>
+          </a:lnRef>
+          <a:fillRef idx="1">
+            <a:schemeClr val="accent1"/>
+          </a:fillRef>
+          <a:effectRef idx="0">
+            <a:schemeClr val="accent1"/>
+          </a:effectRef>
+          <a:fontRef idx="minor">
+            <a:schemeClr val="lt1"/>
+          </a:fontRef>
+        </p:style>
+        <p:txBody>
+          <a:bodyPr rtlCol="0" anchor="ctr"/>
+          <a:lstStyle/>
+          <a:p>
+            <a:pPr algn="ctr"/>
+            <a:r>
+              <a:rPr lang="en-US" altLang="zh-CN" dirty="0">
+                <a:solidFill>
+                  <a:schemeClr val="tx1"/>
+                </a:solidFill>
+              </a:rPr>
+              <a:t>r1(6)</a:t>
+            </a:r>
+          </a:p>
+          <a:p>
+            <a:pPr algn="ctr"/>
+            <a:r>
+              <a:rPr lang="en-US" dirty="0">
+                <a:solidFill>
+                  <a:srgbClr val="FF0000"/>
+                </a:solidFill>
+              </a:rPr>
+              <a:t>[]</a:t>
+            </a:r>
+          </a:p>
+        </p:txBody>
+      </p:sp>
+      <p:sp>
+        <p:nvSpPr>
+          <p:cNvPr id="12" name="Rectangle: Rounded Corners 11">
+            <a:extLst>
+              <a:ext uri="{FF2B5EF4-FFF2-40B4-BE49-F238E27FC236}">
+                <a16:creationId xmlns:a16="http://schemas.microsoft.com/office/drawing/2014/main" id="{E5168E16-F256-6847-3150-03777B2E61A3}"/>
+              </a:ext>
+            </a:extLst>
+          </p:cNvPr>
+          <p:cNvSpPr/>
+          <p:nvPr/>
+        </p:nvSpPr>
+        <p:spPr>
+          <a:xfrm>
+            <a:off x="7897760" y="2267821"/>
+            <a:ext cx="1415844" cy="788521"/>
+          </a:xfrm>
+          <a:prstGeom prst="roundRect">
+            <a:avLst/>
+          </a:prstGeom>
+          <a:solidFill>
+            <a:schemeClr val="accent5">
+              <a:lumMod val="20000"/>
+              <a:lumOff val="80000"/>
+            </a:schemeClr>
+          </a:solidFill>
+          <a:ln>
+            <a:solidFill>
+              <a:schemeClr val="accent5">
+                <a:lumMod val="75000"/>
+              </a:schemeClr>
+            </a:solidFill>
+          </a:ln>
+        </p:spPr>
+        <p:style>
+          <a:lnRef idx="2">
+            <a:schemeClr val="accent1">
+              <a:shade val="50000"/>
+            </a:schemeClr>
+          </a:lnRef>
+          <a:fillRef idx="1">
+            <a:schemeClr val="accent1"/>
+          </a:fillRef>
+          <a:effectRef idx="0">
+            <a:schemeClr val="accent1"/>
+          </a:effectRef>
+          <a:fontRef idx="minor">
+            <a:schemeClr val="lt1"/>
+          </a:fontRef>
+        </p:style>
+        <p:txBody>
+          <a:bodyPr rtlCol="0" anchor="ctr"/>
+          <a:lstStyle/>
+          <a:p>
+            <a:pPr algn="ctr"/>
+            <a:r>
+              <a:rPr lang="en-US" altLang="zh-CN" dirty="0">
+                <a:solidFill>
+                  <a:schemeClr val="tx1"/>
+                </a:solidFill>
+              </a:rPr>
+              <a:t>r2(9)</a:t>
+            </a:r>
+          </a:p>
+          <a:p>
+            <a:pPr algn="ctr"/>
+            <a:r>
+              <a:rPr lang="en-US" dirty="0">
+                <a:solidFill>
+                  <a:srgbClr val="FF0000"/>
+                </a:solidFill>
+              </a:rPr>
+              <a:t>[]</a:t>
+            </a:r>
+          </a:p>
+        </p:txBody>
+      </p:sp>
+      <p:sp>
+        <p:nvSpPr>
+          <p:cNvPr id="13" name="Rectangle: Rounded Corners 12">
+            <a:extLst>
+              <a:ext uri="{FF2B5EF4-FFF2-40B4-BE49-F238E27FC236}">
+                <a16:creationId xmlns:a16="http://schemas.microsoft.com/office/drawing/2014/main" id="{3758C776-88F2-6E9E-A734-2AAC935BDACB}"/>
+              </a:ext>
+            </a:extLst>
+          </p:cNvPr>
+          <p:cNvSpPr/>
+          <p:nvPr/>
+        </p:nvSpPr>
+        <p:spPr>
+          <a:xfrm>
+            <a:off x="7897760" y="3303119"/>
+            <a:ext cx="1415844" cy="788521"/>
+          </a:xfrm>
+          <a:prstGeom prst="roundRect">
+            <a:avLst/>
+          </a:prstGeom>
+          <a:solidFill>
+            <a:schemeClr val="accent5">
+              <a:lumMod val="20000"/>
+              <a:lumOff val="80000"/>
+            </a:schemeClr>
+          </a:solidFill>
+          <a:ln>
+            <a:solidFill>
+              <a:schemeClr val="accent5">
+                <a:lumMod val="75000"/>
+              </a:schemeClr>
+            </a:solidFill>
+          </a:ln>
+        </p:spPr>
+        <p:style>
+          <a:lnRef idx="2">
+            <a:schemeClr val="accent1">
+              <a:shade val="50000"/>
+            </a:schemeClr>
+          </a:lnRef>
+          <a:fillRef idx="1">
+            <a:schemeClr val="accent1"/>
+          </a:fillRef>
+          <a:effectRef idx="0">
+            <a:schemeClr val="accent1"/>
+          </a:effectRef>
+          <a:fontRef idx="minor">
+            <a:schemeClr val="lt1"/>
+          </a:fontRef>
+        </p:style>
+        <p:txBody>
+          <a:bodyPr rtlCol="0" anchor="ctr"/>
+          <a:lstStyle/>
+          <a:p>
+            <a:pPr algn="ctr"/>
+            <a:r>
+              <a:rPr lang="en-US" altLang="zh-CN" dirty="0">
+                <a:solidFill>
+                  <a:schemeClr val="tx1"/>
+                </a:solidFill>
+              </a:rPr>
+              <a:t>r3(13)</a:t>
+            </a:r>
+          </a:p>
+          <a:p>
+            <a:pPr algn="ctr"/>
+            <a:r>
+              <a:rPr lang="en-US">
+                <a:solidFill>
+                  <a:srgbClr val="FF0000"/>
+                </a:solidFill>
+              </a:rPr>
+              <a:t>[]</a:t>
+            </a:r>
+            <a:endParaRPr lang="en-US" dirty="0">
+              <a:solidFill>
+                <a:srgbClr val="FF0000"/>
+              </a:solidFill>
+            </a:endParaRPr>
+          </a:p>
+        </p:txBody>
+      </p:sp>
+      <p:cxnSp>
+        <p:nvCxnSpPr>
+          <p:cNvPr id="15" name="Straight Arrow Connector 14">
+            <a:extLst>
+              <a:ext uri="{FF2B5EF4-FFF2-40B4-BE49-F238E27FC236}">
+                <a16:creationId xmlns:a16="http://schemas.microsoft.com/office/drawing/2014/main" id="{6F06EC58-5C78-480E-8D4F-0A44555D22E9}"/>
+              </a:ext>
+            </a:extLst>
+          </p:cNvPr>
+          <p:cNvCxnSpPr>
+            <a:cxnSpLocks/>
+            <a:endCxn id="8" idx="0"/>
+          </p:cNvCxnSpPr>
+          <p:nvPr/>
+        </p:nvCxnSpPr>
+        <p:spPr>
+          <a:xfrm>
+            <a:off x="3952567" y="1990057"/>
+            <a:ext cx="0" cy="277764"/>
+          </a:xfrm>
+          <a:prstGeom prst="straightConnector1">
+            <a:avLst/>
+          </a:prstGeom>
+          <a:ln>
+            <a:tailEnd type="triangle"/>
+          </a:ln>
+        </p:spPr>
+        <p:style>
+          <a:lnRef idx="1">
+            <a:schemeClr val="accent1"/>
+          </a:lnRef>
+          <a:fillRef idx="0">
+            <a:schemeClr val="accent1"/>
+          </a:fillRef>
+          <a:effectRef idx="0">
+            <a:schemeClr val="accent1"/>
+          </a:effectRef>
+          <a:fontRef idx="minor">
+            <a:schemeClr val="tx1"/>
+          </a:fontRef>
+        </p:style>
+      </p:cxnSp>
+      <p:cxnSp>
+        <p:nvCxnSpPr>
+          <p:cNvPr id="16" name="Straight Arrow Connector 15">
+            <a:extLst>
+              <a:ext uri="{FF2B5EF4-FFF2-40B4-BE49-F238E27FC236}">
+                <a16:creationId xmlns:a16="http://schemas.microsoft.com/office/drawing/2014/main" id="{EE9D5372-0E8F-C461-19C6-E04AF5BC0E73}"/>
+              </a:ext>
+            </a:extLst>
+          </p:cNvPr>
+          <p:cNvCxnSpPr>
+            <a:cxnSpLocks/>
+            <a:stCxn id="8" idx="2"/>
+            <a:endCxn id="9" idx="0"/>
+          </p:cNvCxnSpPr>
+          <p:nvPr/>
+        </p:nvCxnSpPr>
+        <p:spPr>
+          <a:xfrm>
+            <a:off x="3952567" y="3056342"/>
+            <a:ext cx="0" cy="277764"/>
+          </a:xfrm>
+          <a:prstGeom prst="straightConnector1">
+            <a:avLst/>
+          </a:prstGeom>
+          <a:ln>
+            <a:tailEnd type="triangle"/>
+          </a:ln>
+        </p:spPr>
+        <p:style>
+          <a:lnRef idx="1">
+            <a:schemeClr val="accent1"/>
+          </a:lnRef>
+          <a:fillRef idx="0">
+            <a:schemeClr val="accent1"/>
+          </a:fillRef>
+          <a:effectRef idx="0">
+            <a:schemeClr val="accent1"/>
+          </a:effectRef>
+          <a:fontRef idx="minor">
+            <a:schemeClr val="tx1"/>
+          </a:fontRef>
+        </p:style>
+      </p:cxnSp>
+      <p:cxnSp>
+        <p:nvCxnSpPr>
+          <p:cNvPr id="17" name="Straight Arrow Connector 16">
+            <a:extLst>
+              <a:ext uri="{FF2B5EF4-FFF2-40B4-BE49-F238E27FC236}">
+                <a16:creationId xmlns:a16="http://schemas.microsoft.com/office/drawing/2014/main" id="{76364F1C-F5EE-3F63-862B-C2B4CB5B8B96}"/>
+              </a:ext>
+            </a:extLst>
+          </p:cNvPr>
+          <p:cNvCxnSpPr>
+            <a:cxnSpLocks/>
+            <a:stCxn id="10" idx="2"/>
+            <a:endCxn id="11" idx="0"/>
+          </p:cNvCxnSpPr>
+          <p:nvPr/>
+        </p:nvCxnSpPr>
+        <p:spPr>
+          <a:xfrm>
+            <a:off x="8605682" y="923772"/>
+            <a:ext cx="0" cy="277764"/>
+          </a:xfrm>
+          <a:prstGeom prst="straightConnector1">
+            <a:avLst/>
+          </a:prstGeom>
+          <a:ln>
+            <a:tailEnd type="triangle"/>
+          </a:ln>
+        </p:spPr>
+        <p:style>
+          <a:lnRef idx="1">
+            <a:schemeClr val="accent1"/>
+          </a:lnRef>
+          <a:fillRef idx="0">
+            <a:schemeClr val="accent1"/>
+          </a:fillRef>
+          <a:effectRef idx="0">
+            <a:schemeClr val="accent1"/>
+          </a:effectRef>
+          <a:fontRef idx="minor">
+            <a:schemeClr val="tx1"/>
+          </a:fontRef>
+        </p:style>
+      </p:cxnSp>
+      <p:cxnSp>
+        <p:nvCxnSpPr>
+          <p:cNvPr id="18" name="Straight Arrow Connector 17">
+            <a:extLst>
+              <a:ext uri="{FF2B5EF4-FFF2-40B4-BE49-F238E27FC236}">
+                <a16:creationId xmlns:a16="http://schemas.microsoft.com/office/drawing/2014/main" id="{9DA6EC7A-3178-387E-929F-E1488AE5A738}"/>
+              </a:ext>
+            </a:extLst>
+          </p:cNvPr>
+          <p:cNvCxnSpPr>
+            <a:cxnSpLocks/>
+            <a:stCxn id="11" idx="2"/>
+            <a:endCxn id="12" idx="0"/>
+          </p:cNvCxnSpPr>
+          <p:nvPr/>
+        </p:nvCxnSpPr>
+        <p:spPr>
+          <a:xfrm>
+            <a:off x="8605682" y="1990057"/>
+            <a:ext cx="0" cy="277764"/>
+          </a:xfrm>
+          <a:prstGeom prst="straightConnector1">
+            <a:avLst/>
+          </a:prstGeom>
+          <a:ln>
+            <a:tailEnd type="triangle"/>
+          </a:ln>
+        </p:spPr>
+        <p:style>
+          <a:lnRef idx="1">
+            <a:schemeClr val="accent1"/>
+          </a:lnRef>
+          <a:fillRef idx="0">
+            <a:schemeClr val="accent1"/>
+          </a:fillRef>
+          <a:effectRef idx="0">
+            <a:schemeClr val="accent1"/>
+          </a:effectRef>
+          <a:fontRef idx="minor">
+            <a:schemeClr val="tx1"/>
+          </a:fontRef>
+        </p:style>
+      </p:cxnSp>
+      <p:cxnSp>
+        <p:nvCxnSpPr>
+          <p:cNvPr id="19" name="Straight Arrow Connector 18">
+            <a:extLst>
+              <a:ext uri="{FF2B5EF4-FFF2-40B4-BE49-F238E27FC236}">
+                <a16:creationId xmlns:a16="http://schemas.microsoft.com/office/drawing/2014/main" id="{A79D0EC6-78FA-942A-F83F-27F2E9FBDB75}"/>
+              </a:ext>
+            </a:extLst>
+          </p:cNvPr>
+          <p:cNvCxnSpPr>
+            <a:cxnSpLocks/>
+            <a:stCxn id="12" idx="2"/>
+            <a:endCxn id="13" idx="0"/>
+          </p:cNvCxnSpPr>
+          <p:nvPr/>
+        </p:nvCxnSpPr>
+        <p:spPr>
+          <a:xfrm>
+            <a:off x="8605682" y="3056342"/>
+            <a:ext cx="0" cy="246777"/>
+          </a:xfrm>
+          <a:prstGeom prst="straightConnector1">
+            <a:avLst/>
+          </a:prstGeom>
+          <a:ln>
+            <a:tailEnd type="triangle"/>
+          </a:ln>
+        </p:spPr>
+        <p:style>
+          <a:lnRef idx="1">
+            <a:schemeClr val="accent1"/>
+          </a:lnRef>
+          <a:fillRef idx="0">
+            <a:schemeClr val="accent1"/>
+          </a:fillRef>
+          <a:effectRef idx="0">
+            <a:schemeClr val="accent1"/>
+          </a:effectRef>
+          <a:fontRef idx="minor">
+            <a:schemeClr val="tx1"/>
+          </a:fontRef>
+        </p:style>
+      </p:cxnSp>
+      <p:cxnSp>
+        <p:nvCxnSpPr>
+          <p:cNvPr id="20" name="Straight Arrow Connector 19">
+            <a:extLst>
+              <a:ext uri="{FF2B5EF4-FFF2-40B4-BE49-F238E27FC236}">
+                <a16:creationId xmlns:a16="http://schemas.microsoft.com/office/drawing/2014/main" id="{75B20009-50D4-484F-8B01-D64CD5F9849A}"/>
+              </a:ext>
+            </a:extLst>
+          </p:cNvPr>
+          <p:cNvCxnSpPr>
+            <a:cxnSpLocks/>
+            <a:stCxn id="13" idx="2"/>
+            <a:endCxn id="5" idx="0"/>
+          </p:cNvCxnSpPr>
+          <p:nvPr/>
+        </p:nvCxnSpPr>
+        <p:spPr>
+          <a:xfrm flipH="1">
+            <a:off x="6400801" y="4091640"/>
+            <a:ext cx="2204881" cy="310472"/>
+          </a:xfrm>
+          <a:prstGeom prst="straightConnector1">
+            <a:avLst/>
+          </a:prstGeom>
+          <a:ln>
+            <a:tailEnd type="triangle"/>
+          </a:ln>
+        </p:spPr>
+        <p:style>
+          <a:lnRef idx="1">
+            <a:schemeClr val="accent1"/>
+          </a:lnRef>
+          <a:fillRef idx="0">
+            <a:schemeClr val="accent1"/>
+          </a:fillRef>
+          <a:effectRef idx="0">
+            <a:schemeClr val="accent1"/>
+          </a:effectRef>
+          <a:fontRef idx="minor">
+            <a:schemeClr val="tx1"/>
+          </a:fontRef>
+        </p:style>
+      </p:cxnSp>
+      <p:cxnSp>
+        <p:nvCxnSpPr>
+          <p:cNvPr id="23" name="Straight Arrow Connector 22">
+            <a:extLst>
+              <a:ext uri="{FF2B5EF4-FFF2-40B4-BE49-F238E27FC236}">
+                <a16:creationId xmlns:a16="http://schemas.microsoft.com/office/drawing/2014/main" id="{8EFFA105-8D17-61C5-FA03-8C7F0C578393}"/>
+              </a:ext>
+            </a:extLst>
+          </p:cNvPr>
+          <p:cNvCxnSpPr>
+            <a:cxnSpLocks/>
+            <a:stCxn id="9" idx="2"/>
+            <a:endCxn id="5" idx="0"/>
+          </p:cNvCxnSpPr>
+          <p:nvPr/>
+        </p:nvCxnSpPr>
+        <p:spPr>
+          <a:xfrm>
+            <a:off x="3952567" y="4122627"/>
+            <a:ext cx="2448234" cy="279485"/>
+          </a:xfrm>
+          <a:prstGeom prst="straightConnector1">
+            <a:avLst/>
+          </a:prstGeom>
+          <a:ln>
+            <a:tailEnd type="triangle"/>
+          </a:ln>
+        </p:spPr>
+        <p:style>
+          <a:lnRef idx="1">
+            <a:schemeClr val="accent1"/>
+          </a:lnRef>
+          <a:fillRef idx="0">
+            <a:schemeClr val="accent1"/>
+          </a:fillRef>
+          <a:effectRef idx="0">
+            <a:schemeClr val="accent1"/>
+          </a:effectRef>
+          <a:fontRef idx="minor">
+            <a:schemeClr val="tx1"/>
+          </a:fontRef>
+        </p:style>
+      </p:cxnSp>
+      <p:cxnSp>
+        <p:nvCxnSpPr>
+          <p:cNvPr id="29" name="Straight Arrow Connector 28">
+            <a:extLst>
+              <a:ext uri="{FF2B5EF4-FFF2-40B4-BE49-F238E27FC236}">
+                <a16:creationId xmlns:a16="http://schemas.microsoft.com/office/drawing/2014/main" id="{E44D37C4-3282-24CF-CF00-49E909DA3B98}"/>
+              </a:ext>
+            </a:extLst>
+          </p:cNvPr>
+          <p:cNvCxnSpPr>
+            <a:cxnSpLocks/>
+            <a:stCxn id="5" idx="2"/>
+            <a:endCxn id="6" idx="0"/>
+          </p:cNvCxnSpPr>
+          <p:nvPr/>
+        </p:nvCxnSpPr>
+        <p:spPr>
+          <a:xfrm>
+            <a:off x="6400801" y="5190633"/>
+            <a:ext cx="0" cy="276043"/>
+          </a:xfrm>
+          <a:prstGeom prst="straightConnector1">
+            <a:avLst/>
+          </a:prstGeom>
+          <a:ln>
+            <a:tailEnd type="triangle"/>
+          </a:ln>
+        </p:spPr>
+        <p:style>
+          <a:lnRef idx="1">
+            <a:schemeClr val="accent1"/>
+          </a:lnRef>
+          <a:fillRef idx="0">
+            <a:schemeClr val="accent1"/>
+          </a:fillRef>
+          <a:effectRef idx="0">
+            <a:schemeClr val="accent1"/>
+          </a:effectRef>
+          <a:fontRef idx="minor">
+            <a:schemeClr val="tx1"/>
+          </a:fontRef>
+        </p:style>
+      </p:cxnSp>
+      <p:cxnSp>
+        <p:nvCxnSpPr>
+          <p:cNvPr id="55" name="Straight Arrow Connector 54">
+            <a:extLst>
+              <a:ext uri="{FF2B5EF4-FFF2-40B4-BE49-F238E27FC236}">
+                <a16:creationId xmlns:a16="http://schemas.microsoft.com/office/drawing/2014/main" id="{E9FDB852-6B18-D03E-E655-04A52FC37585}"/>
+              </a:ext>
+            </a:extLst>
+          </p:cNvPr>
+          <p:cNvCxnSpPr>
+            <a:cxnSpLocks/>
+            <a:stCxn id="13" idx="2"/>
+          </p:cNvCxnSpPr>
+          <p:nvPr/>
+        </p:nvCxnSpPr>
+        <p:spPr>
+          <a:xfrm>
+            <a:off x="8605682" y="4091640"/>
+            <a:ext cx="0" cy="310472"/>
+          </a:xfrm>
+          <a:prstGeom prst="straightConnector1">
+            <a:avLst/>
+          </a:prstGeom>
+          <a:ln>
+            <a:tailEnd type="triangle"/>
+          </a:ln>
+        </p:spPr>
+        <p:style>
+          <a:lnRef idx="1">
+            <a:schemeClr val="accent1"/>
+          </a:lnRef>
+          <a:fillRef idx="0">
+            <a:schemeClr val="accent1"/>
+          </a:fillRef>
+          <a:effectRef idx="0">
+            <a:schemeClr val="accent1"/>
+          </a:effectRef>
+          <a:fontRef idx="minor">
+            <a:schemeClr val="tx1"/>
+          </a:fontRef>
+        </p:style>
+      </p:cxnSp>
+      <p:cxnSp>
+        <p:nvCxnSpPr>
+          <p:cNvPr id="56" name="Straight Arrow Connector 55">
+            <a:extLst>
+              <a:ext uri="{FF2B5EF4-FFF2-40B4-BE49-F238E27FC236}">
+                <a16:creationId xmlns:a16="http://schemas.microsoft.com/office/drawing/2014/main" id="{0CE12F07-2546-3E12-766C-6D132D05B8DD}"/>
+              </a:ext>
+            </a:extLst>
+          </p:cNvPr>
+          <p:cNvCxnSpPr>
+            <a:cxnSpLocks/>
+            <a:stCxn id="6" idx="2"/>
+          </p:cNvCxnSpPr>
+          <p:nvPr/>
+        </p:nvCxnSpPr>
+        <p:spPr>
+          <a:xfrm flipH="1">
+            <a:off x="6393424" y="6255197"/>
+            <a:ext cx="7377" cy="246777"/>
+          </a:xfrm>
+          <a:prstGeom prst="straightConnector1">
+            <a:avLst/>
+          </a:prstGeom>
+          <a:ln>
+            <a:tailEnd type="triangle"/>
+          </a:ln>
+        </p:spPr>
+        <p:style>
+          <a:lnRef idx="1">
+            <a:schemeClr val="accent1"/>
+          </a:lnRef>
+          <a:fillRef idx="0">
+            <a:schemeClr val="accent1"/>
+          </a:fillRef>
+          <a:effectRef idx="0">
+            <a:schemeClr val="accent1"/>
+          </a:effectRef>
+          <a:fontRef idx="minor">
+            <a:schemeClr val="tx1"/>
+          </a:fontRef>
+        </p:style>
+      </p:cxnSp>
+      <p:cxnSp>
+        <p:nvCxnSpPr>
+          <p:cNvPr id="57" name="Straight Arrow Connector 56">
+            <a:extLst>
+              <a:ext uri="{FF2B5EF4-FFF2-40B4-BE49-F238E27FC236}">
+                <a16:creationId xmlns:a16="http://schemas.microsoft.com/office/drawing/2014/main" id="{7342D304-61E8-F837-4970-DF4CD5AE7E86}"/>
+              </a:ext>
+            </a:extLst>
+          </p:cNvPr>
+          <p:cNvCxnSpPr>
+            <a:cxnSpLocks/>
+            <a:stCxn id="9" idx="2"/>
+          </p:cNvCxnSpPr>
+          <p:nvPr/>
+        </p:nvCxnSpPr>
+        <p:spPr>
+          <a:xfrm>
+            <a:off x="3952567" y="4122627"/>
+            <a:ext cx="0" cy="246777"/>
+          </a:xfrm>
+          <a:prstGeom prst="straightConnector1">
+            <a:avLst/>
+          </a:prstGeom>
+          <a:ln>
+            <a:tailEnd type="triangle"/>
+          </a:ln>
+        </p:spPr>
+        <p:style>
+          <a:lnRef idx="1">
+            <a:schemeClr val="accent1"/>
+          </a:lnRef>
+          <a:fillRef idx="0">
+            <a:schemeClr val="accent1"/>
+          </a:fillRef>
+          <a:effectRef idx="0">
+            <a:schemeClr val="accent1"/>
+          </a:effectRef>
+          <a:fontRef idx="minor">
+            <a:schemeClr val="tx1"/>
+          </a:fontRef>
+        </p:style>
+      </p:cxnSp>
+      <p:sp>
+        <p:nvSpPr>
+          <p:cNvPr id="61" name="TextBox 60">
+            <a:extLst>
+              <a:ext uri="{FF2B5EF4-FFF2-40B4-BE49-F238E27FC236}">
+                <a16:creationId xmlns:a16="http://schemas.microsoft.com/office/drawing/2014/main" id="{47136017-D864-AAA7-36EC-F1E7794A6CE4}"/>
+              </a:ext>
+            </a:extLst>
+          </p:cNvPr>
+          <p:cNvSpPr txBox="1"/>
+          <p:nvPr/>
+        </p:nvSpPr>
+        <p:spPr>
+          <a:xfrm>
+            <a:off x="3780884" y="4332221"/>
+            <a:ext cx="343364" cy="369332"/>
+          </a:xfrm>
+          <a:prstGeom prst="rect">
+            <a:avLst/>
+          </a:prstGeom>
+          <a:noFill/>
+        </p:spPr>
+        <p:txBody>
+          <a:bodyPr wrap="none" rtlCol="0">
+            <a:spAutoFit/>
+          </a:bodyPr>
+          <a:lstStyle/>
+          <a:p>
+            <a:r>
+              <a:rPr lang="en-US" dirty="0"/>
+              <a:t>…</a:t>
+            </a:r>
+          </a:p>
+        </p:txBody>
+      </p:sp>
+      <p:sp>
+        <p:nvSpPr>
+          <p:cNvPr id="62" name="TextBox 61">
+            <a:extLst>
+              <a:ext uri="{FF2B5EF4-FFF2-40B4-BE49-F238E27FC236}">
+                <a16:creationId xmlns:a16="http://schemas.microsoft.com/office/drawing/2014/main" id="{52906713-364E-C8A4-D268-BBF92DCBDC55}"/>
+              </a:ext>
+            </a:extLst>
+          </p:cNvPr>
+          <p:cNvSpPr txBox="1"/>
+          <p:nvPr/>
+        </p:nvSpPr>
+        <p:spPr>
+          <a:xfrm>
+            <a:off x="8444596" y="4332221"/>
+            <a:ext cx="343364" cy="369332"/>
+          </a:xfrm>
+          <a:prstGeom prst="rect">
+            <a:avLst/>
+          </a:prstGeom>
+          <a:noFill/>
+        </p:spPr>
+        <p:txBody>
+          <a:bodyPr wrap="none" rtlCol="0">
+            <a:spAutoFit/>
+          </a:bodyPr>
+          <a:lstStyle/>
+          <a:p>
+            <a:r>
+              <a:rPr lang="en-US" dirty="0"/>
+              <a:t>…</a:t>
+            </a:r>
+          </a:p>
+        </p:txBody>
+      </p:sp>
+      <p:sp>
+        <p:nvSpPr>
+          <p:cNvPr id="63" name="TextBox 62">
+            <a:extLst>
+              <a:ext uri="{FF2B5EF4-FFF2-40B4-BE49-F238E27FC236}">
+                <a16:creationId xmlns:a16="http://schemas.microsoft.com/office/drawing/2014/main" id="{ED06E9BA-AF06-AD80-816A-526569AE2393}"/>
+              </a:ext>
+            </a:extLst>
+          </p:cNvPr>
+          <p:cNvSpPr txBox="1"/>
+          <p:nvPr/>
+        </p:nvSpPr>
+        <p:spPr>
+          <a:xfrm>
+            <a:off x="6221742" y="6378585"/>
+            <a:ext cx="343364" cy="369332"/>
+          </a:xfrm>
+          <a:prstGeom prst="rect">
+            <a:avLst/>
+          </a:prstGeom>
+          <a:noFill/>
+        </p:spPr>
+        <p:txBody>
+          <a:bodyPr wrap="none" rtlCol="0">
+            <a:spAutoFit/>
+          </a:bodyPr>
+          <a:lstStyle/>
+          <a:p>
+            <a:r>
+              <a:rPr lang="en-US" dirty="0"/>
+              <a:t>…</a:t>
+            </a:r>
+          </a:p>
+        </p:txBody>
+      </p:sp>
+    </p:spTree>
+    <p:extLst>
+      <p:ext uri="{BB962C8B-B14F-4D97-AF65-F5344CB8AC3E}">
+        <p14:creationId xmlns:p14="http://schemas.microsoft.com/office/powerpoint/2010/main" val="1541397657"/>
+      </p:ext>
+    </p:extLst>
+  </p:cSld>
+  <p:clrMapOvr>
+    <a:masterClrMapping/>
+  </p:clrMapOvr>
+</p:sld>
+</file>
+
 <file path=ppt/slides/slide2.xml><?xml version="1.0" encoding="utf-8"?>
 <p:sld xmlns:a="http://schemas.openxmlformats.org/drawingml/2006/main" xmlns:r="http://schemas.openxmlformats.org/officeDocument/2006/relationships" xmlns:p="http://schemas.openxmlformats.org/presentationml/2006/main">
   <p:cSld>

</xml_diff>

<commit_message>
done up to dual-task
</commit_message>
<xml_diff>
--- a/figures/figures.pptx
+++ b/figures/figures.pptx
@@ -6,8 +6,8 @@
   </p:sldMasterIdLst>
   <p:sldIdLst>
     <p:sldId id="256" r:id="rId2"/>
-    <p:sldId id="257" r:id="rId3"/>
-    <p:sldId id="258" r:id="rId4"/>
+    <p:sldId id="258" r:id="rId3"/>
+    <p:sldId id="257" r:id="rId4"/>
     <p:sldId id="259" r:id="rId5"/>
     <p:sldId id="260" r:id="rId6"/>
     <p:sldId id="261" r:id="rId7"/>
@@ -18,6 +18,7 @@
     <p:sldId id="267" r:id="rId12"/>
     <p:sldId id="268" r:id="rId13"/>
     <p:sldId id="269" r:id="rId14"/>
+    <p:sldId id="270" r:id="rId15"/>
   </p:sldIdLst>
   <p:sldSz cx="12192000" cy="6858000"/>
   <p:notesSz cx="6858000" cy="9144000"/>
@@ -271,7 +272,7 @@
           <a:p>
             <a:fld id="{4B9CF307-EB09-4B6C-AE6A-0B77EE827448}" type="datetimeFigureOut">
               <a:rPr lang="en-US" smtClean="0"/>
-              <a:t>1/31/2023</a:t>
+              <a:t>2/1/2023</a:t>
             </a:fld>
             <a:endParaRPr lang="en-US"/>
           </a:p>
@@ -469,7 +470,7 @@
           <a:p>
             <a:fld id="{4B9CF307-EB09-4B6C-AE6A-0B77EE827448}" type="datetimeFigureOut">
               <a:rPr lang="en-US" smtClean="0"/>
-              <a:t>1/31/2023</a:t>
+              <a:t>2/1/2023</a:t>
             </a:fld>
             <a:endParaRPr lang="en-US"/>
           </a:p>
@@ -677,7 +678,7 @@
           <a:p>
             <a:fld id="{4B9CF307-EB09-4B6C-AE6A-0B77EE827448}" type="datetimeFigureOut">
               <a:rPr lang="en-US" smtClean="0"/>
-              <a:t>1/31/2023</a:t>
+              <a:t>2/1/2023</a:t>
             </a:fld>
             <a:endParaRPr lang="en-US"/>
           </a:p>
@@ -875,7 +876,7 @@
           <a:p>
             <a:fld id="{4B9CF307-EB09-4B6C-AE6A-0B77EE827448}" type="datetimeFigureOut">
               <a:rPr lang="en-US" smtClean="0"/>
-              <a:t>1/31/2023</a:t>
+              <a:t>2/1/2023</a:t>
             </a:fld>
             <a:endParaRPr lang="en-US"/>
           </a:p>
@@ -1150,7 +1151,7 @@
           <a:p>
             <a:fld id="{4B9CF307-EB09-4B6C-AE6A-0B77EE827448}" type="datetimeFigureOut">
               <a:rPr lang="en-US" smtClean="0"/>
-              <a:t>1/31/2023</a:t>
+              <a:t>2/1/2023</a:t>
             </a:fld>
             <a:endParaRPr lang="en-US"/>
           </a:p>
@@ -1415,7 +1416,7 @@
           <a:p>
             <a:fld id="{4B9CF307-EB09-4B6C-AE6A-0B77EE827448}" type="datetimeFigureOut">
               <a:rPr lang="en-US" smtClean="0"/>
-              <a:t>1/31/2023</a:t>
+              <a:t>2/1/2023</a:t>
             </a:fld>
             <a:endParaRPr lang="en-US"/>
           </a:p>
@@ -1827,7 +1828,7 @@
           <a:p>
             <a:fld id="{4B9CF307-EB09-4B6C-AE6A-0B77EE827448}" type="datetimeFigureOut">
               <a:rPr lang="en-US" smtClean="0"/>
-              <a:t>1/31/2023</a:t>
+              <a:t>2/1/2023</a:t>
             </a:fld>
             <a:endParaRPr lang="en-US"/>
           </a:p>
@@ -1968,7 +1969,7 @@
           <a:p>
             <a:fld id="{4B9CF307-EB09-4B6C-AE6A-0B77EE827448}" type="datetimeFigureOut">
               <a:rPr lang="en-US" smtClean="0"/>
-              <a:t>1/31/2023</a:t>
+              <a:t>2/1/2023</a:t>
             </a:fld>
             <a:endParaRPr lang="en-US"/>
           </a:p>
@@ -2081,7 +2082,7 @@
           <a:p>
             <a:fld id="{4B9CF307-EB09-4B6C-AE6A-0B77EE827448}" type="datetimeFigureOut">
               <a:rPr lang="en-US" smtClean="0"/>
-              <a:t>1/31/2023</a:t>
+              <a:t>2/1/2023</a:t>
             </a:fld>
             <a:endParaRPr lang="en-US"/>
           </a:p>
@@ -2392,7 +2393,7 @@
           <a:p>
             <a:fld id="{4B9CF307-EB09-4B6C-AE6A-0B77EE827448}" type="datetimeFigureOut">
               <a:rPr lang="en-US" smtClean="0"/>
-              <a:t>1/31/2023</a:t>
+              <a:t>2/1/2023</a:t>
             </a:fld>
             <a:endParaRPr lang="en-US"/>
           </a:p>
@@ -2680,7 +2681,7 @@
           <a:p>
             <a:fld id="{4B9CF307-EB09-4B6C-AE6A-0B77EE827448}" type="datetimeFigureOut">
               <a:rPr lang="en-US" smtClean="0"/>
-              <a:t>1/31/2023</a:t>
+              <a:t>2/1/2023</a:t>
             </a:fld>
             <a:endParaRPr lang="en-US"/>
           </a:p>
@@ -2921,7 +2922,7 @@
           <a:p>
             <a:fld id="{4B9CF307-EB09-4B6C-AE6A-0B77EE827448}" type="datetimeFigureOut">
               <a:rPr lang="en-US" smtClean="0"/>
-              <a:t>1/31/2023</a:t>
+              <a:t>2/1/2023</a:t>
             </a:fld>
             <a:endParaRPr lang="en-US"/>
           </a:p>
@@ -14179,7 +14180,7 @@
 </p:sld>
 </file>
 
-<file path=ppt/slides/slide2.xml><?xml version="1.0" encoding="utf-8"?>
+<file path=ppt/slides/slide14.xml><?xml version="1.0" encoding="utf-8"?>
 <p:sld xmlns:a="http://schemas.openxmlformats.org/drawingml/2006/main" xmlns:r="http://schemas.openxmlformats.org/officeDocument/2006/relationships" xmlns:p="http://schemas.openxmlformats.org/presentationml/2006/main">
   <p:cSld>
     <p:spTree>
@@ -15017,7 +15018,7 @@
                   <a:schemeClr val="tx1"/>
                 </a:solidFill>
               </a:rPr>
-              <a:t>Variable Type Generation</a:t>
+              <a:t>Variable Name Generation</a:t>
             </a:r>
           </a:p>
           <a:p>
@@ -15094,7 +15095,7 @@
                   <a:schemeClr val="tx1"/>
                 </a:solidFill>
               </a:rPr>
-              <a:t>Variable Name Generation</a:t>
+              <a:t>Variable Type Generation</a:t>
             </a:r>
           </a:p>
           <a:p>
@@ -15255,7 +15256,7 @@
             <a:pPr algn="ctr"/>
             <a:r>
               <a:rPr lang="en-US" dirty="0"/>
-              <a:t>Variables’ Types</a:t>
+              <a:t>Variables’ Names</a:t>
             </a:r>
           </a:p>
         </p:txBody>
@@ -15291,7 +15292,7 @@
             <a:pPr algn="ctr"/>
             <a:r>
               <a:rPr lang="en-US" dirty="0"/>
-              <a:t>Variables’ Names</a:t>
+              <a:t>Variables’ Types</a:t>
             </a:r>
           </a:p>
         </p:txBody>
@@ -15554,7 +15555,7 @@
         <p:spPr>
           <a:xfrm>
             <a:off x="7361941" y="3260084"/>
-            <a:ext cx="1081963" cy="646331"/>
+            <a:ext cx="1093184" cy="646331"/>
           </a:xfrm>
           <a:prstGeom prst="rect">
             <a:avLst/>
@@ -15568,13 +15569,13 @@
           <a:lstStyle/>
           <a:p>
             <a:r>
-              <a:rPr lang="en-US" dirty="0"/>
+              <a:rPr lang="en-US" i="1" dirty="0"/>
               <a:t>Dual-Task</a:t>
             </a:r>
           </a:p>
           <a:p>
             <a:r>
-              <a:rPr lang="en-US" dirty="0"/>
+              <a:rPr lang="en-US" i="1" dirty="0"/>
               <a:t>Learning</a:t>
             </a:r>
           </a:p>
@@ -15669,7 +15670,7 @@
     </p:spTree>
     <p:extLst>
       <p:ext uri="{BB962C8B-B14F-4D97-AF65-F5344CB8AC3E}">
-        <p14:creationId xmlns:p14="http://schemas.microsoft.com/office/powerpoint/2010/main" val="1943562508"/>
+        <p14:creationId xmlns:p14="http://schemas.microsoft.com/office/powerpoint/2010/main" val="478827493"/>
       </p:ext>
     </p:extLst>
   </p:cSld>
@@ -15679,7 +15680,7 @@
 </p:sld>
 </file>
 
-<file path=ppt/slides/slide3.xml><?xml version="1.0" encoding="utf-8"?>
+<file path=ppt/slides/slide2.xml><?xml version="1.0" encoding="utf-8"?>
 <p:sld xmlns:a="http://schemas.openxmlformats.org/drawingml/2006/main" xmlns:r="http://schemas.openxmlformats.org/officeDocument/2006/relationships" xmlns:p="http://schemas.openxmlformats.org/presentationml/2006/main">
   <p:cSld>
     <p:spTree>
@@ -17064,6 +17065,1506 @@
     <p:extLst>
       <p:ext uri="{BB962C8B-B14F-4D97-AF65-F5344CB8AC3E}">
         <p14:creationId xmlns:p14="http://schemas.microsoft.com/office/powerpoint/2010/main" val="351330088"/>
+      </p:ext>
+    </p:extLst>
+  </p:cSld>
+  <p:clrMapOvr>
+    <a:masterClrMapping/>
+  </p:clrMapOvr>
+</p:sld>
+</file>
+
+<file path=ppt/slides/slide3.xml><?xml version="1.0" encoding="utf-8"?>
+<p:sld xmlns:a="http://schemas.openxmlformats.org/drawingml/2006/main" xmlns:r="http://schemas.openxmlformats.org/officeDocument/2006/relationships" xmlns:p="http://schemas.openxmlformats.org/presentationml/2006/main">
+  <p:cSld>
+    <p:spTree>
+      <p:nvGrpSpPr>
+        <p:cNvPr id="1" name=""/>
+        <p:cNvGrpSpPr/>
+        <p:nvPr/>
+      </p:nvGrpSpPr>
+      <p:grpSpPr>
+        <a:xfrm>
+          <a:off x="0" y="0"/>
+          <a:ext cx="0" cy="0"/>
+          <a:chOff x="0" y="0"/>
+          <a:chExt cx="0" cy="0"/>
+        </a:xfrm>
+      </p:grpSpPr>
+      <p:sp>
+        <p:nvSpPr>
+          <p:cNvPr id="4" name="Rectangle: Folded Corner 3">
+            <a:extLst>
+              <a:ext uri="{FF2B5EF4-FFF2-40B4-BE49-F238E27FC236}">
+                <a16:creationId xmlns:a16="http://schemas.microsoft.com/office/drawing/2014/main" id="{83DE70CB-DE98-492C-B0E8-C48F698E91BC}"/>
+              </a:ext>
+            </a:extLst>
+          </p:cNvPr>
+          <p:cNvSpPr/>
+          <p:nvPr/>
+        </p:nvSpPr>
+        <p:spPr>
+          <a:xfrm>
+            <a:off x="2052782" y="3212035"/>
+            <a:ext cx="676656" cy="786384"/>
+          </a:xfrm>
+          <a:prstGeom prst="foldedCorner">
+            <a:avLst/>
+          </a:prstGeom>
+          <a:solidFill>
+            <a:schemeClr val="bg1">
+              <a:lumMod val="85000"/>
+            </a:schemeClr>
+          </a:solidFill>
+          <a:ln>
+            <a:solidFill>
+              <a:schemeClr val="tx1"/>
+            </a:solidFill>
+          </a:ln>
+        </p:spPr>
+        <p:style>
+          <a:lnRef idx="2">
+            <a:schemeClr val="accent1">
+              <a:shade val="50000"/>
+            </a:schemeClr>
+          </a:lnRef>
+          <a:fillRef idx="1">
+            <a:schemeClr val="accent1"/>
+          </a:fillRef>
+          <a:effectRef idx="0">
+            <a:schemeClr val="accent1"/>
+          </a:effectRef>
+          <a:fontRef idx="minor">
+            <a:schemeClr val="lt1"/>
+          </a:fontRef>
+        </p:style>
+        <p:txBody>
+          <a:bodyPr rtlCol="0" anchor="ctr"/>
+          <a:lstStyle/>
+          <a:p>
+            <a:pPr algn="ctr"/>
+            <a:endParaRPr lang="en-US"/>
+          </a:p>
+        </p:txBody>
+      </p:sp>
+      <p:sp>
+        <p:nvSpPr>
+          <p:cNvPr id="5" name="TextBox 4">
+            <a:extLst>
+              <a:ext uri="{FF2B5EF4-FFF2-40B4-BE49-F238E27FC236}">
+                <a16:creationId xmlns:a16="http://schemas.microsoft.com/office/drawing/2014/main" id="{3CF03D92-04AD-486F-933E-7CBEF5781A93}"/>
+              </a:ext>
+            </a:extLst>
+          </p:cNvPr>
+          <p:cNvSpPr txBox="1"/>
+          <p:nvPr/>
+        </p:nvSpPr>
+        <p:spPr>
+          <a:xfrm>
+            <a:off x="1513276" y="2811248"/>
+            <a:ext cx="1609344" cy="369332"/>
+          </a:xfrm>
+          <a:prstGeom prst="rect">
+            <a:avLst/>
+          </a:prstGeom>
+          <a:noFill/>
+        </p:spPr>
+        <p:txBody>
+          <a:bodyPr wrap="square" rtlCol="0">
+            <a:spAutoFit/>
+          </a:bodyPr>
+          <a:lstStyle/>
+          <a:p>
+            <a:pPr algn="ctr"/>
+            <a:r>
+              <a:rPr lang="en-US" dirty="0"/>
+              <a:t>Minified Code</a:t>
+            </a:r>
+          </a:p>
+        </p:txBody>
+      </p:sp>
+      <p:sp>
+        <p:nvSpPr>
+          <p:cNvPr id="6" name="Rectangle: Rounded Corners 5">
+            <a:extLst>
+              <a:ext uri="{FF2B5EF4-FFF2-40B4-BE49-F238E27FC236}">
+                <a16:creationId xmlns:a16="http://schemas.microsoft.com/office/drawing/2014/main" id="{4FE65C00-D047-4D37-84E8-2EBAAB877F85}"/>
+              </a:ext>
+            </a:extLst>
+          </p:cNvPr>
+          <p:cNvSpPr/>
+          <p:nvPr/>
+        </p:nvSpPr>
+        <p:spPr>
+          <a:xfrm>
+            <a:off x="3401187" y="3042284"/>
+            <a:ext cx="1201847" cy="1126266"/>
+          </a:xfrm>
+          <a:prstGeom prst="roundRect">
+            <a:avLst>
+              <a:gd name="adj" fmla="val 10106"/>
+            </a:avLst>
+          </a:prstGeom>
+          <a:solidFill>
+            <a:schemeClr val="accent4">
+              <a:lumMod val="20000"/>
+              <a:lumOff val="80000"/>
+            </a:schemeClr>
+          </a:solidFill>
+          <a:ln>
+            <a:solidFill>
+              <a:srgbClr val="FFC000"/>
+            </a:solidFill>
+          </a:ln>
+        </p:spPr>
+        <p:style>
+          <a:lnRef idx="2">
+            <a:schemeClr val="accent1">
+              <a:shade val="50000"/>
+            </a:schemeClr>
+          </a:lnRef>
+          <a:fillRef idx="1">
+            <a:schemeClr val="accent1"/>
+          </a:fillRef>
+          <a:effectRef idx="0">
+            <a:schemeClr val="accent1"/>
+          </a:effectRef>
+          <a:fontRef idx="minor">
+            <a:schemeClr val="lt1"/>
+          </a:fontRef>
+        </p:style>
+        <p:txBody>
+          <a:bodyPr lIns="0" tIns="0" rIns="0" bIns="0" rtlCol="0" anchor="ctr"/>
+          <a:lstStyle/>
+          <a:p>
+            <a:pPr algn="ctr"/>
+            <a:r>
+              <a:rPr lang="en-US" dirty="0">
+                <a:solidFill>
+                  <a:schemeClr val="tx1"/>
+                </a:solidFill>
+              </a:rPr>
+              <a:t>Graph</a:t>
+            </a:r>
+          </a:p>
+          <a:p>
+            <a:pPr algn="ctr"/>
+            <a:r>
+              <a:rPr lang="en-US" dirty="0">
+                <a:solidFill>
+                  <a:schemeClr val="tx1"/>
+                </a:solidFill>
+              </a:rPr>
+              <a:t>Generation </a:t>
+            </a:r>
+          </a:p>
+        </p:txBody>
+      </p:sp>
+      <p:grpSp>
+        <p:nvGrpSpPr>
+          <p:cNvPr id="31" name="Group 30">
+            <a:extLst>
+              <a:ext uri="{FF2B5EF4-FFF2-40B4-BE49-F238E27FC236}">
+                <a16:creationId xmlns:a16="http://schemas.microsoft.com/office/drawing/2014/main" id="{E0CCCDA8-2B26-45C8-9F0D-7E460680F76E}"/>
+              </a:ext>
+            </a:extLst>
+          </p:cNvPr>
+          <p:cNvGrpSpPr/>
+          <p:nvPr/>
+        </p:nvGrpSpPr>
+        <p:grpSpPr>
+          <a:xfrm>
+            <a:off x="5075832" y="2904474"/>
+            <a:ext cx="1261872" cy="1309146"/>
+            <a:chOff x="3666744" y="2717780"/>
+            <a:chExt cx="1261872" cy="1309146"/>
+          </a:xfrm>
+        </p:grpSpPr>
+        <p:sp>
+          <p:nvSpPr>
+            <p:cNvPr id="7" name="Oval 6">
+              <a:extLst>
+                <a:ext uri="{FF2B5EF4-FFF2-40B4-BE49-F238E27FC236}">
+                  <a16:creationId xmlns:a16="http://schemas.microsoft.com/office/drawing/2014/main" id="{CFCF9805-79BC-4A83-A005-484F41D24980}"/>
+                </a:ext>
+              </a:extLst>
+            </p:cNvPr>
+            <p:cNvSpPr/>
+            <p:nvPr/>
+          </p:nvSpPr>
+          <p:spPr>
+            <a:xfrm>
+              <a:off x="4197096" y="2717780"/>
+              <a:ext cx="182880" cy="182880"/>
+            </a:xfrm>
+            <a:prstGeom prst="ellipse">
+              <a:avLst/>
+            </a:prstGeom>
+            <a:solidFill>
+              <a:schemeClr val="accent6">
+                <a:lumMod val="20000"/>
+                <a:lumOff val="80000"/>
+              </a:schemeClr>
+            </a:solidFill>
+            <a:ln>
+              <a:solidFill>
+                <a:schemeClr val="accent6">
+                  <a:lumMod val="75000"/>
+                </a:schemeClr>
+              </a:solidFill>
+            </a:ln>
+          </p:spPr>
+          <p:style>
+            <a:lnRef idx="2">
+              <a:schemeClr val="accent1">
+                <a:shade val="50000"/>
+              </a:schemeClr>
+            </a:lnRef>
+            <a:fillRef idx="1">
+              <a:schemeClr val="accent1"/>
+            </a:fillRef>
+            <a:effectRef idx="0">
+              <a:schemeClr val="accent1"/>
+            </a:effectRef>
+            <a:fontRef idx="minor">
+              <a:schemeClr val="lt1"/>
+            </a:fontRef>
+          </p:style>
+          <p:txBody>
+            <a:bodyPr rtlCol="0" anchor="ctr"/>
+            <a:lstStyle/>
+            <a:p>
+              <a:pPr algn="ctr"/>
+              <a:endParaRPr lang="en-US"/>
+            </a:p>
+          </p:txBody>
+        </p:sp>
+        <p:sp>
+          <p:nvSpPr>
+            <p:cNvPr id="8" name="Oval 7">
+              <a:extLst>
+                <a:ext uri="{FF2B5EF4-FFF2-40B4-BE49-F238E27FC236}">
+                  <a16:creationId xmlns:a16="http://schemas.microsoft.com/office/drawing/2014/main" id="{D42F71BE-5950-44B1-9EC5-F10C1DC93071}"/>
+                </a:ext>
+              </a:extLst>
+            </p:cNvPr>
+            <p:cNvSpPr/>
+            <p:nvPr/>
+          </p:nvSpPr>
+          <p:spPr>
+            <a:xfrm>
+              <a:off x="3849624" y="3172968"/>
+              <a:ext cx="182880" cy="182880"/>
+            </a:xfrm>
+            <a:prstGeom prst="ellipse">
+              <a:avLst/>
+            </a:prstGeom>
+            <a:solidFill>
+              <a:schemeClr val="accent6">
+                <a:lumMod val="20000"/>
+                <a:lumOff val="80000"/>
+              </a:schemeClr>
+            </a:solidFill>
+            <a:ln>
+              <a:solidFill>
+                <a:schemeClr val="accent6">
+                  <a:lumMod val="75000"/>
+                </a:schemeClr>
+              </a:solidFill>
+            </a:ln>
+          </p:spPr>
+          <p:style>
+            <a:lnRef idx="2">
+              <a:schemeClr val="accent1">
+                <a:shade val="50000"/>
+              </a:schemeClr>
+            </a:lnRef>
+            <a:fillRef idx="1">
+              <a:schemeClr val="accent1"/>
+            </a:fillRef>
+            <a:effectRef idx="0">
+              <a:schemeClr val="accent1"/>
+            </a:effectRef>
+            <a:fontRef idx="minor">
+              <a:schemeClr val="lt1"/>
+            </a:fontRef>
+          </p:style>
+          <p:txBody>
+            <a:bodyPr rtlCol="0" anchor="ctr"/>
+            <a:lstStyle/>
+            <a:p>
+              <a:pPr algn="ctr"/>
+              <a:endParaRPr lang="en-US"/>
+            </a:p>
+          </p:txBody>
+        </p:sp>
+        <p:sp>
+          <p:nvSpPr>
+            <p:cNvPr id="9" name="Oval 8">
+              <a:extLst>
+                <a:ext uri="{FF2B5EF4-FFF2-40B4-BE49-F238E27FC236}">
+                  <a16:creationId xmlns:a16="http://schemas.microsoft.com/office/drawing/2014/main" id="{BAFDDF9D-8F8F-4C4F-B008-92D4B8E4D56C}"/>
+                </a:ext>
+              </a:extLst>
+            </p:cNvPr>
+            <p:cNvSpPr/>
+            <p:nvPr/>
+          </p:nvSpPr>
+          <p:spPr>
+            <a:xfrm>
+              <a:off x="4288536" y="3661166"/>
+              <a:ext cx="182880" cy="182880"/>
+            </a:xfrm>
+            <a:prstGeom prst="ellipse">
+              <a:avLst/>
+            </a:prstGeom>
+            <a:solidFill>
+              <a:schemeClr val="accent6">
+                <a:lumMod val="20000"/>
+                <a:lumOff val="80000"/>
+              </a:schemeClr>
+            </a:solidFill>
+            <a:ln>
+              <a:solidFill>
+                <a:schemeClr val="accent6">
+                  <a:lumMod val="75000"/>
+                </a:schemeClr>
+              </a:solidFill>
+            </a:ln>
+          </p:spPr>
+          <p:style>
+            <a:lnRef idx="2">
+              <a:schemeClr val="accent1">
+                <a:shade val="50000"/>
+              </a:schemeClr>
+            </a:lnRef>
+            <a:fillRef idx="1">
+              <a:schemeClr val="accent1"/>
+            </a:fillRef>
+            <a:effectRef idx="0">
+              <a:schemeClr val="accent1"/>
+            </a:effectRef>
+            <a:fontRef idx="minor">
+              <a:schemeClr val="lt1"/>
+            </a:fontRef>
+          </p:style>
+          <p:txBody>
+            <a:bodyPr rtlCol="0" anchor="ctr"/>
+            <a:lstStyle/>
+            <a:p>
+              <a:pPr algn="ctr"/>
+              <a:endParaRPr lang="en-US"/>
+            </a:p>
+          </p:txBody>
+        </p:sp>
+        <p:sp>
+          <p:nvSpPr>
+            <p:cNvPr id="10" name="Oval 9">
+              <a:extLst>
+                <a:ext uri="{FF2B5EF4-FFF2-40B4-BE49-F238E27FC236}">
+                  <a16:creationId xmlns:a16="http://schemas.microsoft.com/office/drawing/2014/main" id="{4B5193BA-3134-49A7-94B5-D295224606C1}"/>
+                </a:ext>
+              </a:extLst>
+            </p:cNvPr>
+            <p:cNvSpPr/>
+            <p:nvPr/>
+          </p:nvSpPr>
+          <p:spPr>
+            <a:xfrm>
+              <a:off x="4745736" y="3246120"/>
+              <a:ext cx="182880" cy="182880"/>
+            </a:xfrm>
+            <a:prstGeom prst="ellipse">
+              <a:avLst/>
+            </a:prstGeom>
+            <a:solidFill>
+              <a:schemeClr val="accent6">
+                <a:lumMod val="20000"/>
+                <a:lumOff val="80000"/>
+              </a:schemeClr>
+            </a:solidFill>
+            <a:ln>
+              <a:solidFill>
+                <a:schemeClr val="accent6">
+                  <a:lumMod val="75000"/>
+                </a:schemeClr>
+              </a:solidFill>
+            </a:ln>
+          </p:spPr>
+          <p:style>
+            <a:lnRef idx="2">
+              <a:schemeClr val="accent1">
+                <a:shade val="50000"/>
+              </a:schemeClr>
+            </a:lnRef>
+            <a:fillRef idx="1">
+              <a:schemeClr val="accent1"/>
+            </a:fillRef>
+            <a:effectRef idx="0">
+              <a:schemeClr val="accent1"/>
+            </a:effectRef>
+            <a:fontRef idx="minor">
+              <a:schemeClr val="lt1"/>
+            </a:fontRef>
+          </p:style>
+          <p:txBody>
+            <a:bodyPr rtlCol="0" anchor="ctr"/>
+            <a:lstStyle/>
+            <a:p>
+              <a:pPr algn="ctr"/>
+              <a:endParaRPr lang="en-US" dirty="0"/>
+            </a:p>
+          </p:txBody>
+        </p:sp>
+        <p:sp>
+          <p:nvSpPr>
+            <p:cNvPr id="11" name="Oval 10">
+              <a:extLst>
+                <a:ext uri="{FF2B5EF4-FFF2-40B4-BE49-F238E27FC236}">
+                  <a16:creationId xmlns:a16="http://schemas.microsoft.com/office/drawing/2014/main" id="{F6604EDE-2BF7-4CBB-B7D7-E5B175780E3A}"/>
+                </a:ext>
+              </a:extLst>
+            </p:cNvPr>
+            <p:cNvSpPr/>
+            <p:nvPr/>
+          </p:nvSpPr>
+          <p:spPr>
+            <a:xfrm>
+              <a:off x="3666744" y="3844046"/>
+              <a:ext cx="182880" cy="182880"/>
+            </a:xfrm>
+            <a:prstGeom prst="ellipse">
+              <a:avLst/>
+            </a:prstGeom>
+            <a:solidFill>
+              <a:schemeClr val="accent6">
+                <a:lumMod val="20000"/>
+                <a:lumOff val="80000"/>
+              </a:schemeClr>
+            </a:solidFill>
+            <a:ln>
+              <a:solidFill>
+                <a:schemeClr val="accent6">
+                  <a:lumMod val="75000"/>
+                </a:schemeClr>
+              </a:solidFill>
+            </a:ln>
+          </p:spPr>
+          <p:style>
+            <a:lnRef idx="2">
+              <a:schemeClr val="accent1">
+                <a:shade val="50000"/>
+              </a:schemeClr>
+            </a:lnRef>
+            <a:fillRef idx="1">
+              <a:schemeClr val="accent1"/>
+            </a:fillRef>
+            <a:effectRef idx="0">
+              <a:schemeClr val="accent1"/>
+            </a:effectRef>
+            <a:fontRef idx="minor">
+              <a:schemeClr val="lt1"/>
+            </a:fontRef>
+          </p:style>
+          <p:txBody>
+            <a:bodyPr rtlCol="0" anchor="ctr"/>
+            <a:lstStyle/>
+            <a:p>
+              <a:pPr algn="ctr"/>
+              <a:endParaRPr lang="en-US"/>
+            </a:p>
+          </p:txBody>
+        </p:sp>
+        <p:cxnSp>
+          <p:nvCxnSpPr>
+            <p:cNvPr id="13" name="Straight Arrow Connector 12">
+              <a:extLst>
+                <a:ext uri="{FF2B5EF4-FFF2-40B4-BE49-F238E27FC236}">
+                  <a16:creationId xmlns:a16="http://schemas.microsoft.com/office/drawing/2014/main" id="{5879F9E2-F1A1-49B0-9944-6ED1A4B3DB68}"/>
+                </a:ext>
+              </a:extLst>
+            </p:cNvPr>
+            <p:cNvCxnSpPr>
+              <a:stCxn id="7" idx="3"/>
+              <a:endCxn id="8" idx="7"/>
+            </p:cNvCxnSpPr>
+            <p:nvPr/>
+          </p:nvCxnSpPr>
+          <p:spPr>
+            <a:xfrm flipH="1">
+              <a:off x="4005722" y="2873878"/>
+              <a:ext cx="218156" cy="325872"/>
+            </a:xfrm>
+            <a:prstGeom prst="straightConnector1">
+              <a:avLst/>
+            </a:prstGeom>
+            <a:ln>
+              <a:solidFill>
+                <a:srgbClr val="0070C0"/>
+              </a:solidFill>
+              <a:tailEnd type="triangle"/>
+            </a:ln>
+          </p:spPr>
+          <p:style>
+            <a:lnRef idx="1">
+              <a:schemeClr val="accent1"/>
+            </a:lnRef>
+            <a:fillRef idx="0">
+              <a:schemeClr val="accent1"/>
+            </a:fillRef>
+            <a:effectRef idx="0">
+              <a:schemeClr val="accent1"/>
+            </a:effectRef>
+            <a:fontRef idx="minor">
+              <a:schemeClr val="tx1"/>
+            </a:fontRef>
+          </p:style>
+        </p:cxnSp>
+        <p:cxnSp>
+          <p:nvCxnSpPr>
+            <p:cNvPr id="14" name="Straight Arrow Connector 13">
+              <a:extLst>
+                <a:ext uri="{FF2B5EF4-FFF2-40B4-BE49-F238E27FC236}">
+                  <a16:creationId xmlns:a16="http://schemas.microsoft.com/office/drawing/2014/main" id="{75B964A6-5E36-44F5-87C8-AFF4D98B2E81}"/>
+                </a:ext>
+              </a:extLst>
+            </p:cNvPr>
+            <p:cNvCxnSpPr>
+              <a:cxnSpLocks/>
+              <a:stCxn id="7" idx="4"/>
+              <a:endCxn id="9" idx="0"/>
+            </p:cNvCxnSpPr>
+            <p:nvPr/>
+          </p:nvCxnSpPr>
+          <p:spPr>
+            <a:xfrm>
+              <a:off x="4288536" y="2900660"/>
+              <a:ext cx="91440" cy="760506"/>
+            </a:xfrm>
+            <a:prstGeom prst="straightConnector1">
+              <a:avLst/>
+            </a:prstGeom>
+            <a:ln>
+              <a:solidFill>
+                <a:srgbClr val="0070C0"/>
+              </a:solidFill>
+              <a:tailEnd type="triangle"/>
+            </a:ln>
+          </p:spPr>
+          <p:style>
+            <a:lnRef idx="1">
+              <a:schemeClr val="accent1"/>
+            </a:lnRef>
+            <a:fillRef idx="0">
+              <a:schemeClr val="accent1"/>
+            </a:fillRef>
+            <a:effectRef idx="0">
+              <a:schemeClr val="accent1"/>
+            </a:effectRef>
+            <a:fontRef idx="minor">
+              <a:schemeClr val="tx1"/>
+            </a:fontRef>
+          </p:style>
+        </p:cxnSp>
+        <p:cxnSp>
+          <p:nvCxnSpPr>
+            <p:cNvPr id="17" name="Straight Arrow Connector 16">
+              <a:extLst>
+                <a:ext uri="{FF2B5EF4-FFF2-40B4-BE49-F238E27FC236}">
+                  <a16:creationId xmlns:a16="http://schemas.microsoft.com/office/drawing/2014/main" id="{1DB2E3CB-7C3D-4F13-A6AC-67077C484D84}"/>
+                </a:ext>
+              </a:extLst>
+            </p:cNvPr>
+            <p:cNvCxnSpPr>
+              <a:cxnSpLocks/>
+              <a:stCxn id="7" idx="5"/>
+              <a:endCxn id="10" idx="1"/>
+            </p:cNvCxnSpPr>
+            <p:nvPr/>
+          </p:nvCxnSpPr>
+          <p:spPr>
+            <a:xfrm>
+              <a:off x="4353194" y="2873878"/>
+              <a:ext cx="419324" cy="399024"/>
+            </a:xfrm>
+            <a:prstGeom prst="straightConnector1">
+              <a:avLst/>
+            </a:prstGeom>
+            <a:ln>
+              <a:solidFill>
+                <a:srgbClr val="0070C0"/>
+              </a:solidFill>
+              <a:tailEnd type="triangle"/>
+            </a:ln>
+          </p:spPr>
+          <p:style>
+            <a:lnRef idx="1">
+              <a:schemeClr val="accent1"/>
+            </a:lnRef>
+            <a:fillRef idx="0">
+              <a:schemeClr val="accent1"/>
+            </a:fillRef>
+            <a:effectRef idx="0">
+              <a:schemeClr val="accent1"/>
+            </a:effectRef>
+            <a:fontRef idx="minor">
+              <a:schemeClr val="tx1"/>
+            </a:fontRef>
+          </p:style>
+        </p:cxnSp>
+        <p:cxnSp>
+          <p:nvCxnSpPr>
+            <p:cNvPr id="20" name="Straight Arrow Connector 19">
+              <a:extLst>
+                <a:ext uri="{FF2B5EF4-FFF2-40B4-BE49-F238E27FC236}">
+                  <a16:creationId xmlns:a16="http://schemas.microsoft.com/office/drawing/2014/main" id="{A7F3D125-8440-4C24-9645-67F44989D3B5}"/>
+                </a:ext>
+              </a:extLst>
+            </p:cNvPr>
+            <p:cNvCxnSpPr>
+              <a:cxnSpLocks/>
+              <a:stCxn id="10" idx="3"/>
+              <a:endCxn id="9" idx="7"/>
+            </p:cNvCxnSpPr>
+            <p:nvPr/>
+          </p:nvCxnSpPr>
+          <p:spPr>
+            <a:xfrm flipH="1">
+              <a:off x="4444634" y="3402218"/>
+              <a:ext cx="327884" cy="285730"/>
+            </a:xfrm>
+            <a:prstGeom prst="straightConnector1">
+              <a:avLst/>
+            </a:prstGeom>
+            <a:ln>
+              <a:solidFill>
+                <a:srgbClr val="0070C0"/>
+              </a:solidFill>
+              <a:tailEnd type="triangle"/>
+            </a:ln>
+          </p:spPr>
+          <p:style>
+            <a:lnRef idx="1">
+              <a:schemeClr val="accent1"/>
+            </a:lnRef>
+            <a:fillRef idx="0">
+              <a:schemeClr val="accent1"/>
+            </a:fillRef>
+            <a:effectRef idx="0">
+              <a:schemeClr val="accent1"/>
+            </a:effectRef>
+            <a:fontRef idx="minor">
+              <a:schemeClr val="tx1"/>
+            </a:fontRef>
+          </p:style>
+        </p:cxnSp>
+        <p:cxnSp>
+          <p:nvCxnSpPr>
+            <p:cNvPr id="23" name="Straight Arrow Connector 22">
+              <a:extLst>
+                <a:ext uri="{FF2B5EF4-FFF2-40B4-BE49-F238E27FC236}">
+                  <a16:creationId xmlns:a16="http://schemas.microsoft.com/office/drawing/2014/main" id="{ACE0AE8F-0C75-4D78-9BFB-07898567BA1F}"/>
+                </a:ext>
+              </a:extLst>
+            </p:cNvPr>
+            <p:cNvCxnSpPr>
+              <a:cxnSpLocks/>
+              <a:stCxn id="11" idx="6"/>
+              <a:endCxn id="9" idx="2"/>
+            </p:cNvCxnSpPr>
+            <p:nvPr/>
+          </p:nvCxnSpPr>
+          <p:spPr>
+            <a:xfrm flipV="1">
+              <a:off x="3849624" y="3752606"/>
+              <a:ext cx="438912" cy="182880"/>
+            </a:xfrm>
+            <a:prstGeom prst="straightConnector1">
+              <a:avLst/>
+            </a:prstGeom>
+            <a:ln>
+              <a:solidFill>
+                <a:srgbClr val="0070C0"/>
+              </a:solidFill>
+              <a:tailEnd type="triangle"/>
+            </a:ln>
+          </p:spPr>
+          <p:style>
+            <a:lnRef idx="1">
+              <a:schemeClr val="accent1"/>
+            </a:lnRef>
+            <a:fillRef idx="0">
+              <a:schemeClr val="accent1"/>
+            </a:fillRef>
+            <a:effectRef idx="0">
+              <a:schemeClr val="accent1"/>
+            </a:effectRef>
+            <a:fontRef idx="minor">
+              <a:schemeClr val="tx1"/>
+            </a:fontRef>
+          </p:style>
+        </p:cxnSp>
+        <p:cxnSp>
+          <p:nvCxnSpPr>
+            <p:cNvPr id="27" name="Straight Arrow Connector 26">
+              <a:extLst>
+                <a:ext uri="{FF2B5EF4-FFF2-40B4-BE49-F238E27FC236}">
+                  <a16:creationId xmlns:a16="http://schemas.microsoft.com/office/drawing/2014/main" id="{0D13432C-4D7A-40EA-9BAD-2C3E37DF264A}"/>
+                </a:ext>
+              </a:extLst>
+            </p:cNvPr>
+            <p:cNvCxnSpPr>
+              <a:cxnSpLocks/>
+              <a:stCxn id="11" idx="0"/>
+              <a:endCxn id="8" idx="4"/>
+            </p:cNvCxnSpPr>
+            <p:nvPr/>
+          </p:nvCxnSpPr>
+          <p:spPr>
+            <a:xfrm flipV="1">
+              <a:off x="3758184" y="3355848"/>
+              <a:ext cx="182880" cy="488198"/>
+            </a:xfrm>
+            <a:prstGeom prst="straightConnector1">
+              <a:avLst/>
+            </a:prstGeom>
+            <a:ln>
+              <a:solidFill>
+                <a:srgbClr val="0070C0"/>
+              </a:solidFill>
+              <a:tailEnd type="triangle"/>
+            </a:ln>
+          </p:spPr>
+          <p:style>
+            <a:lnRef idx="1">
+              <a:schemeClr val="accent1"/>
+            </a:lnRef>
+            <a:fillRef idx="0">
+              <a:schemeClr val="accent1"/>
+            </a:fillRef>
+            <a:effectRef idx="0">
+              <a:schemeClr val="accent1"/>
+            </a:effectRef>
+            <a:fontRef idx="minor">
+              <a:schemeClr val="tx1"/>
+            </a:fontRef>
+          </p:style>
+        </p:cxnSp>
+      </p:grpSp>
+      <p:sp>
+        <p:nvSpPr>
+          <p:cNvPr id="32" name="Rectangle: Rounded Corners 31">
+            <a:extLst>
+              <a:ext uri="{FF2B5EF4-FFF2-40B4-BE49-F238E27FC236}">
+                <a16:creationId xmlns:a16="http://schemas.microsoft.com/office/drawing/2014/main" id="{B005A5E1-4BFA-43BB-9947-C97901BF37F2}"/>
+              </a:ext>
+            </a:extLst>
+          </p:cNvPr>
+          <p:cNvSpPr/>
+          <p:nvPr/>
+        </p:nvSpPr>
+        <p:spPr>
+          <a:xfrm>
+            <a:off x="6761018" y="1886153"/>
+            <a:ext cx="1201847" cy="1126266"/>
+          </a:xfrm>
+          <a:prstGeom prst="roundRect">
+            <a:avLst>
+              <a:gd name="adj" fmla="val 10106"/>
+            </a:avLst>
+          </a:prstGeom>
+          <a:solidFill>
+            <a:schemeClr val="accent4">
+              <a:lumMod val="20000"/>
+              <a:lumOff val="80000"/>
+            </a:schemeClr>
+          </a:solidFill>
+          <a:ln>
+            <a:solidFill>
+              <a:srgbClr val="FFC000"/>
+            </a:solidFill>
+          </a:ln>
+        </p:spPr>
+        <p:style>
+          <a:lnRef idx="2">
+            <a:schemeClr val="accent1">
+              <a:shade val="50000"/>
+            </a:schemeClr>
+          </a:lnRef>
+          <a:fillRef idx="1">
+            <a:schemeClr val="accent1"/>
+          </a:fillRef>
+          <a:effectRef idx="0">
+            <a:schemeClr val="accent1"/>
+          </a:effectRef>
+          <a:fontRef idx="minor">
+            <a:schemeClr val="lt1"/>
+          </a:fontRef>
+        </p:style>
+        <p:txBody>
+          <a:bodyPr lIns="0" tIns="0" rIns="0" bIns="0" rtlCol="0" anchor="ctr"/>
+          <a:lstStyle/>
+          <a:p>
+            <a:pPr algn="ctr"/>
+            <a:r>
+              <a:rPr lang="en-US" dirty="0">
+                <a:solidFill>
+                  <a:schemeClr val="tx1"/>
+                </a:solidFill>
+              </a:rPr>
+              <a:t>Variable Type Generation</a:t>
+            </a:r>
+          </a:p>
+          <a:p>
+            <a:pPr algn="ctr"/>
+            <a:r>
+              <a:rPr lang="en-US" dirty="0">
+                <a:solidFill>
+                  <a:schemeClr val="tx1"/>
+                </a:solidFill>
+              </a:rPr>
+              <a:t>Model</a:t>
+            </a:r>
+          </a:p>
+        </p:txBody>
+      </p:sp>
+      <p:sp>
+        <p:nvSpPr>
+          <p:cNvPr id="33" name="Rectangle: Rounded Corners 32">
+            <a:extLst>
+              <a:ext uri="{FF2B5EF4-FFF2-40B4-BE49-F238E27FC236}">
+                <a16:creationId xmlns:a16="http://schemas.microsoft.com/office/drawing/2014/main" id="{8C59E19E-2FB7-45C9-8EA3-2932A37D06B2}"/>
+              </a:ext>
+            </a:extLst>
+          </p:cNvPr>
+          <p:cNvSpPr/>
+          <p:nvPr/>
+        </p:nvSpPr>
+        <p:spPr>
+          <a:xfrm>
+            <a:off x="6761018" y="4251980"/>
+            <a:ext cx="1201847" cy="1126266"/>
+          </a:xfrm>
+          <a:prstGeom prst="roundRect">
+            <a:avLst>
+              <a:gd name="adj" fmla="val 10106"/>
+            </a:avLst>
+          </a:prstGeom>
+          <a:solidFill>
+            <a:schemeClr val="accent4">
+              <a:lumMod val="20000"/>
+              <a:lumOff val="80000"/>
+            </a:schemeClr>
+          </a:solidFill>
+          <a:ln>
+            <a:solidFill>
+              <a:srgbClr val="FFC000"/>
+            </a:solidFill>
+          </a:ln>
+        </p:spPr>
+        <p:style>
+          <a:lnRef idx="2">
+            <a:schemeClr val="accent1">
+              <a:shade val="50000"/>
+            </a:schemeClr>
+          </a:lnRef>
+          <a:fillRef idx="1">
+            <a:schemeClr val="accent1"/>
+          </a:fillRef>
+          <a:effectRef idx="0">
+            <a:schemeClr val="accent1"/>
+          </a:effectRef>
+          <a:fontRef idx="minor">
+            <a:schemeClr val="lt1"/>
+          </a:fontRef>
+        </p:style>
+        <p:txBody>
+          <a:bodyPr lIns="0" tIns="0" rIns="0" bIns="0" rtlCol="0" anchor="ctr"/>
+          <a:lstStyle/>
+          <a:p>
+            <a:pPr algn="ctr"/>
+            <a:r>
+              <a:rPr lang="en-US" dirty="0">
+                <a:solidFill>
+                  <a:schemeClr val="tx1"/>
+                </a:solidFill>
+              </a:rPr>
+              <a:t>Variable Name Generation</a:t>
+            </a:r>
+          </a:p>
+          <a:p>
+            <a:pPr algn="ctr"/>
+            <a:r>
+              <a:rPr lang="en-US" dirty="0">
+                <a:solidFill>
+                  <a:schemeClr val="tx1"/>
+                </a:solidFill>
+              </a:rPr>
+              <a:t>Model</a:t>
+            </a:r>
+          </a:p>
+        </p:txBody>
+      </p:sp>
+      <p:sp>
+        <p:nvSpPr>
+          <p:cNvPr id="35" name="Rectangle 34">
+            <a:extLst>
+              <a:ext uri="{FF2B5EF4-FFF2-40B4-BE49-F238E27FC236}">
+                <a16:creationId xmlns:a16="http://schemas.microsoft.com/office/drawing/2014/main" id="{49E16109-8502-402A-905D-C158004FFBD9}"/>
+              </a:ext>
+            </a:extLst>
+          </p:cNvPr>
+          <p:cNvSpPr/>
+          <p:nvPr/>
+        </p:nvSpPr>
+        <p:spPr>
+          <a:xfrm>
+            <a:off x="8789511" y="1886153"/>
+            <a:ext cx="436326" cy="1126266"/>
+          </a:xfrm>
+          <a:prstGeom prst="rect">
+            <a:avLst/>
+          </a:prstGeom>
+          <a:solidFill>
+            <a:schemeClr val="accent2">
+              <a:lumMod val="20000"/>
+              <a:lumOff val="80000"/>
+            </a:schemeClr>
+          </a:solidFill>
+          <a:ln>
+            <a:solidFill>
+              <a:srgbClr val="C00000"/>
+            </a:solidFill>
+          </a:ln>
+        </p:spPr>
+        <p:style>
+          <a:lnRef idx="2">
+            <a:schemeClr val="accent1">
+              <a:shade val="50000"/>
+            </a:schemeClr>
+          </a:lnRef>
+          <a:fillRef idx="1">
+            <a:schemeClr val="accent1"/>
+          </a:fillRef>
+          <a:effectRef idx="0">
+            <a:schemeClr val="accent1"/>
+          </a:effectRef>
+          <a:fontRef idx="minor">
+            <a:schemeClr val="lt1"/>
+          </a:fontRef>
+        </p:style>
+        <p:txBody>
+          <a:bodyPr rtlCol="0" anchor="ctr"/>
+          <a:lstStyle/>
+          <a:p>
+            <a:pPr algn="ctr"/>
+            <a:endParaRPr lang="en-US"/>
+          </a:p>
+        </p:txBody>
+      </p:sp>
+      <p:sp>
+        <p:nvSpPr>
+          <p:cNvPr id="36" name="Rectangle 35">
+            <a:extLst>
+              <a:ext uri="{FF2B5EF4-FFF2-40B4-BE49-F238E27FC236}">
+                <a16:creationId xmlns:a16="http://schemas.microsoft.com/office/drawing/2014/main" id="{FD6C0E98-F9E2-45D2-B037-550984F01837}"/>
+              </a:ext>
+            </a:extLst>
+          </p:cNvPr>
+          <p:cNvSpPr/>
+          <p:nvPr/>
+        </p:nvSpPr>
+        <p:spPr>
+          <a:xfrm>
+            <a:off x="8789511" y="4251980"/>
+            <a:ext cx="436326" cy="1126266"/>
+          </a:xfrm>
+          <a:prstGeom prst="rect">
+            <a:avLst/>
+          </a:prstGeom>
+          <a:solidFill>
+            <a:schemeClr val="accent5">
+              <a:lumMod val="20000"/>
+              <a:lumOff val="80000"/>
+            </a:schemeClr>
+          </a:solidFill>
+          <a:ln>
+            <a:solidFill>
+              <a:srgbClr val="0070C0"/>
+            </a:solidFill>
+          </a:ln>
+        </p:spPr>
+        <p:style>
+          <a:lnRef idx="2">
+            <a:schemeClr val="accent1">
+              <a:shade val="50000"/>
+            </a:schemeClr>
+          </a:lnRef>
+          <a:fillRef idx="1">
+            <a:schemeClr val="accent1"/>
+          </a:fillRef>
+          <a:effectRef idx="0">
+            <a:schemeClr val="accent1"/>
+          </a:effectRef>
+          <a:fontRef idx="minor">
+            <a:schemeClr val="lt1"/>
+          </a:fontRef>
+        </p:style>
+        <p:txBody>
+          <a:bodyPr rtlCol="0" anchor="ctr"/>
+          <a:lstStyle/>
+          <a:p>
+            <a:pPr algn="ctr"/>
+            <a:endParaRPr lang="en-US"/>
+          </a:p>
+        </p:txBody>
+      </p:sp>
+      <p:sp>
+        <p:nvSpPr>
+          <p:cNvPr id="37" name="TextBox 36">
+            <a:extLst>
+              <a:ext uri="{FF2B5EF4-FFF2-40B4-BE49-F238E27FC236}">
+                <a16:creationId xmlns:a16="http://schemas.microsoft.com/office/drawing/2014/main" id="{024AF42E-304E-4AAD-99FC-0740368ECA34}"/>
+              </a:ext>
+            </a:extLst>
+          </p:cNvPr>
+          <p:cNvSpPr txBox="1"/>
+          <p:nvPr/>
+        </p:nvSpPr>
+        <p:spPr>
+          <a:xfrm>
+            <a:off x="8203002" y="1245065"/>
+            <a:ext cx="1609344" cy="646331"/>
+          </a:xfrm>
+          <a:prstGeom prst="rect">
+            <a:avLst/>
+          </a:prstGeom>
+          <a:noFill/>
+        </p:spPr>
+        <p:txBody>
+          <a:bodyPr wrap="square" rtlCol="0">
+            <a:spAutoFit/>
+          </a:bodyPr>
+          <a:lstStyle/>
+          <a:p>
+            <a:pPr algn="ctr"/>
+            <a:r>
+              <a:rPr lang="en-US" dirty="0"/>
+              <a:t>Variables’ Types</a:t>
+            </a:r>
+          </a:p>
+        </p:txBody>
+      </p:sp>
+      <p:sp>
+        <p:nvSpPr>
+          <p:cNvPr id="38" name="TextBox 37">
+            <a:extLst>
+              <a:ext uri="{FF2B5EF4-FFF2-40B4-BE49-F238E27FC236}">
+                <a16:creationId xmlns:a16="http://schemas.microsoft.com/office/drawing/2014/main" id="{89D390B6-92BF-4857-B8B0-5A6700585064}"/>
+              </a:ext>
+            </a:extLst>
+          </p:cNvPr>
+          <p:cNvSpPr txBox="1"/>
+          <p:nvPr/>
+        </p:nvSpPr>
+        <p:spPr>
+          <a:xfrm>
+            <a:off x="8203002" y="3616134"/>
+            <a:ext cx="1609344" cy="646331"/>
+          </a:xfrm>
+          <a:prstGeom prst="rect">
+            <a:avLst/>
+          </a:prstGeom>
+          <a:noFill/>
+        </p:spPr>
+        <p:txBody>
+          <a:bodyPr wrap="square" rtlCol="0">
+            <a:spAutoFit/>
+          </a:bodyPr>
+          <a:lstStyle/>
+          <a:p>
+            <a:pPr algn="ctr"/>
+            <a:r>
+              <a:rPr lang="en-US" dirty="0"/>
+              <a:t>Variables’ Names</a:t>
+            </a:r>
+          </a:p>
+        </p:txBody>
+      </p:sp>
+      <p:sp>
+        <p:nvSpPr>
+          <p:cNvPr id="39" name="TextBox 38">
+            <a:extLst>
+              <a:ext uri="{FF2B5EF4-FFF2-40B4-BE49-F238E27FC236}">
+                <a16:creationId xmlns:a16="http://schemas.microsoft.com/office/drawing/2014/main" id="{357B409A-EC5B-40A4-A5E9-DEF9AFBDF295}"/>
+              </a:ext>
+            </a:extLst>
+          </p:cNvPr>
+          <p:cNvSpPr txBox="1"/>
+          <p:nvPr/>
+        </p:nvSpPr>
+        <p:spPr>
+          <a:xfrm>
+            <a:off x="4828294" y="2239163"/>
+            <a:ext cx="1609344" cy="646331"/>
+          </a:xfrm>
+          <a:prstGeom prst="rect">
+            <a:avLst/>
+          </a:prstGeom>
+          <a:noFill/>
+        </p:spPr>
+        <p:txBody>
+          <a:bodyPr wrap="square" rtlCol="0">
+            <a:spAutoFit/>
+          </a:bodyPr>
+          <a:lstStyle/>
+          <a:p>
+            <a:pPr algn="ctr"/>
+            <a:r>
+              <a:rPr lang="en-US" dirty="0"/>
+              <a:t>Representation Graph</a:t>
+            </a:r>
+          </a:p>
+        </p:txBody>
+      </p:sp>
+      <p:cxnSp>
+        <p:nvCxnSpPr>
+          <p:cNvPr id="41" name="Straight Arrow Connector 40">
+            <a:extLst>
+              <a:ext uri="{FF2B5EF4-FFF2-40B4-BE49-F238E27FC236}">
+                <a16:creationId xmlns:a16="http://schemas.microsoft.com/office/drawing/2014/main" id="{554B9514-3448-47BB-9838-D5D6747BF184}"/>
+              </a:ext>
+            </a:extLst>
+          </p:cNvPr>
+          <p:cNvCxnSpPr>
+            <a:stCxn id="4" idx="3"/>
+            <a:endCxn id="6" idx="1"/>
+          </p:cNvCxnSpPr>
+          <p:nvPr/>
+        </p:nvCxnSpPr>
+        <p:spPr>
+          <a:xfrm>
+            <a:off x="2729438" y="3605227"/>
+            <a:ext cx="671749" cy="190"/>
+          </a:xfrm>
+          <a:prstGeom prst="straightConnector1">
+            <a:avLst/>
+          </a:prstGeom>
+          <a:ln w="25400">
+            <a:tailEnd type="triangle"/>
+          </a:ln>
+        </p:spPr>
+        <p:style>
+          <a:lnRef idx="1">
+            <a:schemeClr val="accent1"/>
+          </a:lnRef>
+          <a:fillRef idx="0">
+            <a:schemeClr val="accent1"/>
+          </a:fillRef>
+          <a:effectRef idx="0">
+            <a:schemeClr val="accent1"/>
+          </a:effectRef>
+          <a:fontRef idx="minor">
+            <a:schemeClr val="tx1"/>
+          </a:fontRef>
+        </p:style>
+      </p:cxnSp>
+      <p:cxnSp>
+        <p:nvCxnSpPr>
+          <p:cNvPr id="42" name="Straight Arrow Connector 41">
+            <a:extLst>
+              <a:ext uri="{FF2B5EF4-FFF2-40B4-BE49-F238E27FC236}">
+                <a16:creationId xmlns:a16="http://schemas.microsoft.com/office/drawing/2014/main" id="{48E6B7C3-87DA-4443-AF04-1C294B79848C}"/>
+              </a:ext>
+            </a:extLst>
+          </p:cNvPr>
+          <p:cNvCxnSpPr/>
+          <p:nvPr/>
+        </p:nvCxnSpPr>
+        <p:spPr>
+          <a:xfrm>
+            <a:off x="4594999" y="3605227"/>
+            <a:ext cx="548640" cy="190"/>
+          </a:xfrm>
+          <a:prstGeom prst="straightConnector1">
+            <a:avLst/>
+          </a:prstGeom>
+          <a:ln w="25400">
+            <a:tailEnd type="triangle"/>
+          </a:ln>
+        </p:spPr>
+        <p:style>
+          <a:lnRef idx="1">
+            <a:schemeClr val="accent1"/>
+          </a:lnRef>
+          <a:fillRef idx="0">
+            <a:schemeClr val="accent1"/>
+          </a:fillRef>
+          <a:effectRef idx="0">
+            <a:schemeClr val="accent1"/>
+          </a:effectRef>
+          <a:fontRef idx="minor">
+            <a:schemeClr val="tx1"/>
+          </a:fontRef>
+        </p:style>
+      </p:cxnSp>
+      <p:cxnSp>
+        <p:nvCxnSpPr>
+          <p:cNvPr id="43" name="Straight Arrow Connector 42">
+            <a:extLst>
+              <a:ext uri="{FF2B5EF4-FFF2-40B4-BE49-F238E27FC236}">
+                <a16:creationId xmlns:a16="http://schemas.microsoft.com/office/drawing/2014/main" id="{B0122614-82B3-4B0E-BEEB-1985ACACAB58}"/>
+              </a:ext>
+            </a:extLst>
+          </p:cNvPr>
+          <p:cNvCxnSpPr>
+            <a:cxnSpLocks/>
+          </p:cNvCxnSpPr>
+          <p:nvPr/>
+        </p:nvCxnSpPr>
+        <p:spPr>
+          <a:xfrm flipV="1">
+            <a:off x="6346198" y="2449476"/>
+            <a:ext cx="414820" cy="950191"/>
+          </a:xfrm>
+          <a:prstGeom prst="straightConnector1">
+            <a:avLst/>
+          </a:prstGeom>
+          <a:ln w="25400">
+            <a:tailEnd type="triangle"/>
+          </a:ln>
+        </p:spPr>
+        <p:style>
+          <a:lnRef idx="1">
+            <a:schemeClr val="accent1"/>
+          </a:lnRef>
+          <a:fillRef idx="0">
+            <a:schemeClr val="accent1"/>
+          </a:fillRef>
+          <a:effectRef idx="0">
+            <a:schemeClr val="accent1"/>
+          </a:effectRef>
+          <a:fontRef idx="minor">
+            <a:schemeClr val="tx1"/>
+          </a:fontRef>
+        </p:style>
+      </p:cxnSp>
+      <p:cxnSp>
+        <p:nvCxnSpPr>
+          <p:cNvPr id="45" name="Straight Arrow Connector 44">
+            <a:extLst>
+              <a:ext uri="{FF2B5EF4-FFF2-40B4-BE49-F238E27FC236}">
+                <a16:creationId xmlns:a16="http://schemas.microsoft.com/office/drawing/2014/main" id="{7BDED607-7075-4604-AC8A-035ECB539DD9}"/>
+              </a:ext>
+            </a:extLst>
+          </p:cNvPr>
+          <p:cNvCxnSpPr>
+            <a:cxnSpLocks/>
+            <a:endCxn id="33" idx="1"/>
+          </p:cNvCxnSpPr>
+          <p:nvPr/>
+        </p:nvCxnSpPr>
+        <p:spPr>
+          <a:xfrm>
+            <a:off x="6337451" y="3786641"/>
+            <a:ext cx="423567" cy="1028472"/>
+          </a:xfrm>
+          <a:prstGeom prst="straightConnector1">
+            <a:avLst/>
+          </a:prstGeom>
+          <a:ln w="25400">
+            <a:tailEnd type="triangle"/>
+          </a:ln>
+        </p:spPr>
+        <p:style>
+          <a:lnRef idx="1">
+            <a:schemeClr val="accent1"/>
+          </a:lnRef>
+          <a:fillRef idx="0">
+            <a:schemeClr val="accent1"/>
+          </a:fillRef>
+          <a:effectRef idx="0">
+            <a:schemeClr val="accent1"/>
+          </a:effectRef>
+          <a:fontRef idx="minor">
+            <a:schemeClr val="tx1"/>
+          </a:fontRef>
+        </p:style>
+      </p:cxnSp>
+      <p:cxnSp>
+        <p:nvCxnSpPr>
+          <p:cNvPr id="3" name="Straight Arrow Connector 2">
+            <a:extLst>
+              <a:ext uri="{FF2B5EF4-FFF2-40B4-BE49-F238E27FC236}">
+                <a16:creationId xmlns:a16="http://schemas.microsoft.com/office/drawing/2014/main" id="{7E25D987-202C-4C95-9F99-8A712C7C7F36}"/>
+              </a:ext>
+            </a:extLst>
+          </p:cNvPr>
+          <p:cNvCxnSpPr>
+            <a:stCxn id="32" idx="2"/>
+            <a:endCxn id="33" idx="0"/>
+          </p:cNvCxnSpPr>
+          <p:nvPr/>
+        </p:nvCxnSpPr>
+        <p:spPr>
+          <a:xfrm>
+            <a:off x="7361942" y="3012419"/>
+            <a:ext cx="0" cy="1239561"/>
+          </a:xfrm>
+          <a:prstGeom prst="straightConnector1">
+            <a:avLst/>
+          </a:prstGeom>
+          <a:ln w="19050">
+            <a:headEnd type="triangle"/>
+            <a:tailEnd type="triangle"/>
+          </a:ln>
+        </p:spPr>
+        <p:style>
+          <a:lnRef idx="1">
+            <a:schemeClr val="accent1"/>
+          </a:lnRef>
+          <a:fillRef idx="0">
+            <a:schemeClr val="accent1"/>
+          </a:fillRef>
+          <a:effectRef idx="0">
+            <a:schemeClr val="accent1"/>
+          </a:effectRef>
+          <a:fontRef idx="minor">
+            <a:schemeClr val="tx1"/>
+          </a:fontRef>
+        </p:style>
+      </p:cxnSp>
+      <p:sp>
+        <p:nvSpPr>
+          <p:cNvPr id="12" name="TextBox 11">
+            <a:extLst>
+              <a:ext uri="{FF2B5EF4-FFF2-40B4-BE49-F238E27FC236}">
+                <a16:creationId xmlns:a16="http://schemas.microsoft.com/office/drawing/2014/main" id="{97BB675F-B265-4C42-AA4D-EFE8CEEF4D23}"/>
+              </a:ext>
+            </a:extLst>
+          </p:cNvPr>
+          <p:cNvSpPr txBox="1"/>
+          <p:nvPr/>
+        </p:nvSpPr>
+        <p:spPr>
+          <a:xfrm>
+            <a:off x="7361941" y="3260084"/>
+            <a:ext cx="1081963" cy="646331"/>
+          </a:xfrm>
+          <a:prstGeom prst="rect">
+            <a:avLst/>
+          </a:prstGeom>
+          <a:noFill/>
+        </p:spPr>
+        <p:txBody>
+          <a:bodyPr wrap="none" rtlCol="0">
+            <a:spAutoFit/>
+          </a:bodyPr>
+          <a:lstStyle/>
+          <a:p>
+            <a:r>
+              <a:rPr lang="en-US" dirty="0"/>
+              <a:t>Dual-Task</a:t>
+            </a:r>
+          </a:p>
+          <a:p>
+            <a:r>
+              <a:rPr lang="en-US" dirty="0"/>
+              <a:t>Learning</a:t>
+            </a:r>
+          </a:p>
+        </p:txBody>
+      </p:sp>
+      <p:cxnSp>
+        <p:nvCxnSpPr>
+          <p:cNvPr id="18" name="Straight Arrow Connector 17">
+            <a:extLst>
+              <a:ext uri="{FF2B5EF4-FFF2-40B4-BE49-F238E27FC236}">
+                <a16:creationId xmlns:a16="http://schemas.microsoft.com/office/drawing/2014/main" id="{97D291E3-F089-48A7-9533-3F61A0515079}"/>
+              </a:ext>
+            </a:extLst>
+          </p:cNvPr>
+          <p:cNvCxnSpPr>
+            <a:stCxn id="32" idx="3"/>
+            <a:endCxn id="35" idx="1"/>
+          </p:cNvCxnSpPr>
+          <p:nvPr/>
+        </p:nvCxnSpPr>
+        <p:spPr>
+          <a:xfrm>
+            <a:off x="7962865" y="2449286"/>
+            <a:ext cx="826646" cy="0"/>
+          </a:xfrm>
+          <a:prstGeom prst="straightConnector1">
+            <a:avLst/>
+          </a:prstGeom>
+          <a:ln w="19050">
+            <a:headEnd type="triangle"/>
+            <a:tailEnd type="triangle"/>
+          </a:ln>
+        </p:spPr>
+        <p:style>
+          <a:lnRef idx="1">
+            <a:schemeClr val="accent1"/>
+          </a:lnRef>
+          <a:fillRef idx="0">
+            <a:schemeClr val="accent1"/>
+          </a:fillRef>
+          <a:effectRef idx="0">
+            <a:schemeClr val="accent1"/>
+          </a:effectRef>
+          <a:fontRef idx="minor">
+            <a:schemeClr val="tx1"/>
+          </a:fontRef>
+        </p:style>
+      </p:cxnSp>
+      <p:cxnSp>
+        <p:nvCxnSpPr>
+          <p:cNvPr id="21" name="Straight Arrow Connector 20">
+            <a:extLst>
+              <a:ext uri="{FF2B5EF4-FFF2-40B4-BE49-F238E27FC236}">
+                <a16:creationId xmlns:a16="http://schemas.microsoft.com/office/drawing/2014/main" id="{5DA08198-DDD0-480F-B362-042AC6C1F30B}"/>
+              </a:ext>
+            </a:extLst>
+          </p:cNvPr>
+          <p:cNvCxnSpPr>
+            <a:stCxn id="33" idx="3"/>
+            <a:endCxn id="36" idx="1"/>
+          </p:cNvCxnSpPr>
+          <p:nvPr/>
+        </p:nvCxnSpPr>
+        <p:spPr>
+          <a:xfrm>
+            <a:off x="7962865" y="4815113"/>
+            <a:ext cx="826646" cy="0"/>
+          </a:xfrm>
+          <a:prstGeom prst="straightConnector1">
+            <a:avLst/>
+          </a:prstGeom>
+          <a:ln w="19050">
+            <a:headEnd type="triangle"/>
+            <a:tailEnd type="triangle"/>
+          </a:ln>
+        </p:spPr>
+        <p:style>
+          <a:lnRef idx="1">
+            <a:schemeClr val="accent1"/>
+          </a:lnRef>
+          <a:fillRef idx="0">
+            <a:schemeClr val="accent1"/>
+          </a:fillRef>
+          <a:effectRef idx="0">
+            <a:schemeClr val="accent1"/>
+          </a:effectRef>
+          <a:fontRef idx="minor">
+            <a:schemeClr val="tx1"/>
+          </a:fontRef>
+        </p:style>
+      </p:cxnSp>
+    </p:spTree>
+    <p:extLst>
+      <p:ext uri="{BB962C8B-B14F-4D97-AF65-F5344CB8AC3E}">
+        <p14:creationId xmlns:p14="http://schemas.microsoft.com/office/powerpoint/2010/main" val="1943562508"/>
       </p:ext>
     </p:extLst>
   </p:cSld>

</xml_diff>